<commit_message>
Edits to make sure we remove empty space
</commit_message>
<xml_diff>
--- a/manuscripts/ABZ2020/source/figures/Diagrams.pptx
+++ b/manuscripts/ABZ2020/source/figures/Diagrams.pptx
@@ -4835,9 +4835,9 @@
         <p:grpSpPr>
           <a:xfrm>
             <a:off x="433735" y="710824"/>
-            <a:ext cx="11176246" cy="4972967"/>
+            <a:ext cx="11176246" cy="4333609"/>
             <a:chOff x="433735" y="710824"/>
-            <a:chExt cx="11176246" cy="4972967"/>
+            <a:chExt cx="11176246" cy="4333609"/>
           </a:xfrm>
         </p:grpSpPr>
         <p:sp>
@@ -5063,7 +5063,7 @@
           <p:spPr>
             <a:xfrm>
               <a:off x="758658" y="2065249"/>
-              <a:ext cx="10851323" cy="3139321"/>
+              <a:ext cx="10851323" cy="2585323"/>
             </a:xfrm>
             <a:prstGeom prst="rect">
               <a:avLst/>
@@ -5124,18 +5124,10 @@
               <a:pPr algn="ctr"/>
               <a:endParaRPr lang="en-US" dirty="0"/>
             </a:p>
-            <a:p>
-              <a:pPr algn="ctr"/>
-              <a:endParaRPr lang="en-US" dirty="0"/>
-            </a:p>
-            <a:p>
-              <a:pPr algn="ctr"/>
-              <a:endParaRPr lang="en-US" dirty="0"/>
-            </a:p>
           </p:txBody>
         </p:sp>
-        <mc:AlternateContent xmlns:mc="http://schemas.openxmlformats.org/markup-compatibility/2006" xmlns:a14="http://schemas.microsoft.com/office/drawing/2010/main">
-          <mc:Choice Requires="a14">
+        <mc:AlternateContent xmlns:mc="http://schemas.openxmlformats.org/markup-compatibility/2006">
+          <mc:Choice xmlns:a14="http://schemas.microsoft.com/office/drawing/2010/main" Requires="a14">
             <p:sp>
               <p:nvSpPr>
                 <p:cNvPr id="4" name="TextBox 3">
@@ -5151,7 +5143,7 @@
               <p:spPr>
                 <a:xfrm>
                   <a:off x="1108762" y="2434408"/>
-                  <a:ext cx="4157702" cy="2620782"/>
+                  <a:ext cx="4157702" cy="1974451"/>
                 </a:xfrm>
                 <a:prstGeom prst="rect">
                   <a:avLst/>
@@ -5257,15 +5249,7 @@
                 </a:p>
                 <a:p>
                   <a:pPr algn="ctr"/>
-                  <a:endParaRPr lang="en-US" dirty="0"/>
-                </a:p>
-                <a:p>
-                  <a:pPr algn="ctr"/>
-                  <a:endParaRPr lang="en-US" dirty="0"/>
-                </a:p>
-                <a:p>
-                  <a:pPr algn="ctr"/>
-                  <a:endParaRPr lang="en-US" dirty="0"/>
+                  <a:endParaRPr lang="en-US" sz="1100" dirty="0"/>
                 </a:p>
                 <a:p>
                   <a:pPr algn="ctr"/>
@@ -5274,7 +5258,7 @@
               </p:txBody>
             </p:sp>
           </mc:Choice>
-          <mc:Fallback xmlns="">
+          <mc:Fallback>
             <p:sp>
               <p:nvSpPr>
                 <p:cNvPr id="4" name="TextBox 3">
@@ -5292,7 +5276,7 @@
               <p:spPr>
                 <a:xfrm>
                   <a:off x="1108762" y="2434408"/>
-                  <a:ext cx="4157702" cy="2620782"/>
+                  <a:ext cx="4157702" cy="1974451"/>
                 </a:xfrm>
                 <a:prstGeom prst="rect">
                   <a:avLst/>
@@ -5300,7 +5284,7 @@
                 <a:blipFill>
                   <a:blip r:embed="rId3"/>
                   <a:stretch>
-                    <a:fillRect t="-478"/>
+                    <a:fillRect t="-633"/>
                   </a:stretch>
                 </a:blipFill>
                 <a:ln w="25400">
@@ -5953,12 +5937,12 @@
           </p:nvCxnSpPr>
           <p:spPr>
             <a:xfrm rot="5400000">
-              <a:off x="7250209" y="2032580"/>
-              <a:ext cx="2106102" cy="4237879"/>
+              <a:off x="7527208" y="1755581"/>
+              <a:ext cx="1552104" cy="4237879"/>
             </a:xfrm>
             <a:prstGeom prst="bentConnector3">
               <a:avLst>
-                <a:gd name="adj1" fmla="val 120241"/>
+                <a:gd name="adj1" fmla="val 123792"/>
               </a:avLst>
             </a:prstGeom>
             <a:ln w="38100">
@@ -6044,7 +6028,7 @@
           </p:nvSpPr>
           <p:spPr>
             <a:xfrm>
-              <a:off x="5328384" y="3739228"/>
+              <a:off x="5328384" y="3410433"/>
               <a:ext cx="644087" cy="369332"/>
             </a:xfrm>
             <a:prstGeom prst="rect">
@@ -6262,7 +6246,7 @@
           </p:nvSpPr>
           <p:spPr>
             <a:xfrm>
-              <a:off x="8733937" y="5314459"/>
+              <a:off x="8712063" y="4675101"/>
               <a:ext cx="1058816" cy="369332"/>
             </a:xfrm>
             <a:prstGeom prst="rect">
@@ -6303,7 +6287,7 @@
           <p:spPr>
             <a:xfrm flipV="1">
               <a:off x="5266464" y="3098468"/>
-              <a:ext cx="767928" cy="646331"/>
+              <a:ext cx="767928" cy="323166"/>
             </a:xfrm>
             <a:prstGeom prst="bentConnector2">
               <a:avLst/>
@@ -6344,7 +6328,7 @@
           </p:nvSpPr>
           <p:spPr>
             <a:xfrm>
-              <a:off x="1247623" y="3560133"/>
+              <a:off x="1247623" y="3437045"/>
               <a:ext cx="988945" cy="369332"/>
             </a:xfrm>
             <a:prstGeom prst="rect">
@@ -6390,7 +6374,7 @@
           </p:nvSpPr>
           <p:spPr>
             <a:xfrm>
-              <a:off x="3595149" y="3981816"/>
+              <a:off x="3595149" y="3858728"/>
               <a:ext cx="1030921" cy="369332"/>
             </a:xfrm>
             <a:prstGeom prst="rect">
@@ -6422,8 +6406,8 @@
             </a:p>
           </p:txBody>
         </p:sp>
-        <mc:AlternateContent xmlns:mc="http://schemas.openxmlformats.org/markup-compatibility/2006" xmlns:a14="http://schemas.microsoft.com/office/drawing/2010/main">
-          <mc:Choice Requires="a14">
+        <mc:AlternateContent xmlns:mc="http://schemas.openxmlformats.org/markup-compatibility/2006">
+          <mc:Choice xmlns:a14="http://schemas.microsoft.com/office/drawing/2010/main" Requires="a14">
             <p:sp>
               <p:nvSpPr>
                 <p:cNvPr id="23" name="TextBox 22">
@@ -6438,7 +6422,7 @@
               </p:nvSpPr>
               <p:spPr>
                 <a:xfrm>
-                  <a:off x="2191424" y="3345367"/>
+                  <a:off x="2191424" y="3222279"/>
                   <a:ext cx="3613600" cy="369332"/>
                 </a:xfrm>
                 <a:prstGeom prst="rect">
@@ -6511,7 +6495,7 @@
               </p:txBody>
             </p:sp>
           </mc:Choice>
-          <mc:Fallback xmlns="">
+          <mc:Fallback>
             <p:sp>
               <p:nvSpPr>
                 <p:cNvPr id="23" name="TextBox 22">
@@ -6528,7 +6512,7 @@
               </p:nvSpPr>
               <p:spPr>
                 <a:xfrm>
-                  <a:off x="2191424" y="3345367"/>
+                  <a:off x="2191424" y="3222279"/>
                   <a:ext cx="3613600" cy="369332"/>
                 </a:xfrm>
                 <a:prstGeom prst="rect">
@@ -6537,7 +6521,7 @@
                 <a:blipFill>
                   <a:blip r:embed="rId4"/>
                   <a:stretch>
-                    <a:fillRect l="-351" t="-3333" b="-26667"/>
+                    <a:fillRect l="-351" t="-6667" b="-23333"/>
                   </a:stretch>
                 </a:blipFill>
               </p:spPr>
@@ -6574,7 +6558,7 @@
           </p:nvCxnSpPr>
           <p:spPr>
             <a:xfrm>
-              <a:off x="2236568" y="3744799"/>
+              <a:off x="2236568" y="3621711"/>
               <a:ext cx="1874042" cy="237017"/>
             </a:xfrm>
             <a:prstGeom prst="bentConnector2">
@@ -6616,7 +6600,7 @@
           </p:nvSpPr>
           <p:spPr>
             <a:xfrm>
-              <a:off x="1274452" y="3157556"/>
+              <a:off x="1274452" y="3034468"/>
               <a:ext cx="198780" cy="198780"/>
             </a:xfrm>
             <a:prstGeom prst="ellipse">
@@ -6674,7 +6658,7 @@
           </p:nvCxnSpPr>
           <p:spPr>
             <a:xfrm>
-              <a:off x="1473232" y="3256946"/>
+              <a:off x="1473232" y="3133858"/>
               <a:ext cx="268864" cy="303187"/>
             </a:xfrm>
             <a:prstGeom prst="curvedConnector2">
@@ -6734,10 +6718,10 @@
       </p:grpSpPr>
       <p:grpSp>
         <p:nvGrpSpPr>
-          <p:cNvPr id="118" name="Group 117">
+          <p:cNvPr id="20" name="Group 19">
             <a:extLst>
               <a:ext uri="{FF2B5EF4-FFF2-40B4-BE49-F238E27FC236}">
-                <a16:creationId xmlns:a16="http://schemas.microsoft.com/office/drawing/2014/main" id="{382EE5B4-4BA3-2442-8939-B1767DE5E202}"/>
+                <a16:creationId xmlns:a16="http://schemas.microsoft.com/office/drawing/2014/main" id="{62E6F770-0926-8041-8EFB-153887562147}"/>
               </a:ext>
             </a:extLst>
           </p:cNvPr>
@@ -6746,10 +6730,10 @@
         </p:nvGrpSpPr>
         <p:grpSpPr>
           <a:xfrm>
-            <a:off x="433735" y="267500"/>
-            <a:ext cx="11564678" cy="6991497"/>
-            <a:chOff x="433735" y="267500"/>
-            <a:chExt cx="11564678" cy="6991497"/>
+            <a:off x="313661" y="366020"/>
+            <a:ext cx="11564678" cy="6314495"/>
+            <a:chOff x="313661" y="366020"/>
+            <a:chExt cx="11564678" cy="6314495"/>
           </a:xfrm>
         </p:grpSpPr>
         <p:sp>
@@ -6766,8 +6750,8 @@
           </p:nvSpPr>
           <p:spPr>
             <a:xfrm>
-              <a:off x="493114" y="1132660"/>
-              <a:ext cx="11505299" cy="5632311"/>
+              <a:off x="373040" y="1231180"/>
+              <a:ext cx="11505299" cy="5078313"/>
             </a:xfrm>
             <a:prstGeom prst="rect">
               <a:avLst/>
@@ -6864,14 +6848,6 @@
               <a:pPr algn="ctr"/>
               <a:endParaRPr lang="en-US" dirty="0"/>
             </a:p>
-            <a:p>
-              <a:pPr algn="ctr"/>
-              <a:endParaRPr lang="en-US" dirty="0"/>
-            </a:p>
-            <a:p>
-              <a:pPr algn="ctr"/>
-              <a:endParaRPr lang="en-US" dirty="0"/>
-            </a:p>
           </p:txBody>
         </p:sp>
         <p:sp>
@@ -6888,8 +6864,8 @@
           </p:nvSpPr>
           <p:spPr>
             <a:xfrm>
-              <a:off x="493112" y="1442025"/>
-              <a:ext cx="11505299" cy="5322941"/>
+              <a:off x="380912" y="1539023"/>
+              <a:ext cx="11497425" cy="4769832"/>
             </a:xfrm>
             <a:prstGeom prst="rect">
               <a:avLst/>
@@ -6945,7 +6921,7 @@
           </p:nvSpPr>
           <p:spPr>
             <a:xfrm>
-              <a:off x="906943" y="465273"/>
+              <a:off x="786869" y="563793"/>
               <a:ext cx="669414" cy="369332"/>
             </a:xfrm>
             <a:prstGeom prst="rect">
@@ -6977,8 +6953,8 @@
             </a:p>
           </p:txBody>
         </p:sp>
-        <mc:AlternateContent xmlns:mc="http://schemas.openxmlformats.org/markup-compatibility/2006" xmlns:a14="http://schemas.microsoft.com/office/drawing/2010/main">
-          <mc:Choice Requires="a14">
+        <mc:AlternateContent xmlns:mc="http://schemas.openxmlformats.org/markup-compatibility/2006">
+          <mc:Choice xmlns:a14="http://schemas.microsoft.com/office/drawing/2010/main" Requires="a14">
             <p:sp>
               <p:nvSpPr>
                 <p:cNvPr id="3" name="TextBox 2">
@@ -6993,7 +6969,7 @@
               </p:nvSpPr>
               <p:spPr>
                 <a:xfrm>
-                  <a:off x="2608048" y="306771"/>
+                  <a:off x="2487974" y="405291"/>
                   <a:ext cx="2494093" cy="681790"/>
                 </a:xfrm>
                 <a:prstGeom prst="rect">
@@ -7089,7 +7065,7 @@
               </p:txBody>
             </p:sp>
           </mc:Choice>
-          <mc:Fallback xmlns="">
+          <mc:Fallback>
             <p:sp>
               <p:nvSpPr>
                 <p:cNvPr id="3" name="TextBox 2">
@@ -7106,7 +7082,7 @@
               </p:nvSpPr>
               <p:spPr>
                 <a:xfrm>
-                  <a:off x="2608048" y="306771"/>
+                  <a:off x="2487974" y="405291"/>
                   <a:ext cx="2494093" cy="681790"/>
                 </a:xfrm>
                 <a:prstGeom prst="rect">
@@ -7115,7 +7091,7 @@
                 <a:blipFill>
                   <a:blip r:embed="rId2"/>
                   <a:stretch>
-                    <a:fillRect b="-8772"/>
+                    <a:fillRect t="-1754" b="-8772"/>
                   </a:stretch>
                 </a:blipFill>
                 <a:ln w="25400">
@@ -7139,8 +7115,8 @@
             </p:sp>
           </mc:Fallback>
         </mc:AlternateContent>
-        <mc:AlternateContent xmlns:mc="http://schemas.openxmlformats.org/markup-compatibility/2006" xmlns:a14="http://schemas.microsoft.com/office/drawing/2010/main">
-          <mc:Choice Requires="a14">
+        <mc:AlternateContent xmlns:mc="http://schemas.openxmlformats.org/markup-compatibility/2006">
+          <mc:Choice xmlns:a14="http://schemas.microsoft.com/office/drawing/2010/main" Requires="a14">
             <p:sp>
               <p:nvSpPr>
                 <p:cNvPr id="4" name="TextBox 3">
@@ -7155,8 +7131,8 @@
               </p:nvSpPr>
               <p:spPr>
                 <a:xfrm>
-                  <a:off x="738059" y="1952491"/>
-                  <a:ext cx="4157702" cy="2620782"/>
+                  <a:off x="617985" y="2051011"/>
+                  <a:ext cx="4157702" cy="1974451"/>
                 </a:xfrm>
                 <a:prstGeom prst="rect">
                   <a:avLst/>
@@ -7266,20 +7242,12 @@
                 </a:p>
                 <a:p>
                   <a:pPr algn="ctr"/>
-                  <a:endParaRPr lang="en-US" dirty="0"/>
-                </a:p>
-                <a:p>
-                  <a:pPr algn="ctr"/>
-                  <a:endParaRPr lang="en-US" dirty="0"/>
-                </a:p>
-                <a:p>
-                  <a:pPr algn="ctr"/>
-                  <a:endParaRPr lang="en-US" dirty="0"/>
+                  <a:endParaRPr lang="en-US" sz="1100" dirty="0"/>
                 </a:p>
               </p:txBody>
             </p:sp>
           </mc:Choice>
-          <mc:Fallback xmlns="">
+          <mc:Fallback>
             <p:sp>
               <p:nvSpPr>
                 <p:cNvPr id="4" name="TextBox 3">
@@ -7296,8 +7264,8 @@
               </p:nvSpPr>
               <p:spPr>
                 <a:xfrm>
-                  <a:off x="738059" y="1952491"/>
-                  <a:ext cx="4157702" cy="2620782"/>
+                  <a:off x="617985" y="2051011"/>
+                  <a:ext cx="4157702" cy="1974451"/>
                 </a:xfrm>
                 <a:prstGeom prst="rect">
                   <a:avLst/>
@@ -7305,7 +7273,7 @@
                 <a:blipFill>
                   <a:blip r:embed="rId3"/>
                   <a:stretch>
-                    <a:fillRect t="-478"/>
+                    <a:fillRect/>
                   </a:stretch>
                 </a:blipFill>
                 <a:ln w="25400">
@@ -7343,7 +7311,7 @@
           </p:nvSpPr>
           <p:spPr>
             <a:xfrm>
-              <a:off x="5328982" y="2247219"/>
+              <a:off x="5208908" y="2345739"/>
               <a:ext cx="669414" cy="369332"/>
             </a:xfrm>
             <a:prstGeom prst="rect">
@@ -7389,7 +7357,7 @@
           </p:nvSpPr>
           <p:spPr>
             <a:xfrm>
-              <a:off x="7064129" y="2247219"/>
+              <a:off x="6944055" y="2345739"/>
               <a:ext cx="1530867" cy="369332"/>
             </a:xfrm>
             <a:prstGeom prst="rect">
@@ -7435,7 +7403,7 @@
           </p:nvSpPr>
           <p:spPr>
             <a:xfrm>
-              <a:off x="9805891" y="2247219"/>
+              <a:off x="9685817" y="2345739"/>
               <a:ext cx="1133774" cy="369332"/>
             </a:xfrm>
             <a:prstGeom prst="rect">
@@ -7481,7 +7449,7 @@
           </p:nvSpPr>
           <p:spPr>
             <a:xfrm>
-              <a:off x="9583466" y="363610"/>
+              <a:off x="9463392" y="462130"/>
               <a:ext cx="1578622" cy="369332"/>
             </a:xfrm>
             <a:prstGeom prst="rect">
@@ -7531,7 +7499,7 @@
           </p:nvCxnSpPr>
           <p:spPr>
             <a:xfrm flipV="1">
-              <a:off x="1576357" y="647666"/>
+              <a:off x="1456283" y="746186"/>
               <a:ext cx="1031691" cy="2273"/>
             </a:xfrm>
             <a:prstGeom prst="straightConnector1">
@@ -7573,7 +7541,7 @@
           </p:nvSpPr>
           <p:spPr>
             <a:xfrm>
-              <a:off x="433735" y="548276"/>
+              <a:off x="313661" y="646796"/>
               <a:ext cx="198780" cy="198780"/>
             </a:xfrm>
             <a:prstGeom prst="ellipse">
@@ -7631,7 +7599,7 @@
           </p:nvCxnSpPr>
           <p:spPr>
             <a:xfrm>
-              <a:off x="632515" y="647666"/>
+              <a:off x="512441" y="746186"/>
               <a:ext cx="274428" cy="2273"/>
             </a:xfrm>
             <a:prstGeom prst="line">
@@ -7676,7 +7644,7 @@
           </p:nvCxnSpPr>
           <p:spPr>
             <a:xfrm>
-              <a:off x="5102141" y="647666"/>
+              <a:off x="4982067" y="746186"/>
               <a:ext cx="1143623" cy="484994"/>
             </a:xfrm>
             <a:prstGeom prst="bentConnector2">
@@ -7718,7 +7686,7 @@
           </p:nvSpPr>
           <p:spPr>
             <a:xfrm>
-              <a:off x="2441331" y="1626846"/>
+              <a:off x="2321257" y="1725366"/>
               <a:ext cx="198780" cy="198780"/>
             </a:xfrm>
             <a:prstGeom prst="ellipse">
@@ -7776,7 +7744,7 @@
           </p:nvCxnSpPr>
           <p:spPr>
             <a:xfrm>
-              <a:off x="2640111" y="1726236"/>
+              <a:off x="2520037" y="1824756"/>
               <a:ext cx="176799" cy="226255"/>
             </a:xfrm>
             <a:prstGeom prst="curvedConnector2">
@@ -7813,6 +7781,7 @@
               </a:extLst>
             </p:cNvPr>
             <p:cNvCxnSpPr>
+              <a:cxnSpLocks/>
               <a:stCxn id="6" idx="3"/>
               <a:endCxn id="7" idx="1"/>
             </p:cNvCxnSpPr>
@@ -7820,7 +7789,7 @@
           </p:nvCxnSpPr>
           <p:spPr>
             <a:xfrm>
-              <a:off x="5998396" y="2431885"/>
+              <a:off x="5878322" y="2530405"/>
               <a:ext cx="1065733" cy="0"/>
             </a:xfrm>
             <a:prstGeom prst="straightConnector1">
@@ -7866,7 +7835,7 @@
           </p:nvCxnSpPr>
           <p:spPr>
             <a:xfrm>
-              <a:off x="8594996" y="2431885"/>
+              <a:off x="8474922" y="2530405"/>
               <a:ext cx="1210895" cy="0"/>
             </a:xfrm>
             <a:prstGeom prst="straightConnector1">
@@ -7912,7 +7881,7 @@
           </p:nvCxnSpPr>
           <p:spPr>
             <a:xfrm flipH="1" flipV="1">
-              <a:off x="10372777" y="732942"/>
+              <a:off x="10252703" y="831462"/>
               <a:ext cx="1" cy="1514277"/>
             </a:xfrm>
             <a:prstGeom prst="straightConnector1">
@@ -7958,12 +7927,12 @@
           </p:nvCxnSpPr>
           <p:spPr>
             <a:xfrm rot="5400000">
-              <a:off x="6235061" y="2627254"/>
-              <a:ext cx="4148420" cy="4127014"/>
+              <a:off x="6391986" y="2448775"/>
+              <a:ext cx="3594422" cy="4127014"/>
             </a:xfrm>
             <a:prstGeom prst="bentConnector3">
               <a:avLst>
-                <a:gd name="adj1" fmla="val 110873"/>
+                <a:gd name="adj1" fmla="val 110029"/>
               </a:avLst>
             </a:prstGeom>
             <a:ln w="38100">
@@ -7998,6 +7967,7 @@
               </a:extLst>
             </p:cNvPr>
             <p:cNvCxnSpPr>
+              <a:cxnSpLocks/>
               <a:stCxn id="9" idx="0"/>
               <a:endCxn id="2" idx="0"/>
             </p:cNvCxnSpPr>
@@ -8005,7 +7975,7 @@
           </p:nvCxnSpPr>
           <p:spPr>
             <a:xfrm rot="16200000" flipH="1" flipV="1">
-              <a:off x="5756382" y="-4151123"/>
+              <a:off x="5636308" y="-4052603"/>
               <a:ext cx="101663" cy="9131127"/>
             </a:xfrm>
             <a:prstGeom prst="bentConnector3">
@@ -8035,8 +8005,8 @@
             </a:fontRef>
           </p:style>
         </p:cxnSp>
-        <mc:AlternateContent xmlns:mc="http://schemas.openxmlformats.org/markup-compatibility/2006" xmlns:a14="http://schemas.microsoft.com/office/drawing/2010/main">
-          <mc:Choice Requires="a14">
+        <mc:AlternateContent xmlns:mc="http://schemas.openxmlformats.org/markup-compatibility/2006">
+          <mc:Choice xmlns:a14="http://schemas.microsoft.com/office/drawing/2010/main" Requires="a14">
             <p:sp>
               <p:nvSpPr>
                 <p:cNvPr id="65" name="TextBox 64">
@@ -8051,7 +8021,7 @@
               </p:nvSpPr>
               <p:spPr>
                 <a:xfrm>
-                  <a:off x="4915048" y="3283083"/>
+                  <a:off x="4735826" y="3065586"/>
                   <a:ext cx="2197654" cy="369332"/>
                 </a:xfrm>
                 <a:prstGeom prst="rect">
@@ -8107,7 +8077,7 @@
               </p:txBody>
             </p:sp>
           </mc:Choice>
-          <mc:Fallback xmlns="">
+          <mc:Fallback>
             <p:sp>
               <p:nvSpPr>
                 <p:cNvPr id="65" name="TextBox 64">
@@ -8124,7 +8094,7 @@
               </p:nvSpPr>
               <p:spPr>
                 <a:xfrm>
-                  <a:off x="4915048" y="3283083"/>
+                  <a:off x="4735826" y="3065586"/>
                   <a:ext cx="2197654" cy="369332"/>
                 </a:xfrm>
                 <a:prstGeom prst="rect">
@@ -8133,7 +8103,7 @@
                 <a:blipFill>
                   <a:blip r:embed="rId4"/>
                   <a:stretch>
-                    <a:fillRect l="-1149" t="-6667" b="-23333"/>
+                    <a:fillRect l="-1724" t="-3333" b="-26667"/>
                   </a:stretch>
                 </a:blipFill>
               </p:spPr>
@@ -8166,7 +8136,7 @@
           </p:nvSpPr>
           <p:spPr>
             <a:xfrm>
-              <a:off x="6063428" y="2062553"/>
+              <a:off x="5943354" y="2161073"/>
               <a:ext cx="833241" cy="369332"/>
             </a:xfrm>
             <a:prstGeom prst="rect">
@@ -8203,7 +8173,7 @@
           </p:nvSpPr>
           <p:spPr>
             <a:xfrm>
-              <a:off x="8610654" y="2062553"/>
+              <a:off x="8490580" y="2161073"/>
               <a:ext cx="829073" cy="369332"/>
             </a:xfrm>
             <a:prstGeom prst="rect">
@@ -8225,8 +8195,8 @@
             </a:p>
           </p:txBody>
         </p:sp>
-        <mc:AlternateContent xmlns:mc="http://schemas.openxmlformats.org/markup-compatibility/2006" xmlns:a14="http://schemas.microsoft.com/office/drawing/2010/main">
-          <mc:Choice Requires="a14">
+        <mc:AlternateContent xmlns:mc="http://schemas.openxmlformats.org/markup-compatibility/2006">
+          <mc:Choice xmlns:a14="http://schemas.microsoft.com/office/drawing/2010/main" Requires="a14">
             <p:sp>
               <p:nvSpPr>
                 <p:cNvPr id="68" name="TextBox 67">
@@ -8241,7 +8211,7 @@
               </p:nvSpPr>
               <p:spPr>
                 <a:xfrm>
-                  <a:off x="5113840" y="267500"/>
+                  <a:off x="4993766" y="366020"/>
                   <a:ext cx="2612382" cy="369332"/>
                 </a:xfrm>
                 <a:prstGeom prst="rect">
@@ -8301,7 +8271,7 @@
               </p:txBody>
             </p:sp>
           </mc:Choice>
-          <mc:Fallback xmlns="">
+          <mc:Fallback>
             <p:sp>
               <p:nvSpPr>
                 <p:cNvPr id="68" name="TextBox 67">
@@ -8318,7 +8288,7 @@
               </p:nvSpPr>
               <p:spPr>
                 <a:xfrm>
-                  <a:off x="5113840" y="267500"/>
+                  <a:off x="4993766" y="366020"/>
                   <a:ext cx="2612382" cy="369332"/>
                 </a:xfrm>
                 <a:prstGeom prst="rect">
@@ -8327,7 +8297,7 @@
                 <a:blipFill>
                   <a:blip r:embed="rId5"/>
                   <a:stretch>
-                    <a:fillRect l="-1456" t="-6667" b="-26667"/>
+                    <a:fillRect l="-966" t="-6667" b="-23333"/>
                   </a:stretch>
                 </a:blipFill>
               </p:spPr>
@@ -8360,7 +8330,7 @@
           </p:nvSpPr>
           <p:spPr>
             <a:xfrm>
-              <a:off x="1852910" y="306771"/>
+              <a:off x="1732836" y="405291"/>
               <a:ext cx="428322" cy="369332"/>
             </a:xfrm>
             <a:prstGeom prst="rect">
@@ -8396,7 +8366,7 @@
           </p:nvSpPr>
           <p:spPr>
             <a:xfrm>
-              <a:off x="10413290" y="779389"/>
+              <a:off x="10293216" y="877909"/>
               <a:ext cx="445315" cy="369332"/>
             </a:xfrm>
             <a:prstGeom prst="rect">
@@ -8417,8 +8387,8 @@
             </a:p>
           </p:txBody>
         </p:sp>
-        <mc:AlternateContent xmlns:mc="http://schemas.openxmlformats.org/markup-compatibility/2006" xmlns:a14="http://schemas.microsoft.com/office/drawing/2010/main">
-          <mc:Choice Requires="a14">
+        <mc:AlternateContent xmlns:mc="http://schemas.openxmlformats.org/markup-compatibility/2006">
+          <mc:Choice xmlns:a14="http://schemas.microsoft.com/office/drawing/2010/main" Requires="a14">
             <p:sp>
               <p:nvSpPr>
                 <p:cNvPr id="71" name="TextBox 70">
@@ -8433,7 +8403,7 @@
               </p:nvSpPr>
               <p:spPr>
                 <a:xfrm>
-                  <a:off x="7581784" y="6889665"/>
+                  <a:off x="7461710" y="6311183"/>
                   <a:ext cx="2612382" cy="369332"/>
                 </a:xfrm>
                 <a:prstGeom prst="rect">
@@ -8492,7 +8462,7 @@
               </p:txBody>
             </p:sp>
           </mc:Choice>
-          <mc:Fallback xmlns="">
+          <mc:Fallback>
             <p:sp>
               <p:nvSpPr>
                 <p:cNvPr id="71" name="TextBox 70">
@@ -8509,7 +8479,7 @@
               </p:nvSpPr>
               <p:spPr>
                 <a:xfrm>
-                  <a:off x="7581784" y="6889665"/>
+                  <a:off x="7461710" y="6311183"/>
                   <a:ext cx="2612382" cy="369332"/>
                 </a:xfrm>
                 <a:prstGeom prst="rect">
@@ -8518,7 +8488,7 @@
                 <a:blipFill>
                   <a:blip r:embed="rId6"/>
                   <a:stretch>
-                    <a:fillRect l="-1932" t="-3226" b="-22581"/>
+                    <a:fillRect l="-2439" t="-6667" b="-23333"/>
                   </a:stretch>
                 </a:blipFill>
               </p:spPr>
@@ -8555,8 +8525,8 @@
           </p:nvCxnSpPr>
           <p:spPr>
             <a:xfrm flipV="1">
-              <a:off x="4895761" y="2616551"/>
-              <a:ext cx="767928" cy="646331"/>
+              <a:off x="4775687" y="2715071"/>
+              <a:ext cx="767928" cy="323166"/>
             </a:xfrm>
             <a:prstGeom prst="bentConnector2">
               <a:avLst/>
@@ -8597,7 +8567,7 @@
           </p:nvSpPr>
           <p:spPr>
             <a:xfrm>
-              <a:off x="876920" y="3078216"/>
+              <a:off x="756846" y="3044856"/>
               <a:ext cx="988945" cy="369332"/>
             </a:xfrm>
             <a:prstGeom prst="rect">
@@ -8643,7 +8613,7 @@
           </p:nvSpPr>
           <p:spPr>
             <a:xfrm>
-              <a:off x="3224446" y="3499899"/>
+              <a:off x="3104372" y="3466539"/>
               <a:ext cx="1030921" cy="369332"/>
             </a:xfrm>
             <a:prstGeom prst="rect">
@@ -8675,8 +8645,8 @@
             </a:p>
           </p:txBody>
         </p:sp>
-        <mc:AlternateContent xmlns:mc="http://schemas.openxmlformats.org/markup-compatibility/2006" xmlns:a14="http://schemas.microsoft.com/office/drawing/2010/main">
-          <mc:Choice Requires="a14">
+        <mc:AlternateContent xmlns:mc="http://schemas.openxmlformats.org/markup-compatibility/2006">
+          <mc:Choice xmlns:a14="http://schemas.microsoft.com/office/drawing/2010/main" Requires="a14">
             <p:sp>
               <p:nvSpPr>
                 <p:cNvPr id="23" name="TextBox 22">
@@ -8691,7 +8661,7 @@
               </p:nvSpPr>
               <p:spPr>
                 <a:xfrm>
-                  <a:off x="1820721" y="2863450"/>
+                  <a:off x="1700647" y="2830090"/>
                   <a:ext cx="3613600" cy="369332"/>
                 </a:xfrm>
                 <a:prstGeom prst="rect">
@@ -8764,7 +8734,7 @@
               </p:txBody>
             </p:sp>
           </mc:Choice>
-          <mc:Fallback xmlns="">
+          <mc:Fallback>
             <p:sp>
               <p:nvSpPr>
                 <p:cNvPr id="23" name="TextBox 22">
@@ -8781,7 +8751,7 @@
               </p:nvSpPr>
               <p:spPr>
                 <a:xfrm>
-                  <a:off x="1820721" y="2863450"/>
+                  <a:off x="1700647" y="2830090"/>
                   <a:ext cx="3613600" cy="369332"/>
                 </a:xfrm>
                 <a:prstGeom prst="rect">
@@ -8790,7 +8760,7 @@
                 <a:blipFill>
                   <a:blip r:embed="rId7"/>
                   <a:stretch>
-                    <a:fillRect t="-3226" b="-22581"/>
+                    <a:fillRect l="-351" t="-6667" b="-23333"/>
                   </a:stretch>
                 </a:blipFill>
               </p:spPr>
@@ -8827,7 +8797,7 @@
           </p:nvCxnSpPr>
           <p:spPr>
             <a:xfrm>
-              <a:off x="1865865" y="3262882"/>
+              <a:off x="1745791" y="3229522"/>
               <a:ext cx="1874042" cy="237017"/>
             </a:xfrm>
             <a:prstGeom prst="bentConnector2">
@@ -8869,7 +8839,7 @@
           </p:nvSpPr>
           <p:spPr>
             <a:xfrm>
-              <a:off x="903749" y="2675639"/>
+              <a:off x="783675" y="2642279"/>
               <a:ext cx="198780" cy="198780"/>
             </a:xfrm>
             <a:prstGeom prst="ellipse">
@@ -8927,7 +8897,7 @@
           </p:nvCxnSpPr>
           <p:spPr>
             <a:xfrm>
-              <a:off x="1102529" y="2775029"/>
+              <a:off x="982455" y="2741669"/>
               <a:ext cx="268864" cy="303187"/>
             </a:xfrm>
             <a:prstGeom prst="curvedConnector2">
@@ -8937,48 +8907,6 @@
               <a:solidFill>
                 <a:schemeClr val="tx1"/>
               </a:solidFill>
-            </a:ln>
-          </p:spPr>
-          <p:style>
-            <a:lnRef idx="1">
-              <a:schemeClr val="accent1"/>
-            </a:lnRef>
-            <a:fillRef idx="0">
-              <a:schemeClr val="accent1"/>
-            </a:fillRef>
-            <a:effectRef idx="0">
-              <a:schemeClr val="accent1"/>
-            </a:effectRef>
-            <a:fontRef idx="minor">
-              <a:schemeClr val="tx1"/>
-            </a:fontRef>
-          </p:style>
-        </p:cxnSp>
-        <p:cxnSp>
-          <p:nvCxnSpPr>
-            <p:cNvPr id="16" name="Straight Connector 15">
-              <a:extLst>
-                <a:ext uri="{FF2B5EF4-FFF2-40B4-BE49-F238E27FC236}">
-                  <a16:creationId xmlns:a16="http://schemas.microsoft.com/office/drawing/2014/main" id="{3C4D6DF5-C7E1-B641-B7DD-E93C23E41576}"/>
-                </a:ext>
-              </a:extLst>
-            </p:cNvPr>
-            <p:cNvCxnSpPr/>
-            <p:nvPr/>
-          </p:nvCxnSpPr>
-          <p:spPr>
-            <a:xfrm>
-              <a:off x="493113" y="1442025"/>
-              <a:ext cx="10851323" cy="0"/>
-            </a:xfrm>
-            <a:prstGeom prst="line">
-              <a:avLst/>
-            </a:prstGeom>
-            <a:ln w="25400">
-              <a:solidFill>
-                <a:schemeClr val="tx1"/>
-              </a:solidFill>
-              <a:prstDash val="solid"/>
             </a:ln>
           </p:spPr>
           <p:style>
@@ -9012,7 +8940,7 @@
           </p:nvCxnSpPr>
           <p:spPr>
             <a:xfrm>
-              <a:off x="493112" y="4662604"/>
+              <a:off x="373038" y="4207212"/>
               <a:ext cx="11505299" cy="0"/>
             </a:xfrm>
             <a:prstGeom prst="line">
@@ -9054,7 +8982,7 @@
           </p:nvSpPr>
           <p:spPr>
             <a:xfrm>
-              <a:off x="5245890" y="1492500"/>
+              <a:off x="5125816" y="1591020"/>
               <a:ext cx="1161999" cy="369332"/>
             </a:xfrm>
             <a:prstGeom prst="rect">
@@ -9090,7 +9018,7 @@
           </p:nvSpPr>
           <p:spPr>
             <a:xfrm>
-              <a:off x="5082689" y="4651293"/>
+              <a:off x="4939082" y="4203170"/>
               <a:ext cx="1981440" cy="369332"/>
             </a:xfrm>
             <a:prstGeom prst="rect">
@@ -9126,7 +9054,7 @@
           </p:nvSpPr>
           <p:spPr>
             <a:xfrm>
-              <a:off x="1655262" y="5667665"/>
+              <a:off x="1535188" y="5203481"/>
               <a:ext cx="198780" cy="198780"/>
             </a:xfrm>
             <a:prstGeom prst="ellipse">
@@ -9180,7 +9108,7 @@
           </p:nvSpPr>
           <p:spPr>
             <a:xfrm>
-              <a:off x="2336928" y="4974062"/>
+              <a:off x="2216854" y="4509878"/>
               <a:ext cx="7313536" cy="1600438"/>
             </a:xfrm>
             <a:prstGeom prst="rect">
@@ -9246,7 +9174,7 @@
           </p:nvSpPr>
           <p:spPr>
             <a:xfrm>
-              <a:off x="2926685" y="5634154"/>
+              <a:off x="2806611" y="5169970"/>
               <a:ext cx="1711783" cy="369332"/>
             </a:xfrm>
             <a:prstGeom prst="rect">
@@ -9292,7 +9220,7 @@
           </p:nvSpPr>
           <p:spPr>
             <a:xfrm>
-              <a:off x="7693360" y="5634154"/>
+              <a:off x="7573286" y="5169970"/>
               <a:ext cx="1830115" cy="369332"/>
             </a:xfrm>
             <a:prstGeom prst="rect">
@@ -9342,7 +9270,7 @@
           </p:nvCxnSpPr>
           <p:spPr>
             <a:xfrm>
-              <a:off x="1854042" y="5767055"/>
+              <a:off x="1733968" y="5302871"/>
               <a:ext cx="482886" cy="7226"/>
             </a:xfrm>
             <a:prstGeom prst="line">
@@ -9383,7 +9311,7 @@
           </p:nvSpPr>
           <p:spPr>
             <a:xfrm>
-              <a:off x="2592512" y="5376587"/>
+              <a:off x="2472438" y="4912403"/>
               <a:ext cx="198780" cy="198780"/>
             </a:xfrm>
             <a:prstGeom prst="ellipse">
@@ -9441,7 +9369,7 @@
           </p:nvCxnSpPr>
           <p:spPr>
             <a:xfrm rot="16200000" flipH="1">
-              <a:off x="2687567" y="5579701"/>
+              <a:off x="2567493" y="5115517"/>
               <a:ext cx="243453" cy="234783"/>
             </a:xfrm>
             <a:prstGeom prst="curvedConnector2">
@@ -9486,7 +9414,7 @@
           </p:nvCxnSpPr>
           <p:spPr>
             <a:xfrm rot="16200000" flipH="1">
-              <a:off x="4118189" y="5298542"/>
+              <a:off x="3998115" y="4834358"/>
               <a:ext cx="184666" cy="855891"/>
             </a:xfrm>
             <a:prstGeom prst="curvedConnector4">
@@ -9535,7 +9463,7 @@
           </p:nvCxnSpPr>
           <p:spPr>
             <a:xfrm rot="16200000" flipH="1">
-              <a:off x="6195497" y="3590565"/>
+              <a:off x="6075423" y="3126381"/>
               <a:ext cx="12700" cy="4825841"/>
             </a:xfrm>
             <a:prstGeom prst="bentConnector3">
@@ -9565,8 +9493,8 @@
             </a:fontRef>
           </p:style>
         </p:cxnSp>
-        <mc:AlternateContent xmlns:mc="http://schemas.openxmlformats.org/markup-compatibility/2006" xmlns:a14="http://schemas.microsoft.com/office/drawing/2010/main">
-          <mc:Choice Requires="a14">
+        <mc:AlternateContent xmlns:mc="http://schemas.openxmlformats.org/markup-compatibility/2006">
+          <mc:Choice xmlns:a14="http://schemas.microsoft.com/office/drawing/2010/main" Requires="a14">
             <p:sp>
               <p:nvSpPr>
                 <p:cNvPr id="93" name="TextBox 92">
@@ -9581,7 +9509,7 @@
               </p:nvSpPr>
               <p:spPr>
                 <a:xfrm>
-                  <a:off x="4795975" y="5232640"/>
+                  <a:off x="4675901" y="4768456"/>
                   <a:ext cx="3288271" cy="646331"/>
                 </a:xfrm>
                 <a:prstGeom prst="rect">
@@ -9679,7 +9607,7 @@
               </p:txBody>
             </p:sp>
           </mc:Choice>
-          <mc:Fallback xmlns="">
+          <mc:Fallback>
             <p:sp>
               <p:nvSpPr>
                 <p:cNvPr id="93" name="TextBox 92">
@@ -9696,7 +9624,7 @@
               </p:nvSpPr>
               <p:spPr>
                 <a:xfrm>
-                  <a:off x="4795975" y="5232640"/>
+                  <a:off x="4675901" y="4768456"/>
                   <a:ext cx="3288271" cy="646331"/>
                 </a:xfrm>
                 <a:prstGeom prst="rect">
@@ -9705,7 +9633,7 @@
                 <a:blipFill>
                   <a:blip r:embed="rId8"/>
                   <a:stretch>
-                    <a:fillRect l="-1154" t="-3846" b="-13462"/>
+                    <a:fillRect l="-769" t="-1923" b="-15385"/>
                   </a:stretch>
                 </a:blipFill>
               </p:spPr>
@@ -9724,8 +9652,8 @@
             </p:sp>
           </mc:Fallback>
         </mc:AlternateContent>
-        <mc:AlternateContent xmlns:mc="http://schemas.openxmlformats.org/markup-compatibility/2006" xmlns:a14="http://schemas.microsoft.com/office/drawing/2010/main">
-          <mc:Choice Requires="a14">
+        <mc:AlternateContent xmlns:mc="http://schemas.openxmlformats.org/markup-compatibility/2006">
+          <mc:Choice xmlns:a14="http://schemas.microsoft.com/office/drawing/2010/main" Requires="a14">
             <p:sp>
               <p:nvSpPr>
                 <p:cNvPr id="101" name="TextBox 100">
@@ -9740,7 +9668,7 @@
               </p:nvSpPr>
               <p:spPr>
                 <a:xfrm>
-                  <a:off x="4973926" y="6179314"/>
+                  <a:off x="4853852" y="5715130"/>
                   <a:ext cx="2467508" cy="369332"/>
                 </a:xfrm>
                 <a:prstGeom prst="rect">
@@ -9793,7 +9721,7 @@
               </p:txBody>
             </p:sp>
           </mc:Choice>
-          <mc:Fallback xmlns="">
+          <mc:Fallback>
             <p:sp>
               <p:nvSpPr>
                 <p:cNvPr id="101" name="TextBox 100">
@@ -9810,7 +9738,7 @@
               </p:nvSpPr>
               <p:spPr>
                 <a:xfrm>
-                  <a:off x="4973926" y="6179314"/>
+                  <a:off x="4853852" y="5715130"/>
                   <a:ext cx="2467508" cy="369332"/>
                 </a:xfrm>
                 <a:prstGeom prst="rect">

</xml_diff>

<commit_message>
adding some more text
</commit_message>
<xml_diff>
--- a/manuscripts/ABZ2020/source/figures/Diagrams.pptx
+++ b/manuscripts/ABZ2020/source/figures/Diagrams.pptx
@@ -9,6 +9,7 @@
     <p:sldId id="259" r:id="rId3"/>
     <p:sldId id="260" r:id="rId4"/>
     <p:sldId id="261" r:id="rId5"/>
+    <p:sldId id="262" r:id="rId6"/>
   </p:sldIdLst>
   <p:sldSz cx="12192000" cy="6858000"/>
   <p:notesSz cx="6858000" cy="9144000"/>
@@ -5126,8 +5127,8 @@
             </a:p>
           </p:txBody>
         </p:sp>
-        <mc:AlternateContent xmlns:mc="http://schemas.openxmlformats.org/markup-compatibility/2006">
-          <mc:Choice xmlns:a14="http://schemas.microsoft.com/office/drawing/2010/main" Requires="a14">
+        <mc:AlternateContent xmlns:mc="http://schemas.openxmlformats.org/markup-compatibility/2006" xmlns:a14="http://schemas.microsoft.com/office/drawing/2010/main">
+          <mc:Choice Requires="a14">
             <p:sp>
               <p:nvSpPr>
                 <p:cNvPr id="4" name="TextBox 3">
@@ -5258,7 +5259,7 @@
               </p:txBody>
             </p:sp>
           </mc:Choice>
-          <mc:Fallback>
+          <mc:Fallback xmlns="">
             <p:sp>
               <p:nvSpPr>
                 <p:cNvPr id="4" name="TextBox 3">
@@ -6406,8 +6407,8 @@
             </a:p>
           </p:txBody>
         </p:sp>
-        <mc:AlternateContent xmlns:mc="http://schemas.openxmlformats.org/markup-compatibility/2006">
-          <mc:Choice xmlns:a14="http://schemas.microsoft.com/office/drawing/2010/main" Requires="a14">
+        <mc:AlternateContent xmlns:mc="http://schemas.openxmlformats.org/markup-compatibility/2006" xmlns:a14="http://schemas.microsoft.com/office/drawing/2010/main">
+          <mc:Choice Requires="a14">
             <p:sp>
               <p:nvSpPr>
                 <p:cNvPr id="23" name="TextBox 22">
@@ -6495,7 +6496,7 @@
               </p:txBody>
             </p:sp>
           </mc:Choice>
-          <mc:Fallback>
+          <mc:Fallback xmlns="">
             <p:sp>
               <p:nvSpPr>
                 <p:cNvPr id="23" name="TextBox 22">
@@ -6953,8 +6954,8 @@
             </a:p>
           </p:txBody>
         </p:sp>
-        <mc:AlternateContent xmlns:mc="http://schemas.openxmlformats.org/markup-compatibility/2006">
-          <mc:Choice xmlns:a14="http://schemas.microsoft.com/office/drawing/2010/main" Requires="a14">
+        <mc:AlternateContent xmlns:mc="http://schemas.openxmlformats.org/markup-compatibility/2006" xmlns:a14="http://schemas.microsoft.com/office/drawing/2010/main">
+          <mc:Choice Requires="a14">
             <p:sp>
               <p:nvSpPr>
                 <p:cNvPr id="3" name="TextBox 2">
@@ -7065,7 +7066,7 @@
               </p:txBody>
             </p:sp>
           </mc:Choice>
-          <mc:Fallback>
+          <mc:Fallback xmlns="">
             <p:sp>
               <p:nvSpPr>
                 <p:cNvPr id="3" name="TextBox 2">
@@ -7115,8 +7116,8 @@
             </p:sp>
           </mc:Fallback>
         </mc:AlternateContent>
-        <mc:AlternateContent xmlns:mc="http://schemas.openxmlformats.org/markup-compatibility/2006">
-          <mc:Choice xmlns:a14="http://schemas.microsoft.com/office/drawing/2010/main" Requires="a14">
+        <mc:AlternateContent xmlns:mc="http://schemas.openxmlformats.org/markup-compatibility/2006" xmlns:a14="http://schemas.microsoft.com/office/drawing/2010/main">
+          <mc:Choice Requires="a14">
             <p:sp>
               <p:nvSpPr>
                 <p:cNvPr id="4" name="TextBox 3">
@@ -7247,7 +7248,7 @@
               </p:txBody>
             </p:sp>
           </mc:Choice>
-          <mc:Fallback>
+          <mc:Fallback xmlns="">
             <p:sp>
               <p:nvSpPr>
                 <p:cNvPr id="4" name="TextBox 3">
@@ -8005,8 +8006,8 @@
             </a:fontRef>
           </p:style>
         </p:cxnSp>
-        <mc:AlternateContent xmlns:mc="http://schemas.openxmlformats.org/markup-compatibility/2006">
-          <mc:Choice xmlns:a14="http://schemas.microsoft.com/office/drawing/2010/main" Requires="a14">
+        <mc:AlternateContent xmlns:mc="http://schemas.openxmlformats.org/markup-compatibility/2006" xmlns:a14="http://schemas.microsoft.com/office/drawing/2010/main">
+          <mc:Choice Requires="a14">
             <p:sp>
               <p:nvSpPr>
                 <p:cNvPr id="65" name="TextBox 64">
@@ -8077,7 +8078,7 @@
               </p:txBody>
             </p:sp>
           </mc:Choice>
-          <mc:Fallback>
+          <mc:Fallback xmlns="">
             <p:sp>
               <p:nvSpPr>
                 <p:cNvPr id="65" name="TextBox 64">
@@ -8195,8 +8196,8 @@
             </a:p>
           </p:txBody>
         </p:sp>
-        <mc:AlternateContent xmlns:mc="http://schemas.openxmlformats.org/markup-compatibility/2006">
-          <mc:Choice xmlns:a14="http://schemas.microsoft.com/office/drawing/2010/main" Requires="a14">
+        <mc:AlternateContent xmlns:mc="http://schemas.openxmlformats.org/markup-compatibility/2006" xmlns:a14="http://schemas.microsoft.com/office/drawing/2010/main">
+          <mc:Choice Requires="a14">
             <p:sp>
               <p:nvSpPr>
                 <p:cNvPr id="68" name="TextBox 67">
@@ -8271,7 +8272,7 @@
               </p:txBody>
             </p:sp>
           </mc:Choice>
-          <mc:Fallback>
+          <mc:Fallback xmlns="">
             <p:sp>
               <p:nvSpPr>
                 <p:cNvPr id="68" name="TextBox 67">
@@ -8387,8 +8388,8 @@
             </a:p>
           </p:txBody>
         </p:sp>
-        <mc:AlternateContent xmlns:mc="http://schemas.openxmlformats.org/markup-compatibility/2006">
-          <mc:Choice xmlns:a14="http://schemas.microsoft.com/office/drawing/2010/main" Requires="a14">
+        <mc:AlternateContent xmlns:mc="http://schemas.openxmlformats.org/markup-compatibility/2006" xmlns:a14="http://schemas.microsoft.com/office/drawing/2010/main">
+          <mc:Choice Requires="a14">
             <p:sp>
               <p:nvSpPr>
                 <p:cNvPr id="71" name="TextBox 70">
@@ -8462,7 +8463,7 @@
               </p:txBody>
             </p:sp>
           </mc:Choice>
-          <mc:Fallback>
+          <mc:Fallback xmlns="">
             <p:sp>
               <p:nvSpPr>
                 <p:cNvPr id="71" name="TextBox 70">
@@ -8645,8 +8646,8 @@
             </a:p>
           </p:txBody>
         </p:sp>
-        <mc:AlternateContent xmlns:mc="http://schemas.openxmlformats.org/markup-compatibility/2006">
-          <mc:Choice xmlns:a14="http://schemas.microsoft.com/office/drawing/2010/main" Requires="a14">
+        <mc:AlternateContent xmlns:mc="http://schemas.openxmlformats.org/markup-compatibility/2006" xmlns:a14="http://schemas.microsoft.com/office/drawing/2010/main">
+          <mc:Choice Requires="a14">
             <p:sp>
               <p:nvSpPr>
                 <p:cNvPr id="23" name="TextBox 22">
@@ -8734,7 +8735,7 @@
               </p:txBody>
             </p:sp>
           </mc:Choice>
-          <mc:Fallback>
+          <mc:Fallback xmlns="">
             <p:sp>
               <p:nvSpPr>
                 <p:cNvPr id="23" name="TextBox 22">
@@ -9493,8 +9494,8 @@
             </a:fontRef>
           </p:style>
         </p:cxnSp>
-        <mc:AlternateContent xmlns:mc="http://schemas.openxmlformats.org/markup-compatibility/2006">
-          <mc:Choice xmlns:a14="http://schemas.microsoft.com/office/drawing/2010/main" Requires="a14">
+        <mc:AlternateContent xmlns:mc="http://schemas.openxmlformats.org/markup-compatibility/2006" xmlns:a14="http://schemas.microsoft.com/office/drawing/2010/main">
+          <mc:Choice Requires="a14">
             <p:sp>
               <p:nvSpPr>
                 <p:cNvPr id="93" name="TextBox 92">
@@ -9607,7 +9608,7 @@
               </p:txBody>
             </p:sp>
           </mc:Choice>
-          <mc:Fallback>
+          <mc:Fallback xmlns="">
             <p:sp>
               <p:nvSpPr>
                 <p:cNvPr id="93" name="TextBox 92">
@@ -9652,8 +9653,8 @@
             </p:sp>
           </mc:Fallback>
         </mc:AlternateContent>
-        <mc:AlternateContent xmlns:mc="http://schemas.openxmlformats.org/markup-compatibility/2006">
-          <mc:Choice xmlns:a14="http://schemas.microsoft.com/office/drawing/2010/main" Requires="a14">
+        <mc:AlternateContent xmlns:mc="http://schemas.openxmlformats.org/markup-compatibility/2006" xmlns:a14="http://schemas.microsoft.com/office/drawing/2010/main">
+          <mc:Choice Requires="a14">
             <p:sp>
               <p:nvSpPr>
                 <p:cNvPr id="101" name="TextBox 100">
@@ -9721,7 +9722,7 @@
               </p:txBody>
             </p:sp>
           </mc:Choice>
-          <mc:Fallback>
+          <mc:Fallback xmlns="">
             <p:sp>
               <p:nvSpPr>
                 <p:cNvPr id="101" name="TextBox 100">
@@ -9799,10 +9800,3602 @@
       </p:grpSpPr>
       <p:grpSp>
         <p:nvGrpSpPr>
-          <p:cNvPr id="112" name="Group 111">
+          <p:cNvPr id="14" name="Group 13">
             <a:extLst>
               <a:ext uri="{FF2B5EF4-FFF2-40B4-BE49-F238E27FC236}">
-                <a16:creationId xmlns:a16="http://schemas.microsoft.com/office/drawing/2014/main" id="{2F24BE70-A180-9C46-81F6-5AE7A778A42F}"/>
+                <a16:creationId xmlns:a16="http://schemas.microsoft.com/office/drawing/2014/main" id="{9AFE2447-77C0-1D42-B6C2-FE90A921A234}"/>
+              </a:ext>
+            </a:extLst>
+          </p:cNvPr>
+          <p:cNvGrpSpPr/>
+          <p:nvPr/>
+        </p:nvGrpSpPr>
+        <p:grpSpPr>
+          <a:xfrm>
+            <a:off x="0" y="0"/>
+            <a:ext cx="12192000" cy="7258997"/>
+            <a:chOff x="0" y="0"/>
+            <a:chExt cx="12192000" cy="7258997"/>
+          </a:xfrm>
+        </p:grpSpPr>
+        <p:grpSp>
+          <p:nvGrpSpPr>
+            <p:cNvPr id="10" name="Group 9">
+              <a:extLst>
+                <a:ext uri="{FF2B5EF4-FFF2-40B4-BE49-F238E27FC236}">
+                  <a16:creationId xmlns:a16="http://schemas.microsoft.com/office/drawing/2014/main" id="{CDA90AFA-ACC9-9D47-81D2-9BD12351FA54}"/>
+                </a:ext>
+              </a:extLst>
+            </p:cNvPr>
+            <p:cNvGrpSpPr/>
+            <p:nvPr/>
+          </p:nvGrpSpPr>
+          <p:grpSpPr>
+            <a:xfrm>
+              <a:off x="433735" y="267500"/>
+              <a:ext cx="11593332" cy="6991497"/>
+              <a:chOff x="433735" y="267500"/>
+              <a:chExt cx="11593332" cy="6991497"/>
+            </a:xfrm>
+          </p:grpSpPr>
+          <p:grpSp>
+            <p:nvGrpSpPr>
+              <p:cNvPr id="118" name="Group 117">
+                <a:extLst>
+                  <a:ext uri="{FF2B5EF4-FFF2-40B4-BE49-F238E27FC236}">
+                    <a16:creationId xmlns:a16="http://schemas.microsoft.com/office/drawing/2014/main" id="{382EE5B4-4BA3-2442-8939-B1767DE5E202}"/>
+                  </a:ext>
+                </a:extLst>
+              </p:cNvPr>
+              <p:cNvGrpSpPr/>
+              <p:nvPr/>
+            </p:nvGrpSpPr>
+            <p:grpSpPr>
+              <a:xfrm>
+                <a:off x="433735" y="267500"/>
+                <a:ext cx="11593332" cy="6991497"/>
+                <a:chOff x="433735" y="267500"/>
+                <a:chExt cx="11593332" cy="6991497"/>
+              </a:xfrm>
+            </p:grpSpPr>
+            <p:sp>
+              <p:nvSpPr>
+                <p:cNvPr id="5" name="TextBox 4">
+                  <a:extLst>
+                    <a:ext uri="{FF2B5EF4-FFF2-40B4-BE49-F238E27FC236}">
+                      <a16:creationId xmlns:a16="http://schemas.microsoft.com/office/drawing/2014/main" id="{F926EDE4-F943-B64F-86F1-578572A4F3FD}"/>
+                    </a:ext>
+                  </a:extLst>
+                </p:cNvPr>
+                <p:cNvSpPr txBox="1"/>
+                <p:nvPr/>
+              </p:nvSpPr>
+              <p:spPr>
+                <a:xfrm>
+                  <a:off x="493114" y="1132660"/>
+                  <a:ext cx="11505299" cy="5632311"/>
+                </a:xfrm>
+                <a:prstGeom prst="rect">
+                  <a:avLst/>
+                </a:prstGeom>
+                <a:solidFill>
+                  <a:schemeClr val="accent1">
+                    <a:lumMod val="60000"/>
+                    <a:lumOff val="40000"/>
+                  </a:schemeClr>
+                </a:solidFill>
+                <a:ln w="25400">
+                  <a:solidFill>
+                    <a:schemeClr val="tx1"/>
+                  </a:solidFill>
+                </a:ln>
+              </p:spPr>
+              <p:txBody>
+                <a:bodyPr wrap="square" rtlCol="0">
+                  <a:spAutoFit/>
+                </a:bodyPr>
+                <a:lstStyle/>
+                <a:p>
+                  <a:pPr algn="ctr"/>
+                  <a:r>
+                    <a:rPr lang="en-US" dirty="0"/>
+                    <a:t>OPERATIONAL</a:t>
+                  </a:r>
+                </a:p>
+                <a:p>
+                  <a:pPr algn="ctr"/>
+                  <a:endParaRPr lang="en-US" dirty="0"/>
+                </a:p>
+                <a:p>
+                  <a:pPr algn="ctr"/>
+                  <a:endParaRPr lang="en-US" dirty="0"/>
+                </a:p>
+                <a:p>
+                  <a:pPr algn="ctr"/>
+                  <a:endParaRPr lang="en-US" dirty="0"/>
+                </a:p>
+                <a:p>
+                  <a:pPr algn="ctr"/>
+                  <a:endParaRPr lang="en-US" dirty="0"/>
+                </a:p>
+                <a:p>
+                  <a:pPr algn="ctr"/>
+                  <a:endParaRPr lang="en-US" dirty="0"/>
+                </a:p>
+                <a:p>
+                  <a:pPr algn="ctr"/>
+                  <a:endParaRPr lang="en-US" dirty="0"/>
+                </a:p>
+                <a:p>
+                  <a:pPr algn="ctr"/>
+                  <a:endParaRPr lang="en-US" dirty="0"/>
+                </a:p>
+                <a:p>
+                  <a:pPr algn="ctr"/>
+                  <a:endParaRPr lang="en-US" dirty="0"/>
+                </a:p>
+                <a:p>
+                  <a:pPr algn="ctr"/>
+                  <a:endParaRPr lang="en-US" dirty="0"/>
+                </a:p>
+                <a:p>
+                  <a:pPr algn="ctr"/>
+                  <a:endParaRPr lang="en-US" dirty="0"/>
+                </a:p>
+                <a:p>
+                  <a:pPr algn="ctr"/>
+                  <a:endParaRPr lang="en-US" dirty="0"/>
+                </a:p>
+                <a:p>
+                  <a:pPr algn="ctr"/>
+                  <a:endParaRPr lang="en-US" dirty="0"/>
+                </a:p>
+                <a:p>
+                  <a:pPr algn="ctr"/>
+                  <a:endParaRPr lang="en-US" dirty="0"/>
+                </a:p>
+                <a:p>
+                  <a:pPr algn="ctr"/>
+                  <a:endParaRPr lang="en-US" dirty="0"/>
+                </a:p>
+                <a:p>
+                  <a:pPr algn="ctr"/>
+                  <a:endParaRPr lang="en-US" dirty="0"/>
+                </a:p>
+                <a:p>
+                  <a:pPr algn="ctr"/>
+                  <a:endParaRPr lang="en-US" dirty="0"/>
+                </a:p>
+                <a:p>
+                  <a:pPr algn="ctr"/>
+                  <a:endParaRPr lang="en-US" dirty="0"/>
+                </a:p>
+                <a:p>
+                  <a:pPr algn="ctr"/>
+                  <a:endParaRPr lang="en-US" dirty="0"/>
+                </a:p>
+                <a:p>
+                  <a:pPr algn="ctr"/>
+                  <a:endParaRPr lang="en-US" dirty="0"/>
+                </a:p>
+              </p:txBody>
+            </p:sp>
+            <p:sp>
+              <p:nvSpPr>
+                <p:cNvPr id="21" name="Rectangle 20">
+                  <a:extLst>
+                    <a:ext uri="{FF2B5EF4-FFF2-40B4-BE49-F238E27FC236}">
+                      <a16:creationId xmlns:a16="http://schemas.microsoft.com/office/drawing/2014/main" id="{96AE5958-6B21-E44E-9E29-96D790B2CFD8}"/>
+                    </a:ext>
+                  </a:extLst>
+                </p:cNvPr>
+                <p:cNvSpPr/>
+                <p:nvPr/>
+              </p:nvSpPr>
+              <p:spPr>
+                <a:xfrm>
+                  <a:off x="493112" y="1442025"/>
+                  <a:ext cx="11505299" cy="5322941"/>
+                </a:xfrm>
+                <a:prstGeom prst="rect">
+                  <a:avLst/>
+                </a:prstGeom>
+                <a:solidFill>
+                  <a:schemeClr val="accent6">
+                    <a:lumMod val="40000"/>
+                    <a:lumOff val="60000"/>
+                  </a:schemeClr>
+                </a:solidFill>
+                <a:ln w="25400">
+                  <a:solidFill>
+                    <a:schemeClr val="tx1"/>
+                  </a:solidFill>
+                </a:ln>
+              </p:spPr>
+              <p:style>
+                <a:lnRef idx="2">
+                  <a:schemeClr val="accent1">
+                    <a:shade val="50000"/>
+                  </a:schemeClr>
+                </a:lnRef>
+                <a:fillRef idx="1">
+                  <a:schemeClr val="accent1"/>
+                </a:fillRef>
+                <a:effectRef idx="0">
+                  <a:schemeClr val="accent1"/>
+                </a:effectRef>
+                <a:fontRef idx="minor">
+                  <a:schemeClr val="lt1"/>
+                </a:fontRef>
+              </p:style>
+              <p:txBody>
+                <a:bodyPr rtlCol="0" anchor="ctr"/>
+                <a:lstStyle/>
+                <a:p>
+                  <a:pPr algn="ctr"/>
+                  <a:endParaRPr lang="en-US"/>
+                </a:p>
+              </p:txBody>
+            </p:sp>
+            <p:sp>
+              <p:nvSpPr>
+                <p:cNvPr id="2" name="TextBox 1">
+                  <a:extLst>
+                    <a:ext uri="{FF2B5EF4-FFF2-40B4-BE49-F238E27FC236}">
+                      <a16:creationId xmlns:a16="http://schemas.microsoft.com/office/drawing/2014/main" id="{AD3E1648-B88D-324C-9698-A3BF2B268B8F}"/>
+                    </a:ext>
+                  </a:extLst>
+                </p:cNvPr>
+                <p:cNvSpPr txBox="1"/>
+                <p:nvPr/>
+              </p:nvSpPr>
+              <p:spPr>
+                <a:xfrm>
+                  <a:off x="906943" y="465273"/>
+                  <a:ext cx="669414" cy="369332"/>
+                </a:xfrm>
+                <a:prstGeom prst="rect">
+                  <a:avLst/>
+                </a:prstGeom>
+                <a:solidFill>
+                  <a:schemeClr val="accent1">
+                    <a:lumMod val="60000"/>
+                    <a:lumOff val="40000"/>
+                  </a:schemeClr>
+                </a:solidFill>
+                <a:ln w="25400">
+                  <a:solidFill>
+                    <a:schemeClr val="tx1"/>
+                  </a:solidFill>
+                </a:ln>
+              </p:spPr>
+              <p:txBody>
+                <a:bodyPr wrap="square" rtlCol="0">
+                  <a:spAutoFit/>
+                </a:bodyPr>
+                <a:lstStyle/>
+                <a:p>
+                  <a:pPr algn="ctr"/>
+                  <a:r>
+                    <a:rPr lang="en-US" dirty="0"/>
+                    <a:t>OFF</a:t>
+                  </a:r>
+                </a:p>
+              </p:txBody>
+            </p:sp>
+            <mc:AlternateContent xmlns:mc="http://schemas.openxmlformats.org/markup-compatibility/2006" xmlns:a14="http://schemas.microsoft.com/office/drawing/2010/main">
+              <mc:Choice Requires="a14">
+                <p:sp>
+                  <p:nvSpPr>
+                    <p:cNvPr id="3" name="TextBox 2">
+                      <a:extLst>
+                        <a:ext uri="{FF2B5EF4-FFF2-40B4-BE49-F238E27FC236}">
+                          <a16:creationId xmlns:a16="http://schemas.microsoft.com/office/drawing/2014/main" id="{24461DD6-2373-D449-AF0F-326CEDA59422}"/>
+                        </a:ext>
+                      </a:extLst>
+                    </p:cNvPr>
+                    <p:cNvSpPr txBox="1"/>
+                    <p:nvPr/>
+                  </p:nvSpPr>
+                  <p:spPr>
+                    <a:xfrm>
+                      <a:off x="2608048" y="306771"/>
+                      <a:ext cx="2494093" cy="681790"/>
+                    </a:xfrm>
+                    <a:prstGeom prst="rect">
+                      <a:avLst/>
+                    </a:prstGeom>
+                    <a:solidFill>
+                      <a:schemeClr val="accent1">
+                        <a:lumMod val="60000"/>
+                        <a:lumOff val="40000"/>
+                      </a:schemeClr>
+                    </a:solidFill>
+                    <a:ln w="25400">
+                      <a:solidFill>
+                        <a:schemeClr val="tx1"/>
+                      </a:solidFill>
+                    </a:ln>
+                  </p:spPr>
+                  <p:txBody>
+                    <a:bodyPr wrap="square" rtlCol="0">
+                      <a:spAutoFit/>
+                    </a:bodyPr>
+                    <a:lstStyle/>
+                    <a:p>
+                      <a:pPr algn="ctr"/>
+                      <a:r>
+                        <a:rPr lang="en-US" dirty="0"/>
+                        <a:t>START</a:t>
+                      </a:r>
+                    </a:p>
+                    <a:p>
+                      <a:pPr algn="ctr"/>
+                      <a:r>
+                        <a:rPr lang="en-US" dirty="0"/>
+                        <a:t>entry: </a:t>
+                      </a:r>
+                      <a14:m>
+                        <m:oMath xmlns:m="http://schemas.openxmlformats.org/officeDocument/2006/math">
+                          <m:acc>
+                            <m:accPr>
+                              <m:chr m:val="⃑"/>
+                              <m:ctrlPr>
+                                <a:rPr lang="en-US" b="0" i="1" smtClean="0">
+                                  <a:latin typeface="Cambria Math" panose="02040503050406030204" pitchFamily="18" charset="0"/>
+                                </a:rPr>
+                              </m:ctrlPr>
+                            </m:accPr>
+                            <m:e>
+                              <m:r>
+                                <a:rPr lang="en-US" b="0" i="1" smtClean="0">
+                                  <a:latin typeface="Cambria Math" panose="02040503050406030204" pitchFamily="18" charset="0"/>
+                                </a:rPr>
+                                <m:t>𝑔𝑒𝑡𝐺𝑃𝑆</m:t>
+                              </m:r>
+                            </m:e>
+                          </m:acc>
+                          <m:r>
+                            <a:rPr lang="en-US" b="0" i="1" smtClean="0">
+                              <a:latin typeface="Cambria Math" panose="02040503050406030204" pitchFamily="18" charset="0"/>
+                            </a:rPr>
+                            <m:t> :</m:t>
+                          </m:r>
+                          <m:r>
+                            <a:rPr lang="en-US" b="0" i="1" smtClean="0">
+                              <a:latin typeface="Cambria Math" panose="02040503050406030204" pitchFamily="18" charset="0"/>
+                              <a:ea typeface="Cambria Math" panose="02040503050406030204" pitchFamily="18" charset="0"/>
+                            </a:rPr>
+                            <m:t>∈ </m:t>
+                          </m:r>
+                          <m:acc>
+                            <m:accPr>
+                              <m:chr m:val="⃑"/>
+                              <m:ctrlPr>
+                                <a:rPr lang="en-US" b="0" i="1" smtClean="0">
+                                  <a:latin typeface="Cambria Math" panose="02040503050406030204" pitchFamily="18" charset="0"/>
+                                  <a:ea typeface="Cambria Math" panose="02040503050406030204" pitchFamily="18" charset="0"/>
+                                </a:rPr>
+                              </m:ctrlPr>
+                            </m:accPr>
+                            <m:e>
+                              <m:r>
+                                <a:rPr lang="en-US" b="0" i="1" smtClean="0">
+                                  <a:latin typeface="Cambria Math" panose="02040503050406030204" pitchFamily="18" charset="0"/>
+                                  <a:ea typeface="Cambria Math" panose="02040503050406030204" pitchFamily="18" charset="0"/>
+                                </a:rPr>
+                                <m:t>𝑁𝐴𝑇</m:t>
+                              </m:r>
+                            </m:e>
+                          </m:acc>
+                        </m:oMath>
+                      </a14:m>
+                      <a:endParaRPr lang="en-US" dirty="0"/>
+                    </a:p>
+                  </p:txBody>
+                </p:sp>
+              </mc:Choice>
+              <mc:Fallback xmlns="">
+                <p:sp>
+                  <p:nvSpPr>
+                    <p:cNvPr id="3" name="TextBox 2">
+                      <a:extLst>
+                        <a:ext uri="{FF2B5EF4-FFF2-40B4-BE49-F238E27FC236}">
+                          <a16:creationId xmlns:a16="http://schemas.microsoft.com/office/drawing/2014/main" id="{24461DD6-2373-D449-AF0F-326CEDA59422}"/>
+                        </a:ext>
+                      </a:extLst>
+                    </p:cNvPr>
+                    <p:cNvSpPr txBox="1">
+                      <a:spLocks noRot="1" noChangeAspect="1" noMove="1" noResize="1" noEditPoints="1" noAdjustHandles="1" noChangeArrowheads="1" noChangeShapeType="1" noTextEdit="1"/>
+                    </p:cNvSpPr>
+                    <p:nvPr/>
+                  </p:nvSpPr>
+                  <p:spPr>
+                    <a:xfrm>
+                      <a:off x="2608048" y="306771"/>
+                      <a:ext cx="2494093" cy="681790"/>
+                    </a:xfrm>
+                    <a:prstGeom prst="rect">
+                      <a:avLst/>
+                    </a:prstGeom>
+                    <a:blipFill>
+                      <a:blip r:embed="rId2"/>
+                      <a:stretch>
+                        <a:fillRect b="-8772"/>
+                      </a:stretch>
+                    </a:blipFill>
+                    <a:ln w="25400">
+                      <a:solidFill>
+                        <a:schemeClr val="tx1"/>
+                      </a:solidFill>
+                    </a:ln>
+                  </p:spPr>
+                  <p:txBody>
+                    <a:bodyPr/>
+                    <a:lstStyle/>
+                    <a:p>
+                      <a:r>
+                        <a:rPr lang="en-US">
+                          <a:noFill/>
+                        </a:rPr>
+                        <a:t> </a:t>
+                      </a:r>
+                    </a:p>
+                  </p:txBody>
+                </p:sp>
+              </mc:Fallback>
+            </mc:AlternateContent>
+            <mc:AlternateContent xmlns:mc="http://schemas.openxmlformats.org/markup-compatibility/2006" xmlns:a14="http://schemas.microsoft.com/office/drawing/2010/main">
+              <mc:Choice Requires="a14">
+                <p:sp>
+                  <p:nvSpPr>
+                    <p:cNvPr id="4" name="TextBox 3">
+                      <a:extLst>
+                        <a:ext uri="{FF2B5EF4-FFF2-40B4-BE49-F238E27FC236}">
+                          <a16:creationId xmlns:a16="http://schemas.microsoft.com/office/drawing/2014/main" id="{ACEB38D5-2291-1547-9012-BCB518635217}"/>
+                        </a:ext>
+                      </a:extLst>
+                    </p:cNvPr>
+                    <p:cNvSpPr txBox="1"/>
+                    <p:nvPr/>
+                  </p:nvSpPr>
+                  <p:spPr>
+                    <a:xfrm>
+                      <a:off x="738058" y="1873468"/>
+                      <a:ext cx="5114445" cy="2620782"/>
+                    </a:xfrm>
+                    <a:prstGeom prst="rect">
+                      <a:avLst/>
+                    </a:prstGeom>
+                    <a:solidFill>
+                      <a:schemeClr val="accent1">
+                        <a:lumMod val="60000"/>
+                        <a:lumOff val="40000"/>
+                      </a:schemeClr>
+                    </a:solidFill>
+                    <a:ln w="25400">
+                      <a:solidFill>
+                        <a:schemeClr val="tx1"/>
+                      </a:solidFill>
+                    </a:ln>
+                  </p:spPr>
+                  <p:txBody>
+                    <a:bodyPr wrap="square" rtlCol="0">
+                      <a:spAutoFit/>
+                    </a:bodyPr>
+                    <a:lstStyle/>
+                    <a:p>
+                      <a:pPr algn="ctr"/>
+                      <a:r>
+                        <a:rPr lang="en-US" dirty="0"/>
+                        <a:t>TAKEOFF</a:t>
+                      </a:r>
+                    </a:p>
+                    <a:p>
+                      <a:pPr algn="ctr"/>
+                      <a:r>
+                        <a:rPr lang="en-US" dirty="0"/>
+                        <a:t>entry: </a:t>
+                      </a:r>
+                      <a14:m>
+                        <m:oMath xmlns:m="http://schemas.openxmlformats.org/officeDocument/2006/math">
+                          <m:acc>
+                            <m:accPr>
+                              <m:chr m:val="⃑"/>
+                              <m:ctrlPr>
+                                <a:rPr lang="en-US" b="0" i="1" smtClean="0">
+                                  <a:latin typeface="Cambria Math" panose="02040503050406030204" pitchFamily="18" charset="0"/>
+                                </a:rPr>
+                              </m:ctrlPr>
+                            </m:accPr>
+                            <m:e>
+                              <m:r>
+                                <a:rPr lang="en-US" b="0" i="1" smtClean="0">
+                                  <a:latin typeface="Cambria Math" panose="02040503050406030204" pitchFamily="18" charset="0"/>
+                                </a:rPr>
+                                <m:t>𝑆𝑡𝑎𝑟𝑡𝑃𝑜𝑠</m:t>
+                              </m:r>
+                            </m:e>
+                          </m:acc>
+                          <m:r>
+                            <a:rPr lang="en-US" b="0" i="1" smtClean="0">
+                              <a:latin typeface="Cambria Math" panose="02040503050406030204" pitchFamily="18" charset="0"/>
+                            </a:rPr>
+                            <m:t>=</m:t>
+                          </m:r>
+                          <m:r>
+                            <a:rPr lang="en-US" b="0" i="1" smtClean="0">
+                              <a:latin typeface="Cambria Math" panose="02040503050406030204" pitchFamily="18" charset="0"/>
+                              <a:ea typeface="Cambria Math" panose="02040503050406030204" pitchFamily="18" charset="0"/>
+                            </a:rPr>
+                            <m:t> </m:t>
+                          </m:r>
+                          <m:acc>
+                            <m:accPr>
+                              <m:chr m:val="⃑"/>
+                              <m:ctrlPr>
+                                <a:rPr lang="en-US" b="0" i="1" smtClean="0">
+                                  <a:latin typeface="Cambria Math" panose="02040503050406030204" pitchFamily="18" charset="0"/>
+                                  <a:ea typeface="Cambria Math" panose="02040503050406030204" pitchFamily="18" charset="0"/>
+                                </a:rPr>
+                              </m:ctrlPr>
+                            </m:accPr>
+                            <m:e>
+                              <m:r>
+                                <a:rPr lang="en-US" b="0" i="1" smtClean="0">
+                                  <a:latin typeface="Cambria Math" panose="02040503050406030204" pitchFamily="18" charset="0"/>
+                                  <a:ea typeface="Cambria Math" panose="02040503050406030204" pitchFamily="18" charset="0"/>
+                                </a:rPr>
+                                <m:t>𝑔𝑒𝑡𝐺𝑃𝑆</m:t>
+                              </m:r>
+                            </m:e>
+                          </m:acc>
+                        </m:oMath>
+                      </a14:m>
+                      <a:endParaRPr lang="en-US" b="0" dirty="0"/>
+                    </a:p>
+                    <a:p>
+                      <a:pPr algn="ctr"/>
+                      <a:endParaRPr lang="en-US" dirty="0"/>
+                    </a:p>
+                    <a:p>
+                      <a:pPr algn="ctr"/>
+                      <a:endParaRPr lang="en-US" dirty="0"/>
+                    </a:p>
+                    <a:p>
+                      <a:pPr algn="ctr"/>
+                      <a:endParaRPr lang="en-US" dirty="0"/>
+                    </a:p>
+                    <a:p>
+                      <a:pPr algn="ctr"/>
+                      <a:endParaRPr lang="en-US" dirty="0"/>
+                    </a:p>
+                    <a:p>
+                      <a:pPr algn="ctr"/>
+                      <a:endParaRPr lang="en-US" dirty="0"/>
+                    </a:p>
+                    <a:p>
+                      <a:pPr algn="ctr"/>
+                      <a:endParaRPr lang="en-US" dirty="0"/>
+                    </a:p>
+                    <a:p>
+                      <a:pPr algn="ctr"/>
+                      <a:endParaRPr lang="en-US" dirty="0"/>
+                    </a:p>
+                  </p:txBody>
+                </p:sp>
+              </mc:Choice>
+              <mc:Fallback xmlns="">
+                <p:sp>
+                  <p:nvSpPr>
+                    <p:cNvPr id="4" name="TextBox 3">
+                      <a:extLst>
+                        <a:ext uri="{FF2B5EF4-FFF2-40B4-BE49-F238E27FC236}">
+                          <a16:creationId xmlns:a16="http://schemas.microsoft.com/office/drawing/2014/main" id="{ACEB38D5-2291-1547-9012-BCB518635217}"/>
+                        </a:ext>
+                      </a:extLst>
+                    </p:cNvPr>
+                    <p:cNvSpPr txBox="1">
+                      <a:spLocks noRot="1" noChangeAspect="1" noMove="1" noResize="1" noEditPoints="1" noAdjustHandles="1" noChangeArrowheads="1" noChangeShapeType="1" noTextEdit="1"/>
+                    </p:cNvSpPr>
+                    <p:nvPr/>
+                  </p:nvSpPr>
+                  <p:spPr>
+                    <a:xfrm>
+                      <a:off x="738058" y="1873468"/>
+                      <a:ext cx="5114445" cy="2620782"/>
+                    </a:xfrm>
+                    <a:prstGeom prst="rect">
+                      <a:avLst/>
+                    </a:prstGeom>
+                    <a:blipFill>
+                      <a:blip r:embed="rId3"/>
+                      <a:stretch>
+                        <a:fillRect t="-478"/>
+                      </a:stretch>
+                    </a:blipFill>
+                    <a:ln w="25400">
+                      <a:solidFill>
+                        <a:schemeClr val="tx1"/>
+                      </a:solidFill>
+                    </a:ln>
+                  </p:spPr>
+                  <p:txBody>
+                    <a:bodyPr/>
+                    <a:lstStyle/>
+                    <a:p>
+                      <a:r>
+                        <a:rPr lang="en-US">
+                          <a:noFill/>
+                        </a:rPr>
+                        <a:t> </a:t>
+                      </a:r>
+                    </a:p>
+                  </p:txBody>
+                </p:sp>
+              </mc:Fallback>
+            </mc:AlternateContent>
+            <p:sp>
+              <p:nvSpPr>
+                <p:cNvPr id="6" name="TextBox 5">
+                  <a:extLst>
+                    <a:ext uri="{FF2B5EF4-FFF2-40B4-BE49-F238E27FC236}">
+                      <a16:creationId xmlns:a16="http://schemas.microsoft.com/office/drawing/2014/main" id="{CCEB3438-064E-524A-B7C2-6DA51B6A22F3}"/>
+                    </a:ext>
+                  </a:extLst>
+                </p:cNvPr>
+                <p:cNvSpPr txBox="1"/>
+                <p:nvPr/>
+              </p:nvSpPr>
+              <p:spPr>
+                <a:xfrm>
+                  <a:off x="6218667" y="2247219"/>
+                  <a:ext cx="669414" cy="369332"/>
+                </a:xfrm>
+                <a:prstGeom prst="rect">
+                  <a:avLst/>
+                </a:prstGeom>
+                <a:solidFill>
+                  <a:schemeClr val="accent1">
+                    <a:lumMod val="60000"/>
+                    <a:lumOff val="40000"/>
+                  </a:schemeClr>
+                </a:solidFill>
+                <a:ln w="25400">
+                  <a:solidFill>
+                    <a:schemeClr val="tx1"/>
+                  </a:solidFill>
+                </a:ln>
+              </p:spPr>
+              <p:txBody>
+                <a:bodyPr wrap="square" rtlCol="0">
+                  <a:spAutoFit/>
+                </a:bodyPr>
+                <a:lstStyle/>
+                <a:p>
+                  <a:pPr algn="ctr"/>
+                  <a:r>
+                    <a:rPr lang="en-US" dirty="0"/>
+                    <a:t>FLY</a:t>
+                  </a:r>
+                </a:p>
+              </p:txBody>
+            </p:sp>
+            <p:sp>
+              <p:nvSpPr>
+                <p:cNvPr id="7" name="TextBox 6">
+                  <a:extLst>
+                    <a:ext uri="{FF2B5EF4-FFF2-40B4-BE49-F238E27FC236}">
+                      <a16:creationId xmlns:a16="http://schemas.microsoft.com/office/drawing/2014/main" id="{DEFF9CA6-1997-5D4A-8DC2-9078642DC892}"/>
+                    </a:ext>
+                  </a:extLst>
+                </p:cNvPr>
+                <p:cNvSpPr txBox="1"/>
+                <p:nvPr/>
+              </p:nvSpPr>
+              <p:spPr>
+                <a:xfrm>
+                  <a:off x="7953814" y="2247219"/>
+                  <a:ext cx="1530867" cy="369332"/>
+                </a:xfrm>
+                <a:prstGeom prst="rect">
+                  <a:avLst/>
+                </a:prstGeom>
+                <a:solidFill>
+                  <a:schemeClr val="accent1">
+                    <a:lumMod val="60000"/>
+                    <a:lumOff val="40000"/>
+                  </a:schemeClr>
+                </a:solidFill>
+                <a:ln w="25400">
+                  <a:solidFill>
+                    <a:schemeClr val="tx1"/>
+                  </a:solidFill>
+                </a:ln>
+              </p:spPr>
+              <p:txBody>
+                <a:bodyPr wrap="square" rtlCol="0">
+                  <a:spAutoFit/>
+                </a:bodyPr>
+                <a:lstStyle/>
+                <a:p>
+                  <a:pPr algn="ctr"/>
+                  <a:r>
+                    <a:rPr lang="en-US" dirty="0"/>
+                    <a:t>DESCEND</a:t>
+                  </a:r>
+                </a:p>
+              </p:txBody>
+            </p:sp>
+            <p:sp>
+              <p:nvSpPr>
+                <p:cNvPr id="8" name="TextBox 7">
+                  <a:extLst>
+                    <a:ext uri="{FF2B5EF4-FFF2-40B4-BE49-F238E27FC236}">
+                      <a16:creationId xmlns:a16="http://schemas.microsoft.com/office/drawing/2014/main" id="{03765019-0C73-4B4A-9B43-99196B286F16}"/>
+                    </a:ext>
+                  </a:extLst>
+                </p:cNvPr>
+                <p:cNvSpPr txBox="1"/>
+                <p:nvPr/>
+              </p:nvSpPr>
+              <p:spPr>
+                <a:xfrm>
+                  <a:off x="10695576" y="2247219"/>
+                  <a:ext cx="1133774" cy="369332"/>
+                </a:xfrm>
+                <a:prstGeom prst="rect">
+                  <a:avLst/>
+                </a:prstGeom>
+                <a:solidFill>
+                  <a:schemeClr val="accent1">
+                    <a:lumMod val="60000"/>
+                    <a:lumOff val="40000"/>
+                  </a:schemeClr>
+                </a:solidFill>
+                <a:ln w="25400">
+                  <a:solidFill>
+                    <a:schemeClr val="tx1"/>
+                  </a:solidFill>
+                </a:ln>
+              </p:spPr>
+              <p:txBody>
+                <a:bodyPr wrap="square" rtlCol="0">
+                  <a:spAutoFit/>
+                </a:bodyPr>
+                <a:lstStyle/>
+                <a:p>
+                  <a:pPr algn="ctr"/>
+                  <a:r>
+                    <a:rPr lang="en-US" dirty="0"/>
+                    <a:t>LANDED</a:t>
+                  </a:r>
+                </a:p>
+              </p:txBody>
+            </p:sp>
+            <p:sp>
+              <p:nvSpPr>
+                <p:cNvPr id="9" name="TextBox 8">
+                  <a:extLst>
+                    <a:ext uri="{FF2B5EF4-FFF2-40B4-BE49-F238E27FC236}">
+                      <a16:creationId xmlns:a16="http://schemas.microsoft.com/office/drawing/2014/main" id="{0D1D3ACA-0A76-1D49-B273-FFE45C11FA3A}"/>
+                    </a:ext>
+                  </a:extLst>
+                </p:cNvPr>
+                <p:cNvSpPr txBox="1"/>
+                <p:nvPr/>
+              </p:nvSpPr>
+              <p:spPr>
+                <a:xfrm>
+                  <a:off x="10448445" y="363610"/>
+                  <a:ext cx="1578622" cy="369332"/>
+                </a:xfrm>
+                <a:prstGeom prst="rect">
+                  <a:avLst/>
+                </a:prstGeom>
+                <a:solidFill>
+                  <a:schemeClr val="accent1">
+                    <a:lumMod val="60000"/>
+                    <a:lumOff val="40000"/>
+                  </a:schemeClr>
+                </a:solidFill>
+                <a:ln w="25400">
+                  <a:solidFill>
+                    <a:schemeClr val="tx1"/>
+                  </a:solidFill>
+                </a:ln>
+              </p:spPr>
+              <p:txBody>
+                <a:bodyPr wrap="square" rtlCol="0">
+                  <a:spAutoFit/>
+                </a:bodyPr>
+                <a:lstStyle/>
+                <a:p>
+                  <a:pPr algn="ctr"/>
+                  <a:r>
+                    <a:rPr lang="en-US" dirty="0"/>
+                    <a:t>SHUTDOWN</a:t>
+                  </a:r>
+                </a:p>
+              </p:txBody>
+            </p:sp>
+            <p:cxnSp>
+              <p:nvCxnSpPr>
+                <p:cNvPr id="11" name="Straight Arrow Connector 10">
+                  <a:extLst>
+                    <a:ext uri="{FF2B5EF4-FFF2-40B4-BE49-F238E27FC236}">
+                      <a16:creationId xmlns:a16="http://schemas.microsoft.com/office/drawing/2014/main" id="{774CADF2-A0BF-4D4D-923E-05197B190A52}"/>
+                    </a:ext>
+                  </a:extLst>
+                </p:cNvPr>
+                <p:cNvCxnSpPr>
+                  <a:cxnSpLocks/>
+                  <a:stCxn id="2" idx="3"/>
+                  <a:endCxn id="3" idx="1"/>
+                </p:cNvCxnSpPr>
+                <p:nvPr/>
+              </p:nvCxnSpPr>
+              <p:spPr>
+                <a:xfrm flipV="1">
+                  <a:off x="1576357" y="647666"/>
+                  <a:ext cx="1031691" cy="2273"/>
+                </a:xfrm>
+                <a:prstGeom prst="straightConnector1">
+                  <a:avLst/>
+                </a:prstGeom>
+                <a:ln w="38100">
+                  <a:solidFill>
+                    <a:schemeClr val="tx1"/>
+                  </a:solidFill>
+                  <a:tailEnd type="triangle"/>
+                </a:ln>
+              </p:spPr>
+              <p:style>
+                <a:lnRef idx="1">
+                  <a:schemeClr val="accent1"/>
+                </a:lnRef>
+                <a:fillRef idx="0">
+                  <a:schemeClr val="accent1"/>
+                </a:fillRef>
+                <a:effectRef idx="0">
+                  <a:schemeClr val="accent1"/>
+                </a:effectRef>
+                <a:fontRef idx="minor">
+                  <a:schemeClr val="tx1"/>
+                </a:fontRef>
+              </p:style>
+            </p:cxnSp>
+            <p:sp>
+              <p:nvSpPr>
+                <p:cNvPr id="13" name="Oval 12">
+                  <a:extLst>
+                    <a:ext uri="{FF2B5EF4-FFF2-40B4-BE49-F238E27FC236}">
+                      <a16:creationId xmlns:a16="http://schemas.microsoft.com/office/drawing/2014/main" id="{11A67139-0964-1440-BA2E-97BD872C16AE}"/>
+                    </a:ext>
+                  </a:extLst>
+                </p:cNvPr>
+                <p:cNvSpPr/>
+                <p:nvPr/>
+              </p:nvSpPr>
+              <p:spPr>
+                <a:xfrm>
+                  <a:off x="433735" y="548276"/>
+                  <a:ext cx="198780" cy="198780"/>
+                </a:xfrm>
+                <a:prstGeom prst="ellipse">
+                  <a:avLst/>
+                </a:prstGeom>
+                <a:solidFill>
+                  <a:schemeClr val="tx1"/>
+                </a:solidFill>
+                <a:ln>
+                  <a:solidFill>
+                    <a:schemeClr val="tx1"/>
+                  </a:solidFill>
+                </a:ln>
+              </p:spPr>
+              <p:style>
+                <a:lnRef idx="2">
+                  <a:schemeClr val="accent1">
+                    <a:shade val="50000"/>
+                  </a:schemeClr>
+                </a:lnRef>
+                <a:fillRef idx="1">
+                  <a:schemeClr val="accent1"/>
+                </a:fillRef>
+                <a:effectRef idx="0">
+                  <a:schemeClr val="accent1"/>
+                </a:effectRef>
+                <a:fontRef idx="minor">
+                  <a:schemeClr val="lt1"/>
+                </a:fontRef>
+              </p:style>
+              <p:txBody>
+                <a:bodyPr rtlCol="0" anchor="ctr"/>
+                <a:lstStyle/>
+                <a:p>
+                  <a:pPr algn="ctr"/>
+                  <a:endParaRPr lang="en-US"/>
+                </a:p>
+              </p:txBody>
+            </p:sp>
+            <p:cxnSp>
+              <p:nvCxnSpPr>
+                <p:cNvPr id="15" name="Straight Connector 14">
+                  <a:extLst>
+                    <a:ext uri="{FF2B5EF4-FFF2-40B4-BE49-F238E27FC236}">
+                      <a16:creationId xmlns:a16="http://schemas.microsoft.com/office/drawing/2014/main" id="{D9AC610E-F278-A84B-B0DC-2BF0A198DBA4}"/>
+                    </a:ext>
+                  </a:extLst>
+                </p:cNvPr>
+                <p:cNvCxnSpPr>
+                  <a:cxnSpLocks/>
+                  <a:stCxn id="13" idx="6"/>
+                  <a:endCxn id="2" idx="1"/>
+                </p:cNvCxnSpPr>
+                <p:nvPr/>
+              </p:nvCxnSpPr>
+              <p:spPr>
+                <a:xfrm>
+                  <a:off x="632515" y="647666"/>
+                  <a:ext cx="274428" cy="2273"/>
+                </a:xfrm>
+                <a:prstGeom prst="line">
+                  <a:avLst/>
+                </a:prstGeom>
+                <a:ln w="38100">
+                  <a:solidFill>
+                    <a:schemeClr val="tx1"/>
+                  </a:solidFill>
+                </a:ln>
+              </p:spPr>
+              <p:style>
+                <a:lnRef idx="1">
+                  <a:schemeClr val="accent1"/>
+                </a:lnRef>
+                <a:fillRef idx="0">
+                  <a:schemeClr val="accent1"/>
+                </a:fillRef>
+                <a:effectRef idx="0">
+                  <a:schemeClr val="accent1"/>
+                </a:effectRef>
+                <a:fontRef idx="minor">
+                  <a:schemeClr val="tx1"/>
+                </a:fontRef>
+              </p:style>
+            </p:cxnSp>
+            <p:cxnSp>
+              <p:nvCxnSpPr>
+                <p:cNvPr id="31" name="Elbow Connector 30">
+                  <a:extLst>
+                    <a:ext uri="{FF2B5EF4-FFF2-40B4-BE49-F238E27FC236}">
+                      <a16:creationId xmlns:a16="http://schemas.microsoft.com/office/drawing/2014/main" id="{FAB7A610-CA3C-F346-91F1-F7E568C51747}"/>
+                    </a:ext>
+                  </a:extLst>
+                </p:cNvPr>
+                <p:cNvCxnSpPr>
+                  <a:cxnSpLocks/>
+                  <a:stCxn id="3" idx="3"/>
+                  <a:endCxn id="5" idx="0"/>
+                </p:cNvCxnSpPr>
+                <p:nvPr/>
+              </p:nvCxnSpPr>
+              <p:spPr>
+                <a:xfrm>
+                  <a:off x="5102141" y="647666"/>
+                  <a:ext cx="1143623" cy="484994"/>
+                </a:xfrm>
+                <a:prstGeom prst="bentConnector2">
+                  <a:avLst/>
+                </a:prstGeom>
+                <a:ln w="38100">
+                  <a:solidFill>
+                    <a:schemeClr val="tx1"/>
+                  </a:solidFill>
+                  <a:tailEnd type="triangle"/>
+                </a:ln>
+              </p:spPr>
+              <p:style>
+                <a:lnRef idx="1">
+                  <a:schemeClr val="accent1"/>
+                </a:lnRef>
+                <a:fillRef idx="0">
+                  <a:schemeClr val="accent1"/>
+                </a:fillRef>
+                <a:effectRef idx="0">
+                  <a:schemeClr val="accent1"/>
+                </a:effectRef>
+                <a:fontRef idx="minor">
+                  <a:schemeClr val="tx1"/>
+                </a:fontRef>
+              </p:style>
+            </p:cxnSp>
+            <p:sp>
+              <p:nvSpPr>
+                <p:cNvPr id="34" name="Oval 33">
+                  <a:extLst>
+                    <a:ext uri="{FF2B5EF4-FFF2-40B4-BE49-F238E27FC236}">
+                      <a16:creationId xmlns:a16="http://schemas.microsoft.com/office/drawing/2014/main" id="{FB7426B3-9731-BA40-A19F-39BC6136E252}"/>
+                    </a:ext>
+                  </a:extLst>
+                </p:cNvPr>
+                <p:cNvSpPr/>
+                <p:nvPr/>
+              </p:nvSpPr>
+              <p:spPr>
+                <a:xfrm>
+                  <a:off x="2441331" y="1626846"/>
+                  <a:ext cx="198780" cy="198780"/>
+                </a:xfrm>
+                <a:prstGeom prst="ellipse">
+                  <a:avLst/>
+                </a:prstGeom>
+                <a:solidFill>
+                  <a:schemeClr val="tx1"/>
+                </a:solidFill>
+                <a:ln>
+                  <a:solidFill>
+                    <a:schemeClr val="tx1"/>
+                  </a:solidFill>
+                </a:ln>
+              </p:spPr>
+              <p:style>
+                <a:lnRef idx="2">
+                  <a:schemeClr val="accent1">
+                    <a:shade val="50000"/>
+                  </a:schemeClr>
+                </a:lnRef>
+                <a:fillRef idx="1">
+                  <a:schemeClr val="accent1"/>
+                </a:fillRef>
+                <a:effectRef idx="0">
+                  <a:schemeClr val="accent1"/>
+                </a:effectRef>
+                <a:fontRef idx="minor">
+                  <a:schemeClr val="lt1"/>
+                </a:fontRef>
+              </p:style>
+              <p:txBody>
+                <a:bodyPr rtlCol="0" anchor="ctr"/>
+                <a:lstStyle/>
+                <a:p>
+                  <a:pPr algn="ctr"/>
+                  <a:endParaRPr lang="en-US"/>
+                </a:p>
+              </p:txBody>
+            </p:sp>
+            <p:cxnSp>
+              <p:nvCxnSpPr>
+                <p:cNvPr id="36" name="Curved Connector 35">
+                  <a:extLst>
+                    <a:ext uri="{FF2B5EF4-FFF2-40B4-BE49-F238E27FC236}">
+                      <a16:creationId xmlns:a16="http://schemas.microsoft.com/office/drawing/2014/main" id="{F31FB133-96D2-2D43-A3C8-C7CEFB228803}"/>
+                    </a:ext>
+                  </a:extLst>
+                </p:cNvPr>
+                <p:cNvCxnSpPr>
+                  <a:cxnSpLocks/>
+                  <a:stCxn id="34" idx="6"/>
+                  <a:endCxn id="4" idx="0"/>
+                </p:cNvCxnSpPr>
+                <p:nvPr/>
+              </p:nvCxnSpPr>
+              <p:spPr>
+                <a:xfrm>
+                  <a:off x="2640111" y="1726236"/>
+                  <a:ext cx="655170" cy="147232"/>
+                </a:xfrm>
+                <a:prstGeom prst="curvedConnector2">
+                  <a:avLst/>
+                </a:prstGeom>
+                <a:ln w="38100">
+                  <a:solidFill>
+                    <a:schemeClr val="tx1"/>
+                  </a:solidFill>
+                </a:ln>
+              </p:spPr>
+              <p:style>
+                <a:lnRef idx="1">
+                  <a:schemeClr val="accent1"/>
+                </a:lnRef>
+                <a:fillRef idx="0">
+                  <a:schemeClr val="accent1"/>
+                </a:fillRef>
+                <a:effectRef idx="0">
+                  <a:schemeClr val="accent1"/>
+                </a:effectRef>
+                <a:fontRef idx="minor">
+                  <a:schemeClr val="tx1"/>
+                </a:fontRef>
+              </p:style>
+            </p:cxnSp>
+            <p:cxnSp>
+              <p:nvCxnSpPr>
+                <p:cNvPr id="41" name="Straight Arrow Connector 40">
+                  <a:extLst>
+                    <a:ext uri="{FF2B5EF4-FFF2-40B4-BE49-F238E27FC236}">
+                      <a16:creationId xmlns:a16="http://schemas.microsoft.com/office/drawing/2014/main" id="{3029C08F-768D-D746-B60E-16E736FD06C0}"/>
+                    </a:ext>
+                  </a:extLst>
+                </p:cNvPr>
+                <p:cNvCxnSpPr>
+                  <a:stCxn id="6" idx="3"/>
+                  <a:endCxn id="7" idx="1"/>
+                </p:cNvCxnSpPr>
+                <p:nvPr/>
+              </p:nvCxnSpPr>
+              <p:spPr>
+                <a:xfrm>
+                  <a:off x="6888081" y="2431885"/>
+                  <a:ext cx="1065733" cy="0"/>
+                </a:xfrm>
+                <a:prstGeom prst="straightConnector1">
+                  <a:avLst/>
+                </a:prstGeom>
+                <a:ln w="38100">
+                  <a:solidFill>
+                    <a:schemeClr val="tx1"/>
+                  </a:solidFill>
+                  <a:tailEnd type="triangle"/>
+                </a:ln>
+              </p:spPr>
+              <p:style>
+                <a:lnRef idx="1">
+                  <a:schemeClr val="accent1"/>
+                </a:lnRef>
+                <a:fillRef idx="0">
+                  <a:schemeClr val="accent1"/>
+                </a:fillRef>
+                <a:effectRef idx="0">
+                  <a:schemeClr val="accent1"/>
+                </a:effectRef>
+                <a:fontRef idx="minor">
+                  <a:schemeClr val="tx1"/>
+                </a:fontRef>
+              </p:style>
+            </p:cxnSp>
+            <p:cxnSp>
+              <p:nvCxnSpPr>
+                <p:cNvPr id="44" name="Straight Arrow Connector 43">
+                  <a:extLst>
+                    <a:ext uri="{FF2B5EF4-FFF2-40B4-BE49-F238E27FC236}">
+                      <a16:creationId xmlns:a16="http://schemas.microsoft.com/office/drawing/2014/main" id="{CEAB5DF4-C3CF-494F-867B-44E912C644C9}"/>
+                    </a:ext>
+                  </a:extLst>
+                </p:cNvPr>
+                <p:cNvCxnSpPr>
+                  <a:cxnSpLocks/>
+                  <a:stCxn id="7" idx="3"/>
+                  <a:endCxn id="8" idx="1"/>
+                </p:cNvCxnSpPr>
+                <p:nvPr/>
+              </p:nvCxnSpPr>
+              <p:spPr>
+                <a:xfrm>
+                  <a:off x="9484681" y="2431885"/>
+                  <a:ext cx="1210895" cy="0"/>
+                </a:xfrm>
+                <a:prstGeom prst="straightConnector1">
+                  <a:avLst/>
+                </a:prstGeom>
+                <a:ln w="38100">
+                  <a:solidFill>
+                    <a:schemeClr val="tx1"/>
+                  </a:solidFill>
+                  <a:tailEnd type="triangle"/>
+                </a:ln>
+              </p:spPr>
+              <p:style>
+                <a:lnRef idx="1">
+                  <a:schemeClr val="accent1"/>
+                </a:lnRef>
+                <a:fillRef idx="0">
+                  <a:schemeClr val="accent1"/>
+                </a:fillRef>
+                <a:effectRef idx="0">
+                  <a:schemeClr val="accent1"/>
+                </a:effectRef>
+                <a:fontRef idx="minor">
+                  <a:schemeClr val="tx1"/>
+                </a:fontRef>
+              </p:style>
+            </p:cxnSp>
+            <p:cxnSp>
+              <p:nvCxnSpPr>
+                <p:cNvPr id="50" name="Straight Arrow Connector 49">
+                  <a:extLst>
+                    <a:ext uri="{FF2B5EF4-FFF2-40B4-BE49-F238E27FC236}">
+                      <a16:creationId xmlns:a16="http://schemas.microsoft.com/office/drawing/2014/main" id="{F7A4A05F-FAD9-5F41-81CA-11ED2EEAFA22}"/>
+                    </a:ext>
+                  </a:extLst>
+                </p:cNvPr>
+                <p:cNvCxnSpPr>
+                  <a:cxnSpLocks/>
+                  <a:stCxn id="8" idx="0"/>
+                  <a:endCxn id="9" idx="2"/>
+                </p:cNvCxnSpPr>
+                <p:nvPr/>
+              </p:nvCxnSpPr>
+              <p:spPr>
+                <a:xfrm flipH="1" flipV="1">
+                  <a:off x="11237756" y="732942"/>
+                  <a:ext cx="24707" cy="1514277"/>
+                </a:xfrm>
+                <a:prstGeom prst="straightConnector1">
+                  <a:avLst/>
+                </a:prstGeom>
+                <a:ln w="38100">
+                  <a:solidFill>
+                    <a:schemeClr val="tx1"/>
+                  </a:solidFill>
+                  <a:tailEnd type="triangle"/>
+                </a:ln>
+              </p:spPr>
+              <p:style>
+                <a:lnRef idx="1">
+                  <a:schemeClr val="accent1"/>
+                </a:lnRef>
+                <a:fillRef idx="0">
+                  <a:schemeClr val="accent1"/>
+                </a:fillRef>
+                <a:effectRef idx="0">
+                  <a:schemeClr val="accent1"/>
+                </a:effectRef>
+                <a:fontRef idx="minor">
+                  <a:schemeClr val="tx1"/>
+                </a:fontRef>
+              </p:style>
+            </p:cxnSp>
+            <p:cxnSp>
+              <p:nvCxnSpPr>
+                <p:cNvPr id="60" name="Elbow Connector 59">
+                  <a:extLst>
+                    <a:ext uri="{FF2B5EF4-FFF2-40B4-BE49-F238E27FC236}">
+                      <a16:creationId xmlns:a16="http://schemas.microsoft.com/office/drawing/2014/main" id="{06D2C459-03EE-D245-9C9D-E2E8DE37917D}"/>
+                    </a:ext>
+                  </a:extLst>
+                </p:cNvPr>
+                <p:cNvCxnSpPr>
+                  <a:cxnSpLocks/>
+                  <a:stCxn id="8" idx="2"/>
+                  <a:endCxn id="5" idx="2"/>
+                </p:cNvCxnSpPr>
+                <p:nvPr/>
+              </p:nvCxnSpPr>
+              <p:spPr>
+                <a:xfrm rot="5400000">
+                  <a:off x="6679904" y="2182412"/>
+                  <a:ext cx="4148420" cy="5016699"/>
+                </a:xfrm>
+                <a:prstGeom prst="bentConnector3">
+                  <a:avLst>
+                    <a:gd name="adj1" fmla="val 112958"/>
+                  </a:avLst>
+                </a:prstGeom>
+                <a:ln w="38100">
+                  <a:solidFill>
+                    <a:schemeClr val="tx1"/>
+                  </a:solidFill>
+                  <a:tailEnd type="triangle"/>
+                </a:ln>
+              </p:spPr>
+              <p:style>
+                <a:lnRef idx="1">
+                  <a:schemeClr val="accent1"/>
+                </a:lnRef>
+                <a:fillRef idx="0">
+                  <a:schemeClr val="accent1"/>
+                </a:fillRef>
+                <a:effectRef idx="0">
+                  <a:schemeClr val="accent1"/>
+                </a:effectRef>
+                <a:fontRef idx="minor">
+                  <a:schemeClr val="tx1"/>
+                </a:fontRef>
+              </p:style>
+            </p:cxnSp>
+            <p:cxnSp>
+              <p:nvCxnSpPr>
+                <p:cNvPr id="63" name="Elbow Connector 62">
+                  <a:extLst>
+                    <a:ext uri="{FF2B5EF4-FFF2-40B4-BE49-F238E27FC236}">
+                      <a16:creationId xmlns:a16="http://schemas.microsoft.com/office/drawing/2014/main" id="{477F5FC8-E5D3-6546-BE50-47FAAB983837}"/>
+                    </a:ext>
+                  </a:extLst>
+                </p:cNvPr>
+                <p:cNvCxnSpPr>
+                  <a:stCxn id="9" idx="0"/>
+                  <a:endCxn id="2" idx="0"/>
+                </p:cNvCxnSpPr>
+                <p:nvPr/>
+              </p:nvCxnSpPr>
+              <p:spPr>
+                <a:xfrm rot="16200000" flipH="1" flipV="1">
+                  <a:off x="6188871" y="-4583612"/>
+                  <a:ext cx="101663" cy="9996106"/>
+                </a:xfrm>
+                <a:prstGeom prst="bentConnector3">
+                  <a:avLst>
+                    <a:gd name="adj1" fmla="val -224861"/>
+                  </a:avLst>
+                </a:prstGeom>
+                <a:ln w="38100">
+                  <a:solidFill>
+                    <a:schemeClr val="tx1"/>
+                  </a:solidFill>
+                  <a:tailEnd type="triangle"/>
+                </a:ln>
+              </p:spPr>
+              <p:style>
+                <a:lnRef idx="1">
+                  <a:schemeClr val="accent1"/>
+                </a:lnRef>
+                <a:fillRef idx="0">
+                  <a:schemeClr val="accent1"/>
+                </a:fillRef>
+                <a:effectRef idx="0">
+                  <a:schemeClr val="accent1"/>
+                </a:effectRef>
+                <a:fontRef idx="minor">
+                  <a:schemeClr val="tx1"/>
+                </a:fontRef>
+              </p:style>
+            </p:cxnSp>
+            <mc:AlternateContent xmlns:mc="http://schemas.openxmlformats.org/markup-compatibility/2006" xmlns:a14="http://schemas.microsoft.com/office/drawing/2010/main">
+              <mc:Choice Requires="a14">
+                <p:sp>
+                  <p:nvSpPr>
+                    <p:cNvPr id="65" name="TextBox 64">
+                      <a:extLst>
+                        <a:ext uri="{FF2B5EF4-FFF2-40B4-BE49-F238E27FC236}">
+                          <a16:creationId xmlns:a16="http://schemas.microsoft.com/office/drawing/2014/main" id="{A6891D6B-692C-0540-BAB2-D3FD072CA3BF}"/>
+                        </a:ext>
+                      </a:extLst>
+                    </p:cNvPr>
+                    <p:cNvSpPr txBox="1"/>
+                    <p:nvPr/>
+                  </p:nvSpPr>
+                  <p:spPr>
+                    <a:xfrm>
+                      <a:off x="5826889" y="3211208"/>
+                      <a:ext cx="2197654" cy="369332"/>
+                    </a:xfrm>
+                    <a:prstGeom prst="rect">
+                      <a:avLst/>
+                    </a:prstGeom>
+                    <a:noFill/>
+                  </p:spPr>
+                  <p:txBody>
+                    <a:bodyPr wrap="none" rtlCol="0">
+                      <a:spAutoFit/>
+                    </a:bodyPr>
+                    <a:lstStyle/>
+                    <a:p>
+                      <a:pPr algn="ctr"/>
+                      <a:r>
+                        <a:rPr lang="en-US" dirty="0"/>
+                        <a:t>toFly </a:t>
+                      </a:r>
+                      <a14:m>
+                        <m:oMath xmlns:m="http://schemas.openxmlformats.org/officeDocument/2006/math">
+                          <m:r>
+                            <a:rPr lang="en-US" b="0" i="1" smtClean="0">
+                              <a:latin typeface="Cambria Math" panose="02040503050406030204" pitchFamily="18" charset="0"/>
+                              <a:ea typeface="Cambria Math" panose="02040503050406030204" pitchFamily="18" charset="0"/>
+                            </a:rPr>
+                            <m:t>&amp; </m:t>
+                          </m:r>
+                          <m:r>
+                            <a:rPr lang="en-US" b="0" i="1" smtClean="0">
+                              <a:latin typeface="Cambria Math" panose="02040503050406030204" pitchFamily="18" charset="0"/>
+                              <a:ea typeface="Cambria Math" panose="02040503050406030204" pitchFamily="18" charset="0"/>
+                            </a:rPr>
+                            <m:t>𝑐h𝑎𝑟𝑔𝑒</m:t>
+                          </m:r>
+                          <m:r>
+                            <a:rPr lang="en-US" i="1" smtClean="0">
+                              <a:latin typeface="Cambria Math" panose="02040503050406030204" pitchFamily="18" charset="0"/>
+                              <a:ea typeface="Cambria Math" panose="02040503050406030204" pitchFamily="18" charset="0"/>
+                            </a:rPr>
+                            <m:t>≤</m:t>
+                          </m:r>
+                          <m:r>
+                            <a:rPr lang="en-US" b="0" i="1" smtClean="0">
+                              <a:latin typeface="Cambria Math" panose="02040503050406030204" pitchFamily="18" charset="0"/>
+                              <a:ea typeface="Cambria Math" panose="02040503050406030204" pitchFamily="18" charset="0"/>
+                            </a:rPr>
+                            <m:t>40</m:t>
+                          </m:r>
+                        </m:oMath>
+                      </a14:m>
+                      <a:endParaRPr lang="en-US" dirty="0"/>
+                    </a:p>
+                  </p:txBody>
+                </p:sp>
+              </mc:Choice>
+              <mc:Fallback xmlns="">
+                <p:sp>
+                  <p:nvSpPr>
+                    <p:cNvPr id="65" name="TextBox 64">
+                      <a:extLst>
+                        <a:ext uri="{FF2B5EF4-FFF2-40B4-BE49-F238E27FC236}">
+                          <a16:creationId xmlns:a16="http://schemas.microsoft.com/office/drawing/2014/main" id="{A6891D6B-692C-0540-BAB2-D3FD072CA3BF}"/>
+                        </a:ext>
+                      </a:extLst>
+                    </p:cNvPr>
+                    <p:cNvSpPr txBox="1">
+                      <a:spLocks noRot="1" noChangeAspect="1" noMove="1" noResize="1" noEditPoints="1" noAdjustHandles="1" noChangeArrowheads="1" noChangeShapeType="1" noTextEdit="1"/>
+                    </p:cNvSpPr>
+                    <p:nvPr/>
+                  </p:nvSpPr>
+                  <p:spPr>
+                    <a:xfrm>
+                      <a:off x="5826889" y="3211208"/>
+                      <a:ext cx="2197654" cy="369332"/>
+                    </a:xfrm>
+                    <a:prstGeom prst="rect">
+                      <a:avLst/>
+                    </a:prstGeom>
+                    <a:blipFill>
+                      <a:blip r:embed="rId4"/>
+                      <a:stretch>
+                        <a:fillRect l="-1724" t="-6667" b="-23333"/>
+                      </a:stretch>
+                    </a:blipFill>
+                  </p:spPr>
+                  <p:txBody>
+                    <a:bodyPr/>
+                    <a:lstStyle/>
+                    <a:p>
+                      <a:r>
+                        <a:rPr lang="en-US">
+                          <a:noFill/>
+                        </a:rPr>
+                        <a:t> </a:t>
+                      </a:r>
+                    </a:p>
+                  </p:txBody>
+                </p:sp>
+              </mc:Fallback>
+            </mc:AlternateContent>
+            <p:sp>
+              <p:nvSpPr>
+                <p:cNvPr id="66" name="TextBox 65">
+                  <a:extLst>
+                    <a:ext uri="{FF2B5EF4-FFF2-40B4-BE49-F238E27FC236}">
+                      <a16:creationId xmlns:a16="http://schemas.microsoft.com/office/drawing/2014/main" id="{E93C5189-0185-BB48-80C8-FC9CAF495146}"/>
+                    </a:ext>
+                  </a:extLst>
+                </p:cNvPr>
+                <p:cNvSpPr txBox="1"/>
+                <p:nvPr/>
+              </p:nvSpPr>
+              <p:spPr>
+                <a:xfrm>
+                  <a:off x="6953113" y="2062553"/>
+                  <a:ext cx="833241" cy="369332"/>
+                </a:xfrm>
+                <a:prstGeom prst="rect">
+                  <a:avLst/>
+                </a:prstGeom>
+                <a:noFill/>
+              </p:spPr>
+              <p:txBody>
+                <a:bodyPr wrap="none" rtlCol="0">
+                  <a:spAutoFit/>
+                </a:bodyPr>
+                <a:lstStyle/>
+                <a:p>
+                  <a:pPr algn="ctr"/>
+                  <a:r>
+                    <a:rPr lang="en-US" dirty="0" err="1"/>
+                    <a:t>toLand</a:t>
+                  </a:r>
+                  <a:endParaRPr lang="en-US" dirty="0"/>
+                </a:p>
+              </p:txBody>
+            </p:sp>
+            <p:sp>
+              <p:nvSpPr>
+                <p:cNvPr id="67" name="TextBox 66">
+                  <a:extLst>
+                    <a:ext uri="{FF2B5EF4-FFF2-40B4-BE49-F238E27FC236}">
+                      <a16:creationId xmlns:a16="http://schemas.microsoft.com/office/drawing/2014/main" id="{6C3C9893-1255-184A-8AD8-265BBEA912F2}"/>
+                    </a:ext>
+                  </a:extLst>
+                </p:cNvPr>
+                <p:cNvSpPr txBox="1"/>
+                <p:nvPr/>
+              </p:nvSpPr>
+              <p:spPr>
+                <a:xfrm>
+                  <a:off x="9500339" y="2062553"/>
+                  <a:ext cx="829073" cy="369332"/>
+                </a:xfrm>
+                <a:prstGeom prst="rect">
+                  <a:avLst/>
+                </a:prstGeom>
+                <a:noFill/>
+              </p:spPr>
+              <p:txBody>
+                <a:bodyPr wrap="none" rtlCol="0">
+                  <a:spAutoFit/>
+                </a:bodyPr>
+                <a:lstStyle/>
+                <a:p>
+                  <a:pPr algn="ctr"/>
+                  <a:r>
+                    <a:rPr lang="en-US" dirty="0"/>
+                    <a:t>landed</a:t>
+                  </a:r>
+                </a:p>
+              </p:txBody>
+            </p:sp>
+            <mc:AlternateContent xmlns:mc="http://schemas.openxmlformats.org/markup-compatibility/2006" xmlns:a14="http://schemas.microsoft.com/office/drawing/2010/main">
+              <mc:Choice Requires="a14">
+                <p:sp>
+                  <p:nvSpPr>
+                    <p:cNvPr id="68" name="TextBox 67">
+                      <a:extLst>
+                        <a:ext uri="{FF2B5EF4-FFF2-40B4-BE49-F238E27FC236}">
+                          <a16:creationId xmlns:a16="http://schemas.microsoft.com/office/drawing/2014/main" id="{869B3175-7591-0949-8573-BC34135BC9D3}"/>
+                        </a:ext>
+                      </a:extLst>
+                    </p:cNvPr>
+                    <p:cNvSpPr txBox="1"/>
+                    <p:nvPr/>
+                  </p:nvSpPr>
+                  <p:spPr>
+                    <a:xfrm>
+                      <a:off x="5113840" y="267500"/>
+                      <a:ext cx="2612382" cy="369332"/>
+                    </a:xfrm>
+                    <a:prstGeom prst="rect">
+                      <a:avLst/>
+                    </a:prstGeom>
+                    <a:noFill/>
+                  </p:spPr>
+                  <p:txBody>
+                    <a:bodyPr wrap="none" rtlCol="0">
+                      <a:spAutoFit/>
+                    </a:bodyPr>
+                    <a:lstStyle/>
+                    <a:p>
+                      <a:pPr algn="ctr"/>
+                      <a:r>
+                        <a:rPr lang="en-US" dirty="0" err="1"/>
+                        <a:t>toTakeoff</a:t>
+                      </a:r>
+                      <a:r>
+                        <a:rPr lang="en-US" dirty="0"/>
+                        <a:t> </a:t>
+                      </a:r>
+                      <a14:m>
+                        <m:oMath xmlns:m="http://schemas.openxmlformats.org/officeDocument/2006/math">
+                          <m:r>
+                            <a:rPr lang="en-US" b="0" i="1" smtClean="0">
+                              <a:latin typeface="Cambria Math" panose="02040503050406030204" pitchFamily="18" charset="0"/>
+                              <a:ea typeface="Cambria Math" panose="02040503050406030204" pitchFamily="18" charset="0"/>
+                            </a:rPr>
+                            <m:t>&amp; </m:t>
+                          </m:r>
+                          <m:r>
+                            <a:rPr lang="en-US" b="0" i="1" smtClean="0">
+                              <a:latin typeface="Cambria Math" panose="02040503050406030204" pitchFamily="18" charset="0"/>
+                              <a:ea typeface="Cambria Math" panose="02040503050406030204" pitchFamily="18" charset="0"/>
+                            </a:rPr>
+                            <m:t>𝑐h𝑎𝑟𝑔𝑒</m:t>
+                          </m:r>
+                          <m:r>
+                            <a:rPr lang="en-US" i="1" smtClean="0">
+                              <a:latin typeface="Cambria Math" panose="02040503050406030204" pitchFamily="18" charset="0"/>
+                              <a:ea typeface="Cambria Math" panose="02040503050406030204" pitchFamily="18" charset="0"/>
+                            </a:rPr>
+                            <m:t>≤</m:t>
+                          </m:r>
+                          <m:r>
+                            <a:rPr lang="en-US" b="0" i="1" smtClean="0">
+                              <a:latin typeface="Cambria Math" panose="02040503050406030204" pitchFamily="18" charset="0"/>
+                              <a:ea typeface="Cambria Math" panose="02040503050406030204" pitchFamily="18" charset="0"/>
+                            </a:rPr>
+                            <m:t>50</m:t>
+                          </m:r>
+                        </m:oMath>
+                      </a14:m>
+                      <a:endParaRPr lang="en-US" dirty="0"/>
+                    </a:p>
+                  </p:txBody>
+                </p:sp>
+              </mc:Choice>
+              <mc:Fallback xmlns="">
+                <p:sp>
+                  <p:nvSpPr>
+                    <p:cNvPr id="68" name="TextBox 67">
+                      <a:extLst>
+                        <a:ext uri="{FF2B5EF4-FFF2-40B4-BE49-F238E27FC236}">
+                          <a16:creationId xmlns:a16="http://schemas.microsoft.com/office/drawing/2014/main" id="{869B3175-7591-0949-8573-BC34135BC9D3}"/>
+                        </a:ext>
+                      </a:extLst>
+                    </p:cNvPr>
+                    <p:cNvSpPr txBox="1">
+                      <a:spLocks noRot="1" noChangeAspect="1" noMove="1" noResize="1" noEditPoints="1" noAdjustHandles="1" noChangeArrowheads="1" noChangeShapeType="1" noTextEdit="1"/>
+                    </p:cNvSpPr>
+                    <p:nvPr/>
+                  </p:nvSpPr>
+                  <p:spPr>
+                    <a:xfrm>
+                      <a:off x="5113840" y="267500"/>
+                      <a:ext cx="2612382" cy="369332"/>
+                    </a:xfrm>
+                    <a:prstGeom prst="rect">
+                      <a:avLst/>
+                    </a:prstGeom>
+                    <a:blipFill>
+                      <a:blip r:embed="rId5"/>
+                      <a:stretch>
+                        <a:fillRect l="-1456" t="-6667" b="-26667"/>
+                      </a:stretch>
+                    </a:blipFill>
+                  </p:spPr>
+                  <p:txBody>
+                    <a:bodyPr/>
+                    <a:lstStyle/>
+                    <a:p>
+                      <a:r>
+                        <a:rPr lang="en-US">
+                          <a:noFill/>
+                        </a:rPr>
+                        <a:t> </a:t>
+                      </a:r>
+                    </a:p>
+                  </p:txBody>
+                </p:sp>
+              </mc:Fallback>
+            </mc:AlternateContent>
+            <p:sp>
+              <p:nvSpPr>
+                <p:cNvPr id="69" name="TextBox 68">
+                  <a:extLst>
+                    <a:ext uri="{FF2B5EF4-FFF2-40B4-BE49-F238E27FC236}">
+                      <a16:creationId xmlns:a16="http://schemas.microsoft.com/office/drawing/2014/main" id="{9472BBD5-8903-1B43-899E-4774419F01D5}"/>
+                    </a:ext>
+                  </a:extLst>
+                </p:cNvPr>
+                <p:cNvSpPr txBox="1"/>
+                <p:nvPr/>
+              </p:nvSpPr>
+              <p:spPr>
+                <a:xfrm>
+                  <a:off x="1852910" y="306771"/>
+                  <a:ext cx="428322" cy="369332"/>
+                </a:xfrm>
+                <a:prstGeom prst="rect">
+                  <a:avLst/>
+                </a:prstGeom>
+                <a:noFill/>
+              </p:spPr>
+              <p:txBody>
+                <a:bodyPr wrap="none" rtlCol="0">
+                  <a:spAutoFit/>
+                </a:bodyPr>
+                <a:lstStyle/>
+                <a:p>
+                  <a:pPr algn="ctr"/>
+                  <a:r>
+                    <a:rPr lang="en-US" dirty="0"/>
+                    <a:t>on</a:t>
+                  </a:r>
+                </a:p>
+              </p:txBody>
+            </p:sp>
+            <p:sp>
+              <p:nvSpPr>
+                <p:cNvPr id="70" name="TextBox 69">
+                  <a:extLst>
+                    <a:ext uri="{FF2B5EF4-FFF2-40B4-BE49-F238E27FC236}">
+                      <a16:creationId xmlns:a16="http://schemas.microsoft.com/office/drawing/2014/main" id="{BA79BFC0-FB5E-1942-A338-ED68D6C0C5AC}"/>
+                    </a:ext>
+                  </a:extLst>
+                </p:cNvPr>
+                <p:cNvSpPr txBox="1"/>
+                <p:nvPr/>
+              </p:nvSpPr>
+              <p:spPr>
+                <a:xfrm>
+                  <a:off x="11294162" y="753039"/>
+                  <a:ext cx="445315" cy="369332"/>
+                </a:xfrm>
+                <a:prstGeom prst="rect">
+                  <a:avLst/>
+                </a:prstGeom>
+                <a:noFill/>
+              </p:spPr>
+              <p:txBody>
+                <a:bodyPr wrap="none" rtlCol="0">
+                  <a:spAutoFit/>
+                </a:bodyPr>
+                <a:lstStyle/>
+                <a:p>
+                  <a:r>
+                    <a:rPr lang="en-US" dirty="0"/>
+                    <a:t>off</a:t>
+                  </a:r>
+                </a:p>
+              </p:txBody>
+            </p:sp>
+            <mc:AlternateContent xmlns:mc="http://schemas.openxmlformats.org/markup-compatibility/2006" xmlns:a14="http://schemas.microsoft.com/office/drawing/2010/main">
+              <mc:Choice Requires="a14">
+                <p:sp>
+                  <p:nvSpPr>
+                    <p:cNvPr id="71" name="TextBox 70">
+                      <a:extLst>
+                        <a:ext uri="{FF2B5EF4-FFF2-40B4-BE49-F238E27FC236}">
+                          <a16:creationId xmlns:a16="http://schemas.microsoft.com/office/drawing/2014/main" id="{DB9A0A30-985D-3045-86B1-A306AE9D22AD}"/>
+                        </a:ext>
+                      </a:extLst>
+                    </p:cNvPr>
+                    <p:cNvSpPr txBox="1"/>
+                    <p:nvPr/>
+                  </p:nvSpPr>
+                  <p:spPr>
+                    <a:xfrm>
+                      <a:off x="7581784" y="6889665"/>
+                      <a:ext cx="2612382" cy="369332"/>
+                    </a:xfrm>
+                    <a:prstGeom prst="rect">
+                      <a:avLst/>
+                    </a:prstGeom>
+                    <a:noFill/>
+                  </p:spPr>
+                  <p:txBody>
+                    <a:bodyPr wrap="none" rtlCol="0">
+                      <a:spAutoFit/>
+                    </a:bodyPr>
+                    <a:lstStyle/>
+                    <a:p>
+                      <a:r>
+                        <a:rPr lang="en-US" dirty="0" err="1"/>
+                        <a:t>toTakeoff</a:t>
+                      </a:r>
+                      <a:r>
+                        <a:rPr lang="en-US" dirty="0"/>
+                        <a:t> </a:t>
+                      </a:r>
+                      <a14:m>
+                        <m:oMath xmlns:m="http://schemas.openxmlformats.org/officeDocument/2006/math">
+                          <m:r>
+                            <a:rPr lang="en-US" b="0" i="1" smtClean="0">
+                              <a:latin typeface="Cambria Math" panose="02040503050406030204" pitchFamily="18" charset="0"/>
+                              <a:ea typeface="Cambria Math" panose="02040503050406030204" pitchFamily="18" charset="0"/>
+                            </a:rPr>
+                            <m:t>&amp; </m:t>
+                          </m:r>
+                          <m:r>
+                            <a:rPr lang="en-US" b="0" i="1" smtClean="0">
+                              <a:latin typeface="Cambria Math" panose="02040503050406030204" pitchFamily="18" charset="0"/>
+                              <a:ea typeface="Cambria Math" panose="02040503050406030204" pitchFamily="18" charset="0"/>
+                            </a:rPr>
+                            <m:t>𝑐h𝑎𝑟𝑔𝑒</m:t>
+                          </m:r>
+                          <m:r>
+                            <a:rPr lang="en-US" i="1" smtClean="0">
+                              <a:latin typeface="Cambria Math" panose="02040503050406030204" pitchFamily="18" charset="0"/>
+                              <a:ea typeface="Cambria Math" panose="02040503050406030204" pitchFamily="18" charset="0"/>
+                            </a:rPr>
+                            <m:t>≤</m:t>
+                          </m:r>
+                          <m:r>
+                            <a:rPr lang="en-US" b="0" i="1" smtClean="0">
+                              <a:latin typeface="Cambria Math" panose="02040503050406030204" pitchFamily="18" charset="0"/>
+                              <a:ea typeface="Cambria Math" panose="02040503050406030204" pitchFamily="18" charset="0"/>
+                            </a:rPr>
+                            <m:t>50</m:t>
+                          </m:r>
+                        </m:oMath>
+                      </a14:m>
+                      <a:endParaRPr lang="en-US" dirty="0"/>
+                    </a:p>
+                  </p:txBody>
+                </p:sp>
+              </mc:Choice>
+              <mc:Fallback xmlns="">
+                <p:sp>
+                  <p:nvSpPr>
+                    <p:cNvPr id="71" name="TextBox 70">
+                      <a:extLst>
+                        <a:ext uri="{FF2B5EF4-FFF2-40B4-BE49-F238E27FC236}">
+                          <a16:creationId xmlns:a16="http://schemas.microsoft.com/office/drawing/2014/main" id="{DB9A0A30-985D-3045-86B1-A306AE9D22AD}"/>
+                        </a:ext>
+                      </a:extLst>
+                    </p:cNvPr>
+                    <p:cNvSpPr txBox="1">
+                      <a:spLocks noRot="1" noChangeAspect="1" noMove="1" noResize="1" noEditPoints="1" noAdjustHandles="1" noChangeArrowheads="1" noChangeShapeType="1" noTextEdit="1"/>
+                    </p:cNvSpPr>
+                    <p:nvPr/>
+                  </p:nvSpPr>
+                  <p:spPr>
+                    <a:xfrm>
+                      <a:off x="7581784" y="6889665"/>
+                      <a:ext cx="2612382" cy="369332"/>
+                    </a:xfrm>
+                    <a:prstGeom prst="rect">
+                      <a:avLst/>
+                    </a:prstGeom>
+                    <a:blipFill>
+                      <a:blip r:embed="rId6"/>
+                      <a:stretch>
+                        <a:fillRect l="-1932" t="-3226" b="-22581"/>
+                      </a:stretch>
+                    </a:blipFill>
+                  </p:spPr>
+                  <p:txBody>
+                    <a:bodyPr/>
+                    <a:lstStyle/>
+                    <a:p>
+                      <a:r>
+                        <a:rPr lang="en-US">
+                          <a:noFill/>
+                        </a:rPr>
+                        <a:t> </a:t>
+                      </a:r>
+                    </a:p>
+                  </p:txBody>
+                </p:sp>
+              </mc:Fallback>
+            </mc:AlternateContent>
+            <p:cxnSp>
+              <p:nvCxnSpPr>
+                <p:cNvPr id="18" name="Elbow Connector 17">
+                  <a:extLst>
+                    <a:ext uri="{FF2B5EF4-FFF2-40B4-BE49-F238E27FC236}">
+                      <a16:creationId xmlns:a16="http://schemas.microsoft.com/office/drawing/2014/main" id="{93DBBA6E-AB9A-DC4D-A7E9-DCD82F00F33F}"/>
+                    </a:ext>
+                  </a:extLst>
+                </p:cNvPr>
+                <p:cNvCxnSpPr>
+                  <a:cxnSpLocks/>
+                  <a:stCxn id="4" idx="3"/>
+                  <a:endCxn id="6" idx="2"/>
+                </p:cNvCxnSpPr>
+                <p:nvPr/>
+              </p:nvCxnSpPr>
+              <p:spPr>
+                <a:xfrm flipV="1">
+                  <a:off x="5852503" y="2616551"/>
+                  <a:ext cx="700871" cy="567308"/>
+                </a:xfrm>
+                <a:prstGeom prst="bentConnector2">
+                  <a:avLst/>
+                </a:prstGeom>
+                <a:ln w="38100">
+                  <a:solidFill>
+                    <a:schemeClr val="tx1"/>
+                  </a:solidFill>
+                  <a:tailEnd type="triangle"/>
+                </a:ln>
+              </p:spPr>
+              <p:style>
+                <a:lnRef idx="1">
+                  <a:schemeClr val="accent1"/>
+                </a:lnRef>
+                <a:fillRef idx="0">
+                  <a:schemeClr val="accent1"/>
+                </a:fillRef>
+                <a:effectRef idx="0">
+                  <a:schemeClr val="accent1"/>
+                </a:effectRef>
+                <a:fontRef idx="minor">
+                  <a:schemeClr val="tx1"/>
+                </a:fontRef>
+              </p:style>
+            </p:cxnSp>
+            <p:sp>
+              <p:nvSpPr>
+                <p:cNvPr id="40" name="TextBox 39">
+                  <a:extLst>
+                    <a:ext uri="{FF2B5EF4-FFF2-40B4-BE49-F238E27FC236}">
+                      <a16:creationId xmlns:a16="http://schemas.microsoft.com/office/drawing/2014/main" id="{D5E9DF1B-3EE4-ED4C-9016-79ED949478C8}"/>
+                    </a:ext>
+                  </a:extLst>
+                </p:cNvPr>
+                <p:cNvSpPr txBox="1"/>
+                <p:nvPr/>
+              </p:nvSpPr>
+              <p:spPr>
+                <a:xfrm>
+                  <a:off x="968509" y="2876939"/>
+                  <a:ext cx="2955167" cy="1523494"/>
+                </a:xfrm>
+                <a:prstGeom prst="rect">
+                  <a:avLst/>
+                </a:prstGeom>
+                <a:solidFill>
+                  <a:schemeClr val="accent2">
+                    <a:lumMod val="20000"/>
+                    <a:lumOff val="80000"/>
+                  </a:schemeClr>
+                </a:solidFill>
+                <a:ln w="25400">
+                  <a:solidFill>
+                    <a:schemeClr val="tx1"/>
+                  </a:solidFill>
+                </a:ln>
+              </p:spPr>
+              <p:txBody>
+                <a:bodyPr wrap="square" rtlCol="0">
+                  <a:spAutoFit/>
+                </a:bodyPr>
+                <a:lstStyle/>
+                <a:p>
+                  <a:pPr algn="ctr"/>
+                  <a:r>
+                    <a:rPr lang="en-US" dirty="0"/>
+                    <a:t>CLIMB</a:t>
+                  </a:r>
+                </a:p>
+                <a:p>
+                  <a:pPr algn="ctr"/>
+                  <a:endParaRPr lang="en-US" dirty="0"/>
+                </a:p>
+                <a:p>
+                  <a:pPr algn="ctr"/>
+                  <a:endParaRPr lang="en-US" dirty="0"/>
+                </a:p>
+                <a:p>
+                  <a:pPr algn="ctr"/>
+                  <a:endParaRPr lang="en-US" sz="1600" dirty="0"/>
+                </a:p>
+                <a:p>
+                  <a:pPr algn="ctr"/>
+                  <a:endParaRPr lang="en-US" sz="1200" dirty="0"/>
+                </a:p>
+                <a:p>
+                  <a:pPr algn="ctr"/>
+                  <a:endParaRPr lang="en-US" sz="1100" dirty="0"/>
+                </a:p>
+              </p:txBody>
+            </p:sp>
+            <p:sp>
+              <p:nvSpPr>
+                <p:cNvPr id="42" name="TextBox 41">
+                  <a:extLst>
+                    <a:ext uri="{FF2B5EF4-FFF2-40B4-BE49-F238E27FC236}">
+                      <a16:creationId xmlns:a16="http://schemas.microsoft.com/office/drawing/2014/main" id="{01C6F749-6B61-2643-9279-C9B3CA89C8F4}"/>
+                    </a:ext>
+                  </a:extLst>
+                </p:cNvPr>
+                <p:cNvSpPr txBox="1"/>
+                <p:nvPr/>
+              </p:nvSpPr>
+              <p:spPr>
+                <a:xfrm>
+                  <a:off x="4303588" y="3593894"/>
+                  <a:ext cx="1030921" cy="369332"/>
+                </a:xfrm>
+                <a:prstGeom prst="rect">
+                  <a:avLst/>
+                </a:prstGeom>
+                <a:solidFill>
+                  <a:schemeClr val="accent2">
+                    <a:lumMod val="20000"/>
+                    <a:lumOff val="80000"/>
+                  </a:schemeClr>
+                </a:solidFill>
+                <a:ln w="25400">
+                  <a:solidFill>
+                    <a:schemeClr val="tx1"/>
+                  </a:solidFill>
+                </a:ln>
+              </p:spPr>
+              <p:txBody>
+                <a:bodyPr wrap="square" rtlCol="0">
+                  <a:spAutoFit/>
+                </a:bodyPr>
+                <a:lstStyle/>
+                <a:p>
+                  <a:pPr algn="ctr"/>
+                  <a:r>
+                    <a:rPr lang="en-US" dirty="0"/>
+                    <a:t>HOVER</a:t>
+                  </a:r>
+                </a:p>
+              </p:txBody>
+            </p:sp>
+            <mc:AlternateContent xmlns:mc="http://schemas.openxmlformats.org/markup-compatibility/2006" xmlns:a14="http://schemas.microsoft.com/office/drawing/2010/main">
+              <mc:Choice Requires="a14">
+                <p:sp>
+                  <p:nvSpPr>
+                    <p:cNvPr id="23" name="TextBox 22">
+                      <a:extLst>
+                        <a:ext uri="{FF2B5EF4-FFF2-40B4-BE49-F238E27FC236}">
+                          <a16:creationId xmlns:a16="http://schemas.microsoft.com/office/drawing/2014/main" id="{3A8AFE6F-0321-7243-806F-704A4434A696}"/>
+                        </a:ext>
+                      </a:extLst>
+                    </p:cNvPr>
+                    <p:cNvSpPr txBox="1"/>
+                    <p:nvPr/>
+                  </p:nvSpPr>
+                  <p:spPr>
+                    <a:xfrm>
+                      <a:off x="2503680" y="2522753"/>
+                      <a:ext cx="3613600" cy="369332"/>
+                    </a:xfrm>
+                    <a:prstGeom prst="rect">
+                      <a:avLst/>
+                    </a:prstGeom>
+                    <a:noFill/>
+                  </p:spPr>
+                  <p:txBody>
+                    <a:bodyPr wrap="square" rtlCol="0">
+                      <a:spAutoFit/>
+                    </a:bodyPr>
+                    <a:lstStyle/>
+                    <a:p>
+                      <a14:m>
+                        <m:oMath xmlns:m="http://schemas.openxmlformats.org/officeDocument/2006/math">
+                          <m:r>
+                            <a:rPr lang="en-US" b="0" i="1" smtClean="0">
+                              <a:latin typeface="Cambria Math" panose="02040503050406030204" pitchFamily="18" charset="0"/>
+                            </a:rPr>
+                            <m:t>𝑔𝑒𝑡𝐺𝑃𝑆</m:t>
+                          </m:r>
+                          <m:r>
+                            <a:rPr lang="en-US" b="0" i="1" smtClean="0">
+                              <a:latin typeface="Cambria Math" panose="02040503050406030204" pitchFamily="18" charset="0"/>
+                            </a:rPr>
+                            <m:t> </m:t>
+                          </m:r>
+                          <m:acc>
+                            <m:accPr>
+                              <m:chr m:val="⃑"/>
+                              <m:ctrlPr>
+                                <a:rPr lang="en-US" b="0" i="1" smtClean="0">
+                                  <a:latin typeface="Cambria Math" panose="02040503050406030204" pitchFamily="18" charset="0"/>
+                                </a:rPr>
+                              </m:ctrlPr>
+                            </m:accPr>
+                            <m:e>
+                              <m:r>
+                                <a:rPr lang="en-US" b="0" i="1" smtClean="0">
+                                  <a:latin typeface="Cambria Math" panose="02040503050406030204" pitchFamily="18" charset="0"/>
+                                </a:rPr>
+                                <m:t>𝑦</m:t>
+                              </m:r>
+                            </m:e>
+                          </m:acc>
+                          <m:r>
+                            <a:rPr lang="en-US" b="0" i="1" smtClean="0">
+                              <a:latin typeface="Cambria Math" panose="02040503050406030204" pitchFamily="18" charset="0"/>
+                            </a:rPr>
+                            <m:t>&gt;</m:t>
+                          </m:r>
+                          <m:r>
+                            <a:rPr lang="en-US" b="0" i="1" smtClean="0">
+                              <a:latin typeface="Cambria Math" panose="02040503050406030204" pitchFamily="18" charset="0"/>
+                            </a:rPr>
+                            <m:t>𝑚𝑖𝑛𝑖𝑚𝑢𝑚</m:t>
+                          </m:r>
+                          <m:r>
+                            <a:rPr lang="en-US" b="0" i="1" smtClean="0">
+                              <a:latin typeface="Cambria Math" panose="02040503050406030204" pitchFamily="18" charset="0"/>
+                            </a:rPr>
+                            <m:t> </m:t>
+                          </m:r>
+                        </m:oMath>
+                      </a14:m>
+                      <a:r>
+                        <a:rPr lang="en-US" dirty="0"/>
+                        <a:t>/ </a:t>
+                      </a:r>
+                      <a:r>
+                        <a:rPr lang="en-US" dirty="0" err="1"/>
+                        <a:t>toFly</a:t>
+                      </a:r>
+                      <a:endParaRPr lang="en-US" dirty="0"/>
+                    </a:p>
+                  </p:txBody>
+                </p:sp>
+              </mc:Choice>
+              <mc:Fallback xmlns="">
+                <p:sp>
+                  <p:nvSpPr>
+                    <p:cNvPr id="23" name="TextBox 22">
+                      <a:extLst>
+                        <a:ext uri="{FF2B5EF4-FFF2-40B4-BE49-F238E27FC236}">
+                          <a16:creationId xmlns:a16="http://schemas.microsoft.com/office/drawing/2014/main" id="{3A8AFE6F-0321-7243-806F-704A4434A696}"/>
+                        </a:ext>
+                      </a:extLst>
+                    </p:cNvPr>
+                    <p:cNvSpPr txBox="1">
+                      <a:spLocks noRot="1" noChangeAspect="1" noMove="1" noResize="1" noEditPoints="1" noAdjustHandles="1" noChangeArrowheads="1" noChangeShapeType="1" noTextEdit="1"/>
+                    </p:cNvSpPr>
+                    <p:nvPr/>
+                  </p:nvSpPr>
+                  <p:spPr>
+                    <a:xfrm>
+                      <a:off x="2503680" y="2522753"/>
+                      <a:ext cx="3613600" cy="369332"/>
+                    </a:xfrm>
+                    <a:prstGeom prst="rect">
+                      <a:avLst/>
+                    </a:prstGeom>
+                    <a:blipFill>
+                      <a:blip r:embed="rId7"/>
+                      <a:stretch>
+                        <a:fillRect t="-6667" b="-23333"/>
+                      </a:stretch>
+                    </a:blipFill>
+                  </p:spPr>
+                  <p:txBody>
+                    <a:bodyPr/>
+                    <a:lstStyle/>
+                    <a:p>
+                      <a:r>
+                        <a:rPr lang="en-US">
+                          <a:noFill/>
+                        </a:rPr>
+                        <a:t> </a:t>
+                      </a:r>
+                    </a:p>
+                  </p:txBody>
+                </p:sp>
+              </mc:Fallback>
+            </mc:AlternateContent>
+            <p:sp>
+              <p:nvSpPr>
+                <p:cNvPr id="49" name="Oval 48">
+                  <a:extLst>
+                    <a:ext uri="{FF2B5EF4-FFF2-40B4-BE49-F238E27FC236}">
+                      <a16:creationId xmlns:a16="http://schemas.microsoft.com/office/drawing/2014/main" id="{1F8C1A23-02BE-B644-8873-8468E15CA8AA}"/>
+                    </a:ext>
+                  </a:extLst>
+                </p:cNvPr>
+                <p:cNvSpPr/>
+                <p:nvPr/>
+              </p:nvSpPr>
+              <p:spPr>
+                <a:xfrm>
+                  <a:off x="769729" y="2685986"/>
+                  <a:ext cx="198780" cy="198780"/>
+                </a:xfrm>
+                <a:prstGeom prst="ellipse">
+                  <a:avLst/>
+                </a:prstGeom>
+                <a:solidFill>
+                  <a:schemeClr val="tx1"/>
+                </a:solidFill>
+                <a:ln>
+                  <a:solidFill>
+                    <a:schemeClr val="tx1"/>
+                  </a:solidFill>
+                </a:ln>
+              </p:spPr>
+              <p:style>
+                <a:lnRef idx="2">
+                  <a:schemeClr val="accent1">
+                    <a:shade val="50000"/>
+                  </a:schemeClr>
+                </a:lnRef>
+                <a:fillRef idx="1">
+                  <a:schemeClr val="accent1"/>
+                </a:fillRef>
+                <a:effectRef idx="0">
+                  <a:schemeClr val="accent1"/>
+                </a:effectRef>
+                <a:fontRef idx="minor">
+                  <a:schemeClr val="lt1"/>
+                </a:fontRef>
+              </p:style>
+              <p:txBody>
+                <a:bodyPr rtlCol="0" anchor="ctr"/>
+                <a:lstStyle/>
+                <a:p>
+                  <a:pPr algn="ctr"/>
+                  <a:endParaRPr lang="en-US"/>
+                </a:p>
+              </p:txBody>
+            </p:sp>
+            <p:cxnSp>
+              <p:nvCxnSpPr>
+                <p:cNvPr id="16" name="Straight Connector 15">
+                  <a:extLst>
+                    <a:ext uri="{FF2B5EF4-FFF2-40B4-BE49-F238E27FC236}">
+                      <a16:creationId xmlns:a16="http://schemas.microsoft.com/office/drawing/2014/main" id="{3C4D6DF5-C7E1-B641-B7DD-E93C23E41576}"/>
+                    </a:ext>
+                  </a:extLst>
+                </p:cNvPr>
+                <p:cNvCxnSpPr/>
+                <p:nvPr/>
+              </p:nvCxnSpPr>
+              <p:spPr>
+                <a:xfrm>
+                  <a:off x="493113" y="1442025"/>
+                  <a:ext cx="10851323" cy="0"/>
+                </a:xfrm>
+                <a:prstGeom prst="line">
+                  <a:avLst/>
+                </a:prstGeom>
+                <a:ln w="25400">
+                  <a:solidFill>
+                    <a:schemeClr val="tx1"/>
+                  </a:solidFill>
+                  <a:prstDash val="solid"/>
+                </a:ln>
+              </p:spPr>
+              <p:style>
+                <a:lnRef idx="1">
+                  <a:schemeClr val="accent1"/>
+                </a:lnRef>
+                <a:fillRef idx="0">
+                  <a:schemeClr val="accent1"/>
+                </a:fillRef>
+                <a:effectRef idx="0">
+                  <a:schemeClr val="accent1"/>
+                </a:effectRef>
+                <a:fontRef idx="minor">
+                  <a:schemeClr val="tx1"/>
+                </a:fontRef>
+              </p:style>
+            </p:cxnSp>
+            <p:cxnSp>
+              <p:nvCxnSpPr>
+                <p:cNvPr id="43" name="Straight Connector 42">
+                  <a:extLst>
+                    <a:ext uri="{FF2B5EF4-FFF2-40B4-BE49-F238E27FC236}">
+                      <a16:creationId xmlns:a16="http://schemas.microsoft.com/office/drawing/2014/main" id="{C4F701E3-0AA1-D24C-ADC9-7DA67A37A43A}"/>
+                    </a:ext>
+                  </a:extLst>
+                </p:cNvPr>
+                <p:cNvCxnSpPr>
+                  <a:cxnSpLocks/>
+                </p:cNvCxnSpPr>
+                <p:nvPr/>
+              </p:nvCxnSpPr>
+              <p:spPr>
+                <a:xfrm>
+                  <a:off x="493112" y="4662604"/>
+                  <a:ext cx="11505299" cy="0"/>
+                </a:xfrm>
+                <a:prstGeom prst="line">
+                  <a:avLst/>
+                </a:prstGeom>
+                <a:ln w="38100">
+                  <a:solidFill>
+                    <a:schemeClr val="tx1"/>
+                  </a:solidFill>
+                  <a:prstDash val="lgDash"/>
+                </a:ln>
+              </p:spPr>
+              <p:style>
+                <a:lnRef idx="1">
+                  <a:schemeClr val="accent1"/>
+                </a:lnRef>
+                <a:fillRef idx="0">
+                  <a:schemeClr val="accent1"/>
+                </a:fillRef>
+                <a:effectRef idx="0">
+                  <a:schemeClr val="accent1"/>
+                </a:effectRef>
+                <a:fontRef idx="minor">
+                  <a:schemeClr val="tx1"/>
+                </a:fontRef>
+              </p:style>
+            </p:cxnSp>
+            <p:sp>
+              <p:nvSpPr>
+                <p:cNvPr id="17" name="TextBox 16">
+                  <a:extLst>
+                    <a:ext uri="{FF2B5EF4-FFF2-40B4-BE49-F238E27FC236}">
+                      <a16:creationId xmlns:a16="http://schemas.microsoft.com/office/drawing/2014/main" id="{5835C2E3-80DC-7947-B73C-A7F013FEDF56}"/>
+                    </a:ext>
+                  </a:extLst>
+                </p:cNvPr>
+                <p:cNvSpPr txBox="1"/>
+                <p:nvPr/>
+              </p:nvSpPr>
+              <p:spPr>
+                <a:xfrm>
+                  <a:off x="5245890" y="1492500"/>
+                  <a:ext cx="1161999" cy="369332"/>
+                </a:xfrm>
+                <a:prstGeom prst="rect">
+                  <a:avLst/>
+                </a:prstGeom>
+                <a:noFill/>
+              </p:spPr>
+              <p:txBody>
+                <a:bodyPr wrap="square" rtlCol="0">
+                  <a:spAutoFit/>
+                </a:bodyPr>
+                <a:lstStyle/>
+                <a:p>
+                  <a:pPr algn="ctr"/>
+                  <a:r>
+                    <a:rPr lang="en-US" dirty="0"/>
+                    <a:t>FLYOP</a:t>
+                  </a:r>
+                </a:p>
+              </p:txBody>
+            </p:sp>
+            <p:sp>
+              <p:nvSpPr>
+                <p:cNvPr id="45" name="TextBox 44">
+                  <a:extLst>
+                    <a:ext uri="{FF2B5EF4-FFF2-40B4-BE49-F238E27FC236}">
+                      <a16:creationId xmlns:a16="http://schemas.microsoft.com/office/drawing/2014/main" id="{AB1A3DF6-D160-A347-BD91-5886A01695D5}"/>
+                    </a:ext>
+                  </a:extLst>
+                </p:cNvPr>
+                <p:cNvSpPr txBox="1"/>
+                <p:nvPr/>
+              </p:nvSpPr>
+              <p:spPr>
+                <a:xfrm>
+                  <a:off x="5082689" y="4651293"/>
+                  <a:ext cx="2003911" cy="369332"/>
+                </a:xfrm>
+                <a:prstGeom prst="rect">
+                  <a:avLst/>
+                </a:prstGeom>
+                <a:noFill/>
+              </p:spPr>
+              <p:txBody>
+                <a:bodyPr wrap="square" rtlCol="0">
+                  <a:spAutoFit/>
+                </a:bodyPr>
+                <a:lstStyle/>
+                <a:p>
+                  <a:pPr algn="ctr"/>
+                  <a:r>
+                    <a:rPr lang="en-US" dirty="0"/>
+                    <a:t>BATTERYOP</a:t>
+                  </a:r>
+                </a:p>
+              </p:txBody>
+            </p:sp>
+            <p:sp>
+              <p:nvSpPr>
+                <p:cNvPr id="46" name="Oval 45">
+                  <a:extLst>
+                    <a:ext uri="{FF2B5EF4-FFF2-40B4-BE49-F238E27FC236}">
+                      <a16:creationId xmlns:a16="http://schemas.microsoft.com/office/drawing/2014/main" id="{B1354ACE-21E9-1243-82AF-EAA33923B765}"/>
+                    </a:ext>
+                  </a:extLst>
+                </p:cNvPr>
+                <p:cNvSpPr/>
+                <p:nvPr/>
+              </p:nvSpPr>
+              <p:spPr>
+                <a:xfrm>
+                  <a:off x="1655262" y="5667665"/>
+                  <a:ext cx="198780" cy="198780"/>
+                </a:xfrm>
+                <a:prstGeom prst="ellipse">
+                  <a:avLst/>
+                </a:prstGeom>
+                <a:solidFill>
+                  <a:schemeClr val="tx1"/>
+                </a:solidFill>
+                <a:ln>
+                  <a:solidFill>
+                    <a:schemeClr val="tx1"/>
+                  </a:solidFill>
+                </a:ln>
+              </p:spPr>
+              <p:style>
+                <a:lnRef idx="2">
+                  <a:schemeClr val="accent1">
+                    <a:shade val="50000"/>
+                  </a:schemeClr>
+                </a:lnRef>
+                <a:fillRef idx="1">
+                  <a:schemeClr val="accent1"/>
+                </a:fillRef>
+                <a:effectRef idx="0">
+                  <a:schemeClr val="accent1"/>
+                </a:effectRef>
+                <a:fontRef idx="minor">
+                  <a:schemeClr val="lt1"/>
+                </a:fontRef>
+              </p:style>
+              <p:txBody>
+                <a:bodyPr rtlCol="0" anchor="ctr"/>
+                <a:lstStyle/>
+                <a:p>
+                  <a:pPr algn="ctr"/>
+                  <a:endParaRPr lang="en-US"/>
+                </a:p>
+              </p:txBody>
+            </p:sp>
+            <p:sp>
+              <p:nvSpPr>
+                <p:cNvPr id="53" name="TextBox 52">
+                  <a:extLst>
+                    <a:ext uri="{FF2B5EF4-FFF2-40B4-BE49-F238E27FC236}">
+                      <a16:creationId xmlns:a16="http://schemas.microsoft.com/office/drawing/2014/main" id="{163F545C-4D0C-9248-BC97-552F68A827F6}"/>
+                    </a:ext>
+                  </a:extLst>
+                </p:cNvPr>
+                <p:cNvSpPr txBox="1"/>
+                <p:nvPr/>
+              </p:nvSpPr>
+              <p:spPr>
+                <a:xfrm>
+                  <a:off x="2336928" y="4974062"/>
+                  <a:ext cx="7313536" cy="1600438"/>
+                </a:xfrm>
+                <a:prstGeom prst="rect">
+                  <a:avLst/>
+                </a:prstGeom>
+                <a:solidFill>
+                  <a:schemeClr val="accent6">
+                    <a:lumMod val="40000"/>
+                    <a:lumOff val="60000"/>
+                  </a:schemeClr>
+                </a:solidFill>
+                <a:ln w="25400">
+                  <a:solidFill>
+                    <a:schemeClr val="tx1"/>
+                  </a:solidFill>
+                </a:ln>
+              </p:spPr>
+              <p:txBody>
+                <a:bodyPr wrap="square" rtlCol="0">
+                  <a:spAutoFit/>
+                </a:bodyPr>
+                <a:lstStyle/>
+                <a:p>
+                  <a:pPr algn="ctr"/>
+                  <a:r>
+                    <a:rPr lang="en-US" dirty="0"/>
+                    <a:t>BATTERY</a:t>
+                  </a:r>
+                </a:p>
+                <a:p>
+                  <a:pPr algn="ctr"/>
+                  <a:endParaRPr lang="en-US" dirty="0"/>
+                </a:p>
+                <a:p>
+                  <a:pPr algn="ctr"/>
+                  <a:endParaRPr lang="en-US" dirty="0"/>
+                </a:p>
+                <a:p>
+                  <a:pPr algn="ctr"/>
+                  <a:endParaRPr lang="en-US" sz="800" dirty="0"/>
+                </a:p>
+                <a:p>
+                  <a:pPr algn="ctr"/>
+                  <a:endParaRPr lang="en-US" dirty="0"/>
+                </a:p>
+                <a:p>
+                  <a:pPr algn="ctr"/>
+                  <a:endParaRPr lang="en-US" dirty="0"/>
+                </a:p>
+              </p:txBody>
+            </p:sp>
+            <p:sp>
+              <p:nvSpPr>
+                <p:cNvPr id="47" name="TextBox 46">
+                  <a:extLst>
+                    <a:ext uri="{FF2B5EF4-FFF2-40B4-BE49-F238E27FC236}">
+                      <a16:creationId xmlns:a16="http://schemas.microsoft.com/office/drawing/2014/main" id="{159FD89B-DCD3-3F4A-B2B1-0DC27047DBEA}"/>
+                    </a:ext>
+                  </a:extLst>
+                </p:cNvPr>
+                <p:cNvSpPr txBox="1"/>
+                <p:nvPr/>
+              </p:nvSpPr>
+              <p:spPr>
+                <a:xfrm>
+                  <a:off x="2926685" y="5634154"/>
+                  <a:ext cx="1711783" cy="369332"/>
+                </a:xfrm>
+                <a:prstGeom prst="rect">
+                  <a:avLst/>
+                </a:prstGeom>
+                <a:solidFill>
+                  <a:schemeClr val="accent6">
+                    <a:lumMod val="40000"/>
+                    <a:lumOff val="60000"/>
+                  </a:schemeClr>
+                </a:solidFill>
+                <a:ln w="25400">
+                  <a:solidFill>
+                    <a:schemeClr val="tx1"/>
+                  </a:solidFill>
+                </a:ln>
+              </p:spPr>
+              <p:txBody>
+                <a:bodyPr wrap="square" rtlCol="0">
+                  <a:spAutoFit/>
+                </a:bodyPr>
+                <a:lstStyle/>
+                <a:p>
+                  <a:pPr algn="ctr"/>
+                  <a:r>
+                    <a:rPr lang="en-US" dirty="0"/>
+                    <a:t>BATTERYOK</a:t>
+                  </a:r>
+                </a:p>
+              </p:txBody>
+            </p:sp>
+            <p:sp>
+              <p:nvSpPr>
+                <p:cNvPr id="52" name="TextBox 51">
+                  <a:extLst>
+                    <a:ext uri="{FF2B5EF4-FFF2-40B4-BE49-F238E27FC236}">
+                      <a16:creationId xmlns:a16="http://schemas.microsoft.com/office/drawing/2014/main" id="{69C9F0C7-365D-7E45-B4F9-DD433EC323B6}"/>
+                    </a:ext>
+                  </a:extLst>
+                </p:cNvPr>
+                <p:cNvSpPr txBox="1"/>
+                <p:nvPr/>
+              </p:nvSpPr>
+              <p:spPr>
+                <a:xfrm>
+                  <a:off x="7693360" y="5634154"/>
+                  <a:ext cx="1830115" cy="369332"/>
+                </a:xfrm>
+                <a:prstGeom prst="rect">
+                  <a:avLst/>
+                </a:prstGeom>
+                <a:solidFill>
+                  <a:schemeClr val="accent6">
+                    <a:lumMod val="40000"/>
+                    <a:lumOff val="60000"/>
+                  </a:schemeClr>
+                </a:solidFill>
+                <a:ln w="25400">
+                  <a:solidFill>
+                    <a:schemeClr val="tx1"/>
+                  </a:solidFill>
+                </a:ln>
+              </p:spPr>
+              <p:txBody>
+                <a:bodyPr wrap="square" rtlCol="0">
+                  <a:spAutoFit/>
+                </a:bodyPr>
+                <a:lstStyle/>
+                <a:p>
+                  <a:pPr algn="ctr"/>
+                  <a:r>
+                    <a:rPr lang="en-US" dirty="0"/>
+                    <a:t>BATTERYLOW</a:t>
+                  </a:r>
+                </a:p>
+              </p:txBody>
+            </p:sp>
+            <p:cxnSp>
+              <p:nvCxnSpPr>
+                <p:cNvPr id="24" name="Straight Connector 23">
+                  <a:extLst>
+                    <a:ext uri="{FF2B5EF4-FFF2-40B4-BE49-F238E27FC236}">
+                      <a16:creationId xmlns:a16="http://schemas.microsoft.com/office/drawing/2014/main" id="{49B89321-1EA2-FB49-860F-F30578156EF3}"/>
+                    </a:ext>
+                  </a:extLst>
+                </p:cNvPr>
+                <p:cNvCxnSpPr>
+                  <a:cxnSpLocks/>
+                  <a:stCxn id="46" idx="6"/>
+                  <a:endCxn id="53" idx="1"/>
+                </p:cNvCxnSpPr>
+                <p:nvPr/>
+              </p:nvCxnSpPr>
+              <p:spPr>
+                <a:xfrm>
+                  <a:off x="1854042" y="5767055"/>
+                  <a:ext cx="482886" cy="7226"/>
+                </a:xfrm>
+                <a:prstGeom prst="line">
+                  <a:avLst/>
+                </a:prstGeom>
+                <a:ln w="38100">
+                  <a:solidFill>
+                    <a:schemeClr val="tx1"/>
+                  </a:solidFill>
+                </a:ln>
+              </p:spPr>
+              <p:style>
+                <a:lnRef idx="1">
+                  <a:schemeClr val="accent1"/>
+                </a:lnRef>
+                <a:fillRef idx="0">
+                  <a:schemeClr val="accent1"/>
+                </a:fillRef>
+                <a:effectRef idx="0">
+                  <a:schemeClr val="accent1"/>
+                </a:effectRef>
+                <a:fontRef idx="minor">
+                  <a:schemeClr val="tx1"/>
+                </a:fontRef>
+              </p:style>
+            </p:cxnSp>
+            <p:sp>
+              <p:nvSpPr>
+                <p:cNvPr id="55" name="Oval 54">
+                  <a:extLst>
+                    <a:ext uri="{FF2B5EF4-FFF2-40B4-BE49-F238E27FC236}">
+                      <a16:creationId xmlns:a16="http://schemas.microsoft.com/office/drawing/2014/main" id="{0794A85D-FB75-2045-9C75-E82F8BB15ABF}"/>
+                    </a:ext>
+                  </a:extLst>
+                </p:cNvPr>
+                <p:cNvSpPr/>
+                <p:nvPr/>
+              </p:nvSpPr>
+              <p:spPr>
+                <a:xfrm>
+                  <a:off x="2592512" y="5376587"/>
+                  <a:ext cx="198780" cy="198780"/>
+                </a:xfrm>
+                <a:prstGeom prst="ellipse">
+                  <a:avLst/>
+                </a:prstGeom>
+                <a:solidFill>
+                  <a:schemeClr val="tx1"/>
+                </a:solidFill>
+                <a:ln>
+                  <a:solidFill>
+                    <a:schemeClr val="tx1"/>
+                  </a:solidFill>
+                </a:ln>
+              </p:spPr>
+              <p:style>
+                <a:lnRef idx="2">
+                  <a:schemeClr val="accent1">
+                    <a:shade val="50000"/>
+                  </a:schemeClr>
+                </a:lnRef>
+                <a:fillRef idx="1">
+                  <a:schemeClr val="accent1"/>
+                </a:fillRef>
+                <a:effectRef idx="0">
+                  <a:schemeClr val="accent1"/>
+                </a:effectRef>
+                <a:fontRef idx="minor">
+                  <a:schemeClr val="lt1"/>
+                </a:fontRef>
+              </p:style>
+              <p:txBody>
+                <a:bodyPr rtlCol="0" anchor="ctr"/>
+                <a:lstStyle/>
+                <a:p>
+                  <a:pPr algn="ctr"/>
+                  <a:endParaRPr lang="en-US"/>
+                </a:p>
+              </p:txBody>
+            </p:sp>
+            <p:cxnSp>
+              <p:nvCxnSpPr>
+                <p:cNvPr id="32" name="Curved Connector 31">
+                  <a:extLst>
+                    <a:ext uri="{FF2B5EF4-FFF2-40B4-BE49-F238E27FC236}">
+                      <a16:creationId xmlns:a16="http://schemas.microsoft.com/office/drawing/2014/main" id="{7237A0D8-360F-FF4E-9EFA-CA99056DA523}"/>
+                    </a:ext>
+                  </a:extLst>
+                </p:cNvPr>
+                <p:cNvCxnSpPr>
+                  <a:cxnSpLocks/>
+                  <a:stCxn id="55" idx="4"/>
+                  <a:endCxn id="47" idx="1"/>
+                </p:cNvCxnSpPr>
+                <p:nvPr/>
+              </p:nvCxnSpPr>
+              <p:spPr>
+                <a:xfrm rot="16200000" flipH="1">
+                  <a:off x="2687567" y="5579701"/>
+                  <a:ext cx="243453" cy="234783"/>
+                </a:xfrm>
+                <a:prstGeom prst="curvedConnector2">
+                  <a:avLst/>
+                </a:prstGeom>
+                <a:ln w="38100">
+                  <a:solidFill>
+                    <a:schemeClr val="tx1"/>
+                  </a:solidFill>
+                </a:ln>
+              </p:spPr>
+              <p:style>
+                <a:lnRef idx="1">
+                  <a:schemeClr val="accent1"/>
+                </a:lnRef>
+                <a:fillRef idx="0">
+                  <a:schemeClr val="accent1"/>
+                </a:fillRef>
+                <a:effectRef idx="0">
+                  <a:schemeClr val="accent1"/>
+                </a:effectRef>
+                <a:fontRef idx="minor">
+                  <a:schemeClr val="tx1"/>
+                </a:fontRef>
+              </p:style>
+            </p:cxnSp>
+            <p:cxnSp>
+              <p:nvCxnSpPr>
+                <p:cNvPr id="76" name="Curved Connector 75">
+                  <a:extLst>
+                    <a:ext uri="{FF2B5EF4-FFF2-40B4-BE49-F238E27FC236}">
+                      <a16:creationId xmlns:a16="http://schemas.microsoft.com/office/drawing/2014/main" id="{7F36CC38-E8C7-4441-B802-6A8239A0EC64}"/>
+                    </a:ext>
+                  </a:extLst>
+                </p:cNvPr>
+                <p:cNvCxnSpPr>
+                  <a:cxnSpLocks/>
+                  <a:stCxn id="47" idx="0"/>
+                  <a:endCxn id="47" idx="3"/>
+                </p:cNvCxnSpPr>
+                <p:nvPr/>
+              </p:nvCxnSpPr>
+              <p:spPr>
+                <a:xfrm rot="16200000" flipH="1">
+                  <a:off x="4118189" y="5298542"/>
+                  <a:ext cx="184666" cy="855891"/>
+                </a:xfrm>
+                <a:prstGeom prst="curvedConnector4">
+                  <a:avLst>
+                    <a:gd name="adj1" fmla="val -123791"/>
+                    <a:gd name="adj2" fmla="val 126709"/>
+                  </a:avLst>
+                </a:prstGeom>
+                <a:ln w="38100">
+                  <a:solidFill>
+                    <a:schemeClr val="tx1"/>
+                  </a:solidFill>
+                  <a:tailEnd type="triangle"/>
+                </a:ln>
+              </p:spPr>
+              <p:style>
+                <a:lnRef idx="1">
+                  <a:schemeClr val="accent1"/>
+                </a:lnRef>
+                <a:fillRef idx="0">
+                  <a:schemeClr val="accent1"/>
+                </a:fillRef>
+                <a:effectRef idx="0">
+                  <a:schemeClr val="accent1"/>
+                </a:effectRef>
+                <a:fontRef idx="minor">
+                  <a:schemeClr val="tx1"/>
+                </a:fontRef>
+              </p:style>
+            </p:cxnSp>
+            <p:cxnSp>
+              <p:nvCxnSpPr>
+                <p:cNvPr id="85" name="Elbow Connector 84">
+                  <a:extLst>
+                    <a:ext uri="{FF2B5EF4-FFF2-40B4-BE49-F238E27FC236}">
+                      <a16:creationId xmlns:a16="http://schemas.microsoft.com/office/drawing/2014/main" id="{76286AA2-A0C9-4848-8908-E05A0795A380}"/>
+                    </a:ext>
+                  </a:extLst>
+                </p:cNvPr>
+                <p:cNvCxnSpPr>
+                  <a:cxnSpLocks/>
+                  <a:stCxn id="47" idx="2"/>
+                  <a:endCxn id="52" idx="2"/>
+                </p:cNvCxnSpPr>
+                <p:nvPr/>
+              </p:nvCxnSpPr>
+              <p:spPr>
+                <a:xfrm rot="16200000" flipH="1">
+                  <a:off x="6195497" y="3590565"/>
+                  <a:ext cx="12700" cy="4825841"/>
+                </a:xfrm>
+                <a:prstGeom prst="bentConnector3">
+                  <a:avLst>
+                    <a:gd name="adj1" fmla="val 1800000"/>
+                  </a:avLst>
+                </a:prstGeom>
+                <a:ln w="38100">
+                  <a:solidFill>
+                    <a:schemeClr val="tx1"/>
+                  </a:solidFill>
+                  <a:tailEnd type="triangle"/>
+                </a:ln>
+              </p:spPr>
+              <p:style>
+                <a:lnRef idx="1">
+                  <a:schemeClr val="accent1"/>
+                </a:lnRef>
+                <a:fillRef idx="0">
+                  <a:schemeClr val="accent1"/>
+                </a:fillRef>
+                <a:effectRef idx="0">
+                  <a:schemeClr val="accent1"/>
+                </a:effectRef>
+                <a:fontRef idx="minor">
+                  <a:schemeClr val="tx1"/>
+                </a:fontRef>
+              </p:style>
+            </p:cxnSp>
+            <mc:AlternateContent xmlns:mc="http://schemas.openxmlformats.org/markup-compatibility/2006" xmlns:a14="http://schemas.microsoft.com/office/drawing/2010/main">
+              <mc:Choice Requires="a14">
+                <p:sp>
+                  <p:nvSpPr>
+                    <p:cNvPr id="93" name="TextBox 92">
+                      <a:extLst>
+                        <a:ext uri="{FF2B5EF4-FFF2-40B4-BE49-F238E27FC236}">
+                          <a16:creationId xmlns:a16="http://schemas.microsoft.com/office/drawing/2014/main" id="{6A0B3013-AC86-5545-9F9D-D8A6ADDD5B6C}"/>
+                        </a:ext>
+                      </a:extLst>
+                    </p:cNvPr>
+                    <p:cNvSpPr txBox="1"/>
+                    <p:nvPr/>
+                  </p:nvSpPr>
+                  <p:spPr>
+                    <a:xfrm>
+                      <a:off x="4795975" y="5232640"/>
+                      <a:ext cx="3288271" cy="646331"/>
+                    </a:xfrm>
+                    <a:prstGeom prst="rect">
+                      <a:avLst/>
+                    </a:prstGeom>
+                    <a:noFill/>
+                  </p:spPr>
+                  <p:txBody>
+                    <a:bodyPr wrap="none" rtlCol="0">
+                      <a:spAutoFit/>
+                    </a:bodyPr>
+                    <a:lstStyle/>
+                    <a:p>
+                      <a:pPr algn="ctr"/>
+                      <a:r>
+                        <a:rPr lang="en-US" dirty="0"/>
+                        <a:t>decreaseCharge &amp; </a:t>
+                      </a:r>
+                      <a14:m>
+                        <m:oMath xmlns:m="http://schemas.openxmlformats.org/officeDocument/2006/math">
+                          <m:r>
+                            <a:rPr lang="en-US" b="0" i="1" dirty="0" smtClean="0">
+                              <a:latin typeface="Cambria Math" panose="02040503050406030204" pitchFamily="18" charset="0"/>
+                              <a:ea typeface="Cambria Math" panose="02040503050406030204" pitchFamily="18" charset="0"/>
+                            </a:rPr>
+                            <m:t>𝑐h𝑎𝑟𝑔𝑒</m:t>
+                          </m:r>
+                          <m:r>
+                            <a:rPr lang="en-US" i="1" dirty="0" smtClean="0">
+                              <a:latin typeface="Cambria Math" panose="02040503050406030204" pitchFamily="18" charset="0"/>
+                              <a:ea typeface="Cambria Math" panose="02040503050406030204" pitchFamily="18" charset="0"/>
+                            </a:rPr>
+                            <m:t>≥</m:t>
+                          </m:r>
+                          <m:r>
+                            <a:rPr lang="en-US" b="0" i="1" dirty="0" smtClean="0">
+                              <a:latin typeface="Cambria Math" panose="02040503050406030204" pitchFamily="18" charset="0"/>
+                              <a:ea typeface="Cambria Math" panose="02040503050406030204" pitchFamily="18" charset="0"/>
+                            </a:rPr>
+                            <m:t>10</m:t>
+                          </m:r>
+                          <m:r>
+                            <a:rPr lang="en-US" i="1" dirty="0" smtClean="0">
+                              <a:latin typeface="Cambria Math" panose="02040503050406030204" pitchFamily="18" charset="0"/>
+                            </a:rPr>
+                            <m:t> </m:t>
+                          </m:r>
+                        </m:oMath>
+                      </a14:m>
+                      <a:endParaRPr lang="en-US" dirty="0"/>
+                    </a:p>
+                    <a:p>
+                      <a:pPr algn="ctr"/>
+                      <a:r>
+                        <a:rPr lang="en-US" dirty="0"/>
+                        <a:t>/ </a:t>
+                      </a:r>
+                      <a14:m>
+                        <m:oMath xmlns:m="http://schemas.openxmlformats.org/officeDocument/2006/math">
+                          <m:r>
+                            <a:rPr lang="en-US" b="0" i="1" smtClean="0">
+                              <a:latin typeface="Cambria Math" panose="02040503050406030204" pitchFamily="18" charset="0"/>
+                              <a:ea typeface="Cambria Math" panose="02040503050406030204" pitchFamily="18" charset="0"/>
+                            </a:rPr>
+                            <m:t>𝑐h𝑎𝑟𝑔𝑒</m:t>
+                          </m:r>
+                          <m:r>
+                            <a:rPr lang="en-US" b="0" i="1" smtClean="0">
+                              <a:latin typeface="Cambria Math" panose="02040503050406030204" pitchFamily="18" charset="0"/>
+                              <a:ea typeface="Cambria Math" panose="02040503050406030204" pitchFamily="18" charset="0"/>
+                            </a:rPr>
+                            <m:t>=</m:t>
+                          </m:r>
+                          <m:r>
+                            <a:rPr lang="en-US" b="0" i="1" smtClean="0">
+                              <a:latin typeface="Cambria Math" panose="02040503050406030204" pitchFamily="18" charset="0"/>
+                              <a:ea typeface="Cambria Math" panose="02040503050406030204" pitchFamily="18" charset="0"/>
+                            </a:rPr>
+                            <m:t>𝑐h𝑎𝑟𝑔𝑒</m:t>
+                          </m:r>
+                          <m:r>
+                            <a:rPr lang="en-US" b="0" i="1" smtClean="0">
+                              <a:latin typeface="Cambria Math" panose="02040503050406030204" pitchFamily="18" charset="0"/>
+                              <a:ea typeface="Cambria Math" panose="02040503050406030204" pitchFamily="18" charset="0"/>
+                            </a:rPr>
+                            <m:t>− 10</m:t>
+                          </m:r>
+                        </m:oMath>
+                      </a14:m>
+                      <a:r>
+                        <a:rPr lang="en-US" dirty="0"/>
+                        <a:t> </a:t>
+                      </a:r>
+                    </a:p>
+                  </p:txBody>
+                </p:sp>
+              </mc:Choice>
+              <mc:Fallback xmlns="">
+                <p:sp>
+                  <p:nvSpPr>
+                    <p:cNvPr id="93" name="TextBox 92">
+                      <a:extLst>
+                        <a:ext uri="{FF2B5EF4-FFF2-40B4-BE49-F238E27FC236}">
+                          <a16:creationId xmlns:a16="http://schemas.microsoft.com/office/drawing/2014/main" id="{6A0B3013-AC86-5545-9F9D-D8A6ADDD5B6C}"/>
+                        </a:ext>
+                      </a:extLst>
+                    </p:cNvPr>
+                    <p:cNvSpPr txBox="1">
+                      <a:spLocks noRot="1" noChangeAspect="1" noMove="1" noResize="1" noEditPoints="1" noAdjustHandles="1" noChangeArrowheads="1" noChangeShapeType="1" noTextEdit="1"/>
+                    </p:cNvSpPr>
+                    <p:nvPr/>
+                  </p:nvSpPr>
+                  <p:spPr>
+                    <a:xfrm>
+                      <a:off x="4795975" y="5232640"/>
+                      <a:ext cx="3288271" cy="646331"/>
+                    </a:xfrm>
+                    <a:prstGeom prst="rect">
+                      <a:avLst/>
+                    </a:prstGeom>
+                    <a:blipFill>
+                      <a:blip r:embed="rId8"/>
+                      <a:stretch>
+                        <a:fillRect l="-1154" t="-3846" b="-13462"/>
+                      </a:stretch>
+                    </a:blipFill>
+                  </p:spPr>
+                  <p:txBody>
+                    <a:bodyPr/>
+                    <a:lstStyle/>
+                    <a:p>
+                      <a:r>
+                        <a:rPr lang="en-US">
+                          <a:noFill/>
+                        </a:rPr>
+                        <a:t> </a:t>
+                      </a:r>
+                    </a:p>
+                  </p:txBody>
+                </p:sp>
+              </mc:Fallback>
+            </mc:AlternateContent>
+            <mc:AlternateContent xmlns:mc="http://schemas.openxmlformats.org/markup-compatibility/2006" xmlns:a14="http://schemas.microsoft.com/office/drawing/2010/main">
+              <mc:Choice Requires="a14">
+                <p:sp>
+                  <p:nvSpPr>
+                    <p:cNvPr id="101" name="TextBox 100">
+                      <a:extLst>
+                        <a:ext uri="{FF2B5EF4-FFF2-40B4-BE49-F238E27FC236}">
+                          <a16:creationId xmlns:a16="http://schemas.microsoft.com/office/drawing/2014/main" id="{BFD7E865-43D9-9B44-9022-76BC711F9499}"/>
+                        </a:ext>
+                      </a:extLst>
+                    </p:cNvPr>
+                    <p:cNvSpPr txBox="1"/>
+                    <p:nvPr/>
+                  </p:nvSpPr>
+                  <p:spPr>
+                    <a:xfrm>
+                      <a:off x="4973926" y="6179314"/>
+                      <a:ext cx="2467508" cy="369332"/>
+                    </a:xfrm>
+                    <a:prstGeom prst="rect">
+                      <a:avLst/>
+                    </a:prstGeom>
+                    <a:noFill/>
+                  </p:spPr>
+                  <p:txBody>
+                    <a:bodyPr wrap="square" rtlCol="0">
+                      <a:spAutoFit/>
+                    </a:bodyPr>
+                    <a:lstStyle/>
+                    <a:p>
+                      <a:pPr algn="ctr"/>
+                      <a14:m>
+                        <m:oMath xmlns:m="http://schemas.openxmlformats.org/officeDocument/2006/math">
+                          <m:r>
+                            <a:rPr lang="en-US" b="0" i="1" smtClean="0">
+                              <a:latin typeface="Cambria Math" panose="02040503050406030204" pitchFamily="18" charset="0"/>
+                              <a:ea typeface="Cambria Math" panose="02040503050406030204" pitchFamily="18" charset="0"/>
+                            </a:rPr>
+                            <m:t>𝑐h𝑎𝑟𝑔𝑒</m:t>
+                          </m:r>
+                          <m:r>
+                            <a:rPr lang="en-US" i="1" smtClean="0">
+                              <a:latin typeface="Cambria Math" panose="02040503050406030204" pitchFamily="18" charset="0"/>
+                              <a:ea typeface="Cambria Math" panose="02040503050406030204" pitchFamily="18" charset="0"/>
+                            </a:rPr>
+                            <m:t>≤</m:t>
+                          </m:r>
+                          <m:r>
+                            <a:rPr lang="en-US" b="0" i="1" smtClean="0">
+                              <a:latin typeface="Cambria Math" panose="02040503050406030204" pitchFamily="18" charset="0"/>
+                              <a:ea typeface="Cambria Math" panose="02040503050406030204" pitchFamily="18" charset="0"/>
+                            </a:rPr>
+                            <m:t>20</m:t>
+                          </m:r>
+                        </m:oMath>
+                      </a14:m>
+                      <a:r>
+                        <a:rPr lang="en-US" dirty="0"/>
+                        <a:t> / </a:t>
+                      </a:r>
+                      <a:r>
+                        <a:rPr lang="en-US" dirty="0" err="1"/>
+                        <a:t>toLand</a:t>
+                      </a:r>
+                      <a:endParaRPr lang="en-US" dirty="0"/>
+                    </a:p>
+                  </p:txBody>
+                </p:sp>
+              </mc:Choice>
+              <mc:Fallback xmlns="">
+                <p:sp>
+                  <p:nvSpPr>
+                    <p:cNvPr id="101" name="TextBox 100">
+                      <a:extLst>
+                        <a:ext uri="{FF2B5EF4-FFF2-40B4-BE49-F238E27FC236}">
+                          <a16:creationId xmlns:a16="http://schemas.microsoft.com/office/drawing/2014/main" id="{BFD7E865-43D9-9B44-9022-76BC711F9499}"/>
+                        </a:ext>
+                      </a:extLst>
+                    </p:cNvPr>
+                    <p:cNvSpPr txBox="1">
+                      <a:spLocks noRot="1" noChangeAspect="1" noMove="1" noResize="1" noEditPoints="1" noAdjustHandles="1" noChangeArrowheads="1" noChangeShapeType="1" noTextEdit="1"/>
+                    </p:cNvSpPr>
+                    <p:nvPr/>
+                  </p:nvSpPr>
+                  <p:spPr>
+                    <a:xfrm>
+                      <a:off x="4973926" y="6179314"/>
+                      <a:ext cx="2467508" cy="369332"/>
+                    </a:xfrm>
+                    <a:prstGeom prst="rect">
+                      <a:avLst/>
+                    </a:prstGeom>
+                    <a:blipFill>
+                      <a:blip r:embed="rId9"/>
+                      <a:stretch>
+                        <a:fillRect t="-6667" b="-23333"/>
+                      </a:stretch>
+                    </a:blipFill>
+                  </p:spPr>
+                  <p:txBody>
+                    <a:bodyPr/>
+                    <a:lstStyle/>
+                    <a:p>
+                      <a:r>
+                        <a:rPr lang="en-US">
+                          <a:noFill/>
+                        </a:rPr>
+                        <a:t> </a:t>
+                      </a:r>
+                    </a:p>
+                  </p:txBody>
+                </p:sp>
+              </mc:Fallback>
+            </mc:AlternateContent>
+          </p:grpSp>
+          <p:cxnSp>
+            <p:nvCxnSpPr>
+              <p:cNvPr id="33" name="Curved Connector 32">
+                <a:extLst>
+                  <a:ext uri="{FF2B5EF4-FFF2-40B4-BE49-F238E27FC236}">
+                    <a16:creationId xmlns:a16="http://schemas.microsoft.com/office/drawing/2014/main" id="{03BD10EE-A672-2047-BCC2-CA8BA5618624}"/>
+                  </a:ext>
+                </a:extLst>
+              </p:cNvPr>
+              <p:cNvCxnSpPr>
+                <a:cxnSpLocks/>
+                <a:stCxn id="40" idx="1"/>
+                <a:endCxn id="49" idx="3"/>
+              </p:cNvCxnSpPr>
+              <p:nvPr/>
+            </p:nvCxnSpPr>
+            <p:spPr>
+              <a:xfrm rot="10800000">
+                <a:off x="798841" y="2855656"/>
+                <a:ext cx="169669" cy="783031"/>
+              </a:xfrm>
+              <a:prstGeom prst="curvedConnector2">
+                <a:avLst/>
+              </a:prstGeom>
+              <a:ln w="38100">
+                <a:solidFill>
+                  <a:schemeClr val="tx1"/>
+                </a:solidFill>
+                <a:tailEnd type="none"/>
+              </a:ln>
+            </p:spPr>
+            <p:style>
+              <a:lnRef idx="1">
+                <a:schemeClr val="accent1"/>
+              </a:lnRef>
+              <a:fillRef idx="0">
+                <a:schemeClr val="accent1"/>
+              </a:fillRef>
+              <a:effectRef idx="0">
+                <a:schemeClr val="accent1"/>
+              </a:effectRef>
+              <a:fontRef idx="minor">
+                <a:schemeClr val="tx1"/>
+              </a:fontRef>
+            </p:style>
+          </p:cxnSp>
+          <p:sp>
+            <p:nvSpPr>
+              <p:cNvPr id="87" name="Oval 86">
+                <a:extLst>
+                  <a:ext uri="{FF2B5EF4-FFF2-40B4-BE49-F238E27FC236}">
+                    <a16:creationId xmlns:a16="http://schemas.microsoft.com/office/drawing/2014/main" id="{962420E2-6676-6E4A-AE3F-29C0A16D6DDC}"/>
+                  </a:ext>
+                </a:extLst>
+              </p:cNvPr>
+              <p:cNvSpPr/>
+              <p:nvPr/>
+            </p:nvSpPr>
+            <p:spPr>
+              <a:xfrm>
+                <a:off x="1213455" y="3023351"/>
+                <a:ext cx="198780" cy="198780"/>
+              </a:xfrm>
+              <a:prstGeom prst="ellipse">
+                <a:avLst/>
+              </a:prstGeom>
+              <a:solidFill>
+                <a:schemeClr val="tx1"/>
+              </a:solidFill>
+              <a:ln>
+                <a:solidFill>
+                  <a:schemeClr val="tx1"/>
+                </a:solidFill>
+              </a:ln>
+            </p:spPr>
+            <p:style>
+              <a:lnRef idx="2">
+                <a:schemeClr val="accent1">
+                  <a:shade val="50000"/>
+                </a:schemeClr>
+              </a:lnRef>
+              <a:fillRef idx="1">
+                <a:schemeClr val="accent1"/>
+              </a:fillRef>
+              <a:effectRef idx="0">
+                <a:schemeClr val="accent1"/>
+              </a:effectRef>
+              <a:fontRef idx="minor">
+                <a:schemeClr val="lt1"/>
+              </a:fontRef>
+            </p:style>
+            <p:txBody>
+              <a:bodyPr rtlCol="0" anchor="ctr"/>
+              <a:lstStyle/>
+              <a:p>
+                <a:pPr algn="ctr"/>
+                <a:endParaRPr lang="en-US"/>
+              </a:p>
+            </p:txBody>
+          </p:sp>
+          <p:sp>
+            <p:nvSpPr>
+              <p:cNvPr id="89" name="TextBox 88">
+                <a:extLst>
+                  <a:ext uri="{FF2B5EF4-FFF2-40B4-BE49-F238E27FC236}">
+                    <a16:creationId xmlns:a16="http://schemas.microsoft.com/office/drawing/2014/main" id="{75300A0E-9EF4-874A-A7F4-2CBD76491503}"/>
+                  </a:ext>
+                </a:extLst>
+              </p:cNvPr>
+              <p:cNvSpPr txBox="1"/>
+              <p:nvPr/>
+            </p:nvSpPr>
+            <p:spPr>
+              <a:xfrm>
+                <a:off x="1397657" y="3328554"/>
+                <a:ext cx="1043674" cy="369332"/>
+              </a:xfrm>
+              <a:prstGeom prst="rect">
+                <a:avLst/>
+              </a:prstGeom>
+              <a:solidFill>
+                <a:srgbClr val="D7ACEC"/>
+              </a:solidFill>
+              <a:ln w="25400">
+                <a:solidFill>
+                  <a:schemeClr val="tx1"/>
+                </a:solidFill>
+              </a:ln>
+            </p:spPr>
+            <p:txBody>
+              <a:bodyPr wrap="square" rtlCol="0">
+                <a:spAutoFit/>
+              </a:bodyPr>
+              <a:lstStyle/>
+              <a:p>
+                <a:pPr algn="ctr"/>
+                <a:r>
+                  <a:rPr lang="en-US" dirty="0"/>
+                  <a:t>CLIMB2</a:t>
+                </a:r>
+              </a:p>
+            </p:txBody>
+          </p:sp>
+          <p:sp>
+            <p:nvSpPr>
+              <p:cNvPr id="90" name="TextBox 89">
+                <a:extLst>
+                  <a:ext uri="{FF2B5EF4-FFF2-40B4-BE49-F238E27FC236}">
+                    <a16:creationId xmlns:a16="http://schemas.microsoft.com/office/drawing/2014/main" id="{5D3874B7-B267-AE4A-966C-00EC6674D96F}"/>
+                  </a:ext>
+                </a:extLst>
+              </p:cNvPr>
+              <p:cNvSpPr txBox="1"/>
+              <p:nvPr/>
+            </p:nvSpPr>
+            <p:spPr>
+              <a:xfrm>
+                <a:off x="2702593" y="3751577"/>
+                <a:ext cx="1043674" cy="369332"/>
+              </a:xfrm>
+              <a:prstGeom prst="rect">
+                <a:avLst/>
+              </a:prstGeom>
+              <a:solidFill>
+                <a:srgbClr val="D7ACEC"/>
+              </a:solidFill>
+              <a:ln w="25400">
+                <a:solidFill>
+                  <a:schemeClr val="tx1"/>
+                </a:solidFill>
+              </a:ln>
+            </p:spPr>
+            <p:txBody>
+              <a:bodyPr wrap="square" rtlCol="0">
+                <a:spAutoFit/>
+              </a:bodyPr>
+              <a:lstStyle/>
+              <a:p>
+                <a:pPr algn="ctr"/>
+                <a:r>
+                  <a:rPr lang="en-US" dirty="0"/>
+                  <a:t>ABORT</a:t>
+                </a:r>
+              </a:p>
+            </p:txBody>
+          </p:sp>
+          <p:cxnSp>
+            <p:nvCxnSpPr>
+              <p:cNvPr id="95" name="Curved Connector 94">
+                <a:extLst>
+                  <a:ext uri="{FF2B5EF4-FFF2-40B4-BE49-F238E27FC236}">
+                    <a16:creationId xmlns:a16="http://schemas.microsoft.com/office/drawing/2014/main" id="{50395900-D94A-1545-95BE-0B8C6363883F}"/>
+                  </a:ext>
+                </a:extLst>
+              </p:cNvPr>
+              <p:cNvCxnSpPr>
+                <a:cxnSpLocks/>
+                <a:stCxn id="87" idx="3"/>
+                <a:endCxn id="89" idx="1"/>
+              </p:cNvCxnSpPr>
+              <p:nvPr/>
+            </p:nvCxnSpPr>
+            <p:spPr>
+              <a:xfrm rot="16200000" flipH="1">
+                <a:off x="1160011" y="3275574"/>
+                <a:ext cx="320200" cy="155091"/>
+              </a:xfrm>
+              <a:prstGeom prst="curvedConnector2">
+                <a:avLst/>
+              </a:prstGeom>
+              <a:ln w="38100">
+                <a:solidFill>
+                  <a:schemeClr val="tx1"/>
+                </a:solidFill>
+              </a:ln>
+            </p:spPr>
+            <p:style>
+              <a:lnRef idx="1">
+                <a:schemeClr val="accent1"/>
+              </a:lnRef>
+              <a:fillRef idx="0">
+                <a:schemeClr val="accent1"/>
+              </a:fillRef>
+              <a:effectRef idx="0">
+                <a:schemeClr val="accent1"/>
+              </a:effectRef>
+              <a:fontRef idx="minor">
+                <a:schemeClr val="tx1"/>
+              </a:fontRef>
+            </p:style>
+          </p:cxnSp>
+          <p:cxnSp>
+            <p:nvCxnSpPr>
+              <p:cNvPr id="108" name="Elbow Connector 107">
+                <a:extLst>
+                  <a:ext uri="{FF2B5EF4-FFF2-40B4-BE49-F238E27FC236}">
+                    <a16:creationId xmlns:a16="http://schemas.microsoft.com/office/drawing/2014/main" id="{A0110865-C2C8-544E-8098-5310493AE278}"/>
+                  </a:ext>
+                </a:extLst>
+              </p:cNvPr>
+              <p:cNvCxnSpPr>
+                <a:stCxn id="89" idx="2"/>
+                <a:endCxn id="90" idx="1"/>
+              </p:cNvCxnSpPr>
+              <p:nvPr/>
+            </p:nvCxnSpPr>
+            <p:spPr>
+              <a:xfrm rot="16200000" flipH="1">
+                <a:off x="2191865" y="3425514"/>
+                <a:ext cx="238357" cy="783099"/>
+              </a:xfrm>
+              <a:prstGeom prst="bentConnector2">
+                <a:avLst/>
+              </a:prstGeom>
+              <a:ln w="38100">
+                <a:solidFill>
+                  <a:schemeClr val="tx1"/>
+                </a:solidFill>
+                <a:tailEnd type="triangle"/>
+              </a:ln>
+            </p:spPr>
+            <p:style>
+              <a:lnRef idx="1">
+                <a:schemeClr val="accent1"/>
+              </a:lnRef>
+              <a:fillRef idx="0">
+                <a:schemeClr val="accent1"/>
+              </a:fillRef>
+              <a:effectRef idx="0">
+                <a:schemeClr val="accent1"/>
+              </a:effectRef>
+              <a:fontRef idx="minor">
+                <a:schemeClr val="tx1"/>
+              </a:fontRef>
+            </p:style>
+          </p:cxnSp>
+          <p:sp>
+            <p:nvSpPr>
+              <p:cNvPr id="113" name="TextBox 112">
+                <a:extLst>
+                  <a:ext uri="{FF2B5EF4-FFF2-40B4-BE49-F238E27FC236}">
+                    <a16:creationId xmlns:a16="http://schemas.microsoft.com/office/drawing/2014/main" id="{F6C8EA24-F01A-B343-B359-A137DFC83200}"/>
+                  </a:ext>
+                </a:extLst>
+              </p:cNvPr>
+              <p:cNvSpPr txBox="1"/>
+              <p:nvPr/>
+            </p:nvSpPr>
+            <p:spPr>
+              <a:xfrm>
+                <a:off x="1041309" y="3946476"/>
+                <a:ext cx="1623201" cy="369332"/>
+              </a:xfrm>
+              <a:prstGeom prst="rect">
+                <a:avLst/>
+              </a:prstGeom>
+              <a:noFill/>
+            </p:spPr>
+            <p:txBody>
+              <a:bodyPr wrap="none" rtlCol="0">
+                <a:spAutoFit/>
+              </a:bodyPr>
+              <a:lstStyle/>
+              <a:p>
+                <a:pPr algn="ctr"/>
+                <a:r>
+                  <a:rPr lang="en-US" dirty="0"/>
+                  <a:t>cancel / </a:t>
+                </a:r>
+                <a:r>
+                  <a:rPr lang="en-US" dirty="0" err="1"/>
+                  <a:t>toLand</a:t>
+                </a:r>
+                <a:endParaRPr lang="en-US" dirty="0"/>
+              </a:p>
+            </p:txBody>
+          </p:sp>
+          <p:cxnSp>
+            <p:nvCxnSpPr>
+              <p:cNvPr id="35" name="Elbow Connector 34">
+                <a:extLst>
+                  <a:ext uri="{FF2B5EF4-FFF2-40B4-BE49-F238E27FC236}">
+                    <a16:creationId xmlns:a16="http://schemas.microsoft.com/office/drawing/2014/main" id="{AB385173-398B-B340-8FAB-F4B6A5C6D421}"/>
+                  </a:ext>
+                </a:extLst>
+              </p:cNvPr>
+              <p:cNvCxnSpPr>
+                <a:cxnSpLocks/>
+                <a:stCxn id="40" idx="0"/>
+                <a:endCxn id="42" idx="3"/>
+              </p:cNvCxnSpPr>
+              <p:nvPr/>
+            </p:nvCxnSpPr>
+            <p:spPr>
+              <a:xfrm rot="16200000" flipH="1">
+                <a:off x="3439490" y="1883541"/>
+                <a:ext cx="901621" cy="2888416"/>
+              </a:xfrm>
+              <a:prstGeom prst="bentConnector4">
+                <a:avLst>
+                  <a:gd name="adj1" fmla="val -36623"/>
+                  <a:gd name="adj2" fmla="val 110650"/>
+                </a:avLst>
+              </a:prstGeom>
+              <a:ln w="38100">
+                <a:solidFill>
+                  <a:schemeClr val="tx1"/>
+                </a:solidFill>
+                <a:tailEnd type="triangle"/>
+              </a:ln>
+            </p:spPr>
+            <p:style>
+              <a:lnRef idx="1">
+                <a:schemeClr val="accent1"/>
+              </a:lnRef>
+              <a:fillRef idx="0">
+                <a:schemeClr val="accent1"/>
+              </a:fillRef>
+              <a:effectRef idx="0">
+                <a:schemeClr val="accent1"/>
+              </a:effectRef>
+              <a:fontRef idx="minor">
+                <a:schemeClr val="tx1"/>
+              </a:fontRef>
+            </p:style>
+          </p:cxnSp>
+          <p:cxnSp>
+            <p:nvCxnSpPr>
+              <p:cNvPr id="77" name="Elbow Connector 76">
+                <a:extLst>
+                  <a:ext uri="{FF2B5EF4-FFF2-40B4-BE49-F238E27FC236}">
+                    <a16:creationId xmlns:a16="http://schemas.microsoft.com/office/drawing/2014/main" id="{25CFE2DB-FA86-EE45-8A11-176CB24081B1}"/>
+                  </a:ext>
+                </a:extLst>
+              </p:cNvPr>
+              <p:cNvCxnSpPr>
+                <a:cxnSpLocks/>
+                <a:endCxn id="7" idx="2"/>
+              </p:cNvCxnSpPr>
+              <p:nvPr/>
+            </p:nvCxnSpPr>
+            <p:spPr>
+              <a:xfrm flipV="1">
+                <a:off x="5852503" y="2616551"/>
+                <a:ext cx="2866745" cy="1699258"/>
+              </a:xfrm>
+              <a:prstGeom prst="bentConnector2">
+                <a:avLst/>
+              </a:prstGeom>
+              <a:ln w="38100">
+                <a:solidFill>
+                  <a:schemeClr val="tx1"/>
+                </a:solidFill>
+                <a:tailEnd type="triangle"/>
+              </a:ln>
+            </p:spPr>
+            <p:style>
+              <a:lnRef idx="1">
+                <a:schemeClr val="accent1"/>
+              </a:lnRef>
+              <a:fillRef idx="0">
+                <a:schemeClr val="accent1"/>
+              </a:fillRef>
+              <a:effectRef idx="0">
+                <a:schemeClr val="accent1"/>
+              </a:effectRef>
+              <a:fontRef idx="minor">
+                <a:schemeClr val="tx1"/>
+              </a:fontRef>
+            </p:style>
+          </p:cxnSp>
+          <p:sp>
+            <p:nvSpPr>
+              <p:cNvPr id="91" name="TextBox 90">
+                <a:extLst>
+                  <a:ext uri="{FF2B5EF4-FFF2-40B4-BE49-F238E27FC236}">
+                    <a16:creationId xmlns:a16="http://schemas.microsoft.com/office/drawing/2014/main" id="{606D4AAE-C80C-3749-9FAF-111B1DBFC240}"/>
+                  </a:ext>
+                </a:extLst>
+              </p:cNvPr>
+              <p:cNvSpPr txBox="1"/>
+              <p:nvPr/>
+            </p:nvSpPr>
+            <p:spPr>
+              <a:xfrm>
+                <a:off x="6843179" y="3990531"/>
+                <a:ext cx="833241" cy="369332"/>
+              </a:xfrm>
+              <a:prstGeom prst="rect">
+                <a:avLst/>
+              </a:prstGeom>
+              <a:noFill/>
+            </p:spPr>
+            <p:txBody>
+              <a:bodyPr wrap="none" rtlCol="0">
+                <a:spAutoFit/>
+              </a:bodyPr>
+              <a:lstStyle/>
+              <a:p>
+                <a:pPr algn="ctr"/>
+                <a:r>
+                  <a:rPr lang="en-US" dirty="0" err="1"/>
+                  <a:t>toLand</a:t>
+                </a:r>
+                <a:endParaRPr lang="en-US" dirty="0"/>
+              </a:p>
+            </p:txBody>
+          </p:sp>
+        </p:grpSp>
+        <p:pic>
+          <p:nvPicPr>
+            <p:cNvPr id="12" name="Picture 11">
+              <a:extLst>
+                <a:ext uri="{FF2B5EF4-FFF2-40B4-BE49-F238E27FC236}">
+                  <a16:creationId xmlns:a16="http://schemas.microsoft.com/office/drawing/2014/main" id="{08C117DB-52C6-834D-898C-C29EA2D4F7C9}"/>
+                </a:ext>
+              </a:extLst>
+            </p:cNvPr>
+            <p:cNvPicPr>
+              <a:picLocks noChangeAspect="1"/>
+            </p:cNvPicPr>
+            <p:nvPr/>
+          </p:nvPicPr>
+          <p:blipFill>
+            <a:blip r:embed="rId10"/>
+            <a:stretch>
+              <a:fillRect/>
+            </a:stretch>
+          </p:blipFill>
+          <p:spPr>
+            <a:xfrm>
+              <a:off x="0" y="0"/>
+              <a:ext cx="12192000" cy="6858000"/>
+            </a:xfrm>
+            <a:prstGeom prst="rect">
+              <a:avLst/>
+            </a:prstGeom>
+          </p:spPr>
+        </p:pic>
+      </p:grpSp>
+    </p:spTree>
+    <p:extLst>
+      <p:ext uri="{BB962C8B-B14F-4D97-AF65-F5344CB8AC3E}">
+        <p14:creationId xmlns:p14="http://schemas.microsoft.com/office/powerpoint/2010/main" val="1693187717"/>
+      </p:ext>
+    </p:extLst>
+  </p:cSld>
+  <p:clrMapOvr>
+    <a:masterClrMapping/>
+  </p:clrMapOvr>
+</p:sld>
+</file>
+
+<file path=ppt/slides/slide5.xml><?xml version="1.0" encoding="utf-8"?>
+<p:sld xmlns:a="http://schemas.openxmlformats.org/drawingml/2006/main" xmlns:r="http://schemas.openxmlformats.org/officeDocument/2006/relationships" xmlns:p="http://schemas.openxmlformats.org/presentationml/2006/main">
+  <p:cSld>
+    <p:spTree>
+      <p:nvGrpSpPr>
+        <p:cNvPr id="1" name=""/>
+        <p:cNvGrpSpPr/>
+        <p:nvPr/>
+      </p:nvGrpSpPr>
+      <p:grpSpPr>
+        <a:xfrm>
+          <a:off x="0" y="0"/>
+          <a:ext cx="0" cy="0"/>
+          <a:chOff x="0" y="0"/>
+          <a:chExt cx="0" cy="0"/>
+        </a:xfrm>
+      </p:grpSpPr>
+      <p:grpSp>
+        <p:nvGrpSpPr>
+          <p:cNvPr id="10" name="Group 9">
+            <a:extLst>
+              <a:ext uri="{FF2B5EF4-FFF2-40B4-BE49-F238E27FC236}">
+                <a16:creationId xmlns:a16="http://schemas.microsoft.com/office/drawing/2014/main" id="{B991F248-525F-EF44-8467-5427F0AF1652}"/>
               </a:ext>
             </a:extLst>
           </p:cNvPr>
@@ -10240,8 +13833,8 @@
                 </p:nvSpPr>
                 <p:spPr>
                   <a:xfrm>
-                    <a:off x="738058" y="1952491"/>
-                    <a:ext cx="5241679" cy="2620782"/>
+                    <a:off x="738058" y="1873468"/>
+                    <a:ext cx="5114445" cy="2620782"/>
                   </a:xfrm>
                   <a:prstGeom prst="rect">
                     <a:avLst/>
@@ -10381,8 +13974,8 @@
                 </p:nvSpPr>
                 <p:spPr>
                   <a:xfrm>
-                    <a:off x="738058" y="1952491"/>
-                    <a:ext cx="5241679" cy="2620782"/>
+                    <a:off x="738058" y="1873468"/>
+                    <a:ext cx="5114445" cy="2620782"/>
                   </a:xfrm>
                   <a:prstGeom prst="rect">
                     <a:avLst/>
@@ -10862,7 +14455,7 @@
             <p:spPr>
               <a:xfrm>
                 <a:off x="2640111" y="1726236"/>
-                <a:ext cx="718787" cy="226255"/>
+                <a:ext cx="655170" cy="147232"/>
               </a:xfrm>
               <a:prstGeom prst="curvedConnector2">
                 <a:avLst/>
@@ -11136,7 +14729,7 @@
                 </p:nvSpPr>
                 <p:spPr>
                   <a:xfrm>
-                    <a:off x="5939988" y="3233945"/>
+                    <a:off x="5826889" y="3211208"/>
                     <a:ext cx="2197654" cy="369332"/>
                   </a:xfrm>
                   <a:prstGeom prst="rect">
@@ -11209,7 +14802,7 @@
                 </p:nvSpPr>
                 <p:spPr>
                   <a:xfrm>
-                    <a:off x="5939988" y="3233945"/>
+                    <a:off x="5826889" y="3211208"/>
                     <a:ext cx="2197654" cy="369332"/>
                   </a:xfrm>
                   <a:prstGeom prst="rect">
@@ -11218,7 +14811,7 @@
                   <a:blipFill>
                     <a:blip r:embed="rId4"/>
                     <a:stretch>
-                      <a:fillRect l="-2312" t="-6667" b="-23333"/>
+                      <a:fillRect l="-1724" t="-6667" b="-23333"/>
                     </a:stretch>
                   </a:blipFill>
                 </p:spPr>
@@ -11640,8 +15233,8 @@
             </p:nvCxnSpPr>
             <p:spPr>
               <a:xfrm flipV="1">
-                <a:off x="5979737" y="2616551"/>
-                <a:ext cx="573637" cy="646331"/>
+                <a:off x="5852503" y="2616551"/>
+                <a:ext cx="700871" cy="567308"/>
               </a:xfrm>
               <a:prstGeom prst="bentConnector2">
                 <a:avLst/>
@@ -11682,8 +15275,8 @@
             </p:nvSpPr>
             <p:spPr>
               <a:xfrm>
-                <a:off x="1026433" y="2628567"/>
-                <a:ext cx="3623076" cy="1800493"/>
+                <a:off x="968509" y="2876939"/>
+                <a:ext cx="2955167" cy="1523494"/>
               </a:xfrm>
               <a:prstGeom prst="rect">
                 <a:avLst/>
@@ -11722,10 +15315,6 @@
               </a:p>
               <a:p>
                 <a:pPr algn="ctr"/>
-                <a:endParaRPr lang="en-US" dirty="0"/>
-              </a:p>
-              <a:p>
-                <a:pPr algn="ctr"/>
                 <a:endParaRPr lang="en-US" sz="1600" dirty="0"/>
               </a:p>
               <a:p>
@@ -11752,7 +15341,7 @@
             </p:nvSpPr>
             <p:spPr>
               <a:xfrm>
-                <a:off x="4795968" y="3746470"/>
+                <a:off x="4303588" y="3593894"/>
                 <a:ext cx="1030921" cy="369332"/>
               </a:xfrm>
               <a:prstGeom prst="rect">
@@ -11800,7 +15389,7 @@
                 </p:nvSpPr>
                 <p:spPr>
                   <a:xfrm>
-                    <a:off x="2670010" y="3137298"/>
+                    <a:off x="2503680" y="2522753"/>
                     <a:ext cx="3613600" cy="369332"/>
                   </a:xfrm>
                   <a:prstGeom prst="rect">
@@ -11896,7 +15485,7 @@
                 </p:nvSpPr>
                 <p:spPr>
                   <a:xfrm>
-                    <a:off x="2670010" y="3137298"/>
+                    <a:off x="2503680" y="2522753"/>
                     <a:ext cx="3613600" cy="369332"/>
                   </a:xfrm>
                   <a:prstGeom prst="rect">
@@ -12882,7 +16471,7 @@
           <p:spPr>
             <a:xfrm rot="10800000">
               <a:off x="798841" y="2855656"/>
-              <a:ext cx="227593" cy="673159"/>
+              <a:ext cx="169669" cy="783031"/>
             </a:xfrm>
             <a:prstGeom prst="curvedConnector2">
               <a:avLst/>
@@ -12923,7 +16512,7 @@
           </p:nvSpPr>
           <p:spPr>
             <a:xfrm>
-              <a:off x="1255660" y="2773714"/>
+              <a:off x="1213455" y="3023351"/>
               <a:ext cx="198780" cy="198780"/>
             </a:xfrm>
             <a:prstGeom prst="ellipse">
@@ -12977,7 +16566,7 @@
           </p:nvSpPr>
           <p:spPr>
             <a:xfrm>
-              <a:off x="1397657" y="3091485"/>
+              <a:off x="1397657" y="3328554"/>
               <a:ext cx="1043674" cy="369332"/>
             </a:xfrm>
             <a:prstGeom prst="rect">
@@ -13067,8 +16656,8 @@
           </p:nvCxnSpPr>
           <p:spPr>
             <a:xfrm rot="16200000" flipH="1">
-              <a:off x="1174830" y="3053324"/>
-              <a:ext cx="332768" cy="112886"/>
+              <a:off x="1160011" y="3275574"/>
+              <a:ext cx="320200" cy="155091"/>
             </a:xfrm>
             <a:prstGeom prst="curvedConnector2">
               <a:avLst/>
@@ -13111,59 +16700,11 @@
           </p:nvCxnSpPr>
           <p:spPr>
             <a:xfrm rot="16200000" flipH="1">
-              <a:off x="2073330" y="3306980"/>
-              <a:ext cx="475426" cy="783099"/>
+              <a:off x="2191865" y="3425514"/>
+              <a:ext cx="238357" cy="783099"/>
             </a:xfrm>
             <a:prstGeom prst="bentConnector2">
               <a:avLst/>
-            </a:prstGeom>
-            <a:ln w="38100">
-              <a:solidFill>
-                <a:schemeClr val="tx1"/>
-              </a:solidFill>
-              <a:tailEnd type="triangle"/>
-            </a:ln>
-          </p:spPr>
-          <p:style>
-            <a:lnRef idx="1">
-              <a:schemeClr val="accent1"/>
-            </a:lnRef>
-            <a:fillRef idx="0">
-              <a:schemeClr val="accent1"/>
-            </a:fillRef>
-            <a:effectRef idx="0">
-              <a:schemeClr val="accent1"/>
-            </a:effectRef>
-            <a:fontRef idx="minor">
-              <a:schemeClr val="tx1"/>
-            </a:fontRef>
-          </p:style>
-        </p:cxnSp>
-        <p:cxnSp>
-          <p:nvCxnSpPr>
-            <p:cNvPr id="110" name="Elbow Connector 109">
-              <a:extLst>
-                <a:ext uri="{FF2B5EF4-FFF2-40B4-BE49-F238E27FC236}">
-                  <a16:creationId xmlns:a16="http://schemas.microsoft.com/office/drawing/2014/main" id="{0652F0CB-FD5E-6D4A-9D21-C6E62EA24C2D}"/>
-                </a:ext>
-              </a:extLst>
-            </p:cNvPr>
-            <p:cNvCxnSpPr>
-              <a:cxnSpLocks/>
-              <a:stCxn id="90" idx="0"/>
-              <a:endCxn id="42" idx="0"/>
-            </p:cNvCxnSpPr>
-            <p:nvPr/>
-          </p:nvCxnSpPr>
-          <p:spPr>
-            <a:xfrm rot="5400000" flipH="1" flipV="1">
-              <a:off x="4265376" y="2705525"/>
-              <a:ext cx="5107" cy="2086999"/>
-            </a:xfrm>
-            <a:prstGeom prst="bentConnector3">
-              <a:avLst>
-                <a:gd name="adj1" fmla="val 4576209"/>
-              </a:avLst>
             </a:prstGeom>
             <a:ln w="38100">
               <a:solidFill>
@@ -13228,11 +16769,151 @@
             </a:p>
           </p:txBody>
         </p:sp>
+        <p:cxnSp>
+          <p:nvCxnSpPr>
+            <p:cNvPr id="35" name="Elbow Connector 34">
+              <a:extLst>
+                <a:ext uri="{FF2B5EF4-FFF2-40B4-BE49-F238E27FC236}">
+                  <a16:creationId xmlns:a16="http://schemas.microsoft.com/office/drawing/2014/main" id="{AB385173-398B-B340-8FAB-F4B6A5C6D421}"/>
+                </a:ext>
+              </a:extLst>
+            </p:cNvPr>
+            <p:cNvCxnSpPr>
+              <a:cxnSpLocks/>
+              <a:stCxn id="40" idx="0"/>
+              <a:endCxn id="42" idx="3"/>
+            </p:cNvCxnSpPr>
+            <p:nvPr/>
+          </p:nvCxnSpPr>
+          <p:spPr>
+            <a:xfrm rot="16200000" flipH="1">
+              <a:off x="3439490" y="1883541"/>
+              <a:ext cx="901621" cy="2888416"/>
+            </a:xfrm>
+            <a:prstGeom prst="bentConnector4">
+              <a:avLst>
+                <a:gd name="adj1" fmla="val -36623"/>
+                <a:gd name="adj2" fmla="val 110650"/>
+              </a:avLst>
+            </a:prstGeom>
+            <a:ln w="38100">
+              <a:solidFill>
+                <a:schemeClr val="tx1"/>
+              </a:solidFill>
+              <a:tailEnd type="triangle"/>
+            </a:ln>
+          </p:spPr>
+          <p:style>
+            <a:lnRef idx="1">
+              <a:schemeClr val="accent1"/>
+            </a:lnRef>
+            <a:fillRef idx="0">
+              <a:schemeClr val="accent1"/>
+            </a:fillRef>
+            <a:effectRef idx="0">
+              <a:schemeClr val="accent1"/>
+            </a:effectRef>
+            <a:fontRef idx="minor">
+              <a:schemeClr val="tx1"/>
+            </a:fontRef>
+          </p:style>
+        </p:cxnSp>
+        <p:cxnSp>
+          <p:nvCxnSpPr>
+            <p:cNvPr id="77" name="Elbow Connector 76">
+              <a:extLst>
+                <a:ext uri="{FF2B5EF4-FFF2-40B4-BE49-F238E27FC236}">
+                  <a16:creationId xmlns:a16="http://schemas.microsoft.com/office/drawing/2014/main" id="{25CFE2DB-FA86-EE45-8A11-176CB24081B1}"/>
+                </a:ext>
+              </a:extLst>
+            </p:cNvPr>
+            <p:cNvCxnSpPr>
+              <a:cxnSpLocks/>
+              <a:endCxn id="7" idx="2"/>
+            </p:cNvCxnSpPr>
+            <p:nvPr/>
+          </p:nvCxnSpPr>
+          <p:spPr>
+            <a:xfrm flipV="1">
+              <a:off x="5852503" y="2616551"/>
+              <a:ext cx="2866745" cy="1699258"/>
+            </a:xfrm>
+            <a:prstGeom prst="bentConnector2">
+              <a:avLst/>
+            </a:prstGeom>
+            <a:ln w="38100">
+              <a:solidFill>
+                <a:srgbClr val="D7ACEC"/>
+              </a:solidFill>
+              <a:prstDash val="solid"/>
+              <a:tailEnd type="triangle"/>
+            </a:ln>
+          </p:spPr>
+          <p:style>
+            <a:lnRef idx="1">
+              <a:schemeClr val="accent1"/>
+            </a:lnRef>
+            <a:fillRef idx="0">
+              <a:schemeClr val="accent1"/>
+            </a:fillRef>
+            <a:effectRef idx="0">
+              <a:schemeClr val="accent1"/>
+            </a:effectRef>
+            <a:fontRef idx="minor">
+              <a:schemeClr val="tx1"/>
+            </a:fontRef>
+          </p:style>
+        </p:cxnSp>
+        <p:sp>
+          <p:nvSpPr>
+            <p:cNvPr id="91" name="TextBox 90">
+              <a:extLst>
+                <a:ext uri="{FF2B5EF4-FFF2-40B4-BE49-F238E27FC236}">
+                  <a16:creationId xmlns:a16="http://schemas.microsoft.com/office/drawing/2014/main" id="{606D4AAE-C80C-3749-9FAF-111B1DBFC240}"/>
+                </a:ext>
+              </a:extLst>
+            </p:cNvPr>
+            <p:cNvSpPr txBox="1"/>
+            <p:nvPr/>
+          </p:nvSpPr>
+          <p:spPr>
+            <a:xfrm>
+              <a:off x="6843179" y="3990531"/>
+              <a:ext cx="833241" cy="369332"/>
+            </a:xfrm>
+            <a:prstGeom prst="rect">
+              <a:avLst/>
+            </a:prstGeom>
+            <a:noFill/>
+          </p:spPr>
+          <p:txBody>
+            <a:bodyPr wrap="none" rtlCol="0">
+              <a:spAutoFit/>
+            </a:bodyPr>
+            <a:lstStyle/>
+            <a:p>
+              <a:pPr algn="ctr"/>
+              <a:r>
+                <a:rPr lang="en-US" dirty="0" err="1">
+                  <a:solidFill>
+                    <a:srgbClr val="D7ACEC"/>
+                  </a:solidFill>
+                </a:rPr>
+                <a:t>toLand</a:t>
+              </a:r>
+              <a:endParaRPr lang="en-US" dirty="0">
+                <a:solidFill>
+                  <a:srgbClr val="D7ACEC"/>
+                </a:solidFill>
+              </a:endParaRPr>
+            </a:p>
+          </p:txBody>
+        </p:sp>
       </p:grpSp>
     </p:spTree>
     <p:extLst>
       <p:ext uri="{BB962C8B-B14F-4D97-AF65-F5344CB8AC3E}">
-        <p14:creationId xmlns:p14="http://schemas.microsoft.com/office/powerpoint/2010/main" val="1693187717"/>
+        <p14:creationId xmlns:p14="http://schemas.microsoft.com/office/powerpoint/2010/main" val="2399497921"/>
       </p:ext>
     </p:extLst>
   </p:cSld>

</xml_diff>

<commit_message>
Changing the basis figure again and starting to make changes around the document for naming consistency
</commit_message>
<xml_diff>
--- a/manuscripts/ABZ2020/source/figures/Diagrams.pptx
+++ b/manuscripts/ABZ2020/source/figures/Diagrams.pptx
@@ -5,7 +5,7 @@
     <p:sldMasterId id="2147483648" r:id="rId1"/>
   </p:sldMasterIdLst>
   <p:notesMasterIdLst>
-    <p:notesMasterId r:id="rId9"/>
+    <p:notesMasterId r:id="rId10"/>
   </p:notesMasterIdLst>
   <p:sldIdLst>
     <p:sldId id="258" r:id="rId2"/>
@@ -15,6 +15,7 @@
     <p:sldId id="262" r:id="rId6"/>
     <p:sldId id="265" r:id="rId7"/>
     <p:sldId id="266" r:id="rId8"/>
+    <p:sldId id="267" r:id="rId9"/>
   </p:sldIdLst>
   <p:sldSz cx="12192000" cy="6858000"/>
   <p:notesSz cx="6858000" cy="9144000"/>
@@ -203,7 +204,7 @@
           <a:p>
             <a:fld id="{7D74606A-B61D-D347-B748-EF32FB610A1A}" type="datetimeFigureOut">
               <a:rPr lang="en-US" smtClean="0"/>
-              <a:t>1/21/20</a:t>
+              <a:t>1/22/20</a:t>
             </a:fld>
             <a:endParaRPr lang="en-US"/>
           </a:p>
@@ -638,6 +639,90 @@
 </p:notes>
 </file>
 
+<file path=ppt/notesSlides/notesSlide3.xml><?xml version="1.0" encoding="utf-8"?>
+<p:notes xmlns:a="http://schemas.openxmlformats.org/drawingml/2006/main" xmlns:r="http://schemas.openxmlformats.org/officeDocument/2006/relationships" xmlns:p="http://schemas.openxmlformats.org/presentationml/2006/main">
+  <p:cSld>
+    <p:spTree>
+      <p:nvGrpSpPr>
+        <p:cNvPr id="1" name=""/>
+        <p:cNvGrpSpPr/>
+        <p:nvPr/>
+      </p:nvGrpSpPr>
+      <p:grpSpPr>
+        <a:xfrm>
+          <a:off x="0" y="0"/>
+          <a:ext cx="0" cy="0"/>
+          <a:chOff x="0" y="0"/>
+          <a:chExt cx="0" cy="0"/>
+        </a:xfrm>
+      </p:grpSpPr>
+      <p:sp>
+        <p:nvSpPr>
+          <p:cNvPr id="2" name="Slide Image Placeholder 1"/>
+          <p:cNvSpPr>
+            <a:spLocks noGrp="1" noRot="1" noChangeAspect="1"/>
+          </p:cNvSpPr>
+          <p:nvPr>
+            <p:ph type="sldImg"/>
+          </p:nvPr>
+        </p:nvSpPr>
+        <p:spPr/>
+      </p:sp>
+      <p:sp>
+        <p:nvSpPr>
+          <p:cNvPr id="3" name="Notes Placeholder 2"/>
+          <p:cNvSpPr>
+            <a:spLocks noGrp="1"/>
+          </p:cNvSpPr>
+          <p:nvPr>
+            <p:ph type="body" idx="1"/>
+          </p:nvPr>
+        </p:nvSpPr>
+        <p:spPr/>
+        <p:txBody>
+          <a:bodyPr/>
+          <a:lstStyle/>
+          <a:p>
+            <a:endParaRPr lang="en-US"/>
+          </a:p>
+        </p:txBody>
+      </p:sp>
+      <p:sp>
+        <p:nvSpPr>
+          <p:cNvPr id="4" name="Slide Number Placeholder 3"/>
+          <p:cNvSpPr>
+            <a:spLocks noGrp="1"/>
+          </p:cNvSpPr>
+          <p:nvPr>
+            <p:ph type="sldNum" sz="quarter" idx="5"/>
+          </p:nvPr>
+        </p:nvSpPr>
+        <p:spPr/>
+        <p:txBody>
+          <a:bodyPr/>
+          <a:lstStyle/>
+          <a:p>
+            <a:fld id="{EE6C659E-A600-B343-BD06-BDB38718077A}" type="slidenum">
+              <a:rPr lang="en-US" smtClean="0"/>
+              <a:t>8</a:t>
+            </a:fld>
+            <a:endParaRPr lang="en-US"/>
+          </a:p>
+        </p:txBody>
+      </p:sp>
+    </p:spTree>
+    <p:extLst>
+      <p:ext uri="{BB962C8B-B14F-4D97-AF65-F5344CB8AC3E}">
+        <p14:creationId xmlns:p14="http://schemas.microsoft.com/office/powerpoint/2010/main" val="3921210645"/>
+      </p:ext>
+    </p:extLst>
+  </p:cSld>
+  <p:clrMapOvr>
+    <a:masterClrMapping/>
+  </p:clrMapOvr>
+</p:notes>
+</file>
+
 <file path=ppt/slideLayouts/slideLayout1.xml><?xml version="1.0" encoding="utf-8"?>
 <p:sldLayout xmlns:a="http://schemas.openxmlformats.org/drawingml/2006/main" xmlns:r="http://schemas.openxmlformats.org/officeDocument/2006/relationships" xmlns:p="http://schemas.openxmlformats.org/presentationml/2006/main" type="title" preserve="1">
   <p:cSld name="Title Slide">
@@ -785,7 +870,7 @@
           <a:p>
             <a:fld id="{3F17AAA4-97D1-8441-B9B5-03EA66229AFE}" type="datetimeFigureOut">
               <a:rPr lang="en-US" smtClean="0"/>
-              <a:t>1/21/20</a:t>
+              <a:t>1/22/20</a:t>
             </a:fld>
             <a:endParaRPr lang="en-US"/>
           </a:p>
@@ -983,7 +1068,7 @@
           <a:p>
             <a:fld id="{3F17AAA4-97D1-8441-B9B5-03EA66229AFE}" type="datetimeFigureOut">
               <a:rPr lang="en-US" smtClean="0"/>
-              <a:t>1/21/20</a:t>
+              <a:t>1/22/20</a:t>
             </a:fld>
             <a:endParaRPr lang="en-US"/>
           </a:p>
@@ -1191,7 +1276,7 @@
           <a:p>
             <a:fld id="{3F17AAA4-97D1-8441-B9B5-03EA66229AFE}" type="datetimeFigureOut">
               <a:rPr lang="en-US" smtClean="0"/>
-              <a:t>1/21/20</a:t>
+              <a:t>1/22/20</a:t>
             </a:fld>
             <a:endParaRPr lang="en-US"/>
           </a:p>
@@ -1389,7 +1474,7 @@
           <a:p>
             <a:fld id="{3F17AAA4-97D1-8441-B9B5-03EA66229AFE}" type="datetimeFigureOut">
               <a:rPr lang="en-US" smtClean="0"/>
-              <a:t>1/21/20</a:t>
+              <a:t>1/22/20</a:t>
             </a:fld>
             <a:endParaRPr lang="en-US"/>
           </a:p>
@@ -1664,7 +1749,7 @@
           <a:p>
             <a:fld id="{3F17AAA4-97D1-8441-B9B5-03EA66229AFE}" type="datetimeFigureOut">
               <a:rPr lang="en-US" smtClean="0"/>
-              <a:t>1/21/20</a:t>
+              <a:t>1/22/20</a:t>
             </a:fld>
             <a:endParaRPr lang="en-US"/>
           </a:p>
@@ -1929,7 +2014,7 @@
           <a:p>
             <a:fld id="{3F17AAA4-97D1-8441-B9B5-03EA66229AFE}" type="datetimeFigureOut">
               <a:rPr lang="en-US" smtClean="0"/>
-              <a:t>1/21/20</a:t>
+              <a:t>1/22/20</a:t>
             </a:fld>
             <a:endParaRPr lang="en-US"/>
           </a:p>
@@ -2341,7 +2426,7 @@
           <a:p>
             <a:fld id="{3F17AAA4-97D1-8441-B9B5-03EA66229AFE}" type="datetimeFigureOut">
               <a:rPr lang="en-US" smtClean="0"/>
-              <a:t>1/21/20</a:t>
+              <a:t>1/22/20</a:t>
             </a:fld>
             <a:endParaRPr lang="en-US"/>
           </a:p>
@@ -2482,7 +2567,7 @@
           <a:p>
             <a:fld id="{3F17AAA4-97D1-8441-B9B5-03EA66229AFE}" type="datetimeFigureOut">
               <a:rPr lang="en-US" smtClean="0"/>
-              <a:t>1/21/20</a:t>
+              <a:t>1/22/20</a:t>
             </a:fld>
             <a:endParaRPr lang="en-US"/>
           </a:p>
@@ -2595,7 +2680,7 @@
           <a:p>
             <a:fld id="{3F17AAA4-97D1-8441-B9B5-03EA66229AFE}" type="datetimeFigureOut">
               <a:rPr lang="en-US" smtClean="0"/>
-              <a:t>1/21/20</a:t>
+              <a:t>1/22/20</a:t>
             </a:fld>
             <a:endParaRPr lang="en-US"/>
           </a:p>
@@ -2906,7 +2991,7 @@
           <a:p>
             <a:fld id="{3F17AAA4-97D1-8441-B9B5-03EA66229AFE}" type="datetimeFigureOut">
               <a:rPr lang="en-US" smtClean="0"/>
-              <a:t>1/21/20</a:t>
+              <a:t>1/22/20</a:t>
             </a:fld>
             <a:endParaRPr lang="en-US"/>
           </a:p>
@@ -3194,7 +3279,7 @@
           <a:p>
             <a:fld id="{3F17AAA4-97D1-8441-B9B5-03EA66229AFE}" type="datetimeFigureOut">
               <a:rPr lang="en-US" smtClean="0"/>
-              <a:t>1/21/20</a:t>
+              <a:t>1/22/20</a:t>
             </a:fld>
             <a:endParaRPr lang="en-US"/>
           </a:p>
@@ -3435,7 +3520,7 @@
           <a:p>
             <a:fld id="{3F17AAA4-97D1-8441-B9B5-03EA66229AFE}" type="datetimeFigureOut">
               <a:rPr lang="en-US" smtClean="0"/>
-              <a:t>1/21/20</a:t>
+              <a:t>1/22/20</a:t>
             </a:fld>
             <a:endParaRPr lang="en-US"/>
           </a:p>
@@ -17877,7 +17962,8 @@
               <a:solidFill>
                 <a:schemeClr val="tx1"/>
               </a:solidFill>
-              <a:tailEnd type="triangle"/>
+              <a:headEnd type="triangle"/>
+              <a:tailEnd type="none"/>
             </a:ln>
           </p:spPr>
           <p:style>
@@ -18055,8 +18141,8 @@
               <a:solidFill>
                 <a:schemeClr val="tx1"/>
               </a:solidFill>
-              <a:headEnd type="triangle"/>
-              <a:tailEnd type="none"/>
+              <a:headEnd type="none"/>
+              <a:tailEnd type="triangle"/>
             </a:ln>
           </p:spPr>
           <p:style>
@@ -19544,7 +19630,7 @@
         </p:nvGrpSpPr>
         <p:grpSpPr>
           <a:xfrm>
-            <a:off x="-3171148" y="-298074"/>
+            <a:off x="-3181087" y="-298074"/>
             <a:ext cx="16740103" cy="8592316"/>
             <a:chOff x="-3316582" y="-37460"/>
             <a:chExt cx="20522248" cy="9373359"/>
@@ -19990,7 +20076,8 @@
               <a:solidFill>
                 <a:schemeClr val="tx1"/>
               </a:solidFill>
-              <a:tailEnd type="triangle"/>
+              <a:headEnd type="triangle"/>
+              <a:tailEnd type="none"/>
             </a:ln>
           </p:spPr>
           <p:style>
@@ -20168,8 +20255,8 @@
               <a:solidFill>
                 <a:schemeClr val="tx1"/>
               </a:solidFill>
-              <a:headEnd type="triangle"/>
-              <a:tailEnd type="none"/>
+              <a:headEnd type="none"/>
+              <a:tailEnd type="triangle"/>
             </a:ln>
           </p:spPr>
           <p:style>
@@ -20240,8 +20327,8 @@
             </a:p>
           </p:txBody>
         </p:sp>
-        <mc:AlternateContent xmlns:mc="http://schemas.openxmlformats.org/markup-compatibility/2006">
-          <mc:Choice xmlns:a14="http://schemas.microsoft.com/office/drawing/2010/main" Requires="a14">
+        <mc:AlternateContent xmlns:mc="http://schemas.openxmlformats.org/markup-compatibility/2006" xmlns:a14="http://schemas.microsoft.com/office/drawing/2010/main">
+          <mc:Choice Requires="a14">
             <p:sp>
               <p:nvSpPr>
                 <p:cNvPr id="102" name="TextBox 101">
@@ -20397,7 +20484,7 @@
               </p:txBody>
             </p:sp>
           </mc:Choice>
-          <mc:Fallback>
+          <mc:Fallback xmlns="">
             <p:sp>
               <p:nvSpPr>
                 <p:cNvPr id="102" name="TextBox 101">
@@ -20442,8 +20529,8 @@
             </p:sp>
           </mc:Fallback>
         </mc:AlternateContent>
-        <mc:AlternateContent xmlns:mc="http://schemas.openxmlformats.org/markup-compatibility/2006">
-          <mc:Choice xmlns:a14="http://schemas.microsoft.com/office/drawing/2010/main" Requires="a14">
+        <mc:AlternateContent xmlns:mc="http://schemas.openxmlformats.org/markup-compatibility/2006" xmlns:a14="http://schemas.microsoft.com/office/drawing/2010/main">
+          <mc:Choice Requires="a14">
             <p:sp>
               <p:nvSpPr>
                 <p:cNvPr id="103" name="TextBox 102">
@@ -20535,7 +20622,7 @@
               </p:txBody>
             </p:sp>
           </mc:Choice>
-          <mc:Fallback>
+          <mc:Fallback xmlns="">
             <p:sp>
               <p:nvSpPr>
                 <p:cNvPr id="103" name="TextBox 102">
@@ -20580,8 +20667,8 @@
             </p:sp>
           </mc:Fallback>
         </mc:AlternateContent>
-        <mc:AlternateContent xmlns:mc="http://schemas.openxmlformats.org/markup-compatibility/2006">
-          <mc:Choice xmlns:a14="http://schemas.microsoft.com/office/drawing/2010/main" Requires="a14">
+        <mc:AlternateContent xmlns:mc="http://schemas.openxmlformats.org/markup-compatibility/2006" xmlns:a14="http://schemas.microsoft.com/office/drawing/2010/main">
+          <mc:Choice Requires="a14">
             <p:sp>
               <p:nvSpPr>
                 <p:cNvPr id="104" name="TextBox 103">
@@ -20697,7 +20784,7 @@
               </p:txBody>
             </p:sp>
           </mc:Choice>
-          <mc:Fallback>
+          <mc:Fallback xmlns="">
             <p:sp>
               <p:nvSpPr>
                 <p:cNvPr id="104" name="TextBox 103">
@@ -20742,8 +20829,8 @@
             </p:sp>
           </mc:Fallback>
         </mc:AlternateContent>
-        <mc:AlternateContent xmlns:mc="http://schemas.openxmlformats.org/markup-compatibility/2006">
-          <mc:Choice xmlns:a14="http://schemas.microsoft.com/office/drawing/2010/main" Requires="a14">
+        <mc:AlternateContent xmlns:mc="http://schemas.openxmlformats.org/markup-compatibility/2006" xmlns:a14="http://schemas.microsoft.com/office/drawing/2010/main">
+          <mc:Choice Requires="a14">
             <p:sp>
               <p:nvSpPr>
                 <p:cNvPr id="105" name="TextBox 104">
@@ -20858,7 +20945,7 @@
               </p:txBody>
             </p:sp>
           </mc:Choice>
-          <mc:Fallback>
+          <mc:Fallback xmlns="">
             <p:sp>
               <p:nvSpPr>
                 <p:cNvPr id="105" name="TextBox 104">
@@ -20903,8 +20990,8 @@
             </p:sp>
           </mc:Fallback>
         </mc:AlternateContent>
-        <mc:AlternateContent xmlns:mc="http://schemas.openxmlformats.org/markup-compatibility/2006">
-          <mc:Choice xmlns:a14="http://schemas.microsoft.com/office/drawing/2010/main" Requires="a14">
+        <mc:AlternateContent xmlns:mc="http://schemas.openxmlformats.org/markup-compatibility/2006" xmlns:a14="http://schemas.microsoft.com/office/drawing/2010/main">
+          <mc:Choice Requires="a14">
             <p:sp>
               <p:nvSpPr>
                 <p:cNvPr id="110" name="TextBox 109">
@@ -21033,7 +21120,7 @@
               </p:txBody>
             </p:sp>
           </mc:Choice>
-          <mc:Fallback>
+          <mc:Fallback xmlns="">
             <p:sp>
               <p:nvSpPr>
                 <p:cNvPr id="110" name="TextBox 109">
@@ -21078,8 +21165,8 @@
             </p:sp>
           </mc:Fallback>
         </mc:AlternateContent>
-        <mc:AlternateContent xmlns:mc="http://schemas.openxmlformats.org/markup-compatibility/2006">
-          <mc:Choice xmlns:a14="http://schemas.microsoft.com/office/drawing/2010/main" Requires="a14">
+        <mc:AlternateContent xmlns:mc="http://schemas.openxmlformats.org/markup-compatibility/2006" xmlns:a14="http://schemas.microsoft.com/office/drawing/2010/main">
+          <mc:Choice Requires="a14">
             <p:sp>
               <p:nvSpPr>
                 <p:cNvPr id="111" name="TextBox 110">
@@ -21236,7 +21323,7 @@
               </p:txBody>
             </p:sp>
           </mc:Choice>
-          <mc:Fallback>
+          <mc:Fallback xmlns="">
             <p:sp>
               <p:nvSpPr>
                 <p:cNvPr id="111" name="TextBox 110">
@@ -21281,8 +21368,8 @@
             </p:sp>
           </mc:Fallback>
         </mc:AlternateContent>
-        <mc:AlternateContent xmlns:mc="http://schemas.openxmlformats.org/markup-compatibility/2006">
-          <mc:Choice xmlns:a14="http://schemas.microsoft.com/office/drawing/2010/main" Requires="a14">
+        <mc:AlternateContent xmlns:mc="http://schemas.openxmlformats.org/markup-compatibility/2006" xmlns:a14="http://schemas.microsoft.com/office/drawing/2010/main">
+          <mc:Choice Requires="a14">
             <p:sp>
               <p:nvSpPr>
                 <p:cNvPr id="117" name="TextBox 116">
@@ -21413,7 +21500,7 @@
               </p:txBody>
             </p:sp>
           </mc:Choice>
-          <mc:Fallback>
+          <mc:Fallback xmlns="">
             <p:sp>
               <p:nvSpPr>
                 <p:cNvPr id="117" name="TextBox 116">
@@ -21458,8 +21545,8 @@
             </p:sp>
           </mc:Fallback>
         </mc:AlternateContent>
-        <mc:AlternateContent xmlns:mc="http://schemas.openxmlformats.org/markup-compatibility/2006">
-          <mc:Choice xmlns:a14="http://schemas.microsoft.com/office/drawing/2010/main" Requires="a14">
+        <mc:AlternateContent xmlns:mc="http://schemas.openxmlformats.org/markup-compatibility/2006" xmlns:a14="http://schemas.microsoft.com/office/drawing/2010/main">
+          <mc:Choice Requires="a14">
             <p:sp>
               <p:nvSpPr>
                 <p:cNvPr id="118" name="TextBox 117">
@@ -21562,6 +21649,2037 @@
                   <a:r>
                     <a:rPr lang="en-US" dirty="0" err="1"/>
                     <a:t>SCXML_eq</a:t>
+                  </a:r>
+                  <a:r>
+                    <a:rPr lang="en-US" dirty="0"/>
+                    <a:t> := </a:t>
+                  </a:r>
+                  <a14:m>
+                    <m:oMath xmlns:m="http://schemas.openxmlformats.org/officeDocument/2006/math">
+                      <m:r>
+                        <a:rPr lang="en-US" i="1">
+                          <a:latin typeface="Cambria Math" panose="02040503050406030204" pitchFamily="18" charset="0"/>
+                          <a:ea typeface="Cambria Math" panose="02040503050406030204" pitchFamily="18" charset="0"/>
+                        </a:rPr>
+                        <m:t>∅</m:t>
+                      </m:r>
+                    </m:oMath>
+                  </a14:m>
+                  <a:endParaRPr lang="en-US" dirty="0"/>
+                </a:p>
+              </p:txBody>
+            </p:sp>
+          </mc:Choice>
+          <mc:Fallback xmlns="">
+            <p:sp>
+              <p:nvSpPr>
+                <p:cNvPr id="118" name="TextBox 117">
+                  <a:extLst>
+                    <a:ext uri="{FF2B5EF4-FFF2-40B4-BE49-F238E27FC236}">
+                      <a16:creationId xmlns:a16="http://schemas.microsoft.com/office/drawing/2014/main" id="{DAB51B5B-165F-6E4C-9C8E-1DB5E972A147}"/>
+                    </a:ext>
+                  </a:extLst>
+                </p:cNvPr>
+                <p:cNvSpPr txBox="1">
+                  <a:spLocks noRot="1" noChangeAspect="1" noMove="1" noResize="1" noEditPoints="1" noAdjustHandles="1" noChangeArrowheads="1" noChangeShapeType="1" noTextEdit="1"/>
+                </p:cNvSpPr>
+                <p:nvPr/>
+              </p:nvSpPr>
+              <p:spPr>
+                <a:xfrm>
+                  <a:off x="11422944" y="592008"/>
+                  <a:ext cx="4635404" cy="1007112"/>
+                </a:xfrm>
+                <a:prstGeom prst="rect">
+                  <a:avLst/>
+                </a:prstGeom>
+                <a:blipFill>
+                  <a:blip r:embed="rId10"/>
+                  <a:stretch>
+                    <a:fillRect l="-669" t="-2703" b="-8108"/>
+                  </a:stretch>
+                </a:blipFill>
+              </p:spPr>
+              <p:txBody>
+                <a:bodyPr/>
+                <a:lstStyle/>
+                <a:p>
+                  <a:r>
+                    <a:rPr lang="en-US">
+                      <a:noFill/>
+                    </a:rPr>
+                    <a:t> </a:t>
+                  </a:r>
+                </a:p>
+              </p:txBody>
+            </p:sp>
+          </mc:Fallback>
+        </mc:AlternateContent>
+      </p:grpSp>
+    </p:spTree>
+    <p:extLst>
+      <p:ext uri="{BB962C8B-B14F-4D97-AF65-F5344CB8AC3E}">
+        <p14:creationId xmlns:p14="http://schemas.microsoft.com/office/powerpoint/2010/main" val="1159254917"/>
+      </p:ext>
+    </p:extLst>
+  </p:cSld>
+  <p:clrMapOvr>
+    <a:masterClrMapping/>
+  </p:clrMapOvr>
+</p:sld>
+</file>
+
+<file path=ppt/slides/slide8.xml><?xml version="1.0" encoding="utf-8"?>
+<p:sld xmlns:a="http://schemas.openxmlformats.org/drawingml/2006/main" xmlns:r="http://schemas.openxmlformats.org/officeDocument/2006/relationships" xmlns:p="http://schemas.openxmlformats.org/presentationml/2006/main">
+  <p:cSld>
+    <p:spTree>
+      <p:nvGrpSpPr>
+        <p:cNvPr id="1" name=""/>
+        <p:cNvGrpSpPr/>
+        <p:nvPr/>
+      </p:nvGrpSpPr>
+      <p:grpSpPr>
+        <a:xfrm>
+          <a:off x="0" y="0"/>
+          <a:ext cx="0" cy="0"/>
+          <a:chOff x="0" y="0"/>
+          <a:chExt cx="0" cy="0"/>
+        </a:xfrm>
+      </p:grpSpPr>
+      <p:grpSp>
+        <p:nvGrpSpPr>
+          <p:cNvPr id="125" name="Group 124">
+            <a:extLst>
+              <a:ext uri="{FF2B5EF4-FFF2-40B4-BE49-F238E27FC236}">
+                <a16:creationId xmlns:a16="http://schemas.microsoft.com/office/drawing/2014/main" id="{E50C8548-2F9B-9847-AD63-830C6525FC68}"/>
+              </a:ext>
+            </a:extLst>
+          </p:cNvPr>
+          <p:cNvGrpSpPr>
+            <a:grpSpLocks noChangeAspect="1"/>
+          </p:cNvGrpSpPr>
+          <p:nvPr/>
+        </p:nvGrpSpPr>
+        <p:grpSpPr>
+          <a:xfrm>
+            <a:off x="-3181087" y="-298074"/>
+            <a:ext cx="16577182" cy="8592316"/>
+            <a:chOff x="-3316582" y="-37460"/>
+            <a:chExt cx="20322518" cy="9373359"/>
+          </a:xfrm>
+        </p:grpSpPr>
+        <p:sp>
+          <p:nvSpPr>
+            <p:cNvPr id="101" name="TextBox 100">
+              <a:extLst>
+                <a:ext uri="{FF2B5EF4-FFF2-40B4-BE49-F238E27FC236}">
+                  <a16:creationId xmlns:a16="http://schemas.microsoft.com/office/drawing/2014/main" id="{C486168B-9B5B-8E4A-94C2-943BFE7C38F6}"/>
+                </a:ext>
+              </a:extLst>
+            </p:cNvPr>
+            <p:cNvSpPr txBox="1"/>
+            <p:nvPr/>
+          </p:nvSpPr>
+          <p:spPr>
+            <a:xfrm>
+              <a:off x="1103031" y="-37460"/>
+              <a:ext cx="15902905" cy="4633399"/>
+            </a:xfrm>
+            <a:prstGeom prst="rect">
+              <a:avLst/>
+            </a:prstGeom>
+            <a:solidFill>
+              <a:schemeClr val="accent6">
+                <a:lumMod val="20000"/>
+                <a:lumOff val="80000"/>
+              </a:schemeClr>
+            </a:solidFill>
+            <a:ln w="38100">
+              <a:solidFill>
+                <a:schemeClr val="tx1"/>
+              </a:solidFill>
+              <a:prstDash val="dash"/>
+            </a:ln>
+          </p:spPr>
+          <p:txBody>
+            <a:bodyPr wrap="square" rtlCol="0">
+              <a:spAutoFit/>
+            </a:bodyPr>
+            <a:lstStyle/>
+            <a:p>
+              <a:pPr algn="ctr"/>
+              <a:r>
+                <a:rPr lang="en-US" b="1" i="1" dirty="0"/>
+                <a:t>Firing Transitions</a:t>
+              </a:r>
+            </a:p>
+            <a:p>
+              <a:pPr algn="ctr"/>
+              <a:endParaRPr lang="en-US" b="1" i="1" dirty="0"/>
+            </a:p>
+            <a:p>
+              <a:pPr algn="ctr"/>
+              <a:endParaRPr lang="en-US" b="1" i="1" dirty="0"/>
+            </a:p>
+            <a:p>
+              <a:pPr algn="ctr"/>
+              <a:endParaRPr lang="en-US" b="1" i="1" dirty="0"/>
+            </a:p>
+            <a:p>
+              <a:pPr algn="ctr"/>
+              <a:endParaRPr lang="en-US" dirty="0"/>
+            </a:p>
+            <a:p>
+              <a:pPr algn="ctr"/>
+              <a:endParaRPr lang="en-US" dirty="0"/>
+            </a:p>
+            <a:p>
+              <a:pPr algn="ctr"/>
+              <a:endParaRPr lang="en-US" dirty="0"/>
+            </a:p>
+            <a:p>
+              <a:pPr algn="ctr"/>
+              <a:endParaRPr lang="en-US" dirty="0"/>
+            </a:p>
+            <a:p>
+              <a:pPr algn="ctr"/>
+              <a:endParaRPr lang="en-US" dirty="0"/>
+            </a:p>
+            <a:p>
+              <a:pPr algn="ctr"/>
+              <a:endParaRPr lang="en-US" dirty="0"/>
+            </a:p>
+            <a:p>
+              <a:pPr algn="ctr"/>
+              <a:endParaRPr lang="en-US" dirty="0"/>
+            </a:p>
+            <a:p>
+              <a:pPr algn="ctr"/>
+              <a:endParaRPr lang="en-US" dirty="0"/>
+            </a:p>
+            <a:p>
+              <a:pPr algn="ctr"/>
+              <a:endParaRPr lang="en-US" dirty="0"/>
+            </a:p>
+            <a:p>
+              <a:pPr algn="ctr"/>
+              <a:endParaRPr lang="en-US" dirty="0"/>
+            </a:p>
+            <a:p>
+              <a:pPr algn="ctr"/>
+              <a:endParaRPr lang="en-US" dirty="0"/>
+            </a:p>
+          </p:txBody>
+        </p:sp>
+        <p:sp>
+          <p:nvSpPr>
+            <p:cNvPr id="2" name="TextBox 1">
+              <a:extLst>
+                <a:ext uri="{FF2B5EF4-FFF2-40B4-BE49-F238E27FC236}">
+                  <a16:creationId xmlns:a16="http://schemas.microsoft.com/office/drawing/2014/main" id="{971FA984-4077-6D4B-9E4F-F7ACBF2CCD98}"/>
+                </a:ext>
+              </a:extLst>
+            </p:cNvPr>
+            <p:cNvSpPr txBox="1"/>
+            <p:nvPr/>
+          </p:nvSpPr>
+          <p:spPr>
+            <a:xfrm>
+              <a:off x="1450270" y="1146163"/>
+              <a:ext cx="2068534" cy="2819917"/>
+            </a:xfrm>
+            <a:prstGeom prst="rect">
+              <a:avLst/>
+            </a:prstGeom>
+            <a:solidFill>
+              <a:srgbClr val="92D050"/>
+            </a:solidFill>
+            <a:ln w="25400">
+              <a:solidFill>
+                <a:schemeClr val="tx1"/>
+              </a:solidFill>
+            </a:ln>
+          </p:spPr>
+          <p:txBody>
+            <a:bodyPr wrap="square" rtlCol="0">
+              <a:spAutoFit/>
+            </a:bodyPr>
+            <a:lstStyle/>
+            <a:p>
+              <a:pPr algn="ctr"/>
+              <a:endParaRPr lang="en-US" dirty="0"/>
+            </a:p>
+            <a:p>
+              <a:pPr algn="ctr"/>
+              <a:endParaRPr lang="en-US" dirty="0"/>
+            </a:p>
+            <a:p>
+              <a:pPr algn="ctr"/>
+              <a:endParaRPr lang="en-US" dirty="0"/>
+            </a:p>
+            <a:p>
+              <a:pPr algn="ctr"/>
+              <a:r>
+                <a:rPr lang="en-US" dirty="0"/>
+                <a:t>FIRING</a:t>
+              </a:r>
+            </a:p>
+            <a:p>
+              <a:pPr algn="ctr"/>
+              <a:r>
+                <a:rPr lang="en-US" dirty="0"/>
+                <a:t>TRIGGERED</a:t>
+              </a:r>
+            </a:p>
+            <a:p>
+              <a:pPr algn="ctr"/>
+              <a:endParaRPr lang="en-US" dirty="0"/>
+            </a:p>
+            <a:p>
+              <a:pPr algn="ctr"/>
+              <a:endParaRPr lang="en-US" dirty="0"/>
+            </a:p>
+            <a:p>
+              <a:pPr algn="ctr"/>
+              <a:endParaRPr lang="en-US" dirty="0"/>
+            </a:p>
+            <a:p>
+              <a:pPr algn="ctr"/>
+              <a:endParaRPr lang="en-US" dirty="0"/>
+            </a:p>
+          </p:txBody>
+        </p:sp>
+        <p:sp>
+          <p:nvSpPr>
+            <p:cNvPr id="3" name="TextBox 2">
+              <a:extLst>
+                <a:ext uri="{FF2B5EF4-FFF2-40B4-BE49-F238E27FC236}">
+                  <a16:creationId xmlns:a16="http://schemas.microsoft.com/office/drawing/2014/main" id="{F42D3D35-1962-DB48-980A-68C922E31B52}"/>
+                </a:ext>
+              </a:extLst>
+            </p:cNvPr>
+            <p:cNvSpPr txBox="1"/>
+            <p:nvPr/>
+          </p:nvSpPr>
+          <p:spPr>
+            <a:xfrm>
+              <a:off x="8650717" y="1146163"/>
+              <a:ext cx="2277854" cy="3122508"/>
+            </a:xfrm>
+            <a:prstGeom prst="rect">
+              <a:avLst/>
+            </a:prstGeom>
+            <a:solidFill>
+              <a:srgbClr val="92D050"/>
+            </a:solidFill>
+            <a:ln w="25400">
+              <a:solidFill>
+                <a:schemeClr val="tx1"/>
+              </a:solidFill>
+            </a:ln>
+          </p:spPr>
+          <p:txBody>
+            <a:bodyPr wrap="square" rtlCol="0">
+              <a:spAutoFit/>
+            </a:bodyPr>
+            <a:lstStyle/>
+            <a:p>
+              <a:pPr algn="ctr"/>
+              <a:endParaRPr lang="en-US" dirty="0"/>
+            </a:p>
+            <a:p>
+              <a:pPr algn="ctr"/>
+              <a:endParaRPr lang="en-US" dirty="0"/>
+            </a:p>
+            <a:p>
+              <a:pPr algn="ctr"/>
+              <a:endParaRPr lang="en-US" dirty="0"/>
+            </a:p>
+            <a:p>
+              <a:pPr algn="ctr"/>
+              <a:r>
+                <a:rPr lang="en-US" dirty="0"/>
+                <a:t>FIRING</a:t>
+              </a:r>
+            </a:p>
+            <a:p>
+              <a:pPr algn="ctr"/>
+              <a:r>
+                <a:rPr lang="en-US" dirty="0"/>
+                <a:t>UN-TRIGGERED</a:t>
+              </a:r>
+            </a:p>
+            <a:p>
+              <a:pPr algn="ctr"/>
+              <a:endParaRPr lang="en-US" dirty="0"/>
+            </a:p>
+            <a:p>
+              <a:pPr algn="ctr"/>
+              <a:endParaRPr lang="en-US" dirty="0"/>
+            </a:p>
+            <a:p>
+              <a:pPr algn="ctr"/>
+              <a:endParaRPr lang="en-US" dirty="0"/>
+            </a:p>
+            <a:p>
+              <a:pPr algn="ctr"/>
+              <a:endParaRPr lang="en-US" dirty="0"/>
+            </a:p>
+            <a:p>
+              <a:pPr algn="ctr"/>
+              <a:endParaRPr lang="en-US" dirty="0"/>
+            </a:p>
+          </p:txBody>
+        </p:sp>
+        <p:sp>
+          <p:nvSpPr>
+            <p:cNvPr id="4" name="Oval 3">
+              <a:extLst>
+                <a:ext uri="{FF2B5EF4-FFF2-40B4-BE49-F238E27FC236}">
+                  <a16:creationId xmlns:a16="http://schemas.microsoft.com/office/drawing/2014/main" id="{0CDB28EA-4F8C-C440-BE47-FCE05F83E614}"/>
+                </a:ext>
+              </a:extLst>
+            </p:cNvPr>
+            <p:cNvSpPr/>
+            <p:nvPr/>
+          </p:nvSpPr>
+          <p:spPr>
+            <a:xfrm>
+              <a:off x="12587788" y="709570"/>
+              <a:ext cx="198780" cy="198780"/>
+            </a:xfrm>
+            <a:prstGeom prst="ellipse">
+              <a:avLst/>
+            </a:prstGeom>
+            <a:solidFill>
+              <a:schemeClr val="tx1"/>
+            </a:solidFill>
+            <a:ln>
+              <a:solidFill>
+                <a:schemeClr val="tx1"/>
+              </a:solidFill>
+            </a:ln>
+          </p:spPr>
+          <p:style>
+            <a:lnRef idx="2">
+              <a:schemeClr val="accent1">
+                <a:shade val="50000"/>
+              </a:schemeClr>
+            </a:lnRef>
+            <a:fillRef idx="1">
+              <a:schemeClr val="accent1"/>
+            </a:fillRef>
+            <a:effectRef idx="0">
+              <a:schemeClr val="accent1"/>
+            </a:effectRef>
+            <a:fontRef idx="minor">
+              <a:schemeClr val="lt1"/>
+            </a:fontRef>
+          </p:style>
+          <p:txBody>
+            <a:bodyPr rtlCol="0" anchor="ctr"/>
+            <a:lstStyle/>
+            <a:p>
+              <a:pPr algn="ctr"/>
+              <a:endParaRPr lang="en-US"/>
+            </a:p>
+          </p:txBody>
+        </p:sp>
+        <p:cxnSp>
+          <p:nvCxnSpPr>
+            <p:cNvPr id="6" name="Elbow Connector 5">
+              <a:extLst>
+                <a:ext uri="{FF2B5EF4-FFF2-40B4-BE49-F238E27FC236}">
+                  <a16:creationId xmlns:a16="http://schemas.microsoft.com/office/drawing/2014/main" id="{EF36610D-0025-5943-A83A-85A24A7D0A88}"/>
+                </a:ext>
+              </a:extLst>
+            </p:cNvPr>
+            <p:cNvCxnSpPr>
+              <a:cxnSpLocks/>
+              <a:stCxn id="4" idx="2"/>
+              <a:endCxn id="3" idx="0"/>
+            </p:cNvCxnSpPr>
+            <p:nvPr/>
+          </p:nvCxnSpPr>
+          <p:spPr>
+            <a:xfrm rot="10800000" flipV="1">
+              <a:off x="9789644" y="808960"/>
+              <a:ext cx="2798143" cy="337204"/>
+            </a:xfrm>
+            <a:prstGeom prst="bentConnector2">
+              <a:avLst/>
+            </a:prstGeom>
+            <a:ln w="50800">
+              <a:solidFill>
+                <a:schemeClr val="tx1"/>
+              </a:solidFill>
+              <a:tailEnd type="triangle"/>
+            </a:ln>
+          </p:spPr>
+          <p:style>
+            <a:lnRef idx="1">
+              <a:schemeClr val="accent1"/>
+            </a:lnRef>
+            <a:fillRef idx="0">
+              <a:schemeClr val="accent1"/>
+            </a:fillRef>
+            <a:effectRef idx="0">
+              <a:schemeClr val="accent1"/>
+            </a:effectRef>
+            <a:fontRef idx="minor">
+              <a:schemeClr val="tx1"/>
+            </a:fontRef>
+          </p:style>
+        </p:cxnSp>
+        <p:sp>
+          <p:nvSpPr>
+            <p:cNvPr id="9" name="TextBox 8">
+              <a:extLst>
+                <a:ext uri="{FF2B5EF4-FFF2-40B4-BE49-F238E27FC236}">
+                  <a16:creationId xmlns:a16="http://schemas.microsoft.com/office/drawing/2014/main" id="{6A9848B8-CD59-624D-B64D-7CB349D600AB}"/>
+                </a:ext>
+              </a:extLst>
+            </p:cNvPr>
+            <p:cNvSpPr txBox="1"/>
+            <p:nvPr/>
+          </p:nvSpPr>
+          <p:spPr>
+            <a:xfrm>
+              <a:off x="1382837" y="5787946"/>
+              <a:ext cx="10053546" cy="1007112"/>
+            </a:xfrm>
+            <a:prstGeom prst="rect">
+              <a:avLst/>
+            </a:prstGeom>
+            <a:solidFill>
+              <a:srgbClr val="00B050"/>
+            </a:solidFill>
+            <a:ln w="25400">
+              <a:solidFill>
+                <a:schemeClr val="tx1"/>
+              </a:solidFill>
+            </a:ln>
+          </p:spPr>
+          <p:txBody>
+            <a:bodyPr wrap="square" rtlCol="0">
+              <a:spAutoFit/>
+            </a:bodyPr>
+            <a:lstStyle/>
+            <a:p>
+              <a:pPr algn="ctr"/>
+              <a:endParaRPr lang="en-US" dirty="0"/>
+            </a:p>
+            <a:p>
+              <a:pPr algn="ctr"/>
+              <a:r>
+                <a:rPr lang="en-US" dirty="0"/>
+                <a:t>READY TO DE-QUEUE</a:t>
+              </a:r>
+            </a:p>
+            <a:p>
+              <a:pPr algn="ctr"/>
+              <a:endParaRPr lang="en-US" dirty="0"/>
+            </a:p>
+          </p:txBody>
+        </p:sp>
+        <p:cxnSp>
+          <p:nvCxnSpPr>
+            <p:cNvPr id="13" name="Straight Arrow Connector 12">
+              <a:extLst>
+                <a:ext uri="{FF2B5EF4-FFF2-40B4-BE49-F238E27FC236}">
+                  <a16:creationId xmlns:a16="http://schemas.microsoft.com/office/drawing/2014/main" id="{52AF5C87-65F1-124D-97DF-B2B622AC5F15}"/>
+                </a:ext>
+              </a:extLst>
+            </p:cNvPr>
+            <p:cNvCxnSpPr>
+              <a:cxnSpLocks/>
+            </p:cNvCxnSpPr>
+            <p:nvPr/>
+          </p:nvCxnSpPr>
+          <p:spPr>
+            <a:xfrm>
+              <a:off x="3044731" y="3984054"/>
+              <a:ext cx="0" cy="1805071"/>
+            </a:xfrm>
+            <a:prstGeom prst="straightConnector1">
+              <a:avLst/>
+            </a:prstGeom>
+            <a:ln w="50800">
+              <a:solidFill>
+                <a:schemeClr val="tx1"/>
+              </a:solidFill>
+              <a:headEnd type="triangle"/>
+              <a:tailEnd type="none"/>
+            </a:ln>
+          </p:spPr>
+          <p:style>
+            <a:lnRef idx="1">
+              <a:schemeClr val="accent1"/>
+            </a:lnRef>
+            <a:fillRef idx="0">
+              <a:schemeClr val="accent1"/>
+            </a:fillRef>
+            <a:effectRef idx="0">
+              <a:schemeClr val="accent1"/>
+            </a:effectRef>
+            <a:fontRef idx="minor">
+              <a:schemeClr val="tx1"/>
+            </a:fontRef>
+          </p:style>
+        </p:cxnSp>
+        <p:cxnSp>
+          <p:nvCxnSpPr>
+            <p:cNvPr id="14" name="Straight Arrow Connector 13">
+              <a:extLst>
+                <a:ext uri="{FF2B5EF4-FFF2-40B4-BE49-F238E27FC236}">
+                  <a16:creationId xmlns:a16="http://schemas.microsoft.com/office/drawing/2014/main" id="{6998DBF2-1F14-AF41-9672-8B59C4BEC28B}"/>
+                </a:ext>
+              </a:extLst>
+            </p:cNvPr>
+            <p:cNvCxnSpPr>
+              <a:cxnSpLocks/>
+            </p:cNvCxnSpPr>
+            <p:nvPr/>
+          </p:nvCxnSpPr>
+          <p:spPr>
+            <a:xfrm>
+              <a:off x="1820125" y="3984054"/>
+              <a:ext cx="0" cy="1803892"/>
+            </a:xfrm>
+            <a:prstGeom prst="straightConnector1">
+              <a:avLst/>
+            </a:prstGeom>
+            <a:ln w="50800">
+              <a:solidFill>
+                <a:schemeClr val="tx1"/>
+              </a:solidFill>
+              <a:headEnd type="triangle"/>
+              <a:tailEnd type="none"/>
+            </a:ln>
+          </p:spPr>
+          <p:style>
+            <a:lnRef idx="1">
+              <a:schemeClr val="accent1"/>
+            </a:lnRef>
+            <a:fillRef idx="0">
+              <a:schemeClr val="accent1"/>
+            </a:fillRef>
+            <a:effectRef idx="0">
+              <a:schemeClr val="accent1"/>
+            </a:effectRef>
+            <a:fontRef idx="minor">
+              <a:schemeClr val="tx1"/>
+            </a:fontRef>
+          </p:style>
+        </p:cxnSp>
+        <p:cxnSp>
+          <p:nvCxnSpPr>
+            <p:cNvPr id="15" name="Straight Arrow Connector 14">
+              <a:extLst>
+                <a:ext uri="{FF2B5EF4-FFF2-40B4-BE49-F238E27FC236}">
+                  <a16:creationId xmlns:a16="http://schemas.microsoft.com/office/drawing/2014/main" id="{E09D293C-430E-024B-9BBB-F91C50010939}"/>
+                </a:ext>
+              </a:extLst>
+            </p:cNvPr>
+            <p:cNvCxnSpPr>
+              <a:cxnSpLocks/>
+              <a:stCxn id="3" idx="2"/>
+            </p:cNvCxnSpPr>
+            <p:nvPr/>
+          </p:nvCxnSpPr>
+          <p:spPr>
+            <a:xfrm>
+              <a:off x="9789644" y="4268671"/>
+              <a:ext cx="0" cy="1519275"/>
+            </a:xfrm>
+            <a:prstGeom prst="straightConnector1">
+              <a:avLst/>
+            </a:prstGeom>
+            <a:ln w="50800">
+              <a:solidFill>
+                <a:schemeClr val="tx1"/>
+              </a:solidFill>
+              <a:tailEnd type="triangle"/>
+            </a:ln>
+          </p:spPr>
+          <p:style>
+            <a:lnRef idx="1">
+              <a:schemeClr val="accent1"/>
+            </a:lnRef>
+            <a:fillRef idx="0">
+              <a:schemeClr val="accent1"/>
+            </a:fillRef>
+            <a:effectRef idx="0">
+              <a:schemeClr val="accent1"/>
+            </a:effectRef>
+            <a:fontRef idx="minor">
+              <a:schemeClr val="tx1"/>
+            </a:fontRef>
+          </p:style>
+        </p:cxnSp>
+        <p:cxnSp>
+          <p:nvCxnSpPr>
+            <p:cNvPr id="19" name="Straight Arrow Connector 18">
+              <a:extLst>
+                <a:ext uri="{FF2B5EF4-FFF2-40B4-BE49-F238E27FC236}">
+                  <a16:creationId xmlns:a16="http://schemas.microsoft.com/office/drawing/2014/main" id="{F43AE6D0-4FE5-8C48-B46C-2BC084BC9F80}"/>
+                </a:ext>
+              </a:extLst>
+            </p:cNvPr>
+            <p:cNvCxnSpPr>
+              <a:cxnSpLocks/>
+            </p:cNvCxnSpPr>
+            <p:nvPr/>
+          </p:nvCxnSpPr>
+          <p:spPr>
+            <a:xfrm>
+              <a:off x="3518805" y="1996877"/>
+              <a:ext cx="5148712" cy="0"/>
+            </a:xfrm>
+            <a:prstGeom prst="straightConnector1">
+              <a:avLst/>
+            </a:prstGeom>
+            <a:ln w="50800">
+              <a:solidFill>
+                <a:schemeClr val="tx1"/>
+              </a:solidFill>
+              <a:tailEnd type="triangle"/>
+            </a:ln>
+          </p:spPr>
+          <p:style>
+            <a:lnRef idx="1">
+              <a:schemeClr val="accent1"/>
+            </a:lnRef>
+            <a:fillRef idx="0">
+              <a:schemeClr val="accent1"/>
+            </a:fillRef>
+            <a:effectRef idx="0">
+              <a:schemeClr val="accent1"/>
+            </a:effectRef>
+            <a:fontRef idx="minor">
+              <a:schemeClr val="tx1"/>
+            </a:fontRef>
+          </p:style>
+        </p:cxnSp>
+        <p:cxnSp>
+          <p:nvCxnSpPr>
+            <p:cNvPr id="20" name="Straight Arrow Connector 19">
+              <a:extLst>
+                <a:ext uri="{FF2B5EF4-FFF2-40B4-BE49-F238E27FC236}">
+                  <a16:creationId xmlns:a16="http://schemas.microsoft.com/office/drawing/2014/main" id="{6EF7FAFD-D5D0-9642-9300-8980A87185D8}"/>
+                </a:ext>
+              </a:extLst>
+            </p:cNvPr>
+            <p:cNvCxnSpPr>
+              <a:cxnSpLocks/>
+            </p:cNvCxnSpPr>
+            <p:nvPr/>
+          </p:nvCxnSpPr>
+          <p:spPr>
+            <a:xfrm>
+              <a:off x="3518805" y="3505428"/>
+              <a:ext cx="5131912" cy="0"/>
+            </a:xfrm>
+            <a:prstGeom prst="straightConnector1">
+              <a:avLst/>
+            </a:prstGeom>
+            <a:ln w="50800">
+              <a:solidFill>
+                <a:schemeClr val="tx1"/>
+              </a:solidFill>
+              <a:headEnd type="none"/>
+              <a:tailEnd type="triangle"/>
+            </a:ln>
+          </p:spPr>
+          <p:style>
+            <a:lnRef idx="1">
+              <a:schemeClr val="accent1"/>
+            </a:lnRef>
+            <a:fillRef idx="0">
+              <a:schemeClr val="accent1"/>
+            </a:fillRef>
+            <a:effectRef idx="0">
+              <a:schemeClr val="accent1"/>
+            </a:effectRef>
+            <a:fontRef idx="minor">
+              <a:schemeClr val="tx1"/>
+            </a:fontRef>
+          </p:style>
+        </p:cxnSp>
+        <p:sp>
+          <p:nvSpPr>
+            <p:cNvPr id="100" name="Arc 99">
+              <a:extLst>
+                <a:ext uri="{FF2B5EF4-FFF2-40B4-BE49-F238E27FC236}">
+                  <a16:creationId xmlns:a16="http://schemas.microsoft.com/office/drawing/2014/main" id="{906E22AA-B2EF-5746-BCB2-DB609B654DA4}"/>
+                </a:ext>
+              </a:extLst>
+            </p:cNvPr>
+            <p:cNvSpPr/>
+            <p:nvPr/>
+          </p:nvSpPr>
+          <p:spPr>
+            <a:xfrm rot="21410085">
+              <a:off x="10446106" y="1610443"/>
+              <a:ext cx="935447" cy="923331"/>
+            </a:xfrm>
+            <a:prstGeom prst="arc">
+              <a:avLst>
+                <a:gd name="adj1" fmla="val 16200000"/>
+                <a:gd name="adj2" fmla="val 5550432"/>
+              </a:avLst>
+            </a:prstGeom>
+            <a:ln w="50800">
+              <a:solidFill>
+                <a:schemeClr val="tx1"/>
+              </a:solidFill>
+              <a:headEnd type="triangle"/>
+            </a:ln>
+          </p:spPr>
+          <p:style>
+            <a:lnRef idx="1">
+              <a:schemeClr val="accent1"/>
+            </a:lnRef>
+            <a:fillRef idx="0">
+              <a:schemeClr val="accent1"/>
+            </a:fillRef>
+            <a:effectRef idx="0">
+              <a:schemeClr val="accent1"/>
+            </a:effectRef>
+            <a:fontRef idx="minor">
+              <a:schemeClr val="tx1"/>
+            </a:fontRef>
+          </p:style>
+          <p:txBody>
+            <a:bodyPr rtlCol="0" anchor="ctr"/>
+            <a:lstStyle/>
+            <a:p>
+              <a:pPr algn="ctr"/>
+              <a:endParaRPr lang="en-US"/>
+            </a:p>
+          </p:txBody>
+        </p:sp>
+        <mc:AlternateContent xmlns:mc="http://schemas.openxmlformats.org/markup-compatibility/2006" xmlns:a14="http://schemas.microsoft.com/office/drawing/2010/main">
+          <mc:Choice Requires="a14">
+            <p:sp>
+              <p:nvSpPr>
+                <p:cNvPr id="102" name="TextBox 101">
+                  <a:extLst>
+                    <a:ext uri="{FF2B5EF4-FFF2-40B4-BE49-F238E27FC236}">
+                      <a16:creationId xmlns:a16="http://schemas.microsoft.com/office/drawing/2014/main" id="{686248CD-7F6D-1044-B45E-09E9AC21B1C0}"/>
+                    </a:ext>
+                  </a:extLst>
+                </p:cNvPr>
+                <p:cNvSpPr txBox="1"/>
+                <p:nvPr/>
+              </p:nvSpPr>
+              <p:spPr>
+                <a:xfrm>
+                  <a:off x="1382837" y="6818116"/>
+                  <a:ext cx="14958103" cy="2517783"/>
+                </a:xfrm>
+                <a:prstGeom prst="rect">
+                  <a:avLst/>
+                </a:prstGeom>
+                <a:noFill/>
+              </p:spPr>
+              <p:txBody>
+                <a:bodyPr wrap="square" numCol="2" rtlCol="0">
+                  <a:spAutoFit/>
+                </a:bodyPr>
+                <a:lstStyle/>
+                <a:p>
+                  <a:pPr marL="285750" indent="-285750">
+                    <a:buFont typeface="Arial" panose="020B0604020202020204" pitchFamily="34" charset="0"/>
+                    <a:buChar char="•"/>
+                  </a:pPr>
+                  <a:r>
+                    <a:rPr lang="en-US" b="1" i="1" dirty="0"/>
+                    <a:t>Bold+Italic: Short Description</a:t>
+                  </a:r>
+                </a:p>
+                <a:p>
+                  <a:pPr marL="285750" indent="-285750">
+                    <a:buFont typeface="Arial" panose="020B0604020202020204" pitchFamily="34" charset="0"/>
+                    <a:buChar char="•"/>
+                  </a:pPr>
+                  <a:r>
+                    <a:rPr lang="en-US" i="1" dirty="0"/>
+                    <a:t>Italic: Event-B event name</a:t>
+                  </a:r>
+                </a:p>
+                <a:p>
+                  <a:pPr marL="285750" indent="-285750">
+                    <a:buFont typeface="Arial" panose="020B0604020202020204" pitchFamily="34" charset="0"/>
+                    <a:buChar char="•"/>
+                  </a:pPr>
+                  <a:r>
+                    <a:rPr lang="en-US" dirty="0"/>
+                    <a:t>ALL CAPS: STATE NAMES</a:t>
+                  </a:r>
+                </a:p>
+                <a:p>
+                  <a:pPr marL="285750" indent="-285750">
+                    <a:buFont typeface="Arial" panose="020B0604020202020204" pitchFamily="34" charset="0"/>
+                    <a:buChar char="•"/>
+                  </a:pPr>
+                  <a:endParaRPr lang="en-US" dirty="0"/>
+                </a:p>
+                <a:p>
+                  <a:pPr marL="285750" indent="-285750">
+                    <a:buFont typeface="Arial" panose="020B0604020202020204" pitchFamily="34" charset="0"/>
+                    <a:buChar char="•"/>
+                  </a:pPr>
+                  <a:endParaRPr lang="en-US" dirty="0"/>
+                </a:p>
+                <a:p>
+                  <a:pPr marL="285750" indent="-285750">
+                    <a:buFont typeface="Arial" panose="020B0604020202020204" pitchFamily="34" charset="0"/>
+                    <a:buChar char="•"/>
+                  </a:pPr>
+                  <a:endParaRPr lang="en-US" dirty="0"/>
+                </a:p>
+                <a:p>
+                  <a:endParaRPr lang="en-US" dirty="0"/>
+                </a:p>
+                <a:p>
+                  <a:endParaRPr lang="en-US" dirty="0"/>
+                </a:p>
+                <a:p>
+                  <a:pPr marL="285750" indent="-285750">
+                    <a:buFont typeface="Arial" panose="020B0604020202020204" pitchFamily="34" charset="0"/>
+                    <a:buChar char="•"/>
+                  </a:pPr>
+                  <a:r>
+                    <a:rPr lang="en-US" dirty="0"/>
+                    <a:t>Event guards: P1 &amp; P2 / Event action: </a:t>
+                  </a:r>
+                  <a14:m>
+                    <m:oMath xmlns:m="http://schemas.openxmlformats.org/officeDocument/2006/math">
+                      <m:r>
+                        <a:rPr lang="en-US" b="0" i="1" smtClean="0">
+                          <a:latin typeface="Cambria Math" panose="02040503050406030204" pitchFamily="18" charset="0"/>
+                        </a:rPr>
+                        <m:t>𝑏</m:t>
+                      </m:r>
+                      <m:r>
+                        <a:rPr lang="en-US" b="0" i="1" smtClean="0">
+                          <a:latin typeface="Cambria Math" panose="02040503050406030204" pitchFamily="18" charset="0"/>
+                        </a:rPr>
+                        <m:t>≔</m:t>
+                      </m:r>
+                      <m:r>
+                        <a:rPr lang="en-US" b="0" i="1" smtClean="0">
+                          <a:latin typeface="Cambria Math" panose="02040503050406030204" pitchFamily="18" charset="0"/>
+                        </a:rPr>
+                        <m:t>𝑏</m:t>
+                      </m:r>
+                      <m:r>
+                        <a:rPr lang="en-US" b="0" i="1" smtClean="0">
+                          <a:latin typeface="Cambria Math" panose="02040503050406030204" pitchFamily="18" charset="0"/>
+                        </a:rPr>
+                        <m:t>+1</m:t>
+                      </m:r>
+                    </m:oMath>
+                  </a14:m>
+                  <a:r>
+                    <a:rPr lang="en-US" dirty="0"/>
+                    <a:t> </a:t>
+                  </a:r>
+                </a:p>
+                <a:p>
+                  <a:r>
+                    <a:rPr lang="en-US" dirty="0"/>
+                    <a:t>Note: P1, P2 are predicates, </a:t>
+                  </a:r>
+                  <a14:m>
+                    <m:oMath xmlns:m="http://schemas.openxmlformats.org/officeDocument/2006/math">
+                      <m:r>
+                        <a:rPr lang="en-US" b="0" i="1" smtClean="0">
+                          <a:latin typeface="Cambria Math" panose="02040503050406030204" pitchFamily="18" charset="0"/>
+                        </a:rPr>
+                        <m:t>𝑏</m:t>
+                      </m:r>
+                      <m:r>
+                        <a:rPr lang="en-US" i="1">
+                          <a:latin typeface="Cambria Math" panose="02040503050406030204" pitchFamily="18" charset="0"/>
+                        </a:rPr>
+                        <m:t> </m:t>
+                      </m:r>
+                    </m:oMath>
+                  </a14:m>
+                  <a:r>
+                    <a:rPr lang="en-US" dirty="0"/>
+                    <a:t>is a model variable, and / separates guards from actions</a:t>
+                  </a:r>
+                </a:p>
+              </p:txBody>
+            </p:sp>
+          </mc:Choice>
+          <mc:Fallback xmlns="">
+            <p:sp>
+              <p:nvSpPr>
+                <p:cNvPr id="102" name="TextBox 101">
+                  <a:extLst>
+                    <a:ext uri="{FF2B5EF4-FFF2-40B4-BE49-F238E27FC236}">
+                      <a16:creationId xmlns:a16="http://schemas.microsoft.com/office/drawing/2014/main" id="{686248CD-7F6D-1044-B45E-09E9AC21B1C0}"/>
+                    </a:ext>
+                  </a:extLst>
+                </p:cNvPr>
+                <p:cNvSpPr txBox="1">
+                  <a:spLocks noRot="1" noChangeAspect="1" noMove="1" noResize="1" noEditPoints="1" noAdjustHandles="1" noChangeArrowheads="1" noChangeShapeType="1" noTextEdit="1"/>
+                </p:cNvSpPr>
+                <p:nvPr/>
+              </p:nvSpPr>
+              <p:spPr>
+                <a:xfrm>
+                  <a:off x="1382837" y="6818116"/>
+                  <a:ext cx="14958103" cy="2517783"/>
+                </a:xfrm>
+                <a:prstGeom prst="rect">
+                  <a:avLst/>
+                </a:prstGeom>
+                <a:blipFill>
+                  <a:blip r:embed="rId3"/>
+                  <a:stretch>
+                    <a:fillRect l="-312" t="-546"/>
+                  </a:stretch>
+                </a:blipFill>
+              </p:spPr>
+              <p:txBody>
+                <a:bodyPr/>
+                <a:lstStyle/>
+                <a:p>
+                  <a:r>
+                    <a:rPr lang="en-US">
+                      <a:noFill/>
+                    </a:rPr>
+                    <a:t> </a:t>
+                  </a:r>
+                </a:p>
+              </p:txBody>
+            </p:sp>
+          </mc:Fallback>
+        </mc:AlternateContent>
+        <mc:AlternateContent xmlns:mc="http://schemas.openxmlformats.org/markup-compatibility/2006">
+          <mc:Choice xmlns:a14="http://schemas.microsoft.com/office/drawing/2010/main" Requires="a14">
+            <p:sp>
+              <p:nvSpPr>
+                <p:cNvPr id="103" name="TextBox 102">
+                  <a:extLst>
+                    <a:ext uri="{FF2B5EF4-FFF2-40B4-BE49-F238E27FC236}">
+                      <a16:creationId xmlns:a16="http://schemas.microsoft.com/office/drawing/2014/main" id="{32052193-2A6B-A84B-BFD4-16AE3364E8B3}"/>
+                    </a:ext>
+                  </a:extLst>
+                </p:cNvPr>
+                <p:cNvSpPr txBox="1"/>
+                <p:nvPr/>
+              </p:nvSpPr>
+              <p:spPr>
+                <a:xfrm>
+                  <a:off x="10673916" y="4267847"/>
+                  <a:ext cx="3183426" cy="1309439"/>
+                </a:xfrm>
+                <a:prstGeom prst="rect">
+                  <a:avLst/>
+                </a:prstGeom>
+                <a:noFill/>
+              </p:spPr>
+              <p:txBody>
+                <a:bodyPr wrap="none" rtlCol="0">
+                  <a:spAutoFit/>
+                </a:bodyPr>
+                <a:lstStyle/>
+                <a:p>
+                  <a:pPr algn="ctr"/>
+                  <a:r>
+                    <a:rPr lang="en-US" b="1" i="1" dirty="0"/>
+                    <a:t>Completion</a:t>
+                  </a:r>
+                </a:p>
+                <a:p>
+                  <a:pPr algn="ctr"/>
+                  <a:r>
+                    <a:rPr lang="en-US" i="1" dirty="0" err="1"/>
+                    <a:t>NoUntriggeredTransitions</a:t>
+                  </a:r>
+                  <a:endParaRPr lang="en-US" i="1" dirty="0"/>
+                </a:p>
+                <a:p>
+                  <a:pPr algn="ctr"/>
+                  <a:r>
+                    <a:rPr lang="en-US" dirty="0" err="1"/>
+                    <a:t>uc</a:t>
+                  </a:r>
+                  <a:r>
+                    <a:rPr lang="en-US" dirty="0"/>
+                    <a:t> = FALSE &amp; dt = </a:t>
+                  </a:r>
+                  <a14:m>
+                    <m:oMath xmlns:m="http://schemas.openxmlformats.org/officeDocument/2006/math">
+                      <m:r>
+                        <a:rPr lang="en-US" i="1" smtClean="0">
+                          <a:latin typeface="Cambria Math" panose="02040503050406030204" pitchFamily="18" charset="0"/>
+                          <a:ea typeface="Cambria Math" panose="02040503050406030204" pitchFamily="18" charset="0"/>
+                        </a:rPr>
+                        <m:t>∅</m:t>
+                      </m:r>
+                    </m:oMath>
+                  </a14:m>
+                  <a:endParaRPr lang="en-US" dirty="0"/>
+                </a:p>
+                <a:p>
+                  <a:pPr algn="ctr"/>
+                  <a:r>
+                    <a:rPr lang="en-US" dirty="0"/>
+                    <a:t>/ </a:t>
+                  </a:r>
+                  <a:r>
+                    <a:rPr lang="en-US" dirty="0" err="1"/>
+                    <a:t>uc</a:t>
+                  </a:r>
+                  <a:r>
+                    <a:rPr lang="en-US" dirty="0"/>
+                    <a:t> := TRUE</a:t>
+                  </a:r>
+                </a:p>
+              </p:txBody>
+            </p:sp>
+          </mc:Choice>
+          <mc:Fallback>
+            <p:sp>
+              <p:nvSpPr>
+                <p:cNvPr id="103" name="TextBox 102">
+                  <a:extLst>
+                    <a:ext uri="{FF2B5EF4-FFF2-40B4-BE49-F238E27FC236}">
+                      <a16:creationId xmlns:a16="http://schemas.microsoft.com/office/drawing/2014/main" id="{32052193-2A6B-A84B-BFD4-16AE3364E8B3}"/>
+                    </a:ext>
+                  </a:extLst>
+                </p:cNvPr>
+                <p:cNvSpPr txBox="1">
+                  <a:spLocks noRot="1" noChangeAspect="1" noMove="1" noResize="1" noEditPoints="1" noAdjustHandles="1" noChangeArrowheads="1" noChangeShapeType="1" noTextEdit="1"/>
+                </p:cNvSpPr>
+                <p:nvPr/>
+              </p:nvSpPr>
+              <p:spPr>
+                <a:xfrm>
+                  <a:off x="10673916" y="4267847"/>
+                  <a:ext cx="3183426" cy="1309439"/>
+                </a:xfrm>
+                <a:prstGeom prst="rect">
+                  <a:avLst/>
+                </a:prstGeom>
+                <a:blipFill>
+                  <a:blip r:embed="rId4"/>
+                  <a:stretch>
+                    <a:fillRect l="-1463" t="-1042" r="-976" b="-7292"/>
+                  </a:stretch>
+                </a:blipFill>
+              </p:spPr>
+              <p:txBody>
+                <a:bodyPr/>
+                <a:lstStyle/>
+                <a:p>
+                  <a:r>
+                    <a:rPr lang="en-US">
+                      <a:noFill/>
+                    </a:rPr>
+                    <a:t> </a:t>
+                  </a:r>
+                </a:p>
+              </p:txBody>
+            </p:sp>
+          </mc:Fallback>
+        </mc:AlternateContent>
+        <mc:AlternateContent xmlns:mc="http://schemas.openxmlformats.org/markup-compatibility/2006">
+          <mc:Choice xmlns:a14="http://schemas.microsoft.com/office/drawing/2010/main" Requires="a14">
+            <p:sp>
+              <p:nvSpPr>
+                <p:cNvPr id="104" name="TextBox 103">
+                  <a:extLst>
+                    <a:ext uri="{FF2B5EF4-FFF2-40B4-BE49-F238E27FC236}">
+                      <a16:creationId xmlns:a16="http://schemas.microsoft.com/office/drawing/2014/main" id="{A4FA411C-7D95-1146-8A83-BF7DD32F7358}"/>
+                    </a:ext>
+                  </a:extLst>
+                </p:cNvPr>
+                <p:cNvSpPr txBox="1"/>
+                <p:nvPr/>
+              </p:nvSpPr>
+              <p:spPr>
+                <a:xfrm>
+                  <a:off x="2713402" y="4239187"/>
+                  <a:ext cx="5876839" cy="1309439"/>
+                </a:xfrm>
+                <a:prstGeom prst="rect">
+                  <a:avLst/>
+                </a:prstGeom>
+                <a:noFill/>
+              </p:spPr>
+              <p:txBody>
+                <a:bodyPr wrap="square" rtlCol="0">
+                  <a:spAutoFit/>
+                </a:bodyPr>
+                <a:lstStyle/>
+                <a:p>
+                  <a:pPr algn="ctr"/>
+                  <a:r>
+                    <a:rPr lang="en-US" b="1" i="1" dirty="0"/>
+                    <a:t>De-queue Internal Trigger </a:t>
+                  </a:r>
+                  <a:r>
+                    <a:rPr lang="en-US" b="1" i="1" dirty="0" err="1"/>
+                    <a:t>intQ</a:t>
+                  </a:r>
+                  <a:endParaRPr lang="en-US" b="1" i="1" dirty="0"/>
+                </a:p>
+                <a:p>
+                  <a:pPr algn="ctr"/>
+                  <a:r>
+                    <a:rPr lang="en-US" i="1" dirty="0" err="1"/>
+                    <a:t>dequeueInternalTriggered</a:t>
+                  </a:r>
+                  <a:endParaRPr lang="en-US" i="1" dirty="0"/>
+                </a:p>
+                <a:p>
+                  <a:pPr algn="ctr"/>
+                  <a:r>
+                    <a:rPr lang="en-US" dirty="0" err="1"/>
+                    <a:t>uc</a:t>
+                  </a:r>
+                  <a:r>
+                    <a:rPr lang="en-US" dirty="0"/>
+                    <a:t> = TRUE &amp; dt = </a:t>
+                  </a:r>
+                  <a14:m>
+                    <m:oMath xmlns:m="http://schemas.openxmlformats.org/officeDocument/2006/math">
+                      <m:r>
+                        <a:rPr lang="en-US" i="1" smtClean="0">
+                          <a:latin typeface="Cambria Math" panose="02040503050406030204" pitchFamily="18" charset="0"/>
+                          <a:ea typeface="Cambria Math" panose="02040503050406030204" pitchFamily="18" charset="0"/>
+                        </a:rPr>
+                        <m:t>∅</m:t>
+                      </m:r>
+                    </m:oMath>
+                  </a14:m>
+                  <a:endParaRPr lang="en-US" dirty="0"/>
+                </a:p>
+                <a:p>
+                  <a:pPr algn="ctr"/>
+                  <a:r>
+                    <a:rPr lang="en-US" dirty="0"/>
+                    <a:t>/ </a:t>
+                  </a:r>
+                  <a:r>
+                    <a:rPr lang="en-US" dirty="0" err="1"/>
+                    <a:t>uc</a:t>
+                  </a:r>
+                  <a:r>
+                    <a:rPr lang="en-US" dirty="0"/>
+                    <a:t> := FALSE &amp; dt := {</a:t>
+                  </a:r>
+                  <a:r>
+                    <a:rPr lang="en-US" dirty="0" err="1"/>
+                    <a:t>intQ</a:t>
+                  </a:r>
+                  <a:r>
+                    <a:rPr lang="en-US" dirty="0"/>
+                    <a:t>}</a:t>
+                  </a:r>
+                </a:p>
+              </p:txBody>
+            </p:sp>
+          </mc:Choice>
+          <mc:Fallback>
+            <p:sp>
+              <p:nvSpPr>
+                <p:cNvPr id="104" name="TextBox 103">
+                  <a:extLst>
+                    <a:ext uri="{FF2B5EF4-FFF2-40B4-BE49-F238E27FC236}">
+                      <a16:creationId xmlns:a16="http://schemas.microsoft.com/office/drawing/2014/main" id="{A4FA411C-7D95-1146-8A83-BF7DD32F7358}"/>
+                    </a:ext>
+                  </a:extLst>
+                </p:cNvPr>
+                <p:cNvSpPr txBox="1">
+                  <a:spLocks noRot="1" noChangeAspect="1" noMove="1" noResize="1" noEditPoints="1" noAdjustHandles="1" noChangeArrowheads="1" noChangeShapeType="1" noTextEdit="1"/>
+                </p:cNvSpPr>
+                <p:nvPr/>
+              </p:nvSpPr>
+              <p:spPr>
+                <a:xfrm>
+                  <a:off x="2713402" y="4239187"/>
+                  <a:ext cx="5876839" cy="1309439"/>
+                </a:xfrm>
+                <a:prstGeom prst="rect">
+                  <a:avLst/>
+                </a:prstGeom>
+                <a:blipFill>
+                  <a:blip r:embed="rId5"/>
+                  <a:stretch>
+                    <a:fillRect t="-1042" b="-6250"/>
+                  </a:stretch>
+                </a:blipFill>
+              </p:spPr>
+              <p:txBody>
+                <a:bodyPr/>
+                <a:lstStyle/>
+                <a:p>
+                  <a:r>
+                    <a:rPr lang="en-US">
+                      <a:noFill/>
+                    </a:rPr>
+                    <a:t> </a:t>
+                  </a:r>
+                </a:p>
+              </p:txBody>
+            </p:sp>
+          </mc:Fallback>
+        </mc:AlternateContent>
+        <mc:AlternateContent xmlns:mc="http://schemas.openxmlformats.org/markup-compatibility/2006">
+          <mc:Choice xmlns:a14="http://schemas.microsoft.com/office/drawing/2010/main" Requires="a14">
+            <p:sp>
+              <p:nvSpPr>
+                <p:cNvPr id="105" name="TextBox 104">
+                  <a:extLst>
+                    <a:ext uri="{FF2B5EF4-FFF2-40B4-BE49-F238E27FC236}">
+                      <a16:creationId xmlns:a16="http://schemas.microsoft.com/office/drawing/2014/main" id="{8DE941AA-8537-8140-A384-C92A0860614E}"/>
+                    </a:ext>
+                  </a:extLst>
+                </p:cNvPr>
+                <p:cNvSpPr txBox="1"/>
+                <p:nvPr/>
+              </p:nvSpPr>
+              <p:spPr>
+                <a:xfrm>
+                  <a:off x="-3316582" y="4243414"/>
+                  <a:ext cx="5607213" cy="1309439"/>
+                </a:xfrm>
+                <a:prstGeom prst="rect">
+                  <a:avLst/>
+                </a:prstGeom>
+                <a:noFill/>
+              </p:spPr>
+              <p:txBody>
+                <a:bodyPr wrap="square" rtlCol="0">
+                  <a:spAutoFit/>
+                </a:bodyPr>
+                <a:lstStyle/>
+                <a:p>
+                  <a:pPr algn="ctr"/>
+                  <a:r>
+                    <a:rPr lang="en-US" b="1" i="1" dirty="0"/>
+                    <a:t>De-queue External Trigger </a:t>
+                  </a:r>
+                  <a:r>
+                    <a:rPr lang="en-US" b="1" i="1" dirty="0" err="1"/>
+                    <a:t>extQ</a:t>
+                  </a:r>
+                  <a:endParaRPr lang="en-US" b="1" i="1" dirty="0"/>
+                </a:p>
+                <a:p>
+                  <a:pPr algn="ctr"/>
+                  <a:r>
+                    <a:rPr lang="en-US" i="1" dirty="0" err="1"/>
+                    <a:t>dequeueExternalTriggered</a:t>
+                  </a:r>
+                  <a:endParaRPr lang="en-US" i="1" dirty="0"/>
+                </a:p>
+                <a:p>
+                  <a:pPr algn="ctr"/>
+                  <a:r>
+                    <a:rPr lang="en-US" dirty="0" err="1"/>
+                    <a:t>uc</a:t>
+                  </a:r>
+                  <a:r>
+                    <a:rPr lang="en-US" dirty="0"/>
+                    <a:t> = TRUE &amp; dt = </a:t>
+                  </a:r>
+                  <a14:m>
+                    <m:oMath xmlns:m="http://schemas.openxmlformats.org/officeDocument/2006/math">
+                      <m:r>
+                        <a:rPr lang="en-US" i="1">
+                          <a:latin typeface="Cambria Math" panose="02040503050406030204" pitchFamily="18" charset="0"/>
+                          <a:ea typeface="Cambria Math" panose="02040503050406030204" pitchFamily="18" charset="0"/>
+                        </a:rPr>
+                        <m:t>∅</m:t>
+                      </m:r>
+                    </m:oMath>
+                  </a14:m>
+                  <a:endParaRPr lang="en-US" dirty="0"/>
+                </a:p>
+                <a:p>
+                  <a:pPr algn="ctr"/>
+                  <a:r>
+                    <a:rPr lang="en-US" dirty="0"/>
+                    <a:t>/ </a:t>
+                  </a:r>
+                  <a:r>
+                    <a:rPr lang="en-US" dirty="0" err="1"/>
+                    <a:t>uc</a:t>
+                  </a:r>
+                  <a:r>
+                    <a:rPr lang="en-US" dirty="0"/>
+                    <a:t> := FALSE &amp; dt := {</a:t>
+                  </a:r>
+                  <a:r>
+                    <a:rPr lang="en-US" dirty="0" err="1"/>
+                    <a:t>extQ</a:t>
+                  </a:r>
+                  <a:r>
+                    <a:rPr lang="en-US" dirty="0"/>
+                    <a:t>}</a:t>
+                  </a:r>
+                </a:p>
+              </p:txBody>
+            </p:sp>
+          </mc:Choice>
+          <mc:Fallback>
+            <p:sp>
+              <p:nvSpPr>
+                <p:cNvPr id="105" name="TextBox 104">
+                  <a:extLst>
+                    <a:ext uri="{FF2B5EF4-FFF2-40B4-BE49-F238E27FC236}">
+                      <a16:creationId xmlns:a16="http://schemas.microsoft.com/office/drawing/2014/main" id="{8DE941AA-8537-8140-A384-C92A0860614E}"/>
+                    </a:ext>
+                  </a:extLst>
+                </p:cNvPr>
+                <p:cNvSpPr txBox="1">
+                  <a:spLocks noRot="1" noChangeAspect="1" noMove="1" noResize="1" noEditPoints="1" noAdjustHandles="1" noChangeArrowheads="1" noChangeShapeType="1" noTextEdit="1"/>
+                </p:cNvSpPr>
+                <p:nvPr/>
+              </p:nvSpPr>
+              <p:spPr>
+                <a:xfrm>
+                  <a:off x="-3316582" y="4243414"/>
+                  <a:ext cx="5607213" cy="1309439"/>
+                </a:xfrm>
+                <a:prstGeom prst="rect">
+                  <a:avLst/>
+                </a:prstGeom>
+                <a:blipFill>
+                  <a:blip r:embed="rId6"/>
+                  <a:stretch>
+                    <a:fillRect t="-2105" b="-7368"/>
+                  </a:stretch>
+                </a:blipFill>
+              </p:spPr>
+              <p:txBody>
+                <a:bodyPr/>
+                <a:lstStyle/>
+                <a:p>
+                  <a:r>
+                    <a:rPr lang="en-US">
+                      <a:noFill/>
+                    </a:rPr>
+                    <a:t> </a:t>
+                  </a:r>
+                </a:p>
+              </p:txBody>
+            </p:sp>
+          </mc:Fallback>
+        </mc:AlternateContent>
+        <mc:AlternateContent xmlns:mc="http://schemas.openxmlformats.org/markup-compatibility/2006">
+          <mc:Choice xmlns:a14="http://schemas.microsoft.com/office/drawing/2010/main" Requires="a14">
+            <p:sp>
+              <p:nvSpPr>
+                <p:cNvPr id="110" name="TextBox 109">
+                  <a:extLst>
+                    <a:ext uri="{FF2B5EF4-FFF2-40B4-BE49-F238E27FC236}">
+                      <a16:creationId xmlns:a16="http://schemas.microsoft.com/office/drawing/2014/main" id="{E140AAD7-431B-1244-8F4C-1A27A7E5CD89}"/>
+                    </a:ext>
+                  </a:extLst>
+                </p:cNvPr>
+                <p:cNvSpPr txBox="1"/>
+                <p:nvPr/>
+              </p:nvSpPr>
+              <p:spPr>
+                <a:xfrm>
+                  <a:off x="3119914" y="2214302"/>
+                  <a:ext cx="5711787" cy="1309439"/>
+                </a:xfrm>
+                <a:prstGeom prst="rect">
+                  <a:avLst/>
+                </a:prstGeom>
+                <a:noFill/>
+              </p:spPr>
+              <p:txBody>
+                <a:bodyPr wrap="square" rtlCol="0">
+                  <a:spAutoFit/>
+                </a:bodyPr>
+                <a:lstStyle/>
+                <a:p>
+                  <a:pPr algn="ctr"/>
+                  <a:r>
+                    <a:rPr lang="en-US" b="1" i="1" dirty="0"/>
+                    <a:t>No Triggered Enable</a:t>
+                  </a:r>
+                </a:p>
+                <a:p>
+                  <a:pPr algn="ctr"/>
+                  <a:r>
+                    <a:rPr lang="en-US" i="1" dirty="0" err="1"/>
+                    <a:t>NoTriggeredTransitionsEnable</a:t>
+                  </a:r>
+                  <a:endParaRPr lang="en-US" i="1" dirty="0"/>
+                </a:p>
+                <a:p>
+                  <a:pPr algn="ctr"/>
+                  <a:r>
+                    <a:rPr lang="en-US" dirty="0" err="1"/>
+                    <a:t>uc</a:t>
+                  </a:r>
+                  <a:r>
+                    <a:rPr lang="en-US" dirty="0"/>
+                    <a:t> = FALSE &amp; dt </a:t>
+                  </a:r>
+                  <a14:m>
+                    <m:oMath xmlns:m="http://schemas.openxmlformats.org/officeDocument/2006/math">
+                      <m:r>
+                        <a:rPr lang="en-US" i="1">
+                          <a:latin typeface="Cambria Math" panose="02040503050406030204" pitchFamily="18" charset="0"/>
+                          <a:ea typeface="Cambria Math" panose="02040503050406030204" pitchFamily="18" charset="0"/>
+                        </a:rPr>
+                        <m:t>≠</m:t>
+                      </m:r>
+                    </m:oMath>
+                  </a14:m>
+                  <a:r>
+                    <a:rPr lang="en-US" dirty="0"/>
+                    <a:t> </a:t>
+                  </a:r>
+                  <a14:m>
+                    <m:oMath xmlns:m="http://schemas.openxmlformats.org/officeDocument/2006/math">
+                      <m:r>
+                        <a:rPr lang="en-US" i="1" smtClean="0">
+                          <a:latin typeface="Cambria Math" panose="02040503050406030204" pitchFamily="18" charset="0"/>
+                          <a:ea typeface="Cambria Math" panose="02040503050406030204" pitchFamily="18" charset="0"/>
+                        </a:rPr>
+                        <m:t>∅</m:t>
+                      </m:r>
+                      <m:r>
+                        <a:rPr lang="en-US" b="0" i="0" smtClean="0">
+                          <a:latin typeface="Cambria Math" panose="02040503050406030204" pitchFamily="18" charset="0"/>
+                          <a:ea typeface="Cambria Math" panose="02040503050406030204" pitchFamily="18" charset="0"/>
+                        </a:rPr>
+                        <m:t> </m:t>
+                      </m:r>
+                      <m:r>
+                        <a:rPr lang="en-US" b="0" i="0" smtClean="0">
+                          <a:latin typeface="Cambria Math" panose="02040503050406030204" pitchFamily="18" charset="0"/>
+                          <a:ea typeface="Cambria Math" panose="02040503050406030204" pitchFamily="18" charset="0"/>
+                        </a:rPr>
+                        <m:t> </m:t>
+                      </m:r>
+                    </m:oMath>
+                  </a14:m>
+                  <a:endParaRPr lang="en-US" dirty="0"/>
+                </a:p>
+                <a:p>
+                  <a:pPr algn="ctr"/>
+                  <a:r>
+                    <a:rPr lang="en-US" dirty="0"/>
+                    <a:t>/  dt := </a:t>
+                  </a:r>
+                  <a14:m>
+                    <m:oMath xmlns:m="http://schemas.openxmlformats.org/officeDocument/2006/math">
+                      <m:r>
+                        <a:rPr lang="en-US" i="1">
+                          <a:latin typeface="Cambria Math" panose="02040503050406030204" pitchFamily="18" charset="0"/>
+                          <a:ea typeface="Cambria Math" panose="02040503050406030204" pitchFamily="18" charset="0"/>
+                        </a:rPr>
+                        <m:t>∅</m:t>
+                      </m:r>
+                    </m:oMath>
+                  </a14:m>
+                  <a:r>
+                    <a:rPr lang="en-US" dirty="0"/>
+                    <a:t> </a:t>
+                  </a:r>
+                </a:p>
+              </p:txBody>
+            </p:sp>
+          </mc:Choice>
+          <mc:Fallback>
+            <p:sp>
+              <p:nvSpPr>
+                <p:cNvPr id="110" name="TextBox 109">
+                  <a:extLst>
+                    <a:ext uri="{FF2B5EF4-FFF2-40B4-BE49-F238E27FC236}">
+                      <a16:creationId xmlns:a16="http://schemas.microsoft.com/office/drawing/2014/main" id="{E140AAD7-431B-1244-8F4C-1A27A7E5CD89}"/>
+                    </a:ext>
+                  </a:extLst>
+                </p:cNvPr>
+                <p:cNvSpPr txBox="1">
+                  <a:spLocks noRot="1" noChangeAspect="1" noMove="1" noResize="1" noEditPoints="1" noAdjustHandles="1" noChangeArrowheads="1" noChangeShapeType="1" noTextEdit="1"/>
+                </p:cNvSpPr>
+                <p:nvPr/>
+              </p:nvSpPr>
+              <p:spPr>
+                <a:xfrm>
+                  <a:off x="3119914" y="2214302"/>
+                  <a:ext cx="5711787" cy="1309439"/>
+                </a:xfrm>
+                <a:prstGeom prst="rect">
+                  <a:avLst/>
+                </a:prstGeom>
+                <a:blipFill>
+                  <a:blip r:embed="rId7"/>
+                  <a:stretch>
+                    <a:fillRect t="-2083" b="-6250"/>
+                  </a:stretch>
+                </a:blipFill>
+              </p:spPr>
+              <p:txBody>
+                <a:bodyPr/>
+                <a:lstStyle/>
+                <a:p>
+                  <a:r>
+                    <a:rPr lang="en-US">
+                      <a:noFill/>
+                    </a:rPr>
+                    <a:t> </a:t>
+                  </a:r>
+                </a:p>
+              </p:txBody>
+            </p:sp>
+          </mc:Fallback>
+        </mc:AlternateContent>
+        <mc:AlternateContent xmlns:mc="http://schemas.openxmlformats.org/markup-compatibility/2006">
+          <mc:Choice xmlns:a14="http://schemas.microsoft.com/office/drawing/2010/main" Requires="a14">
+            <p:sp>
+              <p:nvSpPr>
+                <p:cNvPr id="111" name="TextBox 110">
+                  <a:extLst>
+                    <a:ext uri="{FF2B5EF4-FFF2-40B4-BE49-F238E27FC236}">
+                      <a16:creationId xmlns:a16="http://schemas.microsoft.com/office/drawing/2014/main" id="{F46861FF-D453-C349-AB2A-49C4BAB40FD6}"/>
+                    </a:ext>
+                  </a:extLst>
+                </p:cNvPr>
+                <p:cNvSpPr txBox="1"/>
+                <p:nvPr/>
+              </p:nvSpPr>
+              <p:spPr>
+                <a:xfrm>
+                  <a:off x="3127402" y="578915"/>
+                  <a:ext cx="5997387" cy="1309439"/>
+                </a:xfrm>
+                <a:prstGeom prst="rect">
+                  <a:avLst/>
+                </a:prstGeom>
+                <a:noFill/>
+              </p:spPr>
+              <p:txBody>
+                <a:bodyPr wrap="square" rtlCol="0">
+                  <a:spAutoFit/>
+                </a:bodyPr>
+                <a:lstStyle/>
+                <a:p>
+                  <a:pPr algn="ctr"/>
+                  <a:r>
+                    <a:rPr lang="en-US" b="1" i="1" dirty="0"/>
+                    <a:t>Fire Triggered</a:t>
+                  </a:r>
+                </a:p>
+                <a:p>
+                  <a:pPr algn="ctr"/>
+                  <a:r>
+                    <a:rPr lang="en-US" i="1" dirty="0" err="1"/>
+                    <a:t>FutureTriggeredTransitions</a:t>
+                  </a:r>
+                  <a:endParaRPr lang="en-US" i="1" dirty="0"/>
+                </a:p>
+                <a:p>
+                  <a:pPr algn="ctr"/>
+                  <a:r>
+                    <a:rPr lang="en-US" dirty="0" err="1"/>
+                    <a:t>uc</a:t>
+                  </a:r>
+                  <a:r>
+                    <a:rPr lang="en-US" dirty="0"/>
+                    <a:t> = FALSE &amp; dt </a:t>
+                  </a:r>
+                  <a14:m>
+                    <m:oMath xmlns:m="http://schemas.openxmlformats.org/officeDocument/2006/math">
+                      <m:r>
+                        <a:rPr lang="en-US" i="1" smtClean="0">
+                          <a:latin typeface="Cambria Math" panose="02040503050406030204" pitchFamily="18" charset="0"/>
+                          <a:ea typeface="Cambria Math" panose="02040503050406030204" pitchFamily="18" charset="0"/>
+                        </a:rPr>
+                        <m:t>≠</m:t>
+                      </m:r>
+                    </m:oMath>
+                  </a14:m>
+                  <a:r>
+                    <a:rPr lang="en-US" dirty="0"/>
+                    <a:t> </a:t>
+                  </a:r>
+                  <a14:m>
+                    <m:oMath xmlns:m="http://schemas.openxmlformats.org/officeDocument/2006/math">
+                      <m:r>
+                        <a:rPr lang="en-US" i="1" smtClean="0">
+                          <a:latin typeface="Cambria Math" panose="02040503050406030204" pitchFamily="18" charset="0"/>
+                          <a:ea typeface="Cambria Math" panose="02040503050406030204" pitchFamily="18" charset="0"/>
+                        </a:rPr>
+                        <m:t>∅</m:t>
+                      </m:r>
+                    </m:oMath>
+                  </a14:m>
+                  <a:endParaRPr lang="en-US" dirty="0">
+                    <a:ea typeface="Cambria Math" panose="02040503050406030204" pitchFamily="18" charset="0"/>
+                  </a:endParaRPr>
+                </a:p>
+                <a:p>
+                  <a:pPr algn="ctr"/>
+                  <a:r>
+                    <a:rPr lang="en-US" dirty="0"/>
+                    <a:t>/ dt := </a:t>
+                  </a:r>
+                  <a14:m>
+                    <m:oMath xmlns:m="http://schemas.openxmlformats.org/officeDocument/2006/math">
+                      <m:r>
+                        <a:rPr lang="en-US" i="1">
+                          <a:latin typeface="Cambria Math" panose="02040503050406030204" pitchFamily="18" charset="0"/>
+                          <a:ea typeface="Cambria Math" panose="02040503050406030204" pitchFamily="18" charset="0"/>
+                        </a:rPr>
+                        <m:t>∅</m:t>
+                      </m:r>
+                    </m:oMath>
+                  </a14:m>
+                  <a:r>
+                    <a:rPr lang="en-US" dirty="0"/>
+                    <a:t> &amp; iQ := </a:t>
+                  </a:r>
+                  <a:r>
+                    <a:rPr lang="en-US" dirty="0" err="1"/>
+                    <a:t>iQ</a:t>
+                  </a:r>
+                  <a:r>
+                    <a:rPr lang="en-US" dirty="0"/>
+                    <a:t> </a:t>
+                  </a:r>
+                  <a14:m>
+                    <m:oMath xmlns:m="http://schemas.openxmlformats.org/officeDocument/2006/math">
+                      <m:r>
+                        <a:rPr lang="en-US" i="1">
+                          <a:latin typeface="Cambria Math" panose="02040503050406030204" pitchFamily="18" charset="0"/>
+                          <a:ea typeface="Cambria Math" panose="02040503050406030204" pitchFamily="18" charset="0"/>
+                        </a:rPr>
+                        <m:t>∪ </m:t>
+                      </m:r>
+                    </m:oMath>
+                  </a14:m>
+                  <a:r>
+                    <a:rPr lang="en-US" dirty="0" err="1"/>
+                    <a:t>raisedTriggers</a:t>
+                  </a:r>
+                  <a:endParaRPr lang="en-US" dirty="0"/>
+                </a:p>
+              </p:txBody>
+            </p:sp>
+          </mc:Choice>
+          <mc:Fallback>
+            <p:sp>
+              <p:nvSpPr>
+                <p:cNvPr id="111" name="TextBox 110">
+                  <a:extLst>
+                    <a:ext uri="{FF2B5EF4-FFF2-40B4-BE49-F238E27FC236}">
+                      <a16:creationId xmlns:a16="http://schemas.microsoft.com/office/drawing/2014/main" id="{F46861FF-D453-C349-AB2A-49C4BAB40FD6}"/>
+                    </a:ext>
+                  </a:extLst>
+                </p:cNvPr>
+                <p:cNvSpPr txBox="1">
+                  <a:spLocks noRot="1" noChangeAspect="1" noMove="1" noResize="1" noEditPoints="1" noAdjustHandles="1" noChangeArrowheads="1" noChangeShapeType="1" noTextEdit="1"/>
+                </p:cNvSpPr>
+                <p:nvPr/>
+              </p:nvSpPr>
+              <p:spPr>
+                <a:xfrm>
+                  <a:off x="3127402" y="578915"/>
+                  <a:ext cx="5997387" cy="1309439"/>
+                </a:xfrm>
+                <a:prstGeom prst="rect">
+                  <a:avLst/>
+                </a:prstGeom>
+                <a:blipFill>
+                  <a:blip r:embed="rId8"/>
+                  <a:stretch>
+                    <a:fillRect t="-2083" b="-6250"/>
+                  </a:stretch>
+                </a:blipFill>
+              </p:spPr>
+              <p:txBody>
+                <a:bodyPr/>
+                <a:lstStyle/>
+                <a:p>
+                  <a:r>
+                    <a:rPr lang="en-US">
+                      <a:noFill/>
+                    </a:rPr>
+                    <a:t> </a:t>
+                  </a:r>
+                </a:p>
+              </p:txBody>
+            </p:sp>
+          </mc:Fallback>
+        </mc:AlternateContent>
+        <mc:AlternateContent xmlns:mc="http://schemas.openxmlformats.org/markup-compatibility/2006">
+          <mc:Choice xmlns:a14="http://schemas.microsoft.com/office/drawing/2010/main" Requires="a14">
+            <p:sp>
+              <p:nvSpPr>
+                <p:cNvPr id="117" name="TextBox 116">
+                  <a:extLst>
+                    <a:ext uri="{FF2B5EF4-FFF2-40B4-BE49-F238E27FC236}">
+                      <a16:creationId xmlns:a16="http://schemas.microsoft.com/office/drawing/2014/main" id="{2C50F20A-6C64-5340-82C6-B08C4A906684}"/>
+                    </a:ext>
+                  </a:extLst>
+                </p:cNvPr>
+                <p:cNvSpPr txBox="1"/>
+                <p:nvPr/>
+              </p:nvSpPr>
+              <p:spPr>
+                <a:xfrm>
+                  <a:off x="9648883" y="2247174"/>
+                  <a:ext cx="6930491" cy="1309439"/>
+                </a:xfrm>
+                <a:prstGeom prst="rect">
+                  <a:avLst/>
+                </a:prstGeom>
+                <a:noFill/>
+              </p:spPr>
+              <p:txBody>
+                <a:bodyPr wrap="square" rtlCol="0">
+                  <a:spAutoFit/>
+                </a:bodyPr>
+                <a:lstStyle/>
+                <a:p>
+                  <a:pPr algn="ctr"/>
+                  <a:r>
+                    <a:rPr lang="en-US" b="1" i="1" dirty="0"/>
+                    <a:t>Fire Untriggered</a:t>
+                  </a:r>
+                </a:p>
+                <a:p>
+                  <a:pPr algn="ctr"/>
+                  <a:r>
+                    <a:rPr lang="en-US" i="1" dirty="0" err="1"/>
+                    <a:t>fututeUntriggeredTransitionSet</a:t>
+                  </a:r>
+                  <a:endParaRPr lang="en-US" i="1" dirty="0"/>
+                </a:p>
+                <a:p>
+                  <a:pPr algn="ctr"/>
+                  <a:r>
+                    <a:rPr lang="en-US" dirty="0" err="1"/>
+                    <a:t>uc</a:t>
+                  </a:r>
+                  <a:r>
+                    <a:rPr lang="en-US" dirty="0"/>
+                    <a:t> = FALSE &amp; dt = </a:t>
+                  </a:r>
+                  <a14:m>
+                    <m:oMath xmlns:m="http://schemas.openxmlformats.org/officeDocument/2006/math">
+                      <m:r>
+                        <a:rPr lang="en-US" i="1" smtClean="0">
+                          <a:latin typeface="Cambria Math" panose="02040503050406030204" pitchFamily="18" charset="0"/>
+                          <a:ea typeface="Cambria Math" panose="02040503050406030204" pitchFamily="18" charset="0"/>
+                        </a:rPr>
+                        <m:t>∅</m:t>
+                      </m:r>
+                    </m:oMath>
+                  </a14:m>
+                  <a:endParaRPr lang="en-US" dirty="0"/>
+                </a:p>
+                <a:p>
+                  <a:pPr algn="ctr"/>
+                  <a:r>
+                    <a:rPr lang="en-US" dirty="0"/>
+                    <a:t>/ </a:t>
+                  </a:r>
+                  <a:r>
+                    <a:rPr lang="en-US" dirty="0" err="1"/>
+                    <a:t>iQ</a:t>
+                  </a:r>
+                  <a:r>
+                    <a:rPr lang="en-US" dirty="0"/>
+                    <a:t> := </a:t>
+                  </a:r>
+                  <a:r>
+                    <a:rPr lang="en-US" dirty="0" err="1"/>
+                    <a:t>iQ</a:t>
+                  </a:r>
+                  <a:r>
+                    <a:rPr lang="en-US" dirty="0"/>
+                    <a:t> </a:t>
+                  </a:r>
+                  <a14:m>
+                    <m:oMath xmlns:m="http://schemas.openxmlformats.org/officeDocument/2006/math">
+                      <m:r>
+                        <a:rPr lang="en-US" i="1" smtClean="0">
+                          <a:latin typeface="Cambria Math" panose="02040503050406030204" pitchFamily="18" charset="0"/>
+                          <a:ea typeface="Cambria Math" panose="02040503050406030204" pitchFamily="18" charset="0"/>
+                        </a:rPr>
+                        <m:t>∪</m:t>
+                      </m:r>
+                      <m:r>
+                        <a:rPr lang="en-US" b="0" i="1" smtClean="0">
+                          <a:latin typeface="Cambria Math" panose="02040503050406030204" pitchFamily="18" charset="0"/>
+                          <a:ea typeface="Cambria Math" panose="02040503050406030204" pitchFamily="18" charset="0"/>
+                        </a:rPr>
+                        <m:t> </m:t>
+                      </m:r>
+                    </m:oMath>
+                  </a14:m>
+                  <a:r>
+                    <a:rPr lang="en-US" dirty="0" err="1"/>
+                    <a:t>raisedTriggers</a:t>
+                  </a:r>
+                  <a:endParaRPr lang="en-US" dirty="0"/>
+                </a:p>
+              </p:txBody>
+            </p:sp>
+          </mc:Choice>
+          <mc:Fallback>
+            <p:sp>
+              <p:nvSpPr>
+                <p:cNvPr id="117" name="TextBox 116">
+                  <a:extLst>
+                    <a:ext uri="{FF2B5EF4-FFF2-40B4-BE49-F238E27FC236}">
+                      <a16:creationId xmlns:a16="http://schemas.microsoft.com/office/drawing/2014/main" id="{2C50F20A-6C64-5340-82C6-B08C4A906684}"/>
+                    </a:ext>
+                  </a:extLst>
+                </p:cNvPr>
+                <p:cNvSpPr txBox="1">
+                  <a:spLocks noRot="1" noChangeAspect="1" noMove="1" noResize="1" noEditPoints="1" noAdjustHandles="1" noChangeArrowheads="1" noChangeShapeType="1" noTextEdit="1"/>
+                </p:cNvSpPr>
+                <p:nvPr/>
+              </p:nvSpPr>
+              <p:spPr>
+                <a:xfrm>
+                  <a:off x="9648883" y="2247174"/>
+                  <a:ext cx="6930491" cy="1309439"/>
+                </a:xfrm>
+                <a:prstGeom prst="rect">
+                  <a:avLst/>
+                </a:prstGeom>
+                <a:blipFill>
+                  <a:blip r:embed="rId9"/>
+                  <a:stretch>
+                    <a:fillRect t="-1042" b="-7292"/>
+                  </a:stretch>
+                </a:blipFill>
+              </p:spPr>
+              <p:txBody>
+                <a:bodyPr/>
+                <a:lstStyle/>
+                <a:p>
+                  <a:r>
+                    <a:rPr lang="en-US">
+                      <a:noFill/>
+                    </a:rPr>
+                    <a:t> </a:t>
+                  </a:r>
+                </a:p>
+              </p:txBody>
+            </p:sp>
+          </mc:Fallback>
+        </mc:AlternateContent>
+        <mc:AlternateContent xmlns:mc="http://schemas.openxmlformats.org/markup-compatibility/2006">
+          <mc:Choice xmlns:a14="http://schemas.microsoft.com/office/drawing/2010/main" Requires="a14">
+            <p:sp>
+              <p:nvSpPr>
+                <p:cNvPr id="118" name="TextBox 117">
+                  <a:extLst>
+                    <a:ext uri="{FF2B5EF4-FFF2-40B4-BE49-F238E27FC236}">
+                      <a16:creationId xmlns:a16="http://schemas.microsoft.com/office/drawing/2014/main" id="{DAB51B5B-165F-6E4C-9C8E-1DB5E972A147}"/>
+                    </a:ext>
+                  </a:extLst>
+                </p:cNvPr>
+                <p:cNvSpPr txBox="1"/>
+                <p:nvPr/>
+              </p:nvSpPr>
+              <p:spPr>
+                <a:xfrm>
+                  <a:off x="11214298" y="592008"/>
+                  <a:ext cx="5052701" cy="705083"/>
+                </a:xfrm>
+                <a:prstGeom prst="rect">
+                  <a:avLst/>
+                </a:prstGeom>
+                <a:noFill/>
+              </p:spPr>
+              <p:txBody>
+                <a:bodyPr wrap="none" rtlCol="0">
+                  <a:spAutoFit/>
+                </a:bodyPr>
+                <a:lstStyle/>
+                <a:p>
+                  <a:pPr algn="ctr"/>
+                  <a:r>
+                    <a:rPr lang="en-US" i="1" dirty="0"/>
+                    <a:t>Initialisation</a:t>
+                  </a:r>
+                </a:p>
+                <a:p>
+                  <a:pPr algn="ctr"/>
+                  <a:r>
+                    <a:rPr lang="en-US" dirty="0"/>
+                    <a:t>/ </a:t>
+                  </a:r>
+                  <a:r>
+                    <a:rPr lang="en-US" dirty="0" err="1"/>
+                    <a:t>uc</a:t>
+                  </a:r>
+                  <a:r>
+                    <a:rPr lang="en-US" dirty="0"/>
+                    <a:t> := FALSE &amp; dt := </a:t>
+                  </a:r>
+                  <a14:m>
+                    <m:oMath xmlns:m="http://schemas.openxmlformats.org/officeDocument/2006/math">
+                      <m:r>
+                        <a:rPr lang="en-US" i="1" smtClean="0">
+                          <a:latin typeface="Cambria Math" panose="02040503050406030204" pitchFamily="18" charset="0"/>
+                          <a:ea typeface="Cambria Math" panose="02040503050406030204" pitchFamily="18" charset="0"/>
+                        </a:rPr>
+                        <m:t>∅</m:t>
+                      </m:r>
+                      <m:r>
+                        <a:rPr lang="en-US" b="0" i="0" smtClean="0">
+                          <a:latin typeface="Cambria Math" panose="02040503050406030204" pitchFamily="18" charset="0"/>
+                          <a:ea typeface="Cambria Math" panose="02040503050406030204" pitchFamily="18" charset="0"/>
+                        </a:rPr>
+                        <m:t> </m:t>
+                      </m:r>
+                    </m:oMath>
+                  </a14:m>
+                  <a:r>
+                    <a:rPr lang="en-US" dirty="0"/>
+                    <a:t>&amp; </a:t>
+                  </a:r>
+                  <a:r>
+                    <a:rPr lang="en-US" dirty="0" err="1"/>
+                    <a:t>iQ</a:t>
+                  </a:r>
+                  <a:r>
+                    <a:rPr lang="en-US" dirty="0"/>
+                    <a:t> := </a:t>
+                  </a:r>
+                  <a14:m>
+                    <m:oMath xmlns:m="http://schemas.openxmlformats.org/officeDocument/2006/math">
+                      <m:r>
+                        <a:rPr lang="en-US" i="1">
+                          <a:latin typeface="Cambria Math" panose="02040503050406030204" pitchFamily="18" charset="0"/>
+                          <a:ea typeface="Cambria Math" panose="02040503050406030204" pitchFamily="18" charset="0"/>
+                        </a:rPr>
+                        <m:t>∅</m:t>
+                      </m:r>
+                    </m:oMath>
+                  </a14:m>
+                  <a:r>
+                    <a:rPr lang="en-US" dirty="0"/>
+                    <a:t> &amp; </a:t>
+                  </a:r>
+                  <a:r>
+                    <a:rPr lang="en-US" dirty="0" err="1"/>
+                    <a:t>eQ</a:t>
                   </a:r>
                   <a:r>
                     <a:rPr lang="en-US" dirty="0"/>
@@ -21600,8 +23718,8 @@
               </p:nvSpPr>
               <p:spPr>
                 <a:xfrm>
-                  <a:off x="11422944" y="592008"/>
-                  <a:ext cx="4635404" cy="1007112"/>
+                  <a:off x="11214298" y="592008"/>
+                  <a:ext cx="5052701" cy="705083"/>
                 </a:xfrm>
                 <a:prstGeom prst="rect">
                   <a:avLst/>
@@ -21609,7 +23727,7 @@
                 <a:blipFill>
                   <a:blip r:embed="rId10"/>
                   <a:stretch>
-                    <a:fillRect l="-669" t="-2703" b="-8108"/>
+                    <a:fillRect l="-615" t="-3846" b="-13462"/>
                   </a:stretch>
                 </a:blipFill>
               </p:spPr>
@@ -21632,7 +23750,7 @@
     </p:spTree>
     <p:extLst>
       <p:ext uri="{BB962C8B-B14F-4D97-AF65-F5344CB8AC3E}">
-        <p14:creationId xmlns:p14="http://schemas.microsoft.com/office/powerpoint/2010/main" val="1159254917"/>
+        <p14:creationId xmlns:p14="http://schemas.microsoft.com/office/powerpoint/2010/main" val="2463922579"/>
       </p:ext>
     </p:extLst>
   </p:cSld>

</xml_diff>

<commit_message>
Changes to basis figure base on meeting notes
</commit_message>
<xml_diff>
--- a/manuscripts/ABZ2020/source/figures/Diagrams.pptx
+++ b/manuscripts/ABZ2020/source/figures/Diagrams.pptx
@@ -13,7 +13,7 @@
     <p:sldId id="260" r:id="rId4"/>
     <p:sldId id="261" r:id="rId5"/>
     <p:sldId id="262" r:id="rId6"/>
-    <p:sldId id="267" r:id="rId7"/>
+    <p:sldId id="268" r:id="rId7"/>
   </p:sldIdLst>
   <p:sldSz cx="12192000" cy="6858000"/>
   <p:notesSz cx="6858000" cy="9144000"/>
@@ -543,7 +543,7 @@
     </p:spTree>
     <p:extLst>
       <p:ext uri="{BB962C8B-B14F-4D97-AF65-F5344CB8AC3E}">
-        <p14:creationId xmlns:p14="http://schemas.microsoft.com/office/powerpoint/2010/main" val="3921210645"/>
+        <p14:creationId xmlns:p14="http://schemas.microsoft.com/office/powerpoint/2010/main" val="3262629218"/>
       </p:ext>
     </p:extLst>
   </p:cSld>
@@ -17631,725 +17631,2129 @@
       </p:grpSpPr>
       <p:grpSp>
         <p:nvGrpSpPr>
-          <p:cNvPr id="125" name="Group 124">
+          <p:cNvPr id="59" name="Group 58">
             <a:extLst>
               <a:ext uri="{FF2B5EF4-FFF2-40B4-BE49-F238E27FC236}">
-                <a16:creationId xmlns:a16="http://schemas.microsoft.com/office/drawing/2014/main" id="{E50C8548-2F9B-9847-AD63-830C6525FC68}"/>
+                <a16:creationId xmlns:a16="http://schemas.microsoft.com/office/drawing/2014/main" id="{C7674BC2-B4D5-8945-955A-8C651589A57D}"/>
               </a:ext>
             </a:extLst>
           </p:cNvPr>
-          <p:cNvGrpSpPr>
-            <a:grpSpLocks noChangeAspect="1"/>
-          </p:cNvGrpSpPr>
+          <p:cNvGrpSpPr/>
           <p:nvPr/>
         </p:nvGrpSpPr>
         <p:grpSpPr>
           <a:xfrm>
-            <a:off x="-3181087" y="-298074"/>
-            <a:ext cx="16577182" cy="8592316"/>
-            <a:chOff x="-3316582" y="-37460"/>
-            <a:chExt cx="20322518" cy="9373359"/>
+            <a:off x="-1914524" y="-1016100"/>
+            <a:ext cx="15533849" cy="9548393"/>
+            <a:chOff x="-1914524" y="-1016100"/>
+            <a:chExt cx="15533849" cy="9548393"/>
           </a:xfrm>
         </p:grpSpPr>
-        <p:sp>
-          <p:nvSpPr>
-            <p:cNvPr id="101" name="TextBox 100">
+        <p:grpSp>
+          <p:nvGrpSpPr>
+            <p:cNvPr id="57" name="Group 56">
               <a:extLst>
                 <a:ext uri="{FF2B5EF4-FFF2-40B4-BE49-F238E27FC236}">
-                  <a16:creationId xmlns:a16="http://schemas.microsoft.com/office/drawing/2014/main" id="{C486168B-9B5B-8E4A-94C2-943BFE7C38F6}"/>
+                  <a16:creationId xmlns:a16="http://schemas.microsoft.com/office/drawing/2014/main" id="{9F5FE43C-C4FE-CF4E-899A-DE0477FCD68E}"/>
                 </a:ext>
               </a:extLst>
             </p:cNvPr>
-            <p:cNvSpPr txBox="1"/>
+            <p:cNvGrpSpPr/>
             <p:nvPr/>
-          </p:nvSpPr>
-          <p:spPr>
+          </p:nvGrpSpPr>
+          <p:grpSpPr>
             <a:xfrm>
-              <a:off x="1103031" y="-37460"/>
-              <a:ext cx="15902905" cy="4633399"/>
+              <a:off x="-1914524" y="-1016100"/>
+              <a:ext cx="15533849" cy="8365733"/>
+              <a:chOff x="-1914524" y="-1016100"/>
+              <a:chExt cx="15533849" cy="8365733"/>
             </a:xfrm>
-            <a:prstGeom prst="rect">
-              <a:avLst/>
-            </a:prstGeom>
-            <a:solidFill>
-              <a:schemeClr val="accent6">
-                <a:lumMod val="20000"/>
-                <a:lumOff val="80000"/>
-              </a:schemeClr>
-            </a:solidFill>
-            <a:ln w="38100">
-              <a:solidFill>
+          </p:grpSpPr>
+          <p:grpSp>
+            <p:nvGrpSpPr>
+              <p:cNvPr id="34" name="Group 33">
+                <a:extLst>
+                  <a:ext uri="{FF2B5EF4-FFF2-40B4-BE49-F238E27FC236}">
+                    <a16:creationId xmlns:a16="http://schemas.microsoft.com/office/drawing/2014/main" id="{00C6BE3F-168E-1D47-B1ED-43BF027DAE67}"/>
+                  </a:ext>
+                </a:extLst>
+              </p:cNvPr>
+              <p:cNvGrpSpPr/>
+              <p:nvPr/>
+            </p:nvGrpSpPr>
+            <p:grpSpPr>
+              <a:xfrm>
+                <a:off x="-1914524" y="-1016100"/>
+                <a:ext cx="15533849" cy="8365733"/>
+                <a:chOff x="-1914524" y="-1030387"/>
+                <a:chExt cx="15533849" cy="8365733"/>
+              </a:xfrm>
+            </p:grpSpPr>
+            <p:grpSp>
+              <p:nvGrpSpPr>
+                <p:cNvPr id="125" name="Group 124">
+                  <a:extLst>
+                    <a:ext uri="{FF2B5EF4-FFF2-40B4-BE49-F238E27FC236}">
+                      <a16:creationId xmlns:a16="http://schemas.microsoft.com/office/drawing/2014/main" id="{E50C8548-2F9B-9847-AD63-830C6525FC68}"/>
+                    </a:ext>
+                  </a:extLst>
+                </p:cNvPr>
+                <p:cNvGrpSpPr>
+                  <a:grpSpLocks noChangeAspect="1"/>
+                </p:cNvGrpSpPr>
+                <p:nvPr/>
+              </p:nvGrpSpPr>
+              <p:grpSpPr>
+                <a:xfrm>
+                  <a:off x="-1914524" y="-1030387"/>
+                  <a:ext cx="15533849" cy="8365116"/>
+                  <a:chOff x="-1763861" y="-836342"/>
+                  <a:chExt cx="19043459" cy="9125507"/>
+                </a:xfrm>
+              </p:grpSpPr>
+              <p:sp>
+                <p:nvSpPr>
+                  <p:cNvPr id="101" name="TextBox 100">
+                    <a:extLst>
+                      <a:ext uri="{FF2B5EF4-FFF2-40B4-BE49-F238E27FC236}">
+                        <a16:creationId xmlns:a16="http://schemas.microsoft.com/office/drawing/2014/main" id="{C486168B-9B5B-8E4A-94C2-943BFE7C38F6}"/>
+                      </a:ext>
+                    </a:extLst>
+                  </p:cNvPr>
+                  <p:cNvSpPr txBox="1"/>
+                  <p:nvPr/>
+                </p:nvSpPr>
+                <p:spPr>
+                  <a:xfrm>
+                    <a:off x="-1496994" y="-836342"/>
+                    <a:ext cx="17984292" cy="5137029"/>
+                  </a:xfrm>
+                  <a:prstGeom prst="rect">
+                    <a:avLst/>
+                  </a:prstGeom>
+                  <a:solidFill>
+                    <a:schemeClr val="accent6">
+                      <a:lumMod val="20000"/>
+                      <a:lumOff val="80000"/>
+                    </a:schemeClr>
+                  </a:solidFill>
+                  <a:ln w="38100">
+                    <a:solidFill>
+                      <a:schemeClr val="tx1"/>
+                    </a:solidFill>
+                    <a:prstDash val="dash"/>
+                  </a:ln>
+                </p:spPr>
+                <p:txBody>
+                  <a:bodyPr wrap="square" rtlCol="0">
+                    <a:spAutoFit/>
+                  </a:bodyPr>
+                  <a:lstStyle/>
+                  <a:p>
+                    <a:pPr algn="ctr"/>
+                    <a:r>
+                      <a:rPr lang="en-US" sz="2400" b="1" i="1" dirty="0"/>
+                      <a:t>Firing Transitions</a:t>
+                    </a:r>
+                  </a:p>
+                  <a:p>
+                    <a:pPr algn="ctr"/>
+                    <a:endParaRPr lang="en-US" sz="2200" b="1" i="1" dirty="0"/>
+                  </a:p>
+                  <a:p>
+                    <a:pPr algn="ctr"/>
+                    <a:endParaRPr lang="en-US" sz="2200" b="1" i="1" dirty="0"/>
+                  </a:p>
+                  <a:p>
+                    <a:pPr algn="ctr"/>
+                    <a:endParaRPr lang="en-US" sz="2200" b="1" i="1" dirty="0"/>
+                  </a:p>
+                  <a:p>
+                    <a:pPr algn="ctr"/>
+                    <a:endParaRPr lang="en-US" sz="1400" b="1" i="1" dirty="0"/>
+                  </a:p>
+                  <a:p>
+                    <a:pPr algn="ctr"/>
+                    <a:endParaRPr lang="en-US" sz="1200" b="1" i="1" dirty="0"/>
+                  </a:p>
+                  <a:p>
+                    <a:pPr algn="ctr"/>
+                    <a:endParaRPr lang="en-US" sz="1200" b="1" i="1" dirty="0"/>
+                  </a:p>
+                  <a:p>
+                    <a:pPr algn="ctr"/>
+                    <a:endParaRPr lang="en-US" sz="1200" dirty="0"/>
+                  </a:p>
+                  <a:p>
+                    <a:pPr algn="ctr"/>
+                    <a:endParaRPr lang="en-US" dirty="0"/>
+                  </a:p>
+                  <a:p>
+                    <a:pPr algn="ctr"/>
+                    <a:endParaRPr lang="en-US" dirty="0"/>
+                  </a:p>
+                  <a:p>
+                    <a:pPr algn="ctr"/>
+                    <a:endParaRPr lang="en-US" dirty="0"/>
+                  </a:p>
+                  <a:p>
+                    <a:pPr algn="ctr"/>
+                    <a:endParaRPr lang="en-US" dirty="0"/>
+                  </a:p>
+                  <a:p>
+                    <a:pPr algn="ctr"/>
+                    <a:endParaRPr lang="en-US" dirty="0"/>
+                  </a:p>
+                  <a:p>
+                    <a:pPr algn="ctr"/>
+                    <a:endParaRPr lang="en-US" dirty="0"/>
+                  </a:p>
+                  <a:p>
+                    <a:pPr algn="ctr"/>
+                    <a:endParaRPr lang="en-US" dirty="0"/>
+                  </a:p>
+                  <a:p>
+                    <a:pPr algn="ctr"/>
+                    <a:endParaRPr lang="en-US" dirty="0"/>
+                  </a:p>
+                  <a:p>
+                    <a:pPr algn="ctr"/>
+                    <a:endParaRPr lang="en-US" dirty="0"/>
+                  </a:p>
+                </p:txBody>
+              </p:sp>
+              <p:sp>
+                <p:nvSpPr>
+                  <p:cNvPr id="2" name="TextBox 1">
+                    <a:extLst>
+                      <a:ext uri="{FF2B5EF4-FFF2-40B4-BE49-F238E27FC236}">
+                        <a16:creationId xmlns:a16="http://schemas.microsoft.com/office/drawing/2014/main" id="{971FA984-4077-6D4B-9E4F-F7ACBF2CCD98}"/>
+                      </a:ext>
+                    </a:extLst>
+                  </p:cNvPr>
+                  <p:cNvSpPr txBox="1"/>
+                  <p:nvPr/>
+                </p:nvSpPr>
+                <p:spPr>
+                  <a:xfrm>
+                    <a:off x="-919086" y="634917"/>
+                    <a:ext cx="2794578" cy="3323960"/>
+                  </a:xfrm>
+                  <a:prstGeom prst="rect">
+                    <a:avLst/>
+                  </a:prstGeom>
+                  <a:solidFill>
+                    <a:srgbClr val="92D050"/>
+                  </a:solidFill>
+                  <a:ln w="25400">
+                    <a:solidFill>
+                      <a:schemeClr val="tx1"/>
+                    </a:solidFill>
+                  </a:ln>
+                </p:spPr>
+                <p:txBody>
+                  <a:bodyPr wrap="square" rtlCol="0">
+                    <a:spAutoFit/>
+                  </a:bodyPr>
+                  <a:lstStyle/>
+                  <a:p>
+                    <a:pPr algn="ctr"/>
+                    <a:endParaRPr lang="en-US" sz="1600" dirty="0"/>
+                  </a:p>
+                  <a:p>
+                    <a:pPr algn="ctr"/>
+                    <a:endParaRPr lang="en-US" sz="1600" dirty="0"/>
+                  </a:p>
+                  <a:p>
+                    <a:pPr algn="ctr"/>
+                    <a:endParaRPr lang="en-US" sz="1600" dirty="0"/>
+                  </a:p>
+                  <a:p>
+                    <a:pPr algn="ctr"/>
+                    <a:endParaRPr lang="en-US" sz="2400" dirty="0"/>
+                  </a:p>
+                  <a:p>
+                    <a:pPr algn="ctr"/>
+                    <a:r>
+                      <a:rPr lang="en-US" sz="2400" dirty="0"/>
+                      <a:t>FIRING</a:t>
+                    </a:r>
+                  </a:p>
+                  <a:p>
+                    <a:pPr algn="ctr"/>
+                    <a:r>
+                      <a:rPr lang="en-US" sz="2400" dirty="0"/>
+                      <a:t>TRIGGERED</a:t>
+                    </a:r>
+                  </a:p>
+                  <a:p>
+                    <a:pPr algn="ctr"/>
+                    <a:endParaRPr lang="en-US" sz="2400" dirty="0"/>
+                  </a:p>
+                  <a:p>
+                    <a:pPr algn="ctr"/>
+                    <a:endParaRPr lang="en-US" sz="2400" dirty="0"/>
+                  </a:p>
+                  <a:p>
+                    <a:pPr algn="ctr"/>
+                    <a:endParaRPr lang="en-US" sz="2400" dirty="0"/>
+                  </a:p>
+                </p:txBody>
+              </p:sp>
+              <p:sp>
+                <p:nvSpPr>
+                  <p:cNvPr id="3" name="TextBox 2">
+                    <a:extLst>
+                      <a:ext uri="{FF2B5EF4-FFF2-40B4-BE49-F238E27FC236}">
+                        <a16:creationId xmlns:a16="http://schemas.microsoft.com/office/drawing/2014/main" id="{F42D3D35-1962-DB48-980A-68C922E31B52}"/>
+                      </a:ext>
+                    </a:extLst>
+                  </p:cNvPr>
+                  <p:cNvSpPr txBox="1"/>
+                  <p:nvPr/>
+                </p:nvSpPr>
+                <p:spPr>
+                  <a:xfrm>
+                    <a:off x="8540513" y="678749"/>
+                    <a:ext cx="2665777" cy="3290384"/>
+                  </a:xfrm>
+                  <a:prstGeom prst="rect">
+                    <a:avLst/>
+                  </a:prstGeom>
+                  <a:solidFill>
+                    <a:srgbClr val="92D050"/>
+                  </a:solidFill>
+                  <a:ln w="25400">
+                    <a:solidFill>
+                      <a:schemeClr val="tx1"/>
+                    </a:solidFill>
+                  </a:ln>
+                </p:spPr>
+                <p:txBody>
+                  <a:bodyPr wrap="square" rtlCol="0">
+                    <a:spAutoFit/>
+                  </a:bodyPr>
+                  <a:lstStyle/>
+                  <a:p>
+                    <a:pPr algn="ctr"/>
+                    <a:endParaRPr lang="en-US" sz="2400" dirty="0"/>
+                  </a:p>
+                  <a:p>
+                    <a:pPr algn="ctr"/>
+                    <a:endParaRPr lang="en-US" sz="2400" dirty="0"/>
+                  </a:p>
+                  <a:p>
+                    <a:pPr algn="ctr"/>
+                    <a:endParaRPr lang="en-US" sz="2400" dirty="0"/>
+                  </a:p>
+                  <a:p>
+                    <a:pPr algn="ctr"/>
+                    <a:r>
+                      <a:rPr lang="en-US" sz="2400" dirty="0"/>
+                      <a:t>FIRING</a:t>
+                    </a:r>
+                  </a:p>
+                  <a:p>
+                    <a:pPr algn="ctr"/>
+                    <a:r>
+                      <a:rPr lang="en-US" sz="2400" dirty="0"/>
+                      <a:t>UN-TRIGGERED</a:t>
+                    </a:r>
+                  </a:p>
+                  <a:p>
+                    <a:pPr algn="ctr"/>
+                    <a:endParaRPr lang="en-US" sz="1600" dirty="0"/>
+                  </a:p>
+                  <a:p>
+                    <a:pPr algn="ctr"/>
+                    <a:endParaRPr lang="en-US" sz="1600" dirty="0"/>
+                  </a:p>
+                  <a:p>
+                    <a:pPr algn="ctr"/>
+                    <a:endParaRPr lang="en-US" sz="1400" dirty="0"/>
+                  </a:p>
+                  <a:p>
+                    <a:pPr algn="ctr"/>
+                    <a:endParaRPr lang="en-US" sz="2400" dirty="0"/>
+                  </a:p>
+                </p:txBody>
+              </p:sp>
+              <p:sp>
+                <p:nvSpPr>
+                  <p:cNvPr id="4" name="Oval 3">
+                    <a:extLst>
+                      <a:ext uri="{FF2B5EF4-FFF2-40B4-BE49-F238E27FC236}">
+                        <a16:creationId xmlns:a16="http://schemas.microsoft.com/office/drawing/2014/main" id="{0CDB28EA-4F8C-C440-BE47-FCE05F83E614}"/>
+                      </a:ext>
+                    </a:extLst>
+                  </p:cNvPr>
+                  <p:cNvSpPr/>
+                  <p:nvPr/>
+                </p:nvSpPr>
+                <p:spPr>
+                  <a:xfrm>
+                    <a:off x="12587788" y="709570"/>
+                    <a:ext cx="198780" cy="198780"/>
+                  </a:xfrm>
+                  <a:prstGeom prst="ellipse">
+                    <a:avLst/>
+                  </a:prstGeom>
+                  <a:solidFill>
+                    <a:schemeClr val="tx1"/>
+                  </a:solidFill>
+                  <a:ln>
+                    <a:solidFill>
+                      <a:schemeClr val="tx1"/>
+                    </a:solidFill>
+                  </a:ln>
+                </p:spPr>
+                <p:style>
+                  <a:lnRef idx="2">
+                    <a:schemeClr val="accent1">
+                      <a:shade val="50000"/>
+                    </a:schemeClr>
+                  </a:lnRef>
+                  <a:fillRef idx="1">
+                    <a:schemeClr val="accent1"/>
+                  </a:fillRef>
+                  <a:effectRef idx="0">
+                    <a:schemeClr val="accent1"/>
+                  </a:effectRef>
+                  <a:fontRef idx="minor">
+                    <a:schemeClr val="lt1"/>
+                  </a:fontRef>
+                </p:style>
+                <p:txBody>
+                  <a:bodyPr rtlCol="0" anchor="ctr"/>
+                  <a:lstStyle/>
+                  <a:p>
+                    <a:pPr algn="ctr"/>
+                    <a:endParaRPr lang="en-US"/>
+                  </a:p>
+                </p:txBody>
+              </p:sp>
+              <p:cxnSp>
+                <p:nvCxnSpPr>
+                  <p:cNvPr id="6" name="Elbow Connector 5">
+                    <a:extLst>
+                      <a:ext uri="{FF2B5EF4-FFF2-40B4-BE49-F238E27FC236}">
+                        <a16:creationId xmlns:a16="http://schemas.microsoft.com/office/drawing/2014/main" id="{EF36610D-0025-5943-A83A-85A24A7D0A88}"/>
+                      </a:ext>
+                    </a:extLst>
+                  </p:cNvPr>
+                  <p:cNvCxnSpPr>
+                    <a:cxnSpLocks/>
+                    <a:endCxn id="3" idx="0"/>
+                  </p:cNvCxnSpPr>
+                  <p:nvPr/>
+                </p:nvCxnSpPr>
+                <p:spPr>
+                  <a:xfrm rot="10800000">
+                    <a:off x="9873401" y="678750"/>
+                    <a:ext cx="2813779" cy="56052"/>
+                  </a:xfrm>
+                  <a:prstGeom prst="bentConnector4">
+                    <a:avLst>
+                      <a:gd name="adj1" fmla="val -1075"/>
+                      <a:gd name="adj2" fmla="val 1101053"/>
+                    </a:avLst>
+                  </a:prstGeom>
+                  <a:ln w="50800">
+                    <a:solidFill>
+                      <a:schemeClr val="tx1"/>
+                    </a:solidFill>
+                    <a:tailEnd type="triangle"/>
+                  </a:ln>
+                </p:spPr>
+                <p:style>
+                  <a:lnRef idx="1">
+                    <a:schemeClr val="accent1"/>
+                  </a:lnRef>
+                  <a:fillRef idx="0">
+                    <a:schemeClr val="accent1"/>
+                  </a:fillRef>
+                  <a:effectRef idx="0">
+                    <a:schemeClr val="accent1"/>
+                  </a:effectRef>
+                  <a:fontRef idx="minor">
+                    <a:schemeClr val="tx1"/>
+                  </a:fontRef>
+                </p:style>
+              </p:cxnSp>
+              <p:cxnSp>
+                <p:nvCxnSpPr>
+                  <p:cNvPr id="15" name="Straight Arrow Connector 14">
+                    <a:extLst>
+                      <a:ext uri="{FF2B5EF4-FFF2-40B4-BE49-F238E27FC236}">
+                        <a16:creationId xmlns:a16="http://schemas.microsoft.com/office/drawing/2014/main" id="{E09D293C-430E-024B-9BBB-F91C50010939}"/>
+                      </a:ext>
+                    </a:extLst>
+                  </p:cNvPr>
+                  <p:cNvCxnSpPr>
+                    <a:cxnSpLocks/>
+                    <a:stCxn id="3" idx="2"/>
+                  </p:cNvCxnSpPr>
+                  <p:nvPr/>
+                </p:nvCxnSpPr>
+                <p:spPr>
+                  <a:xfrm flipH="1">
+                    <a:off x="9873400" y="3969134"/>
+                    <a:ext cx="1" cy="2052794"/>
+                  </a:xfrm>
+                  <a:prstGeom prst="straightConnector1">
+                    <a:avLst/>
+                  </a:prstGeom>
+                  <a:ln w="50800">
+                    <a:solidFill>
+                      <a:schemeClr val="tx1"/>
+                    </a:solidFill>
+                    <a:tailEnd type="triangle"/>
+                  </a:ln>
+                </p:spPr>
+                <p:style>
+                  <a:lnRef idx="1">
+                    <a:schemeClr val="accent1"/>
+                  </a:lnRef>
+                  <a:fillRef idx="0">
+                    <a:schemeClr val="accent1"/>
+                  </a:fillRef>
+                  <a:effectRef idx="0">
+                    <a:schemeClr val="accent1"/>
+                  </a:effectRef>
+                  <a:fontRef idx="minor">
+                    <a:schemeClr val="tx1"/>
+                  </a:fontRef>
+                </p:style>
+              </p:cxnSp>
+              <p:cxnSp>
+                <p:nvCxnSpPr>
+                  <p:cNvPr id="19" name="Straight Arrow Connector 18">
+                    <a:extLst>
+                      <a:ext uri="{FF2B5EF4-FFF2-40B4-BE49-F238E27FC236}">
+                        <a16:creationId xmlns:a16="http://schemas.microsoft.com/office/drawing/2014/main" id="{F43AE6D0-4FE5-8C48-B46C-2BC084BC9F80}"/>
+                      </a:ext>
+                    </a:extLst>
+                  </p:cNvPr>
+                  <p:cNvCxnSpPr>
+                    <a:cxnSpLocks/>
+                  </p:cNvCxnSpPr>
+                  <p:nvPr/>
+                </p:nvCxnSpPr>
+                <p:spPr>
+                  <a:xfrm>
+                    <a:off x="1907368" y="1617037"/>
+                    <a:ext cx="6633145" cy="0"/>
+                  </a:xfrm>
+                  <a:prstGeom prst="straightConnector1">
+                    <a:avLst/>
+                  </a:prstGeom>
+                  <a:ln w="50800">
+                    <a:solidFill>
+                      <a:schemeClr val="tx1"/>
+                    </a:solidFill>
+                    <a:tailEnd type="triangle"/>
+                  </a:ln>
+                </p:spPr>
+                <p:style>
+                  <a:lnRef idx="1">
+                    <a:schemeClr val="accent1"/>
+                  </a:lnRef>
+                  <a:fillRef idx="0">
+                    <a:schemeClr val="accent1"/>
+                  </a:fillRef>
+                  <a:effectRef idx="0">
+                    <a:schemeClr val="accent1"/>
+                  </a:effectRef>
+                  <a:fontRef idx="minor">
+                    <a:schemeClr val="tx1"/>
+                  </a:fontRef>
+                </p:style>
+              </p:cxnSp>
+              <p:cxnSp>
+                <p:nvCxnSpPr>
+                  <p:cNvPr id="20" name="Straight Arrow Connector 19">
+                    <a:extLst>
+                      <a:ext uri="{FF2B5EF4-FFF2-40B4-BE49-F238E27FC236}">
+                        <a16:creationId xmlns:a16="http://schemas.microsoft.com/office/drawing/2014/main" id="{6EF7FAFD-D5D0-9642-9300-8980A87185D8}"/>
+                      </a:ext>
+                    </a:extLst>
+                  </p:cNvPr>
+                  <p:cNvCxnSpPr>
+                    <a:cxnSpLocks/>
+                  </p:cNvCxnSpPr>
+                  <p:nvPr/>
+                </p:nvCxnSpPr>
+                <p:spPr>
+                  <a:xfrm>
+                    <a:off x="1875492" y="3398017"/>
+                    <a:ext cx="6665020" cy="0"/>
+                  </a:xfrm>
+                  <a:prstGeom prst="straightConnector1">
+                    <a:avLst/>
+                  </a:prstGeom>
+                  <a:ln w="50800">
+                    <a:solidFill>
+                      <a:schemeClr val="tx1"/>
+                    </a:solidFill>
+                    <a:headEnd type="none"/>
+                    <a:tailEnd type="triangle"/>
+                  </a:ln>
+                </p:spPr>
+                <p:style>
+                  <a:lnRef idx="1">
+                    <a:schemeClr val="accent1"/>
+                  </a:lnRef>
+                  <a:fillRef idx="0">
+                    <a:schemeClr val="accent1"/>
+                  </a:fillRef>
+                  <a:effectRef idx="0">
+                    <a:schemeClr val="accent1"/>
+                  </a:effectRef>
+                  <a:fontRef idx="minor">
+                    <a:schemeClr val="tx1"/>
+                  </a:fontRef>
+                </p:style>
+              </p:cxnSp>
+              <p:sp>
+                <p:nvSpPr>
+                  <p:cNvPr id="100" name="Arc 99">
+                    <a:extLst>
+                      <a:ext uri="{FF2B5EF4-FFF2-40B4-BE49-F238E27FC236}">
+                        <a16:creationId xmlns:a16="http://schemas.microsoft.com/office/drawing/2014/main" id="{906E22AA-B2EF-5746-BCB2-DB609B654DA4}"/>
+                      </a:ext>
+                    </a:extLst>
+                  </p:cNvPr>
+                  <p:cNvSpPr/>
+                  <p:nvPr/>
+                </p:nvSpPr>
+                <p:spPr>
+                  <a:xfrm rot="21410085">
+                    <a:off x="10747745" y="1675978"/>
+                    <a:ext cx="935447" cy="923330"/>
+                  </a:xfrm>
+                  <a:prstGeom prst="arc">
+                    <a:avLst>
+                      <a:gd name="adj1" fmla="val 16200000"/>
+                      <a:gd name="adj2" fmla="val 5550432"/>
+                    </a:avLst>
+                  </a:prstGeom>
+                  <a:ln w="50800">
+                    <a:solidFill>
+                      <a:schemeClr val="tx1"/>
+                    </a:solidFill>
+                    <a:headEnd type="triangle"/>
+                  </a:ln>
+                </p:spPr>
+                <p:style>
+                  <a:lnRef idx="1">
+                    <a:schemeClr val="accent1"/>
+                  </a:lnRef>
+                  <a:fillRef idx="0">
+                    <a:schemeClr val="accent1"/>
+                  </a:fillRef>
+                  <a:effectRef idx="0">
+                    <a:schemeClr val="accent1"/>
+                  </a:effectRef>
+                  <a:fontRef idx="minor">
+                    <a:schemeClr val="tx1"/>
+                  </a:fontRef>
+                </p:style>
+                <p:txBody>
+                  <a:bodyPr rtlCol="0" anchor="ctr"/>
+                  <a:lstStyle/>
+                  <a:p>
+                    <a:pPr algn="ctr"/>
+                    <a:endParaRPr lang="en-US"/>
+                  </a:p>
+                </p:txBody>
+              </p:sp>
+              <p:sp>
+                <p:nvSpPr>
+                  <p:cNvPr id="102" name="TextBox 101">
+                    <a:extLst>
+                      <a:ext uri="{FF2B5EF4-FFF2-40B4-BE49-F238E27FC236}">
+                        <a16:creationId xmlns:a16="http://schemas.microsoft.com/office/drawing/2014/main" id="{686248CD-7F6D-1044-B45E-09E9AC21B1C0}"/>
+                      </a:ext>
+                    </a:extLst>
+                  </p:cNvPr>
+                  <p:cNvSpPr txBox="1"/>
+                  <p:nvPr/>
+                </p:nvSpPr>
+                <p:spPr>
+                  <a:xfrm>
+                    <a:off x="-1070875" y="6979726"/>
+                    <a:ext cx="6628500" cy="1309439"/>
+                  </a:xfrm>
+                  <a:prstGeom prst="rect">
+                    <a:avLst/>
+                  </a:prstGeom>
+                  <a:noFill/>
+                </p:spPr>
+                <p:txBody>
+                  <a:bodyPr wrap="square" numCol="1" rtlCol="0">
+                    <a:spAutoFit/>
+                  </a:bodyPr>
+                  <a:lstStyle/>
+                  <a:p>
+                    <a:pPr marL="285750" indent="-285750">
+                      <a:buFont typeface="Arial" panose="020B0604020202020204" pitchFamily="34" charset="0"/>
+                      <a:buChar char="•"/>
+                    </a:pPr>
+                    <a:r>
+                      <a:rPr lang="en-US" sz="2400" b="1" i="1" dirty="0"/>
+                      <a:t>Bold+Italic: Short Description</a:t>
+                    </a:r>
+                  </a:p>
+                  <a:p>
+                    <a:pPr marL="285750" indent="-285750">
+                      <a:buFont typeface="Arial" panose="020B0604020202020204" pitchFamily="34" charset="0"/>
+                      <a:buChar char="•"/>
+                    </a:pPr>
+                    <a:r>
+                      <a:rPr lang="en-US" sz="2400" i="1" dirty="0"/>
+                      <a:t>Italic: Event-B event name</a:t>
+                    </a:r>
+                  </a:p>
+                  <a:p>
+                    <a:pPr marL="285750" indent="-285750">
+                      <a:buFont typeface="Arial" panose="020B0604020202020204" pitchFamily="34" charset="0"/>
+                      <a:buChar char="•"/>
+                    </a:pPr>
+                    <a:r>
+                      <a:rPr lang="en-US" sz="2400" dirty="0"/>
+                      <a:t>ALL CAPS: STATE NAMES</a:t>
+                    </a:r>
+                  </a:p>
+                </p:txBody>
+              </p:sp>
+              <mc:AlternateContent xmlns:mc="http://schemas.openxmlformats.org/markup-compatibility/2006">
+                <mc:Choice xmlns:a14="http://schemas.microsoft.com/office/drawing/2010/main" Requires="a14">
+                  <p:sp>
+                    <p:nvSpPr>
+                      <p:cNvPr id="103" name="TextBox 102">
+                        <a:extLst>
+                          <a:ext uri="{FF2B5EF4-FFF2-40B4-BE49-F238E27FC236}">
+                            <a16:creationId xmlns:a16="http://schemas.microsoft.com/office/drawing/2014/main" id="{32052193-2A6B-A84B-BFD4-16AE3364E8B3}"/>
+                          </a:ext>
+                        </a:extLst>
+                      </p:cNvPr>
+                      <p:cNvSpPr txBox="1"/>
+                      <p:nvPr/>
+                    </p:nvSpPr>
+                    <p:spPr>
+                      <a:xfrm>
+                        <a:off x="10185027" y="4240289"/>
+                        <a:ext cx="4182126" cy="1712342"/>
+                      </a:xfrm>
+                      <a:prstGeom prst="rect">
+                        <a:avLst/>
+                      </a:prstGeom>
+                      <a:noFill/>
+                    </p:spPr>
+                    <p:txBody>
+                      <a:bodyPr wrap="none" rtlCol="0">
+                        <a:spAutoFit/>
+                      </a:bodyPr>
+                      <a:lstStyle/>
+                      <a:p>
+                        <a:pPr algn="ctr"/>
+                        <a:r>
+                          <a:rPr lang="en-US" sz="2400" b="1" i="1" dirty="0"/>
+                          <a:t>Completion</a:t>
+                        </a:r>
+                      </a:p>
+                      <a:p>
+                        <a:pPr algn="ctr"/>
+                        <a:r>
+                          <a:rPr lang="en-US" sz="2400" i="1" dirty="0" err="1"/>
+                          <a:t>NoUntriggeredTransitions</a:t>
+                        </a:r>
+                        <a:endParaRPr lang="en-US" sz="2400" i="1" dirty="0"/>
+                      </a:p>
+                      <a:p>
+                        <a:pPr algn="ctr"/>
+                        <a:r>
+                          <a:rPr lang="en-US" sz="2400" dirty="0" err="1"/>
+                          <a:t>uc</a:t>
+                        </a:r>
+                        <a:r>
+                          <a:rPr lang="en-US" sz="2400" dirty="0"/>
+                          <a:t> = FALSE &amp; dt = </a:t>
+                        </a:r>
+                        <a14:m>
+                          <m:oMath xmlns:m="http://schemas.openxmlformats.org/officeDocument/2006/math">
+                            <m:r>
+                              <a:rPr lang="en-US" sz="2400" i="1" smtClean="0">
+                                <a:latin typeface="Cambria Math" panose="02040503050406030204" pitchFamily="18" charset="0"/>
+                                <a:ea typeface="Cambria Math" panose="02040503050406030204" pitchFamily="18" charset="0"/>
+                              </a:rPr>
+                              <m:t>∅</m:t>
+                            </m:r>
+                          </m:oMath>
+                        </a14:m>
+                        <a:endParaRPr lang="en-US" sz="2400" dirty="0"/>
+                      </a:p>
+                      <a:p>
+                        <a:pPr algn="ctr"/>
+                        <a:r>
+                          <a:rPr lang="en-US" sz="2400" dirty="0"/>
+                          <a:t>/ </a:t>
+                        </a:r>
+                        <a:r>
+                          <a:rPr lang="en-US" sz="2400" dirty="0" err="1"/>
+                          <a:t>uc</a:t>
+                        </a:r>
+                        <a:r>
+                          <a:rPr lang="en-US" sz="2400" dirty="0"/>
+                          <a:t> := TRUE</a:t>
+                        </a:r>
+                      </a:p>
+                    </p:txBody>
+                  </p:sp>
+                </mc:Choice>
+                <mc:Fallback>
+                  <p:sp>
+                    <p:nvSpPr>
+                      <p:cNvPr id="103" name="TextBox 102">
+                        <a:extLst>
+                          <a:ext uri="{FF2B5EF4-FFF2-40B4-BE49-F238E27FC236}">
+                            <a16:creationId xmlns:a16="http://schemas.microsoft.com/office/drawing/2014/main" id="{32052193-2A6B-A84B-BFD4-16AE3364E8B3}"/>
+                          </a:ext>
+                        </a:extLst>
+                      </p:cNvPr>
+                      <p:cNvSpPr txBox="1">
+                        <a:spLocks noRot="1" noChangeAspect="1" noMove="1" noResize="1" noEditPoints="1" noAdjustHandles="1" noChangeArrowheads="1" noChangeShapeType="1" noTextEdit="1"/>
+                      </p:cNvSpPr>
+                      <p:nvPr/>
+                    </p:nvSpPr>
+                    <p:spPr>
+                      <a:xfrm>
+                        <a:off x="10185027" y="4240289"/>
+                        <a:ext cx="4182126" cy="1712342"/>
+                      </a:xfrm>
+                      <a:prstGeom prst="rect">
+                        <a:avLst/>
+                      </a:prstGeom>
+                      <a:blipFill>
+                        <a:blip r:embed="rId3"/>
+                        <a:stretch>
+                          <a:fillRect l="-2230" t="-2400" r="-2230" b="-7200"/>
+                        </a:stretch>
+                      </a:blipFill>
+                    </p:spPr>
+                    <p:txBody>
+                      <a:bodyPr/>
+                      <a:lstStyle/>
+                      <a:p>
+                        <a:r>
+                          <a:rPr lang="en-US">
+                            <a:noFill/>
+                          </a:rPr>
+                          <a:t> </a:t>
+                        </a:r>
+                      </a:p>
+                    </p:txBody>
+                  </p:sp>
+                </mc:Fallback>
+              </mc:AlternateContent>
+              <mc:AlternateContent xmlns:mc="http://schemas.openxmlformats.org/markup-compatibility/2006">
+                <mc:Choice xmlns:a14="http://schemas.microsoft.com/office/drawing/2010/main" Requires="a14">
+                  <p:sp>
+                    <p:nvSpPr>
+                      <p:cNvPr id="104" name="TextBox 103">
+                        <a:extLst>
+                          <a:ext uri="{FF2B5EF4-FFF2-40B4-BE49-F238E27FC236}">
+                            <a16:creationId xmlns:a16="http://schemas.microsoft.com/office/drawing/2014/main" id="{A4FA411C-7D95-1146-8A83-BF7DD32F7358}"/>
+                          </a:ext>
+                        </a:extLst>
+                      </p:cNvPr>
+                      <p:cNvSpPr txBox="1"/>
+                      <p:nvPr/>
+                    </p:nvSpPr>
+                    <p:spPr>
+                      <a:xfrm>
+                        <a:off x="3975196" y="4252801"/>
+                        <a:ext cx="5876839" cy="1712343"/>
+                      </a:xfrm>
+                      <a:prstGeom prst="rect">
+                        <a:avLst/>
+                      </a:prstGeom>
+                      <a:noFill/>
+                    </p:spPr>
+                    <p:txBody>
+                      <a:bodyPr wrap="square" rtlCol="0">
+                        <a:spAutoFit/>
+                      </a:bodyPr>
+                      <a:lstStyle/>
+                      <a:p>
+                        <a:pPr algn="ctr"/>
+                        <a:r>
+                          <a:rPr lang="en-US" sz="2400" b="1" i="1" dirty="0"/>
+                          <a:t>De-queue Internal Trigger </a:t>
+                        </a:r>
+                        <a:r>
+                          <a:rPr lang="en-US" sz="2400" b="1" i="1" dirty="0" err="1"/>
+                          <a:t>iQ</a:t>
+                        </a:r>
+                        <a:endParaRPr lang="en-US" sz="2400" b="1" i="1" dirty="0"/>
+                      </a:p>
+                      <a:p>
+                        <a:pPr algn="ctr"/>
+                        <a:r>
+                          <a:rPr lang="en-US" sz="2400" i="1" dirty="0" err="1"/>
+                          <a:t>dequeueInternalTriggered</a:t>
+                        </a:r>
+                        <a:endParaRPr lang="en-US" sz="2400" i="1" dirty="0"/>
+                      </a:p>
+                      <a:p>
+                        <a:pPr algn="ctr"/>
+                        <a:r>
+                          <a:rPr lang="en-US" sz="2400" dirty="0" err="1"/>
+                          <a:t>uc</a:t>
+                        </a:r>
+                        <a:r>
+                          <a:rPr lang="en-US" sz="2400" dirty="0"/>
+                          <a:t> = TRUE &amp; dt = </a:t>
+                        </a:r>
+                        <a14:m>
+                          <m:oMath xmlns:m="http://schemas.openxmlformats.org/officeDocument/2006/math">
+                            <m:r>
+                              <a:rPr lang="en-US" sz="2400" i="1" smtClean="0">
+                                <a:latin typeface="Cambria Math" panose="02040503050406030204" pitchFamily="18" charset="0"/>
+                                <a:ea typeface="Cambria Math" panose="02040503050406030204" pitchFamily="18" charset="0"/>
+                              </a:rPr>
+                              <m:t>∅</m:t>
+                            </m:r>
+                          </m:oMath>
+                        </a14:m>
+                        <a:r>
+                          <a:rPr lang="en-US" sz="2400" dirty="0"/>
+                          <a:t> </a:t>
+                        </a:r>
+                      </a:p>
+                      <a:p>
+                        <a:pPr algn="ctr"/>
+                        <a:r>
+                          <a:rPr lang="en-US" sz="2400" dirty="0"/>
+                          <a:t>/ </a:t>
+                        </a:r>
+                        <a:r>
+                          <a:rPr lang="en-US" sz="2400" dirty="0" err="1"/>
+                          <a:t>uc</a:t>
+                        </a:r>
+                        <a:r>
+                          <a:rPr lang="en-US" sz="2400" dirty="0"/>
+                          <a:t> := FALSE &amp; dt :</a:t>
+                        </a:r>
+                        <a14:m>
+                          <m:oMath xmlns:m="http://schemas.openxmlformats.org/officeDocument/2006/math">
+                            <m:r>
+                              <a:rPr lang="en-US" sz="2400" i="1">
+                                <a:latin typeface="Cambria Math" panose="02040503050406030204" pitchFamily="18" charset="0"/>
+                                <a:ea typeface="Cambria Math" panose="02040503050406030204" pitchFamily="18" charset="0"/>
+                              </a:rPr>
+                              <m:t>∈</m:t>
+                            </m:r>
+                          </m:oMath>
+                        </a14:m>
+                        <a:r>
+                          <a:rPr lang="en-US" sz="2400" dirty="0"/>
+                          <a:t> iQ</a:t>
+                        </a:r>
+                      </a:p>
+                    </p:txBody>
+                  </p:sp>
+                </mc:Choice>
+                <mc:Fallback>
+                  <p:sp>
+                    <p:nvSpPr>
+                      <p:cNvPr id="104" name="TextBox 103">
+                        <a:extLst>
+                          <a:ext uri="{FF2B5EF4-FFF2-40B4-BE49-F238E27FC236}">
+                            <a16:creationId xmlns:a16="http://schemas.microsoft.com/office/drawing/2014/main" id="{A4FA411C-7D95-1146-8A83-BF7DD32F7358}"/>
+                          </a:ext>
+                        </a:extLst>
+                      </p:cNvPr>
+                      <p:cNvSpPr txBox="1">
+                        <a:spLocks noRot="1" noChangeAspect="1" noMove="1" noResize="1" noEditPoints="1" noAdjustHandles="1" noChangeArrowheads="1" noChangeShapeType="1" noTextEdit="1"/>
+                      </p:cNvSpPr>
+                      <p:nvPr/>
+                    </p:nvSpPr>
+                    <p:spPr>
+                      <a:xfrm>
+                        <a:off x="3975196" y="4252801"/>
+                        <a:ext cx="5876839" cy="1712343"/>
+                      </a:xfrm>
+                      <a:prstGeom prst="rect">
+                        <a:avLst/>
+                      </a:prstGeom>
+                      <a:blipFill>
+                        <a:blip r:embed="rId4"/>
+                        <a:stretch>
+                          <a:fillRect t="-2400" b="-7200"/>
+                        </a:stretch>
+                      </a:blipFill>
+                    </p:spPr>
+                    <p:txBody>
+                      <a:bodyPr/>
+                      <a:lstStyle/>
+                      <a:p>
+                        <a:r>
+                          <a:rPr lang="en-US">
+                            <a:noFill/>
+                          </a:rPr>
+                          <a:t> </a:t>
+                        </a:r>
+                      </a:p>
+                    </p:txBody>
+                  </p:sp>
+                </mc:Fallback>
+              </mc:AlternateContent>
+              <mc:AlternateContent xmlns:mc="http://schemas.openxmlformats.org/markup-compatibility/2006">
+                <mc:Choice xmlns:a14="http://schemas.microsoft.com/office/drawing/2010/main" Requires="a14">
+                  <p:sp>
+                    <p:nvSpPr>
+                      <p:cNvPr id="105" name="TextBox 104">
+                        <a:extLst>
+                          <a:ext uri="{FF2B5EF4-FFF2-40B4-BE49-F238E27FC236}">
+                            <a16:creationId xmlns:a16="http://schemas.microsoft.com/office/drawing/2014/main" id="{8DE941AA-8537-8140-A384-C92A0860614E}"/>
+                          </a:ext>
+                        </a:extLst>
+                      </p:cNvPr>
+                      <p:cNvSpPr txBox="1"/>
+                      <p:nvPr/>
+                    </p:nvSpPr>
+                    <p:spPr>
+                      <a:xfrm>
+                        <a:off x="-1763861" y="4299752"/>
+                        <a:ext cx="5607213" cy="1712343"/>
+                      </a:xfrm>
+                      <a:prstGeom prst="rect">
+                        <a:avLst/>
+                      </a:prstGeom>
+                      <a:noFill/>
+                    </p:spPr>
+                    <p:txBody>
+                      <a:bodyPr wrap="square" rtlCol="0">
+                        <a:spAutoFit/>
+                      </a:bodyPr>
+                      <a:lstStyle/>
+                      <a:p>
+                        <a:pPr algn="ctr"/>
+                        <a:r>
+                          <a:rPr lang="en-US" sz="2400" b="1" i="1" dirty="0"/>
+                          <a:t>De-queue External Trigger </a:t>
+                        </a:r>
+                        <a:r>
+                          <a:rPr lang="en-US" sz="2400" b="1" i="1" dirty="0" err="1"/>
+                          <a:t>eQ</a:t>
+                        </a:r>
+                        <a:endParaRPr lang="en-US" sz="2400" b="1" i="1" dirty="0"/>
+                      </a:p>
+                      <a:p>
+                        <a:pPr algn="ctr"/>
+                        <a:r>
+                          <a:rPr lang="en-US" sz="2400" i="1" dirty="0" err="1"/>
+                          <a:t>dequeueExternalTriggered</a:t>
+                        </a:r>
+                        <a:endParaRPr lang="en-US" sz="2400" i="1" dirty="0"/>
+                      </a:p>
+                      <a:p>
+                        <a:pPr algn="ctr"/>
+                        <a:r>
+                          <a:rPr lang="en-US" sz="2400" dirty="0" err="1"/>
+                          <a:t>uc</a:t>
+                        </a:r>
+                        <a:r>
+                          <a:rPr lang="en-US" sz="2400" dirty="0"/>
+                          <a:t> = TRUE &amp; dt = </a:t>
+                        </a:r>
+                        <a14:m>
+                          <m:oMath xmlns:m="http://schemas.openxmlformats.org/officeDocument/2006/math">
+                            <m:r>
+                              <a:rPr lang="en-US" sz="2400" i="1">
+                                <a:latin typeface="Cambria Math" panose="02040503050406030204" pitchFamily="18" charset="0"/>
+                                <a:ea typeface="Cambria Math" panose="02040503050406030204" pitchFamily="18" charset="0"/>
+                              </a:rPr>
+                              <m:t>∅</m:t>
+                            </m:r>
+                          </m:oMath>
+                        </a14:m>
+                        <a:r>
+                          <a:rPr lang="en-US" sz="2400" dirty="0"/>
+                          <a:t> &amp; </a:t>
+                        </a:r>
+                        <a:r>
+                          <a:rPr lang="en-US" sz="2400" dirty="0" err="1"/>
+                          <a:t>iQ</a:t>
+                        </a:r>
+                        <a:r>
+                          <a:rPr lang="en-US" sz="2400" dirty="0"/>
+                          <a:t> = </a:t>
+                        </a:r>
+                        <a14:m>
+                          <m:oMath xmlns:m="http://schemas.openxmlformats.org/officeDocument/2006/math">
+                            <m:r>
+                              <a:rPr lang="en-US" sz="2400" i="1">
+                                <a:latin typeface="Cambria Math" panose="02040503050406030204" pitchFamily="18" charset="0"/>
+                                <a:ea typeface="Cambria Math" panose="02040503050406030204" pitchFamily="18" charset="0"/>
+                              </a:rPr>
+                              <m:t>∅</m:t>
+                            </m:r>
+                          </m:oMath>
+                        </a14:m>
+                        <a:endParaRPr lang="en-US" sz="2400" dirty="0"/>
+                      </a:p>
+                      <a:p>
+                        <a:pPr algn="ctr"/>
+                        <a:r>
+                          <a:rPr lang="en-US" sz="2400" dirty="0"/>
+                          <a:t>/ </a:t>
+                        </a:r>
+                        <a:r>
+                          <a:rPr lang="en-US" sz="2400" dirty="0" err="1"/>
+                          <a:t>uc</a:t>
+                        </a:r>
+                        <a:r>
+                          <a:rPr lang="en-US" sz="2400" dirty="0"/>
+                          <a:t> := FALSE &amp; dt :</a:t>
+                        </a:r>
+                        <a14:m>
+                          <m:oMath xmlns:m="http://schemas.openxmlformats.org/officeDocument/2006/math">
+                            <m:r>
+                              <a:rPr lang="en-US" sz="2400" i="1" smtClean="0">
+                                <a:latin typeface="Cambria Math" panose="02040503050406030204" pitchFamily="18" charset="0"/>
+                                <a:ea typeface="Cambria Math" panose="02040503050406030204" pitchFamily="18" charset="0"/>
+                              </a:rPr>
+                              <m:t>∈</m:t>
+                            </m:r>
+                          </m:oMath>
+                        </a14:m>
+                        <a:r>
+                          <a:rPr lang="en-US" sz="2400" dirty="0"/>
+                          <a:t> eQ</a:t>
+                        </a:r>
+                      </a:p>
+                    </p:txBody>
+                  </p:sp>
+                </mc:Choice>
+                <mc:Fallback>
+                  <p:sp>
+                    <p:nvSpPr>
+                      <p:cNvPr id="105" name="TextBox 104">
+                        <a:extLst>
+                          <a:ext uri="{FF2B5EF4-FFF2-40B4-BE49-F238E27FC236}">
+                            <a16:creationId xmlns:a16="http://schemas.microsoft.com/office/drawing/2014/main" id="{8DE941AA-8537-8140-A384-C92A0860614E}"/>
+                          </a:ext>
+                        </a:extLst>
+                      </p:cNvPr>
+                      <p:cNvSpPr txBox="1">
+                        <a:spLocks noRot="1" noChangeAspect="1" noMove="1" noResize="1" noEditPoints="1" noAdjustHandles="1" noChangeArrowheads="1" noChangeShapeType="1" noTextEdit="1"/>
+                      </p:cNvSpPr>
+                      <p:nvPr/>
+                    </p:nvSpPr>
+                    <p:spPr>
+                      <a:xfrm>
+                        <a:off x="-1763861" y="4299752"/>
+                        <a:ext cx="5607213" cy="1712343"/>
+                      </a:xfrm>
+                      <a:prstGeom prst="rect">
+                        <a:avLst/>
+                      </a:prstGeom>
+                      <a:blipFill>
+                        <a:blip r:embed="rId5"/>
+                        <a:stretch>
+                          <a:fillRect t="-2419" b="-7258"/>
+                        </a:stretch>
+                      </a:blipFill>
+                    </p:spPr>
+                    <p:txBody>
+                      <a:bodyPr/>
+                      <a:lstStyle/>
+                      <a:p>
+                        <a:r>
+                          <a:rPr lang="en-US">
+                            <a:noFill/>
+                          </a:rPr>
+                          <a:t> </a:t>
+                        </a:r>
+                      </a:p>
+                    </p:txBody>
+                  </p:sp>
+                </mc:Fallback>
+              </mc:AlternateContent>
+              <mc:AlternateContent xmlns:mc="http://schemas.openxmlformats.org/markup-compatibility/2006">
+                <mc:Choice xmlns:a14="http://schemas.microsoft.com/office/drawing/2010/main" Requires="a14">
+                  <p:sp>
+                    <p:nvSpPr>
+                      <p:cNvPr id="110" name="TextBox 109">
+                        <a:extLst>
+                          <a:ext uri="{FF2B5EF4-FFF2-40B4-BE49-F238E27FC236}">
+                            <a16:creationId xmlns:a16="http://schemas.microsoft.com/office/drawing/2014/main" id="{E140AAD7-431B-1244-8F4C-1A27A7E5CD89}"/>
+                          </a:ext>
+                        </a:extLst>
+                      </p:cNvPr>
+                      <p:cNvSpPr txBox="1"/>
+                      <p:nvPr/>
+                    </p:nvSpPr>
+                    <p:spPr>
+                      <a:xfrm>
+                        <a:off x="2295552" y="1706690"/>
+                        <a:ext cx="5385058" cy="1712343"/>
+                      </a:xfrm>
+                      <a:prstGeom prst="rect">
+                        <a:avLst/>
+                      </a:prstGeom>
+                      <a:noFill/>
+                    </p:spPr>
+                    <p:txBody>
+                      <a:bodyPr wrap="square" rtlCol="0">
+                        <a:spAutoFit/>
+                      </a:bodyPr>
+                      <a:lstStyle/>
+                      <a:p>
+                        <a:pPr algn="ctr"/>
+                        <a:r>
+                          <a:rPr lang="en-US" sz="2400" b="1" i="1" dirty="0"/>
+                          <a:t>No Triggered Enable</a:t>
+                        </a:r>
+                      </a:p>
+                      <a:p>
+                        <a:pPr algn="ctr"/>
+                        <a:r>
+                          <a:rPr lang="en-US" sz="2400" i="1" dirty="0" err="1"/>
+                          <a:t>NoTriggeredTransitionsEnable</a:t>
+                        </a:r>
+                        <a:endParaRPr lang="en-US" sz="2400" i="1" dirty="0"/>
+                      </a:p>
+                      <a:p>
+                        <a:pPr algn="ctr"/>
+                        <a:r>
+                          <a:rPr lang="en-US" sz="2400" dirty="0" err="1"/>
+                          <a:t>uc</a:t>
+                        </a:r>
+                        <a:r>
+                          <a:rPr lang="en-US" sz="2400" dirty="0"/>
+                          <a:t> = FALSE &amp; dt </a:t>
+                        </a:r>
+                        <a14:m>
+                          <m:oMath xmlns:m="http://schemas.openxmlformats.org/officeDocument/2006/math">
+                            <m:r>
+                              <a:rPr lang="en-US" sz="2400" i="1">
+                                <a:latin typeface="Cambria Math" panose="02040503050406030204" pitchFamily="18" charset="0"/>
+                                <a:ea typeface="Cambria Math" panose="02040503050406030204" pitchFamily="18" charset="0"/>
+                              </a:rPr>
+                              <m:t>≠</m:t>
+                            </m:r>
+                          </m:oMath>
+                        </a14:m>
+                        <a:r>
+                          <a:rPr lang="en-US" sz="2400" dirty="0"/>
+                          <a:t> </a:t>
+                        </a:r>
+                        <a14:m>
+                          <m:oMath xmlns:m="http://schemas.openxmlformats.org/officeDocument/2006/math">
+                            <m:r>
+                              <a:rPr lang="en-US" sz="2400" i="1" smtClean="0">
+                                <a:latin typeface="Cambria Math" panose="02040503050406030204" pitchFamily="18" charset="0"/>
+                                <a:ea typeface="Cambria Math" panose="02040503050406030204" pitchFamily="18" charset="0"/>
+                              </a:rPr>
+                              <m:t>∅</m:t>
+                            </m:r>
+                            <m:r>
+                              <a:rPr lang="en-US" sz="2400" b="0" i="0" smtClean="0">
+                                <a:latin typeface="Cambria Math" panose="02040503050406030204" pitchFamily="18" charset="0"/>
+                                <a:ea typeface="Cambria Math" panose="02040503050406030204" pitchFamily="18" charset="0"/>
+                              </a:rPr>
+                              <m:t>  </m:t>
+                            </m:r>
+                          </m:oMath>
+                        </a14:m>
+                        <a:endParaRPr lang="en-US" sz="2400" dirty="0"/>
+                      </a:p>
+                      <a:p>
+                        <a:pPr algn="ctr"/>
+                        <a:r>
+                          <a:rPr lang="en-US" sz="2400" dirty="0"/>
+                          <a:t>/  dt := </a:t>
+                        </a:r>
+                        <a14:m>
+                          <m:oMath xmlns:m="http://schemas.openxmlformats.org/officeDocument/2006/math">
+                            <m:r>
+                              <a:rPr lang="en-US" sz="2400" i="1">
+                                <a:latin typeface="Cambria Math" panose="02040503050406030204" pitchFamily="18" charset="0"/>
+                                <a:ea typeface="Cambria Math" panose="02040503050406030204" pitchFamily="18" charset="0"/>
+                              </a:rPr>
+                              <m:t>∅</m:t>
+                            </m:r>
+                          </m:oMath>
+                        </a14:m>
+                        <a:r>
+                          <a:rPr lang="en-US" sz="2400" dirty="0"/>
+                          <a:t> </a:t>
+                        </a:r>
+                      </a:p>
+                    </p:txBody>
+                  </p:sp>
+                </mc:Choice>
+                <mc:Fallback>
+                  <p:sp>
+                    <p:nvSpPr>
+                      <p:cNvPr id="110" name="TextBox 109">
+                        <a:extLst>
+                          <a:ext uri="{FF2B5EF4-FFF2-40B4-BE49-F238E27FC236}">
+                            <a16:creationId xmlns:a16="http://schemas.microsoft.com/office/drawing/2014/main" id="{E140AAD7-431B-1244-8F4C-1A27A7E5CD89}"/>
+                          </a:ext>
+                        </a:extLst>
+                      </p:cNvPr>
+                      <p:cNvSpPr txBox="1">
+                        <a:spLocks noRot="1" noChangeAspect="1" noMove="1" noResize="1" noEditPoints="1" noAdjustHandles="1" noChangeArrowheads="1" noChangeShapeType="1" noTextEdit="1"/>
+                      </p:cNvSpPr>
+                      <p:nvPr/>
+                    </p:nvSpPr>
+                    <p:spPr>
+                      <a:xfrm>
+                        <a:off x="2295552" y="1706690"/>
+                        <a:ext cx="5385058" cy="1712343"/>
+                      </a:xfrm>
+                      <a:prstGeom prst="rect">
+                        <a:avLst/>
+                      </a:prstGeom>
+                      <a:blipFill>
+                        <a:blip r:embed="rId6"/>
+                        <a:stretch>
+                          <a:fillRect t="-3226" b="-8065"/>
+                        </a:stretch>
+                      </a:blipFill>
+                    </p:spPr>
+                    <p:txBody>
+                      <a:bodyPr/>
+                      <a:lstStyle/>
+                      <a:p>
+                        <a:r>
+                          <a:rPr lang="en-US">
+                            <a:noFill/>
+                          </a:rPr>
+                          <a:t> </a:t>
+                        </a:r>
+                      </a:p>
+                    </p:txBody>
+                  </p:sp>
+                </mc:Fallback>
+              </mc:AlternateContent>
+              <mc:AlternateContent xmlns:mc="http://schemas.openxmlformats.org/markup-compatibility/2006">
+                <mc:Choice xmlns:a14="http://schemas.microsoft.com/office/drawing/2010/main" Requires="a14">
+                  <p:sp>
+                    <p:nvSpPr>
+                      <p:cNvPr id="111" name="TextBox 110">
+                        <a:extLst>
+                          <a:ext uri="{FF2B5EF4-FFF2-40B4-BE49-F238E27FC236}">
+                            <a16:creationId xmlns:a16="http://schemas.microsoft.com/office/drawing/2014/main" id="{F46861FF-D453-C349-AB2A-49C4BAB40FD6}"/>
+                          </a:ext>
+                        </a:extLst>
+                      </p:cNvPr>
+                      <p:cNvSpPr txBox="1"/>
+                      <p:nvPr/>
+                    </p:nvSpPr>
+                    <p:spPr>
+                      <a:xfrm>
+                        <a:off x="1621169" y="-149396"/>
+                        <a:ext cx="7125152" cy="1712343"/>
+                      </a:xfrm>
+                      <a:prstGeom prst="rect">
+                        <a:avLst/>
+                      </a:prstGeom>
+                      <a:noFill/>
+                    </p:spPr>
+                    <p:txBody>
+                      <a:bodyPr wrap="square" rtlCol="0">
+                        <a:spAutoFit/>
+                      </a:bodyPr>
+                      <a:lstStyle/>
+                      <a:p>
+                        <a:pPr algn="ctr"/>
+                        <a:r>
+                          <a:rPr lang="en-US" sz="2400" b="1" i="1" dirty="0"/>
+                          <a:t>Fire Triggered</a:t>
+                        </a:r>
+                      </a:p>
+                      <a:p>
+                        <a:pPr algn="ctr"/>
+                        <a:r>
+                          <a:rPr lang="en-US" sz="2400" i="1" dirty="0" err="1"/>
+                          <a:t>FutureTriggeredTransitions</a:t>
+                        </a:r>
+                        <a:endParaRPr lang="en-US" sz="2400" i="1" dirty="0"/>
+                      </a:p>
+                      <a:p>
+                        <a:pPr algn="ctr"/>
+                        <a:r>
+                          <a:rPr lang="en-US" sz="2400" dirty="0" err="1"/>
+                          <a:t>uc</a:t>
+                        </a:r>
+                        <a:r>
+                          <a:rPr lang="en-US" sz="2400" dirty="0"/>
+                          <a:t> = FALSE &amp; dt </a:t>
+                        </a:r>
+                        <a14:m>
+                          <m:oMath xmlns:m="http://schemas.openxmlformats.org/officeDocument/2006/math">
+                            <m:r>
+                              <a:rPr lang="en-US" sz="2400" i="1" smtClean="0">
+                                <a:latin typeface="Cambria Math" panose="02040503050406030204" pitchFamily="18" charset="0"/>
+                                <a:ea typeface="Cambria Math" panose="02040503050406030204" pitchFamily="18" charset="0"/>
+                              </a:rPr>
+                              <m:t>≠</m:t>
+                            </m:r>
+                          </m:oMath>
+                        </a14:m>
+                        <a:r>
+                          <a:rPr lang="en-US" sz="2400" dirty="0"/>
+                          <a:t> </a:t>
+                        </a:r>
+                        <a14:m>
+                          <m:oMath xmlns:m="http://schemas.openxmlformats.org/officeDocument/2006/math">
+                            <m:r>
+                              <a:rPr lang="en-US" sz="2400" i="1" smtClean="0">
+                                <a:latin typeface="Cambria Math" panose="02040503050406030204" pitchFamily="18" charset="0"/>
+                                <a:ea typeface="Cambria Math" panose="02040503050406030204" pitchFamily="18" charset="0"/>
+                              </a:rPr>
+                              <m:t>∅</m:t>
+                            </m:r>
+                          </m:oMath>
+                        </a14:m>
+                        <a:endParaRPr lang="en-US" sz="2400" dirty="0">
+                          <a:ea typeface="Cambria Math" panose="02040503050406030204" pitchFamily="18" charset="0"/>
+                        </a:endParaRPr>
+                      </a:p>
+                      <a:p>
+                        <a:pPr algn="ctr"/>
+                        <a:r>
+                          <a:rPr lang="en-US" sz="2400" dirty="0"/>
+                          <a:t>/ dt := </a:t>
+                        </a:r>
+                        <a14:m>
+                          <m:oMath xmlns:m="http://schemas.openxmlformats.org/officeDocument/2006/math">
+                            <m:r>
+                              <a:rPr lang="en-US" sz="2400" i="1">
+                                <a:latin typeface="Cambria Math" panose="02040503050406030204" pitchFamily="18" charset="0"/>
+                                <a:ea typeface="Cambria Math" panose="02040503050406030204" pitchFamily="18" charset="0"/>
+                              </a:rPr>
+                              <m:t>∅</m:t>
+                            </m:r>
+                          </m:oMath>
+                        </a14:m>
+                        <a:r>
+                          <a:rPr lang="en-US" sz="2400" dirty="0"/>
+                          <a:t> &amp; iQ := </a:t>
+                        </a:r>
+                        <a:r>
+                          <a:rPr lang="en-US" sz="2400" dirty="0" err="1"/>
+                          <a:t>iQ</a:t>
+                        </a:r>
+                        <a:r>
+                          <a:rPr lang="en-US" sz="2400" dirty="0"/>
+                          <a:t> </a:t>
+                        </a:r>
+                        <a14:m>
+                          <m:oMath xmlns:m="http://schemas.openxmlformats.org/officeDocument/2006/math">
+                            <m:r>
+                              <a:rPr lang="en-US" sz="2400" i="1">
+                                <a:latin typeface="Cambria Math" panose="02040503050406030204" pitchFamily="18" charset="0"/>
+                                <a:ea typeface="Cambria Math" panose="02040503050406030204" pitchFamily="18" charset="0"/>
+                              </a:rPr>
+                              <m:t>∪ </m:t>
+                            </m:r>
+                          </m:oMath>
+                        </a14:m>
+                        <a:r>
+                          <a:rPr lang="en-US" sz="2400" dirty="0" err="1"/>
+                          <a:t>raisedTriggers</a:t>
+                        </a:r>
+                        <a:endParaRPr lang="en-US" sz="2400" dirty="0"/>
+                      </a:p>
+                    </p:txBody>
+                  </p:sp>
+                </mc:Choice>
+                <mc:Fallback>
+                  <p:sp>
+                    <p:nvSpPr>
+                      <p:cNvPr id="111" name="TextBox 110">
+                        <a:extLst>
+                          <a:ext uri="{FF2B5EF4-FFF2-40B4-BE49-F238E27FC236}">
+                            <a16:creationId xmlns:a16="http://schemas.microsoft.com/office/drawing/2014/main" id="{F46861FF-D453-C349-AB2A-49C4BAB40FD6}"/>
+                          </a:ext>
+                        </a:extLst>
+                      </p:cNvPr>
+                      <p:cNvSpPr txBox="1">
+                        <a:spLocks noRot="1" noChangeAspect="1" noMove="1" noResize="1" noEditPoints="1" noAdjustHandles="1" noChangeArrowheads="1" noChangeShapeType="1" noTextEdit="1"/>
+                      </p:cNvSpPr>
+                      <p:nvPr/>
+                    </p:nvSpPr>
+                    <p:spPr>
+                      <a:xfrm>
+                        <a:off x="1621169" y="-149396"/>
+                        <a:ext cx="7125152" cy="1712343"/>
+                      </a:xfrm>
+                      <a:prstGeom prst="rect">
+                        <a:avLst/>
+                      </a:prstGeom>
+                      <a:blipFill>
+                        <a:blip r:embed="rId7"/>
+                        <a:stretch>
+                          <a:fillRect t="-3252" b="-7317"/>
+                        </a:stretch>
+                      </a:blipFill>
+                    </p:spPr>
+                    <p:txBody>
+                      <a:bodyPr/>
+                      <a:lstStyle/>
+                      <a:p>
+                        <a:r>
+                          <a:rPr lang="en-US">
+                            <a:noFill/>
+                          </a:rPr>
+                          <a:t> </a:t>
+                        </a:r>
+                      </a:p>
+                    </p:txBody>
+                  </p:sp>
+                </mc:Fallback>
+              </mc:AlternateContent>
+              <mc:AlternateContent xmlns:mc="http://schemas.openxmlformats.org/markup-compatibility/2006">
+                <mc:Choice xmlns:a14="http://schemas.microsoft.com/office/drawing/2010/main" Requires="a14">
+                  <p:sp>
+                    <p:nvSpPr>
+                      <p:cNvPr id="117" name="TextBox 116">
+                        <a:extLst>
+                          <a:ext uri="{FF2B5EF4-FFF2-40B4-BE49-F238E27FC236}">
+                            <a16:creationId xmlns:a16="http://schemas.microsoft.com/office/drawing/2014/main" id="{2C50F20A-6C64-5340-82C6-B08C4A906684}"/>
+                          </a:ext>
+                        </a:extLst>
+                      </p:cNvPr>
+                      <p:cNvSpPr txBox="1"/>
+                      <p:nvPr/>
+                    </p:nvSpPr>
+                    <p:spPr>
+                      <a:xfrm>
+                        <a:off x="10349108" y="2329712"/>
+                        <a:ext cx="6930490" cy="1712343"/>
+                      </a:xfrm>
+                      <a:prstGeom prst="rect">
+                        <a:avLst/>
+                      </a:prstGeom>
+                      <a:noFill/>
+                    </p:spPr>
+                    <p:txBody>
+                      <a:bodyPr wrap="square" rtlCol="0">
+                        <a:spAutoFit/>
+                      </a:bodyPr>
+                      <a:lstStyle/>
+                      <a:p>
+                        <a:pPr algn="ctr"/>
+                        <a:r>
+                          <a:rPr lang="en-US" sz="2400" b="1" i="1" dirty="0"/>
+                          <a:t>Fire Untriggered</a:t>
+                        </a:r>
+                      </a:p>
+                      <a:p>
+                        <a:pPr algn="ctr"/>
+                        <a:r>
+                          <a:rPr lang="en-US" sz="2400" i="1" dirty="0" err="1"/>
+                          <a:t>fututeUntriggeredTransitionSet</a:t>
+                        </a:r>
+                        <a:endParaRPr lang="en-US" sz="2400" i="1" dirty="0"/>
+                      </a:p>
+                      <a:p>
+                        <a:pPr algn="ctr"/>
+                        <a:r>
+                          <a:rPr lang="en-US" sz="2400" dirty="0" err="1"/>
+                          <a:t>uc</a:t>
+                        </a:r>
+                        <a:r>
+                          <a:rPr lang="en-US" sz="2400" dirty="0"/>
+                          <a:t> = FALSE &amp; dt = </a:t>
+                        </a:r>
+                        <a14:m>
+                          <m:oMath xmlns:m="http://schemas.openxmlformats.org/officeDocument/2006/math">
+                            <m:r>
+                              <a:rPr lang="en-US" sz="2400" i="1" smtClean="0">
+                                <a:latin typeface="Cambria Math" panose="02040503050406030204" pitchFamily="18" charset="0"/>
+                                <a:ea typeface="Cambria Math" panose="02040503050406030204" pitchFamily="18" charset="0"/>
+                              </a:rPr>
+                              <m:t>∅</m:t>
+                            </m:r>
+                          </m:oMath>
+                        </a14:m>
+                        <a:endParaRPr lang="en-US" sz="2400" dirty="0"/>
+                      </a:p>
+                      <a:p>
+                        <a:pPr algn="ctr"/>
+                        <a:r>
+                          <a:rPr lang="en-US" sz="2400" dirty="0"/>
+                          <a:t>/ </a:t>
+                        </a:r>
+                        <a:r>
+                          <a:rPr lang="en-US" sz="2400" dirty="0" err="1"/>
+                          <a:t>iQ</a:t>
+                        </a:r>
+                        <a:r>
+                          <a:rPr lang="en-US" sz="2400" dirty="0"/>
+                          <a:t> := </a:t>
+                        </a:r>
+                        <a:r>
+                          <a:rPr lang="en-US" sz="2400" dirty="0" err="1"/>
+                          <a:t>iQ</a:t>
+                        </a:r>
+                        <a:r>
+                          <a:rPr lang="en-US" sz="2400" dirty="0"/>
+                          <a:t> </a:t>
+                        </a:r>
+                        <a14:m>
+                          <m:oMath xmlns:m="http://schemas.openxmlformats.org/officeDocument/2006/math">
+                            <m:r>
+                              <a:rPr lang="en-US" sz="2400" i="1" smtClean="0">
+                                <a:latin typeface="Cambria Math" panose="02040503050406030204" pitchFamily="18" charset="0"/>
+                                <a:ea typeface="Cambria Math" panose="02040503050406030204" pitchFamily="18" charset="0"/>
+                              </a:rPr>
+                              <m:t>∪</m:t>
+                            </m:r>
+                            <m:r>
+                              <a:rPr lang="en-US" sz="2400" b="0" i="1" smtClean="0">
+                                <a:latin typeface="Cambria Math" panose="02040503050406030204" pitchFamily="18" charset="0"/>
+                                <a:ea typeface="Cambria Math" panose="02040503050406030204" pitchFamily="18" charset="0"/>
+                              </a:rPr>
+                              <m:t> </m:t>
+                            </m:r>
+                          </m:oMath>
+                        </a14:m>
+                        <a:r>
+                          <a:rPr lang="en-US" sz="2400" dirty="0" err="1"/>
+                          <a:t>raisedTriggers</a:t>
+                        </a:r>
+                        <a:endParaRPr lang="en-US" sz="2400" dirty="0"/>
+                      </a:p>
+                    </p:txBody>
+                  </p:sp>
+                </mc:Choice>
+                <mc:Fallback>
+                  <p:sp>
+                    <p:nvSpPr>
+                      <p:cNvPr id="117" name="TextBox 116">
+                        <a:extLst>
+                          <a:ext uri="{FF2B5EF4-FFF2-40B4-BE49-F238E27FC236}">
+                            <a16:creationId xmlns:a16="http://schemas.microsoft.com/office/drawing/2014/main" id="{2C50F20A-6C64-5340-82C6-B08C4A906684}"/>
+                          </a:ext>
+                        </a:extLst>
+                      </p:cNvPr>
+                      <p:cNvSpPr txBox="1">
+                        <a:spLocks noRot="1" noChangeAspect="1" noMove="1" noResize="1" noEditPoints="1" noAdjustHandles="1" noChangeArrowheads="1" noChangeShapeType="1" noTextEdit="1"/>
+                      </p:cNvSpPr>
+                      <p:nvPr/>
+                    </p:nvSpPr>
+                    <p:spPr>
+                      <a:xfrm>
+                        <a:off x="10349108" y="2329712"/>
+                        <a:ext cx="6930490" cy="1712343"/>
+                      </a:xfrm>
+                      <a:prstGeom prst="rect">
+                        <a:avLst/>
+                      </a:prstGeom>
+                      <a:blipFill>
+                        <a:blip r:embed="rId8"/>
+                        <a:stretch>
+                          <a:fillRect t="-3226" b="-7258"/>
+                        </a:stretch>
+                      </a:blipFill>
+                    </p:spPr>
+                    <p:txBody>
+                      <a:bodyPr/>
+                      <a:lstStyle/>
+                      <a:p>
+                        <a:r>
+                          <a:rPr lang="en-US">
+                            <a:noFill/>
+                          </a:rPr>
+                          <a:t> </a:t>
+                        </a:r>
+                      </a:p>
+                    </p:txBody>
+                  </p:sp>
+                </mc:Fallback>
+              </mc:AlternateContent>
+              <mc:AlternateContent xmlns:mc="http://schemas.openxmlformats.org/markup-compatibility/2006">
+                <mc:Choice xmlns:a14="http://schemas.microsoft.com/office/drawing/2010/main" Requires="a14">
+                  <p:sp>
+                    <p:nvSpPr>
+                      <p:cNvPr id="118" name="TextBox 117">
+                        <a:extLst>
+                          <a:ext uri="{FF2B5EF4-FFF2-40B4-BE49-F238E27FC236}">
+                            <a16:creationId xmlns:a16="http://schemas.microsoft.com/office/drawing/2014/main" id="{DAB51B5B-165F-6E4C-9C8E-1DB5E972A147}"/>
+                          </a:ext>
+                        </a:extLst>
+                      </p:cNvPr>
+                      <p:cNvSpPr txBox="1"/>
+                      <p:nvPr/>
+                    </p:nvSpPr>
+                    <p:spPr>
+                      <a:xfrm>
+                        <a:off x="11899634" y="438984"/>
+                        <a:ext cx="4029394" cy="1309439"/>
+                      </a:xfrm>
+                      <a:prstGeom prst="rect">
+                        <a:avLst/>
+                      </a:prstGeom>
+                      <a:noFill/>
+                    </p:spPr>
+                    <p:txBody>
+                      <a:bodyPr wrap="none" rtlCol="0">
+                        <a:spAutoFit/>
+                      </a:bodyPr>
+                      <a:lstStyle/>
+                      <a:p>
+                        <a:pPr algn="ctr"/>
+                        <a:r>
+                          <a:rPr lang="en-US" sz="2400" i="1" dirty="0"/>
+                          <a:t>Initialisation</a:t>
+                        </a:r>
+                      </a:p>
+                      <a:p>
+                        <a:pPr algn="ctr"/>
+                        <a:r>
+                          <a:rPr lang="en-US" sz="2400" dirty="0"/>
+                          <a:t>/ </a:t>
+                        </a:r>
+                        <a:r>
+                          <a:rPr lang="en-US" sz="2400" dirty="0" err="1"/>
+                          <a:t>uc</a:t>
+                        </a:r>
+                        <a:r>
+                          <a:rPr lang="en-US" sz="2400" dirty="0"/>
+                          <a:t> := FALSE &amp; dt := </a:t>
+                        </a:r>
+                        <a14:m>
+                          <m:oMath xmlns:m="http://schemas.openxmlformats.org/officeDocument/2006/math">
+                            <m:r>
+                              <a:rPr lang="en-US" sz="2400" i="1" smtClean="0">
+                                <a:latin typeface="Cambria Math" panose="02040503050406030204" pitchFamily="18" charset="0"/>
+                                <a:ea typeface="Cambria Math" panose="02040503050406030204" pitchFamily="18" charset="0"/>
+                              </a:rPr>
+                              <m:t>∅</m:t>
+                            </m:r>
+                            <m:r>
+                              <a:rPr lang="en-US" sz="2400" b="0" i="0" smtClean="0">
+                                <a:latin typeface="Cambria Math" panose="02040503050406030204" pitchFamily="18" charset="0"/>
+                                <a:ea typeface="Cambria Math" panose="02040503050406030204" pitchFamily="18" charset="0"/>
+                              </a:rPr>
+                              <m:t> </m:t>
+                            </m:r>
+                          </m:oMath>
+                        </a14:m>
+                        <a:r>
+                          <a:rPr lang="en-US" sz="2400" dirty="0"/>
+                          <a:t>&amp; </a:t>
+                        </a:r>
+                      </a:p>
+                      <a:p>
+                        <a:pPr algn="ctr"/>
+                        <a:r>
+                          <a:rPr lang="en-US" sz="2400" dirty="0" err="1"/>
+                          <a:t>iQ</a:t>
+                        </a:r>
+                        <a:r>
+                          <a:rPr lang="en-US" sz="2400" dirty="0"/>
+                          <a:t> := </a:t>
+                        </a:r>
+                        <a14:m>
+                          <m:oMath xmlns:m="http://schemas.openxmlformats.org/officeDocument/2006/math">
+                            <m:r>
+                              <a:rPr lang="en-US" sz="2400" i="1">
+                                <a:latin typeface="Cambria Math" panose="02040503050406030204" pitchFamily="18" charset="0"/>
+                                <a:ea typeface="Cambria Math" panose="02040503050406030204" pitchFamily="18" charset="0"/>
+                              </a:rPr>
+                              <m:t>∅</m:t>
+                            </m:r>
+                          </m:oMath>
+                        </a14:m>
+                        <a:r>
+                          <a:rPr lang="en-US" sz="2400" dirty="0"/>
+                          <a:t> &amp; </a:t>
+                        </a:r>
+                        <a:r>
+                          <a:rPr lang="en-US" sz="2400" dirty="0" err="1"/>
+                          <a:t>eQ</a:t>
+                        </a:r>
+                        <a:r>
+                          <a:rPr lang="en-US" sz="2400" dirty="0"/>
+                          <a:t> := </a:t>
+                        </a:r>
+                        <a14:m>
+                          <m:oMath xmlns:m="http://schemas.openxmlformats.org/officeDocument/2006/math">
+                            <m:r>
+                              <a:rPr lang="en-US" sz="2400" i="1">
+                                <a:latin typeface="Cambria Math" panose="02040503050406030204" pitchFamily="18" charset="0"/>
+                                <a:ea typeface="Cambria Math" panose="02040503050406030204" pitchFamily="18" charset="0"/>
+                              </a:rPr>
+                              <m:t>∅</m:t>
+                            </m:r>
+                          </m:oMath>
+                        </a14:m>
+                        <a:endParaRPr lang="en-US" sz="2400" dirty="0"/>
+                      </a:p>
+                    </p:txBody>
+                  </p:sp>
+                </mc:Choice>
+                <mc:Fallback>
+                  <p:sp>
+                    <p:nvSpPr>
+                      <p:cNvPr id="118" name="TextBox 117">
+                        <a:extLst>
+                          <a:ext uri="{FF2B5EF4-FFF2-40B4-BE49-F238E27FC236}">
+                            <a16:creationId xmlns:a16="http://schemas.microsoft.com/office/drawing/2014/main" id="{DAB51B5B-165F-6E4C-9C8E-1DB5E972A147}"/>
+                          </a:ext>
+                        </a:extLst>
+                      </p:cNvPr>
+                      <p:cNvSpPr txBox="1">
+                        <a:spLocks noRot="1" noChangeAspect="1" noMove="1" noResize="1" noEditPoints="1" noAdjustHandles="1" noChangeArrowheads="1" noChangeShapeType="1" noTextEdit="1"/>
+                      </p:cNvSpPr>
+                      <p:nvPr/>
+                    </p:nvSpPr>
+                    <p:spPr>
+                      <a:xfrm>
+                        <a:off x="11899634" y="438984"/>
+                        <a:ext cx="4029394" cy="1309439"/>
+                      </a:xfrm>
+                      <a:prstGeom prst="rect">
+                        <a:avLst/>
+                      </a:prstGeom>
+                      <a:blipFill>
+                        <a:blip r:embed="rId9"/>
+                        <a:stretch>
+                          <a:fillRect l="-2308" t="-4211" r="-2308" b="-9474"/>
+                        </a:stretch>
+                      </a:blipFill>
+                    </p:spPr>
+                    <p:txBody>
+                      <a:bodyPr/>
+                      <a:lstStyle/>
+                      <a:p>
+                        <a:r>
+                          <a:rPr lang="en-US">
+                            <a:noFill/>
+                          </a:rPr>
+                          <a:t> </a:t>
+                        </a:r>
+                      </a:p>
+                    </p:txBody>
+                  </p:sp>
+                </mc:Fallback>
+              </mc:AlternateContent>
+              <p:sp>
+                <p:nvSpPr>
+                  <p:cNvPr id="9" name="TextBox 8">
+                    <a:extLst>
+                      <a:ext uri="{FF2B5EF4-FFF2-40B4-BE49-F238E27FC236}">
+                        <a16:creationId xmlns:a16="http://schemas.microsoft.com/office/drawing/2014/main" id="{6A9848B8-CD59-624D-B64D-7CB349D600AB}"/>
+                      </a:ext>
+                    </a:extLst>
+                  </p:cNvPr>
+                  <p:cNvSpPr txBox="1"/>
+                  <p:nvPr/>
+                </p:nvSpPr>
+                <p:spPr>
+                  <a:xfrm>
+                    <a:off x="-1150819" y="6023030"/>
+                    <a:ext cx="13103298" cy="906535"/>
+                  </a:xfrm>
+                  <a:prstGeom prst="rect">
+                    <a:avLst/>
+                  </a:prstGeom>
+                  <a:solidFill>
+                    <a:srgbClr val="00B050"/>
+                  </a:solidFill>
+                  <a:ln w="25400">
+                    <a:solidFill>
+                      <a:schemeClr val="tx1"/>
+                    </a:solidFill>
+                  </a:ln>
+                </p:spPr>
+                <p:txBody>
+                  <a:bodyPr wrap="square" rtlCol="0">
+                    <a:spAutoFit/>
+                  </a:bodyPr>
+                  <a:lstStyle/>
+                  <a:p>
+                    <a:pPr algn="ctr"/>
+                    <a:endParaRPr lang="en-US" sz="1200" dirty="0"/>
+                  </a:p>
+                  <a:p>
+                    <a:pPr algn="ctr"/>
+                    <a:r>
+                      <a:rPr lang="en-US" sz="2400" dirty="0"/>
+                      <a:t>READY TO DE-QUEUE</a:t>
+                    </a:r>
+                  </a:p>
+                  <a:p>
+                    <a:pPr algn="ctr"/>
+                    <a:endParaRPr lang="en-US" sz="1200" dirty="0"/>
+                  </a:p>
+                </p:txBody>
+              </p:sp>
+            </p:grpSp>
+            <mc:AlternateContent xmlns:mc="http://schemas.openxmlformats.org/markup-compatibility/2006">
+              <mc:Choice xmlns:a14="http://schemas.microsoft.com/office/drawing/2010/main" Requires="a14">
+                <p:sp>
+                  <p:nvSpPr>
+                    <p:cNvPr id="66" name="TextBox 65">
+                      <a:extLst>
+                        <a:ext uri="{FF2B5EF4-FFF2-40B4-BE49-F238E27FC236}">
+                          <a16:creationId xmlns:a16="http://schemas.microsoft.com/office/drawing/2014/main" id="{A19EBE4B-4904-C544-BF3A-7645D17C21E5}"/>
+                        </a:ext>
+                      </a:extLst>
+                    </p:cNvPr>
+                    <p:cNvSpPr txBox="1"/>
+                    <p:nvPr/>
+                  </p:nvSpPr>
+                  <p:spPr>
+                    <a:xfrm>
+                      <a:off x="4389314" y="6135017"/>
+                      <a:ext cx="7383586" cy="1200329"/>
+                    </a:xfrm>
+                    <a:prstGeom prst="rect">
+                      <a:avLst/>
+                    </a:prstGeom>
+                    <a:noFill/>
+                  </p:spPr>
+                  <p:txBody>
+                    <a:bodyPr wrap="square" numCol="1" rtlCol="0">
+                      <a:spAutoFit/>
+                    </a:bodyPr>
+                    <a:lstStyle/>
+                    <a:p>
+                      <a:pPr marL="342900" indent="-342900">
+                        <a:buFont typeface="Arial" panose="020B0604020202020204" pitchFamily="34" charset="0"/>
+                        <a:buChar char="•"/>
+                      </a:pPr>
+                      <a:r>
+                        <a:rPr lang="en-US" sz="2400" dirty="0"/>
+                        <a:t>Event guards: P1 &amp; P2 / Event action: </a:t>
+                      </a:r>
+                      <a14:m>
+                        <m:oMath xmlns:m="http://schemas.openxmlformats.org/officeDocument/2006/math">
+                          <m:r>
+                            <a:rPr lang="en-US" sz="2400" b="0" i="1" smtClean="0">
+                              <a:latin typeface="Cambria Math" panose="02040503050406030204" pitchFamily="18" charset="0"/>
+                            </a:rPr>
+                            <m:t>𝑏</m:t>
+                          </m:r>
+                          <m:r>
+                            <a:rPr lang="en-US" sz="2400" b="0" i="1" smtClean="0">
+                              <a:latin typeface="Cambria Math" panose="02040503050406030204" pitchFamily="18" charset="0"/>
+                            </a:rPr>
+                            <m:t>≔</m:t>
+                          </m:r>
+                          <m:r>
+                            <a:rPr lang="en-US" sz="2400" b="0" i="1" smtClean="0">
+                              <a:latin typeface="Cambria Math" panose="02040503050406030204" pitchFamily="18" charset="0"/>
+                            </a:rPr>
+                            <m:t>𝑏</m:t>
+                          </m:r>
+                          <m:r>
+                            <a:rPr lang="en-US" sz="2400" b="0" i="1" smtClean="0">
+                              <a:latin typeface="Cambria Math" panose="02040503050406030204" pitchFamily="18" charset="0"/>
+                            </a:rPr>
+                            <m:t>+1</m:t>
+                          </m:r>
+                        </m:oMath>
+                      </a14:m>
+                      <a:r>
+                        <a:rPr lang="en-US" sz="2400" dirty="0"/>
+                        <a:t> </a:t>
+                      </a:r>
+                    </a:p>
+                    <a:p>
+                      <a:r>
+                        <a:rPr lang="en-US" sz="2400" dirty="0"/>
+                        <a:t>Note: P1, P2 are predicates, </a:t>
+                      </a:r>
+                      <a14:m>
+                        <m:oMath xmlns:m="http://schemas.openxmlformats.org/officeDocument/2006/math">
+                          <m:r>
+                            <a:rPr lang="en-US" sz="2400" b="0" i="1" smtClean="0">
+                              <a:latin typeface="Cambria Math" panose="02040503050406030204" pitchFamily="18" charset="0"/>
+                            </a:rPr>
+                            <m:t>𝑏</m:t>
+                          </m:r>
+                          <m:r>
+                            <a:rPr lang="en-US" sz="2400" i="1">
+                              <a:latin typeface="Cambria Math" panose="02040503050406030204" pitchFamily="18" charset="0"/>
+                            </a:rPr>
+                            <m:t> </m:t>
+                          </m:r>
+                        </m:oMath>
+                      </a14:m>
+                      <a:r>
+                        <a:rPr lang="en-US" sz="2400" dirty="0"/>
+                        <a:t>is a model variable, </a:t>
+                      </a:r>
+                    </a:p>
+                    <a:p>
+                      <a:r>
+                        <a:rPr lang="en-US" sz="2400" dirty="0"/>
+                        <a:t>and / separates guards from actions</a:t>
+                      </a:r>
+                    </a:p>
+                  </p:txBody>
+                </p:sp>
+              </mc:Choice>
+              <mc:Fallback>
+                <p:sp>
+                  <p:nvSpPr>
+                    <p:cNvPr id="66" name="TextBox 65">
+                      <a:extLst>
+                        <a:ext uri="{FF2B5EF4-FFF2-40B4-BE49-F238E27FC236}">
+                          <a16:creationId xmlns:a16="http://schemas.microsoft.com/office/drawing/2014/main" id="{A19EBE4B-4904-C544-BF3A-7645D17C21E5}"/>
+                        </a:ext>
+                      </a:extLst>
+                    </p:cNvPr>
+                    <p:cNvSpPr txBox="1">
+                      <a:spLocks noRot="1" noChangeAspect="1" noMove="1" noResize="1" noEditPoints="1" noAdjustHandles="1" noChangeArrowheads="1" noChangeShapeType="1" noTextEdit="1"/>
+                    </p:cNvSpPr>
+                    <p:nvPr/>
+                  </p:nvSpPr>
+                  <p:spPr>
+                    <a:xfrm>
+                      <a:off x="4389314" y="6135017"/>
+                      <a:ext cx="7383586" cy="1200329"/>
+                    </a:xfrm>
+                    <a:prstGeom prst="rect">
+                      <a:avLst/>
+                    </a:prstGeom>
+                    <a:blipFill>
+                      <a:blip r:embed="rId10"/>
+                      <a:stretch>
+                        <a:fillRect l="-1375" t="-2083" b="-9375"/>
+                      </a:stretch>
+                    </a:blipFill>
+                  </p:spPr>
+                  <p:txBody>
+                    <a:bodyPr/>
+                    <a:lstStyle/>
+                    <a:p>
+                      <a:r>
+                        <a:rPr lang="en-US">
+                          <a:noFill/>
+                        </a:rPr>
+                        <a:t> </a:t>
+                      </a:r>
+                    </a:p>
+                  </p:txBody>
+                </p:sp>
+              </mc:Fallback>
+            </mc:AlternateContent>
+          </p:grpSp>
+          <p:cxnSp>
+            <p:nvCxnSpPr>
+              <p:cNvPr id="31" name="Elbow Connector 30">
+                <a:extLst>
+                  <a:ext uri="{FF2B5EF4-FFF2-40B4-BE49-F238E27FC236}">
+                    <a16:creationId xmlns:a16="http://schemas.microsoft.com/office/drawing/2014/main" id="{F0DE855F-699C-9746-B77F-00739AFCEA1D}"/>
+                  </a:ext>
+                </a:extLst>
+              </p:cNvPr>
+              <p:cNvCxnSpPr>
+                <a:cxnSpLocks/>
+                <a:stCxn id="9" idx="1"/>
+              </p:cNvCxnSpPr>
+              <p:nvPr/>
+            </p:nvCxnSpPr>
+            <p:spPr>
+              <a:xfrm rot="10800000" flipH="1">
+                <a:off x="-1414463" y="3177651"/>
+                <a:ext cx="189026" cy="2509556"/>
+              </a:xfrm>
+              <a:prstGeom prst="bentConnector4">
+                <a:avLst>
+                  <a:gd name="adj1" fmla="val -234313"/>
+                  <a:gd name="adj2" fmla="val 100408"/>
+                </a:avLst>
+              </a:prstGeom>
+              <a:ln w="50800">
+                <a:solidFill>
+                  <a:schemeClr val="tx1"/>
+                </a:solidFill>
+                <a:tailEnd type="triangle"/>
+              </a:ln>
+            </p:spPr>
+            <p:style>
+              <a:lnRef idx="1">
+                <a:schemeClr val="accent1"/>
+              </a:lnRef>
+              <a:fillRef idx="0">
+                <a:schemeClr val="accent1"/>
+              </a:fillRef>
+              <a:effectRef idx="0">
+                <a:schemeClr val="accent1"/>
+              </a:effectRef>
+              <a:fontRef idx="minor">
                 <a:schemeClr val="tx1"/>
-              </a:solidFill>
-              <a:prstDash val="dash"/>
-            </a:ln>
-          </p:spPr>
-          <p:txBody>
-            <a:bodyPr wrap="square" rtlCol="0">
-              <a:spAutoFit/>
-            </a:bodyPr>
-            <a:lstStyle/>
-            <a:p>
-              <a:pPr algn="ctr"/>
-              <a:r>
-                <a:rPr lang="en-US" b="1" i="1" dirty="0"/>
-                <a:t>Firing Transitions</a:t>
-              </a:r>
-            </a:p>
-            <a:p>
-              <a:pPr algn="ctr"/>
-              <a:endParaRPr lang="en-US" b="1" i="1" dirty="0"/>
-            </a:p>
-            <a:p>
-              <a:pPr algn="ctr"/>
-              <a:endParaRPr lang="en-US" b="1" i="1" dirty="0"/>
-            </a:p>
-            <a:p>
-              <a:pPr algn="ctr"/>
-              <a:endParaRPr lang="en-US" b="1" i="1" dirty="0"/>
-            </a:p>
-            <a:p>
-              <a:pPr algn="ctr"/>
-              <a:endParaRPr lang="en-US" dirty="0"/>
-            </a:p>
-            <a:p>
-              <a:pPr algn="ctr"/>
-              <a:endParaRPr lang="en-US" dirty="0"/>
-            </a:p>
-            <a:p>
-              <a:pPr algn="ctr"/>
-              <a:endParaRPr lang="en-US" dirty="0"/>
-            </a:p>
-            <a:p>
-              <a:pPr algn="ctr"/>
-              <a:endParaRPr lang="en-US" dirty="0"/>
-            </a:p>
-            <a:p>
-              <a:pPr algn="ctr"/>
-              <a:endParaRPr lang="en-US" dirty="0"/>
-            </a:p>
-            <a:p>
-              <a:pPr algn="ctr"/>
-              <a:endParaRPr lang="en-US" dirty="0"/>
-            </a:p>
-            <a:p>
-              <a:pPr algn="ctr"/>
-              <a:endParaRPr lang="en-US" dirty="0"/>
-            </a:p>
-            <a:p>
-              <a:pPr algn="ctr"/>
-              <a:endParaRPr lang="en-US" dirty="0"/>
-            </a:p>
-            <a:p>
-              <a:pPr algn="ctr"/>
-              <a:endParaRPr lang="en-US" dirty="0"/>
-            </a:p>
-            <a:p>
-              <a:pPr algn="ctr"/>
-              <a:endParaRPr lang="en-US" dirty="0"/>
-            </a:p>
-            <a:p>
-              <a:pPr algn="ctr"/>
-              <a:endParaRPr lang="en-US" dirty="0"/>
-            </a:p>
-          </p:txBody>
-        </p:sp>
-        <p:sp>
-          <p:nvSpPr>
-            <p:cNvPr id="2" name="TextBox 1">
-              <a:extLst>
-                <a:ext uri="{FF2B5EF4-FFF2-40B4-BE49-F238E27FC236}">
-                  <a16:creationId xmlns:a16="http://schemas.microsoft.com/office/drawing/2014/main" id="{971FA984-4077-6D4B-9E4F-F7ACBF2CCD98}"/>
-                </a:ext>
-              </a:extLst>
-            </p:cNvPr>
-            <p:cNvSpPr txBox="1"/>
-            <p:nvPr/>
-          </p:nvSpPr>
-          <p:spPr>
-            <a:xfrm>
-              <a:off x="1450270" y="1146163"/>
-              <a:ext cx="2068534" cy="2819917"/>
-            </a:xfrm>
-            <a:prstGeom prst="rect">
-              <a:avLst/>
-            </a:prstGeom>
-            <a:solidFill>
-              <a:srgbClr val="92D050"/>
-            </a:solidFill>
-            <a:ln w="25400">
-              <a:solidFill>
+              </a:fontRef>
+            </p:style>
+          </p:cxnSp>
+          <p:cxnSp>
+            <p:nvCxnSpPr>
+              <p:cNvPr id="35" name="Elbow Connector 34">
+                <a:extLst>
+                  <a:ext uri="{FF2B5EF4-FFF2-40B4-BE49-F238E27FC236}">
+                    <a16:creationId xmlns:a16="http://schemas.microsoft.com/office/drawing/2014/main" id="{CACD9559-1CE3-5A4A-8252-B2403EE146E6}"/>
+                  </a:ext>
+                </a:extLst>
+              </p:cNvPr>
+              <p:cNvCxnSpPr>
+                <a:cxnSpLocks/>
+              </p:cNvCxnSpPr>
+              <p:nvPr/>
+            </p:nvCxnSpPr>
+            <p:spPr>
+              <a:xfrm rot="16200000" flipV="1">
+                <a:off x="985970" y="3222988"/>
+                <a:ext cx="2141857" cy="1953563"/>
+              </a:xfrm>
+              <a:prstGeom prst="bentConnector3">
+                <a:avLst>
+                  <a:gd name="adj1" fmla="val 100030"/>
+                </a:avLst>
+              </a:prstGeom>
+              <a:ln w="50800">
+                <a:solidFill>
+                  <a:schemeClr val="tx1"/>
+                </a:solidFill>
+                <a:tailEnd type="triangle"/>
+              </a:ln>
+            </p:spPr>
+            <p:style>
+              <a:lnRef idx="1">
+                <a:schemeClr val="accent1"/>
+              </a:lnRef>
+              <a:fillRef idx="0">
+                <a:schemeClr val="accent1"/>
+              </a:fillRef>
+              <a:effectRef idx="0">
+                <a:schemeClr val="accent1"/>
+              </a:effectRef>
+              <a:fontRef idx="minor">
                 <a:schemeClr val="tx1"/>
-              </a:solidFill>
-            </a:ln>
-          </p:spPr>
-          <p:txBody>
-            <a:bodyPr wrap="square" rtlCol="0">
-              <a:spAutoFit/>
-            </a:bodyPr>
-            <a:lstStyle/>
-            <a:p>
-              <a:pPr algn="ctr"/>
-              <a:endParaRPr lang="en-US" dirty="0"/>
-            </a:p>
-            <a:p>
-              <a:pPr algn="ctr"/>
-              <a:endParaRPr lang="en-US" dirty="0"/>
-            </a:p>
-            <a:p>
-              <a:pPr algn="ctr"/>
-              <a:endParaRPr lang="en-US" dirty="0"/>
-            </a:p>
-            <a:p>
-              <a:pPr algn="ctr"/>
-              <a:r>
-                <a:rPr lang="en-US" dirty="0"/>
-                <a:t>FIRING</a:t>
-              </a:r>
-            </a:p>
-            <a:p>
-              <a:pPr algn="ctr"/>
-              <a:r>
-                <a:rPr lang="en-US" dirty="0"/>
-                <a:t>TRIGGERED</a:t>
-              </a:r>
-            </a:p>
-            <a:p>
-              <a:pPr algn="ctr"/>
-              <a:endParaRPr lang="en-US" dirty="0"/>
-            </a:p>
-            <a:p>
-              <a:pPr algn="ctr"/>
-              <a:endParaRPr lang="en-US" dirty="0"/>
-            </a:p>
-            <a:p>
-              <a:pPr algn="ctr"/>
-              <a:endParaRPr lang="en-US" dirty="0"/>
-            </a:p>
-            <a:p>
-              <a:pPr algn="ctr"/>
-              <a:endParaRPr lang="en-US" dirty="0"/>
-            </a:p>
-          </p:txBody>
-        </p:sp>
-        <p:sp>
-          <p:nvSpPr>
-            <p:cNvPr id="3" name="TextBox 2">
-              <a:extLst>
-                <a:ext uri="{FF2B5EF4-FFF2-40B4-BE49-F238E27FC236}">
-                  <a16:creationId xmlns:a16="http://schemas.microsoft.com/office/drawing/2014/main" id="{F42D3D35-1962-DB48-980A-68C922E31B52}"/>
-                </a:ext>
-              </a:extLst>
-            </p:cNvPr>
-            <p:cNvSpPr txBox="1"/>
-            <p:nvPr/>
-          </p:nvSpPr>
-          <p:spPr>
-            <a:xfrm>
-              <a:off x="8650717" y="1146163"/>
-              <a:ext cx="2277854" cy="3122508"/>
-            </a:xfrm>
-            <a:prstGeom prst="rect">
-              <a:avLst/>
-            </a:prstGeom>
-            <a:solidFill>
-              <a:srgbClr val="92D050"/>
-            </a:solidFill>
-            <a:ln w="25400">
-              <a:solidFill>
-                <a:schemeClr val="tx1"/>
-              </a:solidFill>
-            </a:ln>
-          </p:spPr>
-          <p:txBody>
-            <a:bodyPr wrap="square" rtlCol="0">
-              <a:spAutoFit/>
-            </a:bodyPr>
-            <a:lstStyle/>
-            <a:p>
-              <a:pPr algn="ctr"/>
-              <a:endParaRPr lang="en-US" dirty="0"/>
-            </a:p>
-            <a:p>
-              <a:pPr algn="ctr"/>
-              <a:endParaRPr lang="en-US" dirty="0"/>
-            </a:p>
-            <a:p>
-              <a:pPr algn="ctr"/>
-              <a:endParaRPr lang="en-US" dirty="0"/>
-            </a:p>
-            <a:p>
-              <a:pPr algn="ctr"/>
-              <a:r>
-                <a:rPr lang="en-US" dirty="0"/>
-                <a:t>FIRING</a:t>
-              </a:r>
-            </a:p>
-            <a:p>
-              <a:pPr algn="ctr"/>
-              <a:r>
-                <a:rPr lang="en-US" dirty="0"/>
-                <a:t>UN-TRIGGERED</a:t>
-              </a:r>
-            </a:p>
-            <a:p>
-              <a:pPr algn="ctr"/>
-              <a:endParaRPr lang="en-US" dirty="0"/>
-            </a:p>
-            <a:p>
-              <a:pPr algn="ctr"/>
-              <a:endParaRPr lang="en-US" dirty="0"/>
-            </a:p>
-            <a:p>
-              <a:pPr algn="ctr"/>
-              <a:endParaRPr lang="en-US" dirty="0"/>
-            </a:p>
-            <a:p>
-              <a:pPr algn="ctr"/>
-              <a:endParaRPr lang="en-US" dirty="0"/>
-            </a:p>
-            <a:p>
-              <a:pPr algn="ctr"/>
-              <a:endParaRPr lang="en-US" dirty="0"/>
-            </a:p>
-          </p:txBody>
-        </p:sp>
-        <p:sp>
-          <p:nvSpPr>
-            <p:cNvPr id="4" name="Oval 3">
-              <a:extLst>
-                <a:ext uri="{FF2B5EF4-FFF2-40B4-BE49-F238E27FC236}">
-                  <a16:creationId xmlns:a16="http://schemas.microsoft.com/office/drawing/2014/main" id="{0CDB28EA-4F8C-C440-BE47-FCE05F83E614}"/>
-                </a:ext>
-              </a:extLst>
-            </p:cNvPr>
-            <p:cNvSpPr/>
-            <p:nvPr/>
-          </p:nvSpPr>
-          <p:spPr>
-            <a:xfrm>
-              <a:off x="12587788" y="709570"/>
-              <a:ext cx="198780" cy="198780"/>
-            </a:xfrm>
-            <a:prstGeom prst="ellipse">
-              <a:avLst/>
-            </a:prstGeom>
-            <a:solidFill>
-              <a:schemeClr val="tx1"/>
-            </a:solidFill>
-            <a:ln>
-              <a:solidFill>
-                <a:schemeClr val="tx1"/>
-              </a:solidFill>
-            </a:ln>
-          </p:spPr>
-          <p:style>
-            <a:lnRef idx="2">
-              <a:schemeClr val="accent1">
-                <a:shade val="50000"/>
-              </a:schemeClr>
-            </a:lnRef>
-            <a:fillRef idx="1">
-              <a:schemeClr val="accent1"/>
-            </a:fillRef>
-            <a:effectRef idx="0">
-              <a:schemeClr val="accent1"/>
-            </a:effectRef>
-            <a:fontRef idx="minor">
-              <a:schemeClr val="lt1"/>
-            </a:fontRef>
-          </p:style>
-          <p:txBody>
-            <a:bodyPr rtlCol="0" anchor="ctr"/>
-            <a:lstStyle/>
-            <a:p>
-              <a:pPr algn="ctr"/>
-              <a:endParaRPr lang="en-US"/>
-            </a:p>
-          </p:txBody>
-        </p:sp>
-        <p:cxnSp>
-          <p:nvCxnSpPr>
-            <p:cNvPr id="6" name="Elbow Connector 5">
-              <a:extLst>
-                <a:ext uri="{FF2B5EF4-FFF2-40B4-BE49-F238E27FC236}">
-                  <a16:creationId xmlns:a16="http://schemas.microsoft.com/office/drawing/2014/main" id="{EF36610D-0025-5943-A83A-85A24A7D0A88}"/>
-                </a:ext>
-              </a:extLst>
-            </p:cNvPr>
-            <p:cNvCxnSpPr>
-              <a:cxnSpLocks/>
-              <a:stCxn id="4" idx="2"/>
-              <a:endCxn id="3" idx="0"/>
-            </p:cNvCxnSpPr>
-            <p:nvPr/>
-          </p:nvCxnSpPr>
-          <p:spPr>
-            <a:xfrm rot="10800000" flipV="1">
-              <a:off x="9789644" y="808960"/>
-              <a:ext cx="2798143" cy="337204"/>
-            </a:xfrm>
-            <a:prstGeom prst="bentConnector2">
-              <a:avLst/>
-            </a:prstGeom>
-            <a:ln w="50800">
-              <a:solidFill>
-                <a:schemeClr val="tx1"/>
-              </a:solidFill>
-              <a:tailEnd type="triangle"/>
-            </a:ln>
-          </p:spPr>
-          <p:style>
-            <a:lnRef idx="1">
-              <a:schemeClr val="accent1"/>
-            </a:lnRef>
-            <a:fillRef idx="0">
-              <a:schemeClr val="accent1"/>
-            </a:fillRef>
-            <a:effectRef idx="0">
-              <a:schemeClr val="accent1"/>
-            </a:effectRef>
-            <a:fontRef idx="minor">
-              <a:schemeClr val="tx1"/>
-            </a:fontRef>
-          </p:style>
-        </p:cxnSp>
-        <p:sp>
-          <p:nvSpPr>
-            <p:cNvPr id="9" name="TextBox 8">
-              <a:extLst>
-                <a:ext uri="{FF2B5EF4-FFF2-40B4-BE49-F238E27FC236}">
-                  <a16:creationId xmlns:a16="http://schemas.microsoft.com/office/drawing/2014/main" id="{6A9848B8-CD59-624D-B64D-7CB349D600AB}"/>
-                </a:ext>
-              </a:extLst>
-            </p:cNvPr>
-            <p:cNvSpPr txBox="1"/>
-            <p:nvPr/>
-          </p:nvSpPr>
-          <p:spPr>
-            <a:xfrm>
-              <a:off x="1382837" y="5787946"/>
-              <a:ext cx="10053546" cy="1007112"/>
-            </a:xfrm>
-            <a:prstGeom prst="rect">
-              <a:avLst/>
-            </a:prstGeom>
-            <a:solidFill>
-              <a:srgbClr val="00B050"/>
-            </a:solidFill>
-            <a:ln w="25400">
-              <a:solidFill>
-                <a:schemeClr val="tx1"/>
-              </a:solidFill>
-            </a:ln>
-          </p:spPr>
-          <p:txBody>
-            <a:bodyPr wrap="square" rtlCol="0">
-              <a:spAutoFit/>
-            </a:bodyPr>
-            <a:lstStyle/>
-            <a:p>
-              <a:pPr algn="ctr"/>
-              <a:endParaRPr lang="en-US" dirty="0"/>
-            </a:p>
-            <a:p>
-              <a:pPr algn="ctr"/>
-              <a:r>
-                <a:rPr lang="en-US" dirty="0"/>
-                <a:t>READY TO DE-QUEUE</a:t>
-              </a:r>
-            </a:p>
-            <a:p>
-              <a:pPr algn="ctr"/>
-              <a:endParaRPr lang="en-US" dirty="0"/>
-            </a:p>
-          </p:txBody>
-        </p:sp>
-        <p:cxnSp>
-          <p:nvCxnSpPr>
-            <p:cNvPr id="13" name="Straight Arrow Connector 12">
-              <a:extLst>
-                <a:ext uri="{FF2B5EF4-FFF2-40B4-BE49-F238E27FC236}">
-                  <a16:creationId xmlns:a16="http://schemas.microsoft.com/office/drawing/2014/main" id="{52AF5C87-65F1-124D-97DF-B2B622AC5F15}"/>
-                </a:ext>
-              </a:extLst>
-            </p:cNvPr>
-            <p:cNvCxnSpPr>
-              <a:cxnSpLocks/>
-            </p:cNvCxnSpPr>
-            <p:nvPr/>
-          </p:nvCxnSpPr>
-          <p:spPr>
-            <a:xfrm>
-              <a:off x="3044731" y="3984054"/>
-              <a:ext cx="0" cy="1805071"/>
-            </a:xfrm>
-            <a:prstGeom prst="straightConnector1">
-              <a:avLst/>
-            </a:prstGeom>
-            <a:ln w="50800">
-              <a:solidFill>
-                <a:schemeClr val="tx1"/>
-              </a:solidFill>
-              <a:headEnd type="triangle"/>
-              <a:tailEnd type="none"/>
-            </a:ln>
-          </p:spPr>
-          <p:style>
-            <a:lnRef idx="1">
-              <a:schemeClr val="accent1"/>
-            </a:lnRef>
-            <a:fillRef idx="0">
-              <a:schemeClr val="accent1"/>
-            </a:fillRef>
-            <a:effectRef idx="0">
-              <a:schemeClr val="accent1"/>
-            </a:effectRef>
-            <a:fontRef idx="minor">
-              <a:schemeClr val="tx1"/>
-            </a:fontRef>
-          </p:style>
-        </p:cxnSp>
-        <p:cxnSp>
-          <p:nvCxnSpPr>
-            <p:cNvPr id="14" name="Straight Arrow Connector 13">
-              <a:extLst>
-                <a:ext uri="{FF2B5EF4-FFF2-40B4-BE49-F238E27FC236}">
-                  <a16:creationId xmlns:a16="http://schemas.microsoft.com/office/drawing/2014/main" id="{6998DBF2-1F14-AF41-9672-8B59C4BEC28B}"/>
-                </a:ext>
-              </a:extLst>
-            </p:cNvPr>
-            <p:cNvCxnSpPr>
-              <a:cxnSpLocks/>
-            </p:cNvCxnSpPr>
-            <p:nvPr/>
-          </p:nvCxnSpPr>
-          <p:spPr>
-            <a:xfrm>
-              <a:off x="1820125" y="3984054"/>
-              <a:ext cx="0" cy="1803892"/>
-            </a:xfrm>
-            <a:prstGeom prst="straightConnector1">
-              <a:avLst/>
-            </a:prstGeom>
-            <a:ln w="50800">
-              <a:solidFill>
-                <a:schemeClr val="tx1"/>
-              </a:solidFill>
-              <a:headEnd type="triangle"/>
-              <a:tailEnd type="none"/>
-            </a:ln>
-          </p:spPr>
-          <p:style>
-            <a:lnRef idx="1">
-              <a:schemeClr val="accent1"/>
-            </a:lnRef>
-            <a:fillRef idx="0">
-              <a:schemeClr val="accent1"/>
-            </a:fillRef>
-            <a:effectRef idx="0">
-              <a:schemeClr val="accent1"/>
-            </a:effectRef>
-            <a:fontRef idx="minor">
-              <a:schemeClr val="tx1"/>
-            </a:fontRef>
-          </p:style>
-        </p:cxnSp>
-        <p:cxnSp>
-          <p:nvCxnSpPr>
-            <p:cNvPr id="15" name="Straight Arrow Connector 14">
-              <a:extLst>
-                <a:ext uri="{FF2B5EF4-FFF2-40B4-BE49-F238E27FC236}">
-                  <a16:creationId xmlns:a16="http://schemas.microsoft.com/office/drawing/2014/main" id="{E09D293C-430E-024B-9BBB-F91C50010939}"/>
-                </a:ext>
-              </a:extLst>
-            </p:cNvPr>
-            <p:cNvCxnSpPr>
-              <a:cxnSpLocks/>
-              <a:stCxn id="3" idx="2"/>
-            </p:cNvCxnSpPr>
-            <p:nvPr/>
-          </p:nvCxnSpPr>
-          <p:spPr>
-            <a:xfrm>
-              <a:off x="9789644" y="4268671"/>
-              <a:ext cx="0" cy="1519275"/>
-            </a:xfrm>
-            <a:prstGeom prst="straightConnector1">
-              <a:avLst/>
-            </a:prstGeom>
-            <a:ln w="50800">
-              <a:solidFill>
-                <a:schemeClr val="tx1"/>
-              </a:solidFill>
-              <a:tailEnd type="triangle"/>
-            </a:ln>
-          </p:spPr>
-          <p:style>
-            <a:lnRef idx="1">
-              <a:schemeClr val="accent1"/>
-            </a:lnRef>
-            <a:fillRef idx="0">
-              <a:schemeClr val="accent1"/>
-            </a:fillRef>
-            <a:effectRef idx="0">
-              <a:schemeClr val="accent1"/>
-            </a:effectRef>
-            <a:fontRef idx="minor">
-              <a:schemeClr val="tx1"/>
-            </a:fontRef>
-          </p:style>
-        </p:cxnSp>
-        <p:cxnSp>
-          <p:nvCxnSpPr>
-            <p:cNvPr id="19" name="Straight Arrow Connector 18">
-              <a:extLst>
-                <a:ext uri="{FF2B5EF4-FFF2-40B4-BE49-F238E27FC236}">
-                  <a16:creationId xmlns:a16="http://schemas.microsoft.com/office/drawing/2014/main" id="{F43AE6D0-4FE5-8C48-B46C-2BC084BC9F80}"/>
-                </a:ext>
-              </a:extLst>
-            </p:cNvPr>
-            <p:cNvCxnSpPr>
-              <a:cxnSpLocks/>
-            </p:cNvCxnSpPr>
-            <p:nvPr/>
-          </p:nvCxnSpPr>
-          <p:spPr>
-            <a:xfrm>
-              <a:off x="3518805" y="1996877"/>
-              <a:ext cx="5148712" cy="0"/>
-            </a:xfrm>
-            <a:prstGeom prst="straightConnector1">
-              <a:avLst/>
-            </a:prstGeom>
-            <a:ln w="50800">
-              <a:solidFill>
-                <a:schemeClr val="tx1"/>
-              </a:solidFill>
-              <a:tailEnd type="triangle"/>
-            </a:ln>
-          </p:spPr>
-          <p:style>
-            <a:lnRef idx="1">
-              <a:schemeClr val="accent1"/>
-            </a:lnRef>
-            <a:fillRef idx="0">
-              <a:schemeClr val="accent1"/>
-            </a:fillRef>
-            <a:effectRef idx="0">
-              <a:schemeClr val="accent1"/>
-            </a:effectRef>
-            <a:fontRef idx="minor">
-              <a:schemeClr val="tx1"/>
-            </a:fontRef>
-          </p:style>
-        </p:cxnSp>
-        <p:cxnSp>
-          <p:nvCxnSpPr>
-            <p:cNvPr id="20" name="Straight Arrow Connector 19">
-              <a:extLst>
-                <a:ext uri="{FF2B5EF4-FFF2-40B4-BE49-F238E27FC236}">
-                  <a16:creationId xmlns:a16="http://schemas.microsoft.com/office/drawing/2014/main" id="{6EF7FAFD-D5D0-9642-9300-8980A87185D8}"/>
-                </a:ext>
-              </a:extLst>
-            </p:cNvPr>
-            <p:cNvCxnSpPr>
-              <a:cxnSpLocks/>
-            </p:cNvCxnSpPr>
-            <p:nvPr/>
-          </p:nvCxnSpPr>
-          <p:spPr>
-            <a:xfrm>
-              <a:off x="3518805" y="3505428"/>
-              <a:ext cx="5131912" cy="0"/>
-            </a:xfrm>
-            <a:prstGeom prst="straightConnector1">
-              <a:avLst/>
-            </a:prstGeom>
-            <a:ln w="50800">
-              <a:solidFill>
-                <a:schemeClr val="tx1"/>
-              </a:solidFill>
-              <a:headEnd type="none"/>
-              <a:tailEnd type="triangle"/>
-            </a:ln>
-          </p:spPr>
-          <p:style>
-            <a:lnRef idx="1">
-              <a:schemeClr val="accent1"/>
-            </a:lnRef>
-            <a:fillRef idx="0">
-              <a:schemeClr val="accent1"/>
-            </a:fillRef>
-            <a:effectRef idx="0">
-              <a:schemeClr val="accent1"/>
-            </a:effectRef>
-            <a:fontRef idx="minor">
-              <a:schemeClr val="tx1"/>
-            </a:fontRef>
-          </p:style>
-        </p:cxnSp>
-        <p:sp>
-          <p:nvSpPr>
-            <p:cNvPr id="100" name="Arc 99">
-              <a:extLst>
-                <a:ext uri="{FF2B5EF4-FFF2-40B4-BE49-F238E27FC236}">
-                  <a16:creationId xmlns:a16="http://schemas.microsoft.com/office/drawing/2014/main" id="{906E22AA-B2EF-5746-BCB2-DB609B654DA4}"/>
-                </a:ext>
-              </a:extLst>
-            </p:cNvPr>
-            <p:cNvSpPr/>
-            <p:nvPr/>
-          </p:nvSpPr>
-          <p:spPr>
-            <a:xfrm rot="21410085">
-              <a:off x="10446106" y="1610443"/>
-              <a:ext cx="935447" cy="923331"/>
-            </a:xfrm>
-            <a:prstGeom prst="arc">
-              <a:avLst>
-                <a:gd name="adj1" fmla="val 16200000"/>
-                <a:gd name="adj2" fmla="val 5550432"/>
-              </a:avLst>
-            </a:prstGeom>
-            <a:ln w="50800">
-              <a:solidFill>
-                <a:schemeClr val="tx1"/>
-              </a:solidFill>
-              <a:headEnd type="triangle"/>
-            </a:ln>
-          </p:spPr>
-          <p:style>
-            <a:lnRef idx="1">
-              <a:schemeClr val="accent1"/>
-            </a:lnRef>
-            <a:fillRef idx="0">
-              <a:schemeClr val="accent1"/>
-            </a:fillRef>
-            <a:effectRef idx="0">
-              <a:schemeClr val="accent1"/>
-            </a:effectRef>
-            <a:fontRef idx="minor">
-              <a:schemeClr val="tx1"/>
-            </a:fontRef>
-          </p:style>
-          <p:txBody>
-            <a:bodyPr rtlCol="0" anchor="ctr"/>
-            <a:lstStyle/>
-            <a:p>
-              <a:pPr algn="ctr"/>
-              <a:endParaRPr lang="en-US"/>
-            </a:p>
-          </p:txBody>
-        </p:sp>
+              </a:fontRef>
+            </p:style>
+          </p:cxnSp>
+        </p:grpSp>
         <mc:AlternateContent xmlns:mc="http://schemas.openxmlformats.org/markup-compatibility/2006">
           <mc:Choice xmlns:a14="http://schemas.microsoft.com/office/drawing/2010/main" Requires="a14">
             <p:sp>
               <p:nvSpPr>
-                <p:cNvPr id="102" name="TextBox 101">
+                <p:cNvPr id="58" name="TextBox 57">
                   <a:extLst>
                     <a:ext uri="{FF2B5EF4-FFF2-40B4-BE49-F238E27FC236}">
-                      <a16:creationId xmlns:a16="http://schemas.microsoft.com/office/drawing/2014/main" id="{686248CD-7F6D-1044-B45E-09E9AC21B1C0}"/>
+                      <a16:creationId xmlns:a16="http://schemas.microsoft.com/office/drawing/2014/main" id="{984E114B-8AC4-EE42-839B-A73812A85B6C}"/>
                     </a:ext>
                   </a:extLst>
                 </p:cNvPr>
@@ -18358,339 +19762,8 @@
               </p:nvSpPr>
               <p:spPr>
                 <a:xfrm>
-                  <a:off x="1382837" y="6818116"/>
-                  <a:ext cx="14958103" cy="2517783"/>
-                </a:xfrm>
-                <a:prstGeom prst="rect">
-                  <a:avLst/>
-                </a:prstGeom>
-                <a:noFill/>
-              </p:spPr>
-              <p:txBody>
-                <a:bodyPr wrap="square" numCol="2" rtlCol="0">
-                  <a:spAutoFit/>
-                </a:bodyPr>
-                <a:lstStyle/>
-                <a:p>
-                  <a:pPr marL="285750" indent="-285750">
-                    <a:buFont typeface="Arial" panose="020B0604020202020204" pitchFamily="34" charset="0"/>
-                    <a:buChar char="•"/>
-                  </a:pPr>
-                  <a:r>
-                    <a:rPr lang="en-US" b="1" i="1" dirty="0"/>
-                    <a:t>Bold+Italic: Short Description</a:t>
-                  </a:r>
-                </a:p>
-                <a:p>
-                  <a:pPr marL="285750" indent="-285750">
-                    <a:buFont typeface="Arial" panose="020B0604020202020204" pitchFamily="34" charset="0"/>
-                    <a:buChar char="•"/>
-                  </a:pPr>
-                  <a:r>
-                    <a:rPr lang="en-US" i="1" dirty="0"/>
-                    <a:t>Italic: Event-B event name</a:t>
-                  </a:r>
-                </a:p>
-                <a:p>
-                  <a:pPr marL="285750" indent="-285750">
-                    <a:buFont typeface="Arial" panose="020B0604020202020204" pitchFamily="34" charset="0"/>
-                    <a:buChar char="•"/>
-                  </a:pPr>
-                  <a:r>
-                    <a:rPr lang="en-US" dirty="0"/>
-                    <a:t>ALL CAPS: STATE NAMES</a:t>
-                  </a:r>
-                </a:p>
-                <a:p>
-                  <a:r>
-                    <a:rPr lang="en-US" dirty="0"/>
-                    <a:t>Basis invariants: </a:t>
-                  </a:r>
-                </a:p>
-                <a:p>
-                  <a:pPr marL="285750" indent="-285750">
-                    <a:buFont typeface="Arial" panose="020B0604020202020204" pitchFamily="34" charset="0"/>
-                    <a:buChar char="•"/>
-                  </a:pPr>
-                  <a:endParaRPr lang="en-US" dirty="0"/>
-                </a:p>
-                <a:p>
-                  <a:pPr marL="285750" indent="-285750">
-                    <a:buFont typeface="Arial" panose="020B0604020202020204" pitchFamily="34" charset="0"/>
-                    <a:buChar char="•"/>
-                  </a:pPr>
-                  <a:endParaRPr lang="en-US" dirty="0"/>
-                </a:p>
-                <a:p>
-                  <a:endParaRPr lang="en-US" dirty="0"/>
-                </a:p>
-                <a:p>
-                  <a:endParaRPr lang="en-US" dirty="0"/>
-                </a:p>
-                <a:p>
-                  <a:pPr marL="285750" indent="-285750">
-                    <a:buFont typeface="Arial" panose="020B0604020202020204" pitchFamily="34" charset="0"/>
-                    <a:buChar char="•"/>
-                  </a:pPr>
-                  <a:r>
-                    <a:rPr lang="en-US" dirty="0"/>
-                    <a:t>Event guards: P1 &amp; P2 / Event action: </a:t>
-                  </a:r>
-                  <a14:m>
-                    <m:oMath xmlns:m="http://schemas.openxmlformats.org/officeDocument/2006/math">
-                      <m:r>
-                        <a:rPr lang="en-US" b="0" i="1" smtClean="0">
-                          <a:latin typeface="Cambria Math" panose="02040503050406030204" pitchFamily="18" charset="0"/>
-                        </a:rPr>
-                        <m:t>𝑏</m:t>
-                      </m:r>
-                      <m:r>
-                        <a:rPr lang="en-US" b="0" i="1" smtClean="0">
-                          <a:latin typeface="Cambria Math" panose="02040503050406030204" pitchFamily="18" charset="0"/>
-                        </a:rPr>
-                        <m:t>≔</m:t>
-                      </m:r>
-                      <m:r>
-                        <a:rPr lang="en-US" b="0" i="1" smtClean="0">
-                          <a:latin typeface="Cambria Math" panose="02040503050406030204" pitchFamily="18" charset="0"/>
-                        </a:rPr>
-                        <m:t>𝑏</m:t>
-                      </m:r>
-                      <m:r>
-                        <a:rPr lang="en-US" b="0" i="1" smtClean="0">
-                          <a:latin typeface="Cambria Math" panose="02040503050406030204" pitchFamily="18" charset="0"/>
-                        </a:rPr>
-                        <m:t>+1</m:t>
-                      </m:r>
-                    </m:oMath>
-                  </a14:m>
-                  <a:r>
-                    <a:rPr lang="en-US" dirty="0"/>
-                    <a:t> </a:t>
-                  </a:r>
-                </a:p>
-                <a:p>
-                  <a:r>
-                    <a:rPr lang="en-US" dirty="0"/>
-                    <a:t>Note: P1, P2 are predicates, </a:t>
-                  </a:r>
-                  <a14:m>
-                    <m:oMath xmlns:m="http://schemas.openxmlformats.org/officeDocument/2006/math">
-                      <m:r>
-                        <a:rPr lang="en-US" b="0" i="1" smtClean="0">
-                          <a:latin typeface="Cambria Math" panose="02040503050406030204" pitchFamily="18" charset="0"/>
-                        </a:rPr>
-                        <m:t>𝑏</m:t>
-                      </m:r>
-                      <m:r>
-                        <a:rPr lang="en-US" i="1">
-                          <a:latin typeface="Cambria Math" panose="02040503050406030204" pitchFamily="18" charset="0"/>
-                        </a:rPr>
-                        <m:t> </m:t>
-                      </m:r>
-                    </m:oMath>
-                  </a14:m>
-                  <a:r>
-                    <a:rPr lang="en-US" dirty="0"/>
-                    <a:t>is a model variable, and / separates guards from actions</a:t>
-                  </a:r>
-                </a:p>
-              </p:txBody>
-            </p:sp>
-          </mc:Choice>
-          <mc:Fallback>
-            <p:sp>
-              <p:nvSpPr>
-                <p:cNvPr id="102" name="TextBox 101">
-                  <a:extLst>
-                    <a:ext uri="{FF2B5EF4-FFF2-40B4-BE49-F238E27FC236}">
-                      <a16:creationId xmlns:a16="http://schemas.microsoft.com/office/drawing/2014/main" id="{686248CD-7F6D-1044-B45E-09E9AC21B1C0}"/>
-                    </a:ext>
-                  </a:extLst>
-                </p:cNvPr>
-                <p:cNvSpPr txBox="1">
-                  <a:spLocks noRot="1" noChangeAspect="1" noMove="1" noResize="1" noEditPoints="1" noAdjustHandles="1" noChangeArrowheads="1" noChangeShapeType="1" noTextEdit="1"/>
-                </p:cNvSpPr>
-                <p:nvPr/>
-              </p:nvSpPr>
-              <p:spPr>
-                <a:xfrm>
-                  <a:off x="1382837" y="6818116"/>
-                  <a:ext cx="14958103" cy="2517783"/>
-                </a:xfrm>
-                <a:prstGeom prst="rect">
-                  <a:avLst/>
-                </a:prstGeom>
-                <a:blipFill>
-                  <a:blip r:embed="rId3"/>
-                  <a:stretch>
-                    <a:fillRect l="-312" t="-546"/>
-                  </a:stretch>
-                </a:blipFill>
-              </p:spPr>
-              <p:txBody>
-                <a:bodyPr/>
-                <a:lstStyle/>
-                <a:p>
-                  <a:r>
-                    <a:rPr lang="en-US">
-                      <a:noFill/>
-                    </a:rPr>
-                    <a:t> </a:t>
-                  </a:r>
-                </a:p>
-              </p:txBody>
-            </p:sp>
-          </mc:Fallback>
-        </mc:AlternateContent>
-        <mc:AlternateContent xmlns:mc="http://schemas.openxmlformats.org/markup-compatibility/2006" xmlns:a14="http://schemas.microsoft.com/office/drawing/2010/main">
-          <mc:Choice Requires="a14">
-            <p:sp>
-              <p:nvSpPr>
-                <p:cNvPr id="103" name="TextBox 102">
-                  <a:extLst>
-                    <a:ext uri="{FF2B5EF4-FFF2-40B4-BE49-F238E27FC236}">
-                      <a16:creationId xmlns:a16="http://schemas.microsoft.com/office/drawing/2014/main" id="{32052193-2A6B-A84B-BFD4-16AE3364E8B3}"/>
-                    </a:ext>
-                  </a:extLst>
-                </p:cNvPr>
-                <p:cNvSpPr txBox="1"/>
-                <p:nvPr/>
-              </p:nvSpPr>
-              <p:spPr>
-                <a:xfrm>
-                  <a:off x="10673916" y="4267847"/>
-                  <a:ext cx="3183426" cy="1309439"/>
-                </a:xfrm>
-                <a:prstGeom prst="rect">
-                  <a:avLst/>
-                </a:prstGeom>
-                <a:noFill/>
-              </p:spPr>
-              <p:txBody>
-                <a:bodyPr wrap="none" rtlCol="0">
-                  <a:spAutoFit/>
-                </a:bodyPr>
-                <a:lstStyle/>
-                <a:p>
-                  <a:pPr algn="ctr"/>
-                  <a:r>
-                    <a:rPr lang="en-US" b="1" i="1" dirty="0"/>
-                    <a:t>Completion</a:t>
-                  </a:r>
-                </a:p>
-                <a:p>
-                  <a:pPr algn="ctr"/>
-                  <a:r>
-                    <a:rPr lang="en-US" i="1" dirty="0" err="1"/>
-                    <a:t>NoUntriggeredTransitions</a:t>
-                  </a:r>
-                  <a:endParaRPr lang="en-US" i="1" dirty="0"/>
-                </a:p>
-                <a:p>
-                  <a:pPr algn="ctr"/>
-                  <a:r>
-                    <a:rPr lang="en-US" dirty="0" err="1"/>
-                    <a:t>uc</a:t>
-                  </a:r>
-                  <a:r>
-                    <a:rPr lang="en-US" dirty="0"/>
-                    <a:t> = FALSE &amp; dt = </a:t>
-                  </a:r>
-                  <a14:m>
-                    <m:oMath xmlns:m="http://schemas.openxmlformats.org/officeDocument/2006/math">
-                      <m:r>
-                        <a:rPr lang="en-US" i="1" smtClean="0">
-                          <a:latin typeface="Cambria Math" panose="02040503050406030204" pitchFamily="18" charset="0"/>
-                          <a:ea typeface="Cambria Math" panose="02040503050406030204" pitchFamily="18" charset="0"/>
-                        </a:rPr>
-                        <m:t>∅</m:t>
-                      </m:r>
-                    </m:oMath>
-                  </a14:m>
-                  <a:endParaRPr lang="en-US" dirty="0"/>
-                </a:p>
-                <a:p>
-                  <a:pPr algn="ctr"/>
-                  <a:r>
-                    <a:rPr lang="en-US" dirty="0"/>
-                    <a:t>/ </a:t>
-                  </a:r>
-                  <a:r>
-                    <a:rPr lang="en-US" dirty="0" err="1"/>
-                    <a:t>uc</a:t>
-                  </a:r>
-                  <a:r>
-                    <a:rPr lang="en-US" dirty="0"/>
-                    <a:t> := TRUE</a:t>
-                  </a:r>
-                </a:p>
-              </p:txBody>
-            </p:sp>
-          </mc:Choice>
-          <mc:Fallback xmlns="">
-            <p:sp>
-              <p:nvSpPr>
-                <p:cNvPr id="103" name="TextBox 102">
-                  <a:extLst>
-                    <a:ext uri="{FF2B5EF4-FFF2-40B4-BE49-F238E27FC236}">
-                      <a16:creationId xmlns:a16="http://schemas.microsoft.com/office/drawing/2014/main" id="{32052193-2A6B-A84B-BFD4-16AE3364E8B3}"/>
-                    </a:ext>
-                  </a:extLst>
-                </p:cNvPr>
-                <p:cNvSpPr txBox="1">
-                  <a:spLocks noRot="1" noChangeAspect="1" noMove="1" noResize="1" noEditPoints="1" noAdjustHandles="1" noChangeArrowheads="1" noChangeShapeType="1" noTextEdit="1"/>
-                </p:cNvSpPr>
-                <p:nvPr/>
-              </p:nvSpPr>
-              <p:spPr>
-                <a:xfrm>
-                  <a:off x="10673916" y="4267847"/>
-                  <a:ext cx="3183426" cy="1309439"/>
-                </a:xfrm>
-                <a:prstGeom prst="rect">
-                  <a:avLst/>
-                </a:prstGeom>
-                <a:blipFill>
-                  <a:blip r:embed="rId4"/>
-                  <a:stretch>
-                    <a:fillRect l="-1463" t="-1042" r="-976" b="-7292"/>
-                  </a:stretch>
-                </a:blipFill>
-              </p:spPr>
-              <p:txBody>
-                <a:bodyPr/>
-                <a:lstStyle/>
-                <a:p>
-                  <a:r>
-                    <a:rPr lang="en-US">
-                      <a:noFill/>
-                    </a:rPr>
-                    <a:t> </a:t>
-                  </a:r>
-                </a:p>
-              </p:txBody>
-            </p:sp>
-          </mc:Fallback>
-        </mc:AlternateContent>
-        <mc:AlternateContent xmlns:mc="http://schemas.openxmlformats.org/markup-compatibility/2006">
-          <mc:Choice xmlns:a14="http://schemas.microsoft.com/office/drawing/2010/main" Requires="a14">
-            <p:sp>
-              <p:nvSpPr>
-                <p:cNvPr id="104" name="TextBox 103">
-                  <a:extLst>
-                    <a:ext uri="{FF2B5EF4-FFF2-40B4-BE49-F238E27FC236}">
-                      <a16:creationId xmlns:a16="http://schemas.microsoft.com/office/drawing/2014/main" id="{A4FA411C-7D95-1146-8A83-BF7DD32F7358}"/>
-                    </a:ext>
-                  </a:extLst>
-                </p:cNvPr>
-                <p:cNvSpPr txBox="1"/>
-                <p:nvPr/>
-              </p:nvSpPr>
-              <p:spPr>
-                <a:xfrm>
-                  <a:off x="2713402" y="4239187"/>
-                  <a:ext cx="5876839" cy="1309439"/>
+                  <a:off x="-1225437" y="7331964"/>
+                  <a:ext cx="12301538" cy="1200329"/>
                 </a:xfrm>
                 <a:prstGeom prst="rect">
                   <a:avLst/>
@@ -18703,39 +19776,54 @@
                 </a:bodyPr>
                 <a:lstStyle/>
                 <a:p>
-                  <a:pPr algn="ctr"/>
                   <a:r>
-                    <a:rPr lang="en-US" b="1" i="1" dirty="0"/>
-                    <a:t>De-queue Internal Trigger </a:t>
+                    <a:rPr lang="en-US" sz="2400" b="1" dirty="0">
+                      <a:latin typeface="Al Nile" pitchFamily="2" charset="-78"/>
+                      <a:cs typeface="Al Nile" pitchFamily="2" charset="-78"/>
+                    </a:rPr>
+                    <a:t>Basis invariants: </a:t>
+                  </a:r>
+                </a:p>
+                <a:p>
+                  <a:r>
+                    <a:rPr lang="en-US" sz="2400" dirty="0"/>
+                    <a:t>Internal and external queue must be disjoint, (</a:t>
                   </a:r>
                   <a:r>
-                    <a:rPr lang="en-US" b="1" i="1" dirty="0" err="1"/>
+                    <a:rPr lang="en-US" sz="2400" dirty="0" err="1"/>
                     <a:t>iQ</a:t>
                   </a:r>
-                  <a:endParaRPr lang="en-US" b="1" i="1" dirty="0"/>
-                </a:p>
-                <a:p>
-                  <a:pPr algn="ctr"/>
                   <a:r>
-                    <a:rPr lang="en-US" i="1" dirty="0" err="1"/>
-                    <a:t>dequeueInternalTriggered</a:t>
-                  </a:r>
-                  <a:endParaRPr lang="en-US" i="1" dirty="0"/>
-                </a:p>
-                <a:p>
-                  <a:pPr algn="ctr"/>
-                  <a:r>
-                    <a:rPr lang="en-US" dirty="0" err="1"/>
-                    <a:t>uc</a:t>
-                  </a:r>
-                  <a:r>
-                    <a:rPr lang="en-US" dirty="0"/>
-                    <a:t> = TRUE &amp; dt = </a:t>
+                    <a:rPr lang="en-US" sz="2400" dirty="0"/>
+                    <a:t> </a:t>
                   </a:r>
                   <a14:m>
                     <m:oMath xmlns:m="http://schemas.openxmlformats.org/officeDocument/2006/math">
                       <m:r>
-                        <a:rPr lang="en-US" i="1" smtClean="0">
+                        <a:rPr lang="en-US" sz="2400" i="1" smtClean="0">
+                          <a:latin typeface="Cambria Math" panose="02040503050406030204" pitchFamily="18" charset="0"/>
+                          <a:ea typeface="Cambria Math" panose="02040503050406030204" pitchFamily="18" charset="0"/>
+                        </a:rPr>
+                        <m:t>∩</m:t>
+                      </m:r>
+                    </m:oMath>
+                  </a14:m>
+                  <a:r>
+                    <a:rPr lang="en-US" sz="2400" dirty="0"/>
+                    <a:t> </a:t>
+                  </a:r>
+                  <a:r>
+                    <a:rPr lang="en-US" sz="2400" dirty="0" err="1"/>
+                    <a:t>eQ</a:t>
+                  </a:r>
+                  <a:r>
+                    <a:rPr lang="en-US" sz="2400" dirty="0"/>
+                    <a:t>) = </a:t>
+                  </a:r>
+                  <a14:m>
+                    <m:oMath xmlns:m="http://schemas.openxmlformats.org/officeDocument/2006/math">
+                      <m:r>
+                        <a:rPr lang="en-US" sz="2400" i="1" smtClean="0">
                           <a:latin typeface="Cambria Math" panose="02040503050406030204" pitchFamily="18" charset="0"/>
                           <a:ea typeface="Cambria Math" panose="02040503050406030204" pitchFamily="18" charset="0"/>
                         </a:rPr>
@@ -18744,39 +19832,99 @@
                     </m:oMath>
                   </a14:m>
                   <a:r>
-                    <a:rPr lang="en-US" dirty="0"/>
+                    <a:rPr lang="en-US" sz="2400" dirty="0"/>
                     <a:t> </a:t>
                   </a:r>
                 </a:p>
                 <a:p>
-                  <a:pPr algn="ctr"/>
                   <a:r>
-                    <a:rPr lang="en-US" dirty="0"/>
-                    <a:t>/ </a:t>
-                  </a:r>
-                  <a:r>
-                    <a:rPr lang="en-US" dirty="0" err="1"/>
-                    <a:t>uc</a:t>
-                  </a:r>
-                  <a:r>
-                    <a:rPr lang="en-US" dirty="0"/>
-                    <a:t> := FALSE &amp; dt :</a:t>
+                    <a:rPr lang="en-US" sz="2400" dirty="0"/>
+                    <a:t>At most there shall be one dequeued trigger, dt </a:t>
                   </a:r>
                   <a14:m>
                     <m:oMath xmlns:m="http://schemas.openxmlformats.org/officeDocument/2006/math">
                       <m:r>
-                        <a:rPr lang="en-US" i="1">
+                        <a:rPr lang="en-US" sz="2400" i="1" smtClean="0">
                           <a:latin typeface="Cambria Math" panose="02040503050406030204" pitchFamily="18" charset="0"/>
                           <a:ea typeface="Cambria Math" panose="02040503050406030204" pitchFamily="18" charset="0"/>
                         </a:rPr>
-                        <m:t>∈</m:t>
+                        <m:t>≠</m:t>
                       </m:r>
                     </m:oMath>
                   </a14:m>
                   <a:r>
-                    <a:rPr lang="en-US" dirty="0"/>
-                    <a:t> iQ</a:t>
+                    <a:rPr lang="en-US" sz="2400" dirty="0"/>
+                    <a:t> </a:t>
                   </a:r>
+                  <a14:m>
+                    <m:oMath xmlns:m="http://schemas.openxmlformats.org/officeDocument/2006/math">
+                      <m:r>
+                        <a:rPr lang="en-US" sz="2400" i="1">
+                          <a:latin typeface="Cambria Math" panose="02040503050406030204" pitchFamily="18" charset="0"/>
+                          <a:ea typeface="Cambria Math" panose="02040503050406030204" pitchFamily="18" charset="0"/>
+                        </a:rPr>
+                        <m:t>∅⟹</m:t>
+                      </m:r>
+                      <m:r>
+                        <a:rPr lang="en-US" sz="2400" b="0" i="1" smtClean="0">
+                          <a:latin typeface="Cambria Math" panose="02040503050406030204" pitchFamily="18" charset="0"/>
+                          <a:ea typeface="Cambria Math" panose="02040503050406030204" pitchFamily="18" charset="0"/>
+                        </a:rPr>
+                        <m:t>(</m:t>
+                      </m:r>
+                      <m:r>
+                        <a:rPr lang="en-US" sz="2400" i="1">
+                          <a:latin typeface="Cambria Math" panose="02040503050406030204" pitchFamily="18" charset="0"/>
+                          <a:ea typeface="Cambria Math" panose="02040503050406030204" pitchFamily="18" charset="0"/>
+                        </a:rPr>
+                        <m:t>∃</m:t>
+                      </m:r>
+                      <m:r>
+                        <a:rPr lang="en-US" sz="2400" i="1">
+                          <a:latin typeface="Cambria Math" panose="02040503050406030204" pitchFamily="18" charset="0"/>
+                          <a:ea typeface="Cambria Math" panose="02040503050406030204" pitchFamily="18" charset="0"/>
+                        </a:rPr>
+                        <m:t>𝑡</m:t>
+                      </m:r>
+                      <m:r>
+                        <a:rPr lang="en-US" sz="2400" i="1">
+                          <a:latin typeface="Cambria Math" panose="02040503050406030204" pitchFamily="18" charset="0"/>
+                          <a:ea typeface="Cambria Math" panose="02040503050406030204" pitchFamily="18" charset="0"/>
+                        </a:rPr>
+                        <m:t>∙</m:t>
+                      </m:r>
+                    </m:oMath>
+                  </a14:m>
+                  <a:r>
+                    <a:rPr lang="en-US" sz="2400" dirty="0"/>
+                    <a:t> dt=</a:t>
+                  </a:r>
+                  <a14:m>
+                    <m:oMath xmlns:m="http://schemas.openxmlformats.org/officeDocument/2006/math">
+                      <m:r>
+                        <a:rPr lang="en-US" sz="2400" i="1">
+                          <a:latin typeface="Cambria Math" panose="02040503050406030204" pitchFamily="18" charset="0"/>
+                          <a:ea typeface="Cambria Math" panose="02040503050406030204" pitchFamily="18" charset="0"/>
+                        </a:rPr>
+                        <m:t>{</m:t>
+                      </m:r>
+                      <m:r>
+                        <a:rPr lang="en-US" sz="2400" i="1">
+                          <a:latin typeface="Cambria Math" panose="02040503050406030204" pitchFamily="18" charset="0"/>
+                          <a:ea typeface="Cambria Math" panose="02040503050406030204" pitchFamily="18" charset="0"/>
+                        </a:rPr>
+                        <m:t>𝑡</m:t>
+                      </m:r>
+                      <m:r>
+                        <a:rPr lang="en-US" sz="2400" i="1">
+                          <a:latin typeface="Cambria Math" panose="02040503050406030204" pitchFamily="18" charset="0"/>
+                          <a:ea typeface="Cambria Math" panose="02040503050406030204" pitchFamily="18" charset="0"/>
+                        </a:rPr>
+                        <m:t>})</m:t>
+                      </m:r>
+                    </m:oMath>
+                  </a14:m>
+                  <a:endParaRPr lang="en-US" sz="2400" dirty="0"/>
                 </a:p>
               </p:txBody>
             </p:sp>
@@ -18784,10 +19932,10 @@
           <mc:Fallback>
             <p:sp>
               <p:nvSpPr>
-                <p:cNvPr id="104" name="TextBox 103">
+                <p:cNvPr id="58" name="TextBox 57">
                   <a:extLst>
                     <a:ext uri="{FF2B5EF4-FFF2-40B4-BE49-F238E27FC236}">
-                      <a16:creationId xmlns:a16="http://schemas.microsoft.com/office/drawing/2014/main" id="{A4FA411C-7D95-1146-8A83-BF7DD32F7358}"/>
+                      <a16:creationId xmlns:a16="http://schemas.microsoft.com/office/drawing/2014/main" id="{984E114B-8AC4-EE42-839B-A73812A85B6C}"/>
                     </a:ext>
                   </a:extLst>
                 </p:cNvPr>
@@ -18798,851 +19946,16 @@
               </p:nvSpPr>
               <p:spPr>
                 <a:xfrm>
-                  <a:off x="2713402" y="4239187"/>
-                  <a:ext cx="5876839" cy="1309439"/>
+                  <a:off x="-1225437" y="7331964"/>
+                  <a:ext cx="12301538" cy="1200329"/>
                 </a:xfrm>
                 <a:prstGeom prst="rect">
                   <a:avLst/>
                 </a:prstGeom>
                 <a:blipFill>
-                  <a:blip r:embed="rId5"/>
+                  <a:blip r:embed="rId11"/>
                   <a:stretch>
-                    <a:fillRect t="-1042" b="-6250"/>
-                  </a:stretch>
-                </a:blipFill>
-              </p:spPr>
-              <p:txBody>
-                <a:bodyPr/>
-                <a:lstStyle/>
-                <a:p>
-                  <a:r>
-                    <a:rPr lang="en-US">
-                      <a:noFill/>
-                    </a:rPr>
-                    <a:t> </a:t>
-                  </a:r>
-                </a:p>
-              </p:txBody>
-            </p:sp>
-          </mc:Fallback>
-        </mc:AlternateContent>
-        <mc:AlternateContent xmlns:mc="http://schemas.openxmlformats.org/markup-compatibility/2006">
-          <mc:Choice xmlns:a14="http://schemas.microsoft.com/office/drawing/2010/main" Requires="a14">
-            <p:sp>
-              <p:nvSpPr>
-                <p:cNvPr id="105" name="TextBox 104">
-                  <a:extLst>
-                    <a:ext uri="{FF2B5EF4-FFF2-40B4-BE49-F238E27FC236}">
-                      <a16:creationId xmlns:a16="http://schemas.microsoft.com/office/drawing/2014/main" id="{8DE941AA-8537-8140-A384-C92A0860614E}"/>
-                    </a:ext>
-                  </a:extLst>
-                </p:cNvPr>
-                <p:cNvSpPr txBox="1"/>
-                <p:nvPr/>
-              </p:nvSpPr>
-              <p:spPr>
-                <a:xfrm>
-                  <a:off x="-3316582" y="4243414"/>
-                  <a:ext cx="5607213" cy="1309439"/>
-                </a:xfrm>
-                <a:prstGeom prst="rect">
-                  <a:avLst/>
-                </a:prstGeom>
-                <a:noFill/>
-              </p:spPr>
-              <p:txBody>
-                <a:bodyPr wrap="square" rtlCol="0">
-                  <a:spAutoFit/>
-                </a:bodyPr>
-                <a:lstStyle/>
-                <a:p>
-                  <a:pPr algn="ctr"/>
-                  <a:r>
-                    <a:rPr lang="en-US" b="1" i="1" dirty="0"/>
-                    <a:t>De-queue External Trigger </a:t>
-                  </a:r>
-                  <a:r>
-                    <a:rPr lang="en-US" b="1" i="1" dirty="0" err="1"/>
-                    <a:t>eQ</a:t>
-                  </a:r>
-                  <a:endParaRPr lang="en-US" b="1" i="1" dirty="0"/>
-                </a:p>
-                <a:p>
-                  <a:pPr algn="ctr"/>
-                  <a:r>
-                    <a:rPr lang="en-US" i="1" dirty="0" err="1"/>
-                    <a:t>dequeueExternalTriggered</a:t>
-                  </a:r>
-                  <a:endParaRPr lang="en-US" i="1" dirty="0"/>
-                </a:p>
-                <a:p>
-                  <a:pPr algn="ctr"/>
-                  <a:r>
-                    <a:rPr lang="en-US" dirty="0" err="1"/>
-                    <a:t>uc</a:t>
-                  </a:r>
-                  <a:r>
-                    <a:rPr lang="en-US" dirty="0"/>
-                    <a:t> = TRUE &amp; dt = </a:t>
-                  </a:r>
-                  <a14:m>
-                    <m:oMath xmlns:m="http://schemas.openxmlformats.org/officeDocument/2006/math">
-                      <m:r>
-                        <a:rPr lang="en-US" i="1">
-                          <a:latin typeface="Cambria Math" panose="02040503050406030204" pitchFamily="18" charset="0"/>
-                          <a:ea typeface="Cambria Math" panose="02040503050406030204" pitchFamily="18" charset="0"/>
-                        </a:rPr>
-                        <m:t>∅</m:t>
-                      </m:r>
-                    </m:oMath>
-                  </a14:m>
-                  <a:r>
-                    <a:rPr lang="en-US" dirty="0"/>
-                    <a:t> &amp; </a:t>
-                  </a:r>
-                  <a:r>
-                    <a:rPr lang="en-US" dirty="0" err="1"/>
-                    <a:t>iQ</a:t>
-                  </a:r>
-                  <a:r>
-                    <a:rPr lang="en-US" dirty="0"/>
-                    <a:t> = </a:t>
-                  </a:r>
-                  <a14:m>
-                    <m:oMath xmlns:m="http://schemas.openxmlformats.org/officeDocument/2006/math">
-                      <m:r>
-                        <a:rPr lang="en-US" i="1">
-                          <a:latin typeface="Cambria Math" panose="02040503050406030204" pitchFamily="18" charset="0"/>
-                          <a:ea typeface="Cambria Math" panose="02040503050406030204" pitchFamily="18" charset="0"/>
-                        </a:rPr>
-                        <m:t>∅</m:t>
-                      </m:r>
-                    </m:oMath>
-                  </a14:m>
-                  <a:endParaRPr lang="en-US" dirty="0"/>
-                </a:p>
-                <a:p>
-                  <a:pPr algn="ctr"/>
-                  <a:r>
-                    <a:rPr lang="en-US" dirty="0"/>
-                    <a:t>/ </a:t>
-                  </a:r>
-                  <a:r>
-                    <a:rPr lang="en-US" dirty="0" err="1"/>
-                    <a:t>uc</a:t>
-                  </a:r>
-                  <a:r>
-                    <a:rPr lang="en-US" dirty="0"/>
-                    <a:t> := FALSE &amp; dt :</a:t>
-                  </a:r>
-                  <a14:m>
-                    <m:oMath xmlns:m="http://schemas.openxmlformats.org/officeDocument/2006/math">
-                      <m:r>
-                        <a:rPr lang="en-US" i="1" smtClean="0">
-                          <a:latin typeface="Cambria Math" panose="02040503050406030204" pitchFamily="18" charset="0"/>
-                          <a:ea typeface="Cambria Math" panose="02040503050406030204" pitchFamily="18" charset="0"/>
-                        </a:rPr>
-                        <m:t>∈</m:t>
-                      </m:r>
-                    </m:oMath>
-                  </a14:m>
-                  <a:r>
-                    <a:rPr lang="en-US" dirty="0"/>
-                    <a:t> eQ</a:t>
-                  </a:r>
-                </a:p>
-              </p:txBody>
-            </p:sp>
-          </mc:Choice>
-          <mc:Fallback>
-            <p:sp>
-              <p:nvSpPr>
-                <p:cNvPr id="105" name="TextBox 104">
-                  <a:extLst>
-                    <a:ext uri="{FF2B5EF4-FFF2-40B4-BE49-F238E27FC236}">
-                      <a16:creationId xmlns:a16="http://schemas.microsoft.com/office/drawing/2014/main" id="{8DE941AA-8537-8140-A384-C92A0860614E}"/>
-                    </a:ext>
-                  </a:extLst>
-                </p:cNvPr>
-                <p:cNvSpPr txBox="1">
-                  <a:spLocks noRot="1" noChangeAspect="1" noMove="1" noResize="1" noEditPoints="1" noAdjustHandles="1" noChangeArrowheads="1" noChangeShapeType="1" noTextEdit="1"/>
-                </p:cNvSpPr>
-                <p:nvPr/>
-              </p:nvSpPr>
-              <p:spPr>
-                <a:xfrm>
-                  <a:off x="-3316582" y="4243414"/>
-                  <a:ext cx="5607213" cy="1309439"/>
-                </a:xfrm>
-                <a:prstGeom prst="rect">
-                  <a:avLst/>
-                </a:prstGeom>
-                <a:blipFill>
-                  <a:blip r:embed="rId6"/>
-                  <a:stretch>
-                    <a:fillRect t="-2105" b="-7368"/>
-                  </a:stretch>
-                </a:blipFill>
-              </p:spPr>
-              <p:txBody>
-                <a:bodyPr/>
-                <a:lstStyle/>
-                <a:p>
-                  <a:r>
-                    <a:rPr lang="en-US">
-                      <a:noFill/>
-                    </a:rPr>
-                    <a:t> </a:t>
-                  </a:r>
-                </a:p>
-              </p:txBody>
-            </p:sp>
-          </mc:Fallback>
-        </mc:AlternateContent>
-        <mc:AlternateContent xmlns:mc="http://schemas.openxmlformats.org/markup-compatibility/2006" xmlns:a14="http://schemas.microsoft.com/office/drawing/2010/main">
-          <mc:Choice Requires="a14">
-            <p:sp>
-              <p:nvSpPr>
-                <p:cNvPr id="110" name="TextBox 109">
-                  <a:extLst>
-                    <a:ext uri="{FF2B5EF4-FFF2-40B4-BE49-F238E27FC236}">
-                      <a16:creationId xmlns:a16="http://schemas.microsoft.com/office/drawing/2014/main" id="{E140AAD7-431B-1244-8F4C-1A27A7E5CD89}"/>
-                    </a:ext>
-                  </a:extLst>
-                </p:cNvPr>
-                <p:cNvSpPr txBox="1"/>
-                <p:nvPr/>
-              </p:nvSpPr>
-              <p:spPr>
-                <a:xfrm>
-                  <a:off x="3119914" y="2214302"/>
-                  <a:ext cx="5711787" cy="1309439"/>
-                </a:xfrm>
-                <a:prstGeom prst="rect">
-                  <a:avLst/>
-                </a:prstGeom>
-                <a:noFill/>
-              </p:spPr>
-              <p:txBody>
-                <a:bodyPr wrap="square" rtlCol="0">
-                  <a:spAutoFit/>
-                </a:bodyPr>
-                <a:lstStyle/>
-                <a:p>
-                  <a:pPr algn="ctr"/>
-                  <a:r>
-                    <a:rPr lang="en-US" b="1" i="1" dirty="0"/>
-                    <a:t>No Triggered Enable</a:t>
-                  </a:r>
-                </a:p>
-                <a:p>
-                  <a:pPr algn="ctr"/>
-                  <a:r>
-                    <a:rPr lang="en-US" i="1" dirty="0" err="1"/>
-                    <a:t>NoTriggeredTransitionsEnable</a:t>
-                  </a:r>
-                  <a:endParaRPr lang="en-US" i="1" dirty="0"/>
-                </a:p>
-                <a:p>
-                  <a:pPr algn="ctr"/>
-                  <a:r>
-                    <a:rPr lang="en-US" dirty="0" err="1"/>
-                    <a:t>uc</a:t>
-                  </a:r>
-                  <a:r>
-                    <a:rPr lang="en-US" dirty="0"/>
-                    <a:t> = FALSE &amp; dt </a:t>
-                  </a:r>
-                  <a14:m>
-                    <m:oMath xmlns:m="http://schemas.openxmlformats.org/officeDocument/2006/math">
-                      <m:r>
-                        <a:rPr lang="en-US" i="1">
-                          <a:latin typeface="Cambria Math" panose="02040503050406030204" pitchFamily="18" charset="0"/>
-                          <a:ea typeface="Cambria Math" panose="02040503050406030204" pitchFamily="18" charset="0"/>
-                        </a:rPr>
-                        <m:t>≠</m:t>
-                      </m:r>
-                    </m:oMath>
-                  </a14:m>
-                  <a:r>
-                    <a:rPr lang="en-US" dirty="0"/>
-                    <a:t> </a:t>
-                  </a:r>
-                  <a14:m>
-                    <m:oMath xmlns:m="http://schemas.openxmlformats.org/officeDocument/2006/math">
-                      <m:r>
-                        <a:rPr lang="en-US" i="1" smtClean="0">
-                          <a:latin typeface="Cambria Math" panose="02040503050406030204" pitchFamily="18" charset="0"/>
-                          <a:ea typeface="Cambria Math" panose="02040503050406030204" pitchFamily="18" charset="0"/>
-                        </a:rPr>
-                        <m:t>∅</m:t>
-                      </m:r>
-                      <m:r>
-                        <a:rPr lang="en-US" b="0" i="0" smtClean="0">
-                          <a:latin typeface="Cambria Math" panose="02040503050406030204" pitchFamily="18" charset="0"/>
-                          <a:ea typeface="Cambria Math" panose="02040503050406030204" pitchFamily="18" charset="0"/>
-                        </a:rPr>
-                        <m:t>  </m:t>
-                      </m:r>
-                    </m:oMath>
-                  </a14:m>
-                  <a:endParaRPr lang="en-US" dirty="0"/>
-                </a:p>
-                <a:p>
-                  <a:pPr algn="ctr"/>
-                  <a:r>
-                    <a:rPr lang="en-US" dirty="0"/>
-                    <a:t>/  dt := </a:t>
-                  </a:r>
-                  <a14:m>
-                    <m:oMath xmlns:m="http://schemas.openxmlformats.org/officeDocument/2006/math">
-                      <m:r>
-                        <a:rPr lang="en-US" i="1">
-                          <a:latin typeface="Cambria Math" panose="02040503050406030204" pitchFamily="18" charset="0"/>
-                          <a:ea typeface="Cambria Math" panose="02040503050406030204" pitchFamily="18" charset="0"/>
-                        </a:rPr>
-                        <m:t>∅</m:t>
-                      </m:r>
-                    </m:oMath>
-                  </a14:m>
-                  <a:r>
-                    <a:rPr lang="en-US" dirty="0"/>
-                    <a:t> </a:t>
-                  </a:r>
-                </a:p>
-              </p:txBody>
-            </p:sp>
-          </mc:Choice>
-          <mc:Fallback xmlns="">
-            <p:sp>
-              <p:nvSpPr>
-                <p:cNvPr id="110" name="TextBox 109">
-                  <a:extLst>
-                    <a:ext uri="{FF2B5EF4-FFF2-40B4-BE49-F238E27FC236}">
-                      <a16:creationId xmlns:a16="http://schemas.microsoft.com/office/drawing/2014/main" id="{E140AAD7-431B-1244-8F4C-1A27A7E5CD89}"/>
-                    </a:ext>
-                  </a:extLst>
-                </p:cNvPr>
-                <p:cNvSpPr txBox="1">
-                  <a:spLocks noRot="1" noChangeAspect="1" noMove="1" noResize="1" noEditPoints="1" noAdjustHandles="1" noChangeArrowheads="1" noChangeShapeType="1" noTextEdit="1"/>
-                </p:cNvSpPr>
-                <p:nvPr/>
-              </p:nvSpPr>
-              <p:spPr>
-                <a:xfrm>
-                  <a:off x="3119914" y="2214302"/>
-                  <a:ext cx="5711787" cy="1309439"/>
-                </a:xfrm>
-                <a:prstGeom prst="rect">
-                  <a:avLst/>
-                </a:prstGeom>
-                <a:blipFill>
-                  <a:blip r:embed="rId7"/>
-                  <a:stretch>
-                    <a:fillRect t="-2083" b="-6250"/>
-                  </a:stretch>
-                </a:blipFill>
-              </p:spPr>
-              <p:txBody>
-                <a:bodyPr/>
-                <a:lstStyle/>
-                <a:p>
-                  <a:r>
-                    <a:rPr lang="en-US">
-                      <a:noFill/>
-                    </a:rPr>
-                    <a:t> </a:t>
-                  </a:r>
-                </a:p>
-              </p:txBody>
-            </p:sp>
-          </mc:Fallback>
-        </mc:AlternateContent>
-        <mc:AlternateContent xmlns:mc="http://schemas.openxmlformats.org/markup-compatibility/2006" xmlns:a14="http://schemas.microsoft.com/office/drawing/2010/main">
-          <mc:Choice Requires="a14">
-            <p:sp>
-              <p:nvSpPr>
-                <p:cNvPr id="111" name="TextBox 110">
-                  <a:extLst>
-                    <a:ext uri="{FF2B5EF4-FFF2-40B4-BE49-F238E27FC236}">
-                      <a16:creationId xmlns:a16="http://schemas.microsoft.com/office/drawing/2014/main" id="{F46861FF-D453-C349-AB2A-49C4BAB40FD6}"/>
-                    </a:ext>
-                  </a:extLst>
-                </p:cNvPr>
-                <p:cNvSpPr txBox="1"/>
-                <p:nvPr/>
-              </p:nvSpPr>
-              <p:spPr>
-                <a:xfrm>
-                  <a:off x="3127402" y="578915"/>
-                  <a:ext cx="5997387" cy="1309439"/>
-                </a:xfrm>
-                <a:prstGeom prst="rect">
-                  <a:avLst/>
-                </a:prstGeom>
-                <a:noFill/>
-              </p:spPr>
-              <p:txBody>
-                <a:bodyPr wrap="square" rtlCol="0">
-                  <a:spAutoFit/>
-                </a:bodyPr>
-                <a:lstStyle/>
-                <a:p>
-                  <a:pPr algn="ctr"/>
-                  <a:r>
-                    <a:rPr lang="en-US" b="1" i="1" dirty="0"/>
-                    <a:t>Fire Triggered</a:t>
-                  </a:r>
-                </a:p>
-                <a:p>
-                  <a:pPr algn="ctr"/>
-                  <a:r>
-                    <a:rPr lang="en-US" i="1" dirty="0" err="1"/>
-                    <a:t>FutureTriggeredTransitions</a:t>
-                  </a:r>
-                  <a:endParaRPr lang="en-US" i="1" dirty="0"/>
-                </a:p>
-                <a:p>
-                  <a:pPr algn="ctr"/>
-                  <a:r>
-                    <a:rPr lang="en-US" dirty="0" err="1"/>
-                    <a:t>uc</a:t>
-                  </a:r>
-                  <a:r>
-                    <a:rPr lang="en-US" dirty="0"/>
-                    <a:t> = FALSE &amp; dt </a:t>
-                  </a:r>
-                  <a14:m>
-                    <m:oMath xmlns:m="http://schemas.openxmlformats.org/officeDocument/2006/math">
-                      <m:r>
-                        <a:rPr lang="en-US" i="1" smtClean="0">
-                          <a:latin typeface="Cambria Math" panose="02040503050406030204" pitchFamily="18" charset="0"/>
-                          <a:ea typeface="Cambria Math" panose="02040503050406030204" pitchFamily="18" charset="0"/>
-                        </a:rPr>
-                        <m:t>≠</m:t>
-                      </m:r>
-                    </m:oMath>
-                  </a14:m>
-                  <a:r>
-                    <a:rPr lang="en-US" dirty="0"/>
-                    <a:t> </a:t>
-                  </a:r>
-                  <a14:m>
-                    <m:oMath xmlns:m="http://schemas.openxmlformats.org/officeDocument/2006/math">
-                      <m:r>
-                        <a:rPr lang="en-US" i="1" smtClean="0">
-                          <a:latin typeface="Cambria Math" panose="02040503050406030204" pitchFamily="18" charset="0"/>
-                          <a:ea typeface="Cambria Math" panose="02040503050406030204" pitchFamily="18" charset="0"/>
-                        </a:rPr>
-                        <m:t>∅</m:t>
-                      </m:r>
-                    </m:oMath>
-                  </a14:m>
-                  <a:endParaRPr lang="en-US" dirty="0">
-                    <a:ea typeface="Cambria Math" panose="02040503050406030204" pitchFamily="18" charset="0"/>
-                  </a:endParaRPr>
-                </a:p>
-                <a:p>
-                  <a:pPr algn="ctr"/>
-                  <a:r>
-                    <a:rPr lang="en-US" dirty="0"/>
-                    <a:t>/ dt := </a:t>
-                  </a:r>
-                  <a14:m>
-                    <m:oMath xmlns:m="http://schemas.openxmlformats.org/officeDocument/2006/math">
-                      <m:r>
-                        <a:rPr lang="en-US" i="1">
-                          <a:latin typeface="Cambria Math" panose="02040503050406030204" pitchFamily="18" charset="0"/>
-                          <a:ea typeface="Cambria Math" panose="02040503050406030204" pitchFamily="18" charset="0"/>
-                        </a:rPr>
-                        <m:t>∅</m:t>
-                      </m:r>
-                    </m:oMath>
-                  </a14:m>
-                  <a:r>
-                    <a:rPr lang="en-US" dirty="0"/>
-                    <a:t> &amp; iQ := </a:t>
-                  </a:r>
-                  <a:r>
-                    <a:rPr lang="en-US" dirty="0" err="1"/>
-                    <a:t>iQ</a:t>
-                  </a:r>
-                  <a:r>
-                    <a:rPr lang="en-US" dirty="0"/>
-                    <a:t> </a:t>
-                  </a:r>
-                  <a14:m>
-                    <m:oMath xmlns:m="http://schemas.openxmlformats.org/officeDocument/2006/math">
-                      <m:r>
-                        <a:rPr lang="en-US" i="1">
-                          <a:latin typeface="Cambria Math" panose="02040503050406030204" pitchFamily="18" charset="0"/>
-                          <a:ea typeface="Cambria Math" panose="02040503050406030204" pitchFamily="18" charset="0"/>
-                        </a:rPr>
-                        <m:t>∪ </m:t>
-                      </m:r>
-                    </m:oMath>
-                  </a14:m>
-                  <a:r>
-                    <a:rPr lang="en-US" dirty="0" err="1"/>
-                    <a:t>raisedTriggers</a:t>
-                  </a:r>
-                  <a:endParaRPr lang="en-US" dirty="0"/>
-                </a:p>
-              </p:txBody>
-            </p:sp>
-          </mc:Choice>
-          <mc:Fallback xmlns="">
-            <p:sp>
-              <p:nvSpPr>
-                <p:cNvPr id="111" name="TextBox 110">
-                  <a:extLst>
-                    <a:ext uri="{FF2B5EF4-FFF2-40B4-BE49-F238E27FC236}">
-                      <a16:creationId xmlns:a16="http://schemas.microsoft.com/office/drawing/2014/main" id="{F46861FF-D453-C349-AB2A-49C4BAB40FD6}"/>
-                    </a:ext>
-                  </a:extLst>
-                </p:cNvPr>
-                <p:cNvSpPr txBox="1">
-                  <a:spLocks noRot="1" noChangeAspect="1" noMove="1" noResize="1" noEditPoints="1" noAdjustHandles="1" noChangeArrowheads="1" noChangeShapeType="1" noTextEdit="1"/>
-                </p:cNvSpPr>
-                <p:nvPr/>
-              </p:nvSpPr>
-              <p:spPr>
-                <a:xfrm>
-                  <a:off x="3127402" y="578915"/>
-                  <a:ext cx="5997387" cy="1309439"/>
-                </a:xfrm>
-                <a:prstGeom prst="rect">
-                  <a:avLst/>
-                </a:prstGeom>
-                <a:blipFill>
-                  <a:blip r:embed="rId8"/>
-                  <a:stretch>
-                    <a:fillRect t="-2083" b="-6250"/>
-                  </a:stretch>
-                </a:blipFill>
-              </p:spPr>
-              <p:txBody>
-                <a:bodyPr/>
-                <a:lstStyle/>
-                <a:p>
-                  <a:r>
-                    <a:rPr lang="en-US">
-                      <a:noFill/>
-                    </a:rPr>
-                    <a:t> </a:t>
-                  </a:r>
-                </a:p>
-              </p:txBody>
-            </p:sp>
-          </mc:Fallback>
-        </mc:AlternateContent>
-        <mc:AlternateContent xmlns:mc="http://schemas.openxmlformats.org/markup-compatibility/2006" xmlns:a14="http://schemas.microsoft.com/office/drawing/2010/main">
-          <mc:Choice Requires="a14">
-            <p:sp>
-              <p:nvSpPr>
-                <p:cNvPr id="117" name="TextBox 116">
-                  <a:extLst>
-                    <a:ext uri="{FF2B5EF4-FFF2-40B4-BE49-F238E27FC236}">
-                      <a16:creationId xmlns:a16="http://schemas.microsoft.com/office/drawing/2014/main" id="{2C50F20A-6C64-5340-82C6-B08C4A906684}"/>
-                    </a:ext>
-                  </a:extLst>
-                </p:cNvPr>
-                <p:cNvSpPr txBox="1"/>
-                <p:nvPr/>
-              </p:nvSpPr>
-              <p:spPr>
-                <a:xfrm>
-                  <a:off x="9648883" y="2247174"/>
-                  <a:ext cx="6930491" cy="1309439"/>
-                </a:xfrm>
-                <a:prstGeom prst="rect">
-                  <a:avLst/>
-                </a:prstGeom>
-                <a:noFill/>
-              </p:spPr>
-              <p:txBody>
-                <a:bodyPr wrap="square" rtlCol="0">
-                  <a:spAutoFit/>
-                </a:bodyPr>
-                <a:lstStyle/>
-                <a:p>
-                  <a:pPr algn="ctr"/>
-                  <a:r>
-                    <a:rPr lang="en-US" b="1" i="1" dirty="0"/>
-                    <a:t>Fire Untriggered</a:t>
-                  </a:r>
-                </a:p>
-                <a:p>
-                  <a:pPr algn="ctr"/>
-                  <a:r>
-                    <a:rPr lang="en-US" i="1" dirty="0" err="1"/>
-                    <a:t>fututeUntriggeredTransitionSet</a:t>
-                  </a:r>
-                  <a:endParaRPr lang="en-US" i="1" dirty="0"/>
-                </a:p>
-                <a:p>
-                  <a:pPr algn="ctr"/>
-                  <a:r>
-                    <a:rPr lang="en-US" dirty="0" err="1"/>
-                    <a:t>uc</a:t>
-                  </a:r>
-                  <a:r>
-                    <a:rPr lang="en-US" dirty="0"/>
-                    <a:t> = FALSE &amp; dt = </a:t>
-                  </a:r>
-                  <a14:m>
-                    <m:oMath xmlns:m="http://schemas.openxmlformats.org/officeDocument/2006/math">
-                      <m:r>
-                        <a:rPr lang="en-US" i="1" smtClean="0">
-                          <a:latin typeface="Cambria Math" panose="02040503050406030204" pitchFamily="18" charset="0"/>
-                          <a:ea typeface="Cambria Math" panose="02040503050406030204" pitchFamily="18" charset="0"/>
-                        </a:rPr>
-                        <m:t>∅</m:t>
-                      </m:r>
-                    </m:oMath>
-                  </a14:m>
-                  <a:endParaRPr lang="en-US" dirty="0"/>
-                </a:p>
-                <a:p>
-                  <a:pPr algn="ctr"/>
-                  <a:r>
-                    <a:rPr lang="en-US" dirty="0"/>
-                    <a:t>/ </a:t>
-                  </a:r>
-                  <a:r>
-                    <a:rPr lang="en-US" dirty="0" err="1"/>
-                    <a:t>iQ</a:t>
-                  </a:r>
-                  <a:r>
-                    <a:rPr lang="en-US" dirty="0"/>
-                    <a:t> := </a:t>
-                  </a:r>
-                  <a:r>
-                    <a:rPr lang="en-US" dirty="0" err="1"/>
-                    <a:t>iQ</a:t>
-                  </a:r>
-                  <a:r>
-                    <a:rPr lang="en-US" dirty="0"/>
-                    <a:t> </a:t>
-                  </a:r>
-                  <a14:m>
-                    <m:oMath xmlns:m="http://schemas.openxmlformats.org/officeDocument/2006/math">
-                      <m:r>
-                        <a:rPr lang="en-US" i="1" smtClean="0">
-                          <a:latin typeface="Cambria Math" panose="02040503050406030204" pitchFamily="18" charset="0"/>
-                          <a:ea typeface="Cambria Math" panose="02040503050406030204" pitchFamily="18" charset="0"/>
-                        </a:rPr>
-                        <m:t>∪</m:t>
-                      </m:r>
-                      <m:r>
-                        <a:rPr lang="en-US" b="0" i="1" smtClean="0">
-                          <a:latin typeface="Cambria Math" panose="02040503050406030204" pitchFamily="18" charset="0"/>
-                          <a:ea typeface="Cambria Math" panose="02040503050406030204" pitchFamily="18" charset="0"/>
-                        </a:rPr>
-                        <m:t> </m:t>
-                      </m:r>
-                    </m:oMath>
-                  </a14:m>
-                  <a:r>
-                    <a:rPr lang="en-US" dirty="0" err="1"/>
-                    <a:t>raisedTriggers</a:t>
-                  </a:r>
-                  <a:endParaRPr lang="en-US" dirty="0"/>
-                </a:p>
-              </p:txBody>
-            </p:sp>
-          </mc:Choice>
-          <mc:Fallback xmlns="">
-            <p:sp>
-              <p:nvSpPr>
-                <p:cNvPr id="117" name="TextBox 116">
-                  <a:extLst>
-                    <a:ext uri="{FF2B5EF4-FFF2-40B4-BE49-F238E27FC236}">
-                      <a16:creationId xmlns:a16="http://schemas.microsoft.com/office/drawing/2014/main" id="{2C50F20A-6C64-5340-82C6-B08C4A906684}"/>
-                    </a:ext>
-                  </a:extLst>
-                </p:cNvPr>
-                <p:cNvSpPr txBox="1">
-                  <a:spLocks noRot="1" noChangeAspect="1" noMove="1" noResize="1" noEditPoints="1" noAdjustHandles="1" noChangeArrowheads="1" noChangeShapeType="1" noTextEdit="1"/>
-                </p:cNvSpPr>
-                <p:nvPr/>
-              </p:nvSpPr>
-              <p:spPr>
-                <a:xfrm>
-                  <a:off x="9648883" y="2247174"/>
-                  <a:ext cx="6930491" cy="1309439"/>
-                </a:xfrm>
-                <a:prstGeom prst="rect">
-                  <a:avLst/>
-                </a:prstGeom>
-                <a:blipFill>
-                  <a:blip r:embed="rId9"/>
-                  <a:stretch>
-                    <a:fillRect t="-1042" b="-7292"/>
-                  </a:stretch>
-                </a:blipFill>
-              </p:spPr>
-              <p:txBody>
-                <a:bodyPr/>
-                <a:lstStyle/>
-                <a:p>
-                  <a:r>
-                    <a:rPr lang="en-US">
-                      <a:noFill/>
-                    </a:rPr>
-                    <a:t> </a:t>
-                  </a:r>
-                </a:p>
-              </p:txBody>
-            </p:sp>
-          </mc:Fallback>
-        </mc:AlternateContent>
-        <mc:AlternateContent xmlns:mc="http://schemas.openxmlformats.org/markup-compatibility/2006" xmlns:a14="http://schemas.microsoft.com/office/drawing/2010/main">
-          <mc:Choice Requires="a14">
-            <p:sp>
-              <p:nvSpPr>
-                <p:cNvPr id="118" name="TextBox 117">
-                  <a:extLst>
-                    <a:ext uri="{FF2B5EF4-FFF2-40B4-BE49-F238E27FC236}">
-                      <a16:creationId xmlns:a16="http://schemas.microsoft.com/office/drawing/2014/main" id="{DAB51B5B-165F-6E4C-9C8E-1DB5E972A147}"/>
-                    </a:ext>
-                  </a:extLst>
-                </p:cNvPr>
-                <p:cNvSpPr txBox="1"/>
-                <p:nvPr/>
-              </p:nvSpPr>
-              <p:spPr>
-                <a:xfrm>
-                  <a:off x="11214298" y="592008"/>
-                  <a:ext cx="5052701" cy="705083"/>
-                </a:xfrm>
-                <a:prstGeom prst="rect">
-                  <a:avLst/>
-                </a:prstGeom>
-                <a:noFill/>
-              </p:spPr>
-              <p:txBody>
-                <a:bodyPr wrap="none" rtlCol="0">
-                  <a:spAutoFit/>
-                </a:bodyPr>
-                <a:lstStyle/>
-                <a:p>
-                  <a:pPr algn="ctr"/>
-                  <a:r>
-                    <a:rPr lang="en-US" i="1" dirty="0"/>
-                    <a:t>Initialisation</a:t>
-                  </a:r>
-                </a:p>
-                <a:p>
-                  <a:pPr algn="ctr"/>
-                  <a:r>
-                    <a:rPr lang="en-US" dirty="0"/>
-                    <a:t>/ </a:t>
-                  </a:r>
-                  <a:r>
-                    <a:rPr lang="en-US" dirty="0" err="1"/>
-                    <a:t>uc</a:t>
-                  </a:r>
-                  <a:r>
-                    <a:rPr lang="en-US" dirty="0"/>
-                    <a:t> := FALSE &amp; dt := </a:t>
-                  </a:r>
-                  <a14:m>
-                    <m:oMath xmlns:m="http://schemas.openxmlformats.org/officeDocument/2006/math">
-                      <m:r>
-                        <a:rPr lang="en-US" i="1" smtClean="0">
-                          <a:latin typeface="Cambria Math" panose="02040503050406030204" pitchFamily="18" charset="0"/>
-                          <a:ea typeface="Cambria Math" panose="02040503050406030204" pitchFamily="18" charset="0"/>
-                        </a:rPr>
-                        <m:t>∅</m:t>
-                      </m:r>
-                      <m:r>
-                        <a:rPr lang="en-US" b="0" i="0" smtClean="0">
-                          <a:latin typeface="Cambria Math" panose="02040503050406030204" pitchFamily="18" charset="0"/>
-                          <a:ea typeface="Cambria Math" panose="02040503050406030204" pitchFamily="18" charset="0"/>
-                        </a:rPr>
-                        <m:t> </m:t>
-                      </m:r>
-                    </m:oMath>
-                  </a14:m>
-                  <a:r>
-                    <a:rPr lang="en-US" dirty="0"/>
-                    <a:t>&amp; </a:t>
-                  </a:r>
-                  <a:r>
-                    <a:rPr lang="en-US" dirty="0" err="1"/>
-                    <a:t>iQ</a:t>
-                  </a:r>
-                  <a:r>
-                    <a:rPr lang="en-US" dirty="0"/>
-                    <a:t> := </a:t>
-                  </a:r>
-                  <a14:m>
-                    <m:oMath xmlns:m="http://schemas.openxmlformats.org/officeDocument/2006/math">
-                      <m:r>
-                        <a:rPr lang="en-US" i="1">
-                          <a:latin typeface="Cambria Math" panose="02040503050406030204" pitchFamily="18" charset="0"/>
-                          <a:ea typeface="Cambria Math" panose="02040503050406030204" pitchFamily="18" charset="0"/>
-                        </a:rPr>
-                        <m:t>∅</m:t>
-                      </m:r>
-                    </m:oMath>
-                  </a14:m>
-                  <a:r>
-                    <a:rPr lang="en-US" dirty="0"/>
-                    <a:t> &amp; </a:t>
-                  </a:r>
-                  <a:r>
-                    <a:rPr lang="en-US" dirty="0" err="1"/>
-                    <a:t>eQ</a:t>
-                  </a:r>
-                  <a:r>
-                    <a:rPr lang="en-US" dirty="0"/>
-                    <a:t> := </a:t>
-                  </a:r>
-                  <a14:m>
-                    <m:oMath xmlns:m="http://schemas.openxmlformats.org/officeDocument/2006/math">
-                      <m:r>
-                        <a:rPr lang="en-US" i="1">
-                          <a:latin typeface="Cambria Math" panose="02040503050406030204" pitchFamily="18" charset="0"/>
-                          <a:ea typeface="Cambria Math" panose="02040503050406030204" pitchFamily="18" charset="0"/>
-                        </a:rPr>
-                        <m:t>∅</m:t>
-                      </m:r>
-                    </m:oMath>
-                  </a14:m>
-                  <a:endParaRPr lang="en-US" dirty="0"/>
-                </a:p>
-              </p:txBody>
-            </p:sp>
-          </mc:Choice>
-          <mc:Fallback xmlns="">
-            <p:sp>
-              <p:nvSpPr>
-                <p:cNvPr id="118" name="TextBox 117">
-                  <a:extLst>
-                    <a:ext uri="{FF2B5EF4-FFF2-40B4-BE49-F238E27FC236}">
-                      <a16:creationId xmlns:a16="http://schemas.microsoft.com/office/drawing/2014/main" id="{DAB51B5B-165F-6E4C-9C8E-1DB5E972A147}"/>
-                    </a:ext>
-                  </a:extLst>
-                </p:cNvPr>
-                <p:cNvSpPr txBox="1">
-                  <a:spLocks noRot="1" noChangeAspect="1" noMove="1" noResize="1" noEditPoints="1" noAdjustHandles="1" noChangeArrowheads="1" noChangeShapeType="1" noTextEdit="1"/>
-                </p:cNvSpPr>
-                <p:nvPr/>
-              </p:nvSpPr>
-              <p:spPr>
-                <a:xfrm>
-                  <a:off x="11214298" y="592008"/>
-                  <a:ext cx="5052701" cy="705083"/>
-                </a:xfrm>
-                <a:prstGeom prst="rect">
-                  <a:avLst/>
-                </a:prstGeom>
-                <a:blipFill>
-                  <a:blip r:embed="rId10"/>
-                  <a:stretch>
-                    <a:fillRect l="-615" t="-3846" b="-13462"/>
+                    <a:fillRect l="-826" t="-7292" b="-9375"/>
                   </a:stretch>
                 </a:blipFill>
               </p:spPr>
@@ -19665,7 +19978,7 @@
     </p:spTree>
     <p:extLst>
       <p:ext uri="{BB962C8B-B14F-4D97-AF65-F5344CB8AC3E}">
-        <p14:creationId xmlns:p14="http://schemas.microsoft.com/office/powerpoint/2010/main" val="2463922579"/>
+        <p14:creationId xmlns:p14="http://schemas.microsoft.com/office/powerpoint/2010/main" val="1421810726"/>
       </p:ext>
     </p:extLst>
   </p:cSld>

</xml_diff>